<commit_message>
finished current type up
</commit_message>
<xml_diff>
--- a/Modelling/MyPAM Modelling.pptx
+++ b/Modelling/MyPAM Modelling.pptx
@@ -266,7 +266,7 @@
           <a:p>
             <a:fld id="{4DCC3765-A771-4BBA-8135-6F2E689117A7}" type="datetimeFigureOut">
               <a:rPr lang="en-GB" smtClean="0"/>
-              <a:t>16/10/2018</a:t>
+              <a:t>17/10/2018</a:t>
             </a:fld>
             <a:endParaRPr lang="en-GB"/>
           </a:p>
@@ -466,7 +466,7 @@
           <a:p>
             <a:fld id="{4DCC3765-A771-4BBA-8135-6F2E689117A7}" type="datetimeFigureOut">
               <a:rPr lang="en-GB" smtClean="0"/>
-              <a:t>16/10/2018</a:t>
+              <a:t>17/10/2018</a:t>
             </a:fld>
             <a:endParaRPr lang="en-GB"/>
           </a:p>
@@ -676,7 +676,7 @@
           <a:p>
             <a:fld id="{4DCC3765-A771-4BBA-8135-6F2E689117A7}" type="datetimeFigureOut">
               <a:rPr lang="en-GB" smtClean="0"/>
-              <a:t>16/10/2018</a:t>
+              <a:t>17/10/2018</a:t>
             </a:fld>
             <a:endParaRPr lang="en-GB"/>
           </a:p>
@@ -876,7 +876,7 @@
           <a:p>
             <a:fld id="{4DCC3765-A771-4BBA-8135-6F2E689117A7}" type="datetimeFigureOut">
               <a:rPr lang="en-GB" smtClean="0"/>
-              <a:t>16/10/2018</a:t>
+              <a:t>17/10/2018</a:t>
             </a:fld>
             <a:endParaRPr lang="en-GB"/>
           </a:p>
@@ -1152,7 +1152,7 @@
           <a:p>
             <a:fld id="{4DCC3765-A771-4BBA-8135-6F2E689117A7}" type="datetimeFigureOut">
               <a:rPr lang="en-GB" smtClean="0"/>
-              <a:t>16/10/2018</a:t>
+              <a:t>17/10/2018</a:t>
             </a:fld>
             <a:endParaRPr lang="en-GB"/>
           </a:p>
@@ -1420,7 +1420,7 @@
           <a:p>
             <a:fld id="{4DCC3765-A771-4BBA-8135-6F2E689117A7}" type="datetimeFigureOut">
               <a:rPr lang="en-GB" smtClean="0"/>
-              <a:t>16/10/2018</a:t>
+              <a:t>17/10/2018</a:t>
             </a:fld>
             <a:endParaRPr lang="en-GB"/>
           </a:p>
@@ -1835,7 +1835,7 @@
           <a:p>
             <a:fld id="{4DCC3765-A771-4BBA-8135-6F2E689117A7}" type="datetimeFigureOut">
               <a:rPr lang="en-GB" smtClean="0"/>
-              <a:t>16/10/2018</a:t>
+              <a:t>17/10/2018</a:t>
             </a:fld>
             <a:endParaRPr lang="en-GB"/>
           </a:p>
@@ -1977,7 +1977,7 @@
           <a:p>
             <a:fld id="{4DCC3765-A771-4BBA-8135-6F2E689117A7}" type="datetimeFigureOut">
               <a:rPr lang="en-GB" smtClean="0"/>
-              <a:t>16/10/2018</a:t>
+              <a:t>17/10/2018</a:t>
             </a:fld>
             <a:endParaRPr lang="en-GB"/>
           </a:p>
@@ -2090,7 +2090,7 @@
           <a:p>
             <a:fld id="{4DCC3765-A771-4BBA-8135-6F2E689117A7}" type="datetimeFigureOut">
               <a:rPr lang="en-GB" smtClean="0"/>
-              <a:t>16/10/2018</a:t>
+              <a:t>17/10/2018</a:t>
             </a:fld>
             <a:endParaRPr lang="en-GB"/>
           </a:p>
@@ -2403,7 +2403,7 @@
           <a:p>
             <a:fld id="{4DCC3765-A771-4BBA-8135-6F2E689117A7}" type="datetimeFigureOut">
               <a:rPr lang="en-GB" smtClean="0"/>
-              <a:t>16/10/2018</a:t>
+              <a:t>17/10/2018</a:t>
             </a:fld>
             <a:endParaRPr lang="en-GB"/>
           </a:p>
@@ -2692,7 +2692,7 @@
           <a:p>
             <a:fld id="{4DCC3765-A771-4BBA-8135-6F2E689117A7}" type="datetimeFigureOut">
               <a:rPr lang="en-GB" smtClean="0"/>
-              <a:t>16/10/2018</a:t>
+              <a:t>17/10/2018</a:t>
             </a:fld>
             <a:endParaRPr lang="en-GB"/>
           </a:p>
@@ -2935,7 +2935,7 @@
           <a:p>
             <a:fld id="{4DCC3765-A771-4BBA-8135-6F2E689117A7}" type="datetimeFigureOut">
               <a:rPr lang="en-GB" smtClean="0"/>
-              <a:t>16/10/2018</a:t>
+              <a:t>17/10/2018</a:t>
             </a:fld>
             <a:endParaRPr lang="en-GB"/>
           </a:p>
@@ -12572,8 +12572,8 @@
           </a:fontRef>
         </p:style>
       </p:cxnSp>
-      <mc:AlternateContent xmlns:mc="http://schemas.openxmlformats.org/markup-compatibility/2006">
-        <mc:Choice xmlns:a14="http://schemas.microsoft.com/office/drawing/2010/main" Requires="a14">
+      <mc:AlternateContent xmlns:mc="http://schemas.openxmlformats.org/markup-compatibility/2006" xmlns:a14="http://schemas.microsoft.com/office/drawing/2010/main">
+        <mc:Choice Requires="a14">
           <p:sp>
             <p:nvSpPr>
               <p:cNvPr id="140" name="TextBox 139">
@@ -12643,7 +12643,7 @@
             </p:txBody>
           </p:sp>
         </mc:Choice>
-        <mc:Fallback>
+        <mc:Fallback xmlns="">
           <p:sp>
             <p:nvSpPr>
               <p:cNvPr id="140" name="TextBox 139">
@@ -12846,8 +12846,8 @@
           </a:fontRef>
         </p:style>
       </p:cxnSp>
-      <mc:AlternateContent xmlns:mc="http://schemas.openxmlformats.org/markup-compatibility/2006">
-        <mc:Choice xmlns:a14="http://schemas.microsoft.com/office/drawing/2010/main" Requires="a14">
+      <mc:AlternateContent xmlns:mc="http://schemas.openxmlformats.org/markup-compatibility/2006" xmlns:a14="http://schemas.microsoft.com/office/drawing/2010/main">
+        <mc:Choice Requires="a14">
           <p:sp>
             <p:nvSpPr>
               <p:cNvPr id="142" name="TextBox 141">
@@ -12917,7 +12917,7 @@
             </p:txBody>
           </p:sp>
         </mc:Choice>
-        <mc:Fallback>
+        <mc:Fallback xmlns="">
           <p:sp>
             <p:nvSpPr>
               <p:cNvPr id="142" name="TextBox 141">

</xml_diff>

<commit_message>
finalised working servo lab code
</commit_message>
<xml_diff>
--- a/Modelling/MyPAM Modelling.pptx
+++ b/Modelling/MyPAM Modelling.pptx
@@ -11,6 +11,7 @@
     <p:sldId id="259" r:id="rId5"/>
     <p:sldId id="260" r:id="rId6"/>
     <p:sldId id="261" r:id="rId7"/>
+    <p:sldId id="262" r:id="rId8"/>
   </p:sldIdLst>
   <p:sldSz cx="12192000" cy="6858000"/>
   <p:notesSz cx="6858000" cy="9144000"/>
@@ -266,7 +267,7 @@
           <a:p>
             <a:fld id="{4DCC3765-A771-4BBA-8135-6F2E689117A7}" type="datetimeFigureOut">
               <a:rPr lang="en-GB" smtClean="0"/>
-              <a:t>17/10/2018</a:t>
+              <a:t>18/10/2018</a:t>
             </a:fld>
             <a:endParaRPr lang="en-GB"/>
           </a:p>
@@ -466,7 +467,7 @@
           <a:p>
             <a:fld id="{4DCC3765-A771-4BBA-8135-6F2E689117A7}" type="datetimeFigureOut">
               <a:rPr lang="en-GB" smtClean="0"/>
-              <a:t>17/10/2018</a:t>
+              <a:t>18/10/2018</a:t>
             </a:fld>
             <a:endParaRPr lang="en-GB"/>
           </a:p>
@@ -676,7 +677,7 @@
           <a:p>
             <a:fld id="{4DCC3765-A771-4BBA-8135-6F2E689117A7}" type="datetimeFigureOut">
               <a:rPr lang="en-GB" smtClean="0"/>
-              <a:t>17/10/2018</a:t>
+              <a:t>18/10/2018</a:t>
             </a:fld>
             <a:endParaRPr lang="en-GB"/>
           </a:p>
@@ -876,7 +877,7 @@
           <a:p>
             <a:fld id="{4DCC3765-A771-4BBA-8135-6F2E689117A7}" type="datetimeFigureOut">
               <a:rPr lang="en-GB" smtClean="0"/>
-              <a:t>17/10/2018</a:t>
+              <a:t>18/10/2018</a:t>
             </a:fld>
             <a:endParaRPr lang="en-GB"/>
           </a:p>
@@ -1152,7 +1153,7 @@
           <a:p>
             <a:fld id="{4DCC3765-A771-4BBA-8135-6F2E689117A7}" type="datetimeFigureOut">
               <a:rPr lang="en-GB" smtClean="0"/>
-              <a:t>17/10/2018</a:t>
+              <a:t>18/10/2018</a:t>
             </a:fld>
             <a:endParaRPr lang="en-GB"/>
           </a:p>
@@ -1420,7 +1421,7 @@
           <a:p>
             <a:fld id="{4DCC3765-A771-4BBA-8135-6F2E689117A7}" type="datetimeFigureOut">
               <a:rPr lang="en-GB" smtClean="0"/>
-              <a:t>17/10/2018</a:t>
+              <a:t>18/10/2018</a:t>
             </a:fld>
             <a:endParaRPr lang="en-GB"/>
           </a:p>
@@ -1835,7 +1836,7 @@
           <a:p>
             <a:fld id="{4DCC3765-A771-4BBA-8135-6F2E689117A7}" type="datetimeFigureOut">
               <a:rPr lang="en-GB" smtClean="0"/>
-              <a:t>17/10/2018</a:t>
+              <a:t>18/10/2018</a:t>
             </a:fld>
             <a:endParaRPr lang="en-GB"/>
           </a:p>
@@ -1977,7 +1978,7 @@
           <a:p>
             <a:fld id="{4DCC3765-A771-4BBA-8135-6F2E689117A7}" type="datetimeFigureOut">
               <a:rPr lang="en-GB" smtClean="0"/>
-              <a:t>17/10/2018</a:t>
+              <a:t>18/10/2018</a:t>
             </a:fld>
             <a:endParaRPr lang="en-GB"/>
           </a:p>
@@ -2090,7 +2091,7 @@
           <a:p>
             <a:fld id="{4DCC3765-A771-4BBA-8135-6F2E689117A7}" type="datetimeFigureOut">
               <a:rPr lang="en-GB" smtClean="0"/>
-              <a:t>17/10/2018</a:t>
+              <a:t>18/10/2018</a:t>
             </a:fld>
             <a:endParaRPr lang="en-GB"/>
           </a:p>
@@ -2403,7 +2404,7 @@
           <a:p>
             <a:fld id="{4DCC3765-A771-4BBA-8135-6F2E689117A7}" type="datetimeFigureOut">
               <a:rPr lang="en-GB" smtClean="0"/>
-              <a:t>17/10/2018</a:t>
+              <a:t>18/10/2018</a:t>
             </a:fld>
             <a:endParaRPr lang="en-GB"/>
           </a:p>
@@ -2692,7 +2693,7 @@
           <a:p>
             <a:fld id="{4DCC3765-A771-4BBA-8135-6F2E689117A7}" type="datetimeFigureOut">
               <a:rPr lang="en-GB" smtClean="0"/>
-              <a:t>17/10/2018</a:t>
+              <a:t>18/10/2018</a:t>
             </a:fld>
             <a:endParaRPr lang="en-GB"/>
           </a:p>
@@ -2935,7 +2936,7 @@
           <a:p>
             <a:fld id="{4DCC3765-A771-4BBA-8135-6F2E689117A7}" type="datetimeFigureOut">
               <a:rPr lang="en-GB" smtClean="0"/>
-              <a:t>17/10/2018</a:t>
+              <a:t>18/10/2018</a:t>
             </a:fld>
             <a:endParaRPr lang="en-GB"/>
           </a:p>
@@ -13053,6 +13054,290 @@
 </p:sld>
 </file>
 
+<file path=ppt/slides/slide7.xml><?xml version="1.0" encoding="utf-8"?>
+<p:sld xmlns:a="http://schemas.openxmlformats.org/drawingml/2006/main" xmlns:r="http://schemas.openxmlformats.org/officeDocument/2006/relationships" xmlns:p="http://schemas.openxmlformats.org/presentationml/2006/main">
+  <p:cSld>
+    <p:spTree>
+      <p:nvGrpSpPr>
+        <p:cNvPr id="1" name=""/>
+        <p:cNvGrpSpPr/>
+        <p:nvPr/>
+      </p:nvGrpSpPr>
+      <p:grpSpPr>
+        <a:xfrm>
+          <a:off x="0" y="0"/>
+          <a:ext cx="0" cy="0"/>
+          <a:chOff x="0" y="0"/>
+          <a:chExt cx="0" cy="0"/>
+        </a:xfrm>
+      </p:grpSpPr>
+      <p:cxnSp>
+        <p:nvCxnSpPr>
+          <p:cNvPr id="7" name="Straight Arrow Connector 6">
+            <a:extLst>
+              <a:ext uri="{FF2B5EF4-FFF2-40B4-BE49-F238E27FC236}">
+                <a16:creationId xmlns:a16="http://schemas.microsoft.com/office/drawing/2014/main" id="{57E55105-493C-4139-8438-EBF7332E5D82}"/>
+              </a:ext>
+            </a:extLst>
+          </p:cNvPr>
+          <p:cNvCxnSpPr>
+            <a:cxnSpLocks/>
+          </p:cNvCxnSpPr>
+          <p:nvPr/>
+        </p:nvCxnSpPr>
+        <p:spPr>
+          <a:xfrm flipV="1">
+            <a:off x="4081670" y="1630017"/>
+            <a:ext cx="2372139" cy="1961322"/>
+          </a:xfrm>
+          <a:prstGeom prst="straightConnector1">
+            <a:avLst/>
+          </a:prstGeom>
+          <a:ln w="38100">
+            <a:solidFill>
+              <a:schemeClr val="tx1"/>
+            </a:solidFill>
+            <a:tailEnd type="triangle"/>
+          </a:ln>
+        </p:spPr>
+        <p:style>
+          <a:lnRef idx="1">
+            <a:schemeClr val="accent1"/>
+          </a:lnRef>
+          <a:fillRef idx="0">
+            <a:schemeClr val="accent1"/>
+          </a:fillRef>
+          <a:effectRef idx="0">
+            <a:schemeClr val="accent1"/>
+          </a:effectRef>
+          <a:fontRef idx="minor">
+            <a:schemeClr val="tx1"/>
+          </a:fontRef>
+        </p:style>
+      </p:cxnSp>
+      <p:sp>
+        <p:nvSpPr>
+          <p:cNvPr id="10" name="Oval 9">
+            <a:extLst>
+              <a:ext uri="{FF2B5EF4-FFF2-40B4-BE49-F238E27FC236}">
+                <a16:creationId xmlns:a16="http://schemas.microsoft.com/office/drawing/2014/main" id="{CAFC9641-4588-4ED7-AAC2-C1EA4F3A692F}"/>
+              </a:ext>
+            </a:extLst>
+          </p:cNvPr>
+          <p:cNvSpPr/>
+          <p:nvPr/>
+        </p:nvSpPr>
+        <p:spPr>
+          <a:xfrm>
+            <a:off x="6453809" y="1470991"/>
+            <a:ext cx="159026" cy="159026"/>
+          </a:xfrm>
+          <a:prstGeom prst="ellipse">
+            <a:avLst/>
+          </a:prstGeom>
+          <a:solidFill>
+            <a:schemeClr val="tx1"/>
+          </a:solidFill>
+          <a:ln>
+            <a:solidFill>
+              <a:schemeClr val="tx1"/>
+            </a:solidFill>
+          </a:ln>
+        </p:spPr>
+        <p:style>
+          <a:lnRef idx="2">
+            <a:schemeClr val="accent1">
+              <a:shade val="50000"/>
+            </a:schemeClr>
+          </a:lnRef>
+          <a:fillRef idx="1">
+            <a:schemeClr val="accent1"/>
+          </a:fillRef>
+          <a:effectRef idx="0">
+            <a:schemeClr val="accent1"/>
+          </a:effectRef>
+          <a:fontRef idx="minor">
+            <a:schemeClr val="lt1"/>
+          </a:fontRef>
+        </p:style>
+        <p:txBody>
+          <a:bodyPr rtlCol="0" anchor="ctr"/>
+          <a:lstStyle/>
+          <a:p>
+            <a:pPr algn="ctr"/>
+            <a:endParaRPr lang="en-GB"/>
+          </a:p>
+        </p:txBody>
+      </p:sp>
+      <p:sp>
+        <p:nvSpPr>
+          <p:cNvPr id="11" name="Oval 10">
+            <a:extLst>
+              <a:ext uri="{FF2B5EF4-FFF2-40B4-BE49-F238E27FC236}">
+                <a16:creationId xmlns:a16="http://schemas.microsoft.com/office/drawing/2014/main" id="{1BF5641C-3C21-448F-8797-6836EEC653D8}"/>
+              </a:ext>
+            </a:extLst>
+          </p:cNvPr>
+          <p:cNvSpPr/>
+          <p:nvPr/>
+        </p:nvSpPr>
+        <p:spPr>
+          <a:xfrm>
+            <a:off x="3922644" y="3591339"/>
+            <a:ext cx="159026" cy="159026"/>
+          </a:xfrm>
+          <a:prstGeom prst="ellipse">
+            <a:avLst/>
+          </a:prstGeom>
+          <a:solidFill>
+            <a:schemeClr val="tx1"/>
+          </a:solidFill>
+          <a:ln>
+            <a:solidFill>
+              <a:schemeClr val="tx1"/>
+            </a:solidFill>
+          </a:ln>
+        </p:spPr>
+        <p:style>
+          <a:lnRef idx="2">
+            <a:schemeClr val="accent1">
+              <a:shade val="50000"/>
+            </a:schemeClr>
+          </a:lnRef>
+          <a:fillRef idx="1">
+            <a:schemeClr val="accent1"/>
+          </a:fillRef>
+          <a:effectRef idx="0">
+            <a:schemeClr val="accent1"/>
+          </a:effectRef>
+          <a:fontRef idx="minor">
+            <a:schemeClr val="lt1"/>
+          </a:fontRef>
+        </p:style>
+        <p:txBody>
+          <a:bodyPr rtlCol="0" anchor="ctr"/>
+          <a:lstStyle/>
+          <a:p>
+            <a:pPr algn="ctr"/>
+            <a:endParaRPr lang="en-GB"/>
+          </a:p>
+        </p:txBody>
+      </p:sp>
+      <p:sp>
+        <p:nvSpPr>
+          <p:cNvPr id="12" name="TextBox 11">
+            <a:extLst>
+              <a:ext uri="{FF2B5EF4-FFF2-40B4-BE49-F238E27FC236}">
+                <a16:creationId xmlns:a16="http://schemas.microsoft.com/office/drawing/2014/main" id="{6016BDA9-E60B-4F35-B418-9C3FAB12A079}"/>
+              </a:ext>
+            </a:extLst>
+          </p:cNvPr>
+          <p:cNvSpPr txBox="1"/>
+          <p:nvPr/>
+        </p:nvSpPr>
+        <p:spPr>
+          <a:xfrm>
+            <a:off x="6533322" y="1365838"/>
+            <a:ext cx="744114" cy="369332"/>
+          </a:xfrm>
+          <a:prstGeom prst="rect">
+            <a:avLst/>
+          </a:prstGeom>
+          <a:noFill/>
+        </p:spPr>
+        <p:txBody>
+          <a:bodyPr wrap="none" rtlCol="0">
+            <a:spAutoFit/>
+          </a:bodyPr>
+          <a:lstStyle/>
+          <a:p>
+            <a:r>
+              <a:rPr lang="en-GB" dirty="0"/>
+              <a:t>(x</a:t>
+            </a:r>
+            <a:r>
+              <a:rPr lang="en-GB" baseline="-25000" dirty="0"/>
+              <a:t>2</a:t>
+            </a:r>
+            <a:r>
+              <a:rPr lang="en-GB" dirty="0"/>
+              <a:t>,y</a:t>
+            </a:r>
+            <a:r>
+              <a:rPr lang="en-GB" baseline="-25000" dirty="0"/>
+              <a:t>2</a:t>
+            </a:r>
+            <a:r>
+              <a:rPr lang="en-GB" dirty="0"/>
+              <a:t>)</a:t>
+            </a:r>
+          </a:p>
+        </p:txBody>
+      </p:sp>
+      <p:sp>
+        <p:nvSpPr>
+          <p:cNvPr id="13" name="TextBox 12">
+            <a:extLst>
+              <a:ext uri="{FF2B5EF4-FFF2-40B4-BE49-F238E27FC236}">
+                <a16:creationId xmlns:a16="http://schemas.microsoft.com/office/drawing/2014/main" id="{B3278473-2F92-43B5-8524-037821D27695}"/>
+              </a:ext>
+            </a:extLst>
+          </p:cNvPr>
+          <p:cNvSpPr txBox="1"/>
+          <p:nvPr/>
+        </p:nvSpPr>
+        <p:spPr>
+          <a:xfrm>
+            <a:off x="3258043" y="3486186"/>
+            <a:ext cx="744114" cy="369332"/>
+          </a:xfrm>
+          <a:prstGeom prst="rect">
+            <a:avLst/>
+          </a:prstGeom>
+          <a:noFill/>
+        </p:spPr>
+        <p:txBody>
+          <a:bodyPr wrap="none" rtlCol="0">
+            <a:spAutoFit/>
+          </a:bodyPr>
+          <a:lstStyle/>
+          <a:p>
+            <a:r>
+              <a:rPr lang="en-GB" dirty="0"/>
+              <a:t>(x</a:t>
+            </a:r>
+            <a:r>
+              <a:rPr lang="en-GB" baseline="-25000" dirty="0"/>
+              <a:t>1</a:t>
+            </a:r>
+            <a:r>
+              <a:rPr lang="en-GB" dirty="0"/>
+              <a:t>,y</a:t>
+            </a:r>
+            <a:r>
+              <a:rPr lang="en-GB" baseline="-25000" dirty="0"/>
+              <a:t>1</a:t>
+            </a:r>
+            <a:r>
+              <a:rPr lang="en-GB" dirty="0"/>
+              <a:t>)</a:t>
+            </a:r>
+          </a:p>
+        </p:txBody>
+      </p:sp>
+    </p:spTree>
+    <p:extLst>
+      <p:ext uri="{BB962C8B-B14F-4D97-AF65-F5344CB8AC3E}">
+        <p14:creationId xmlns:p14="http://schemas.microsoft.com/office/powerpoint/2010/main" val="3411474013"/>
+      </p:ext>
+    </p:extLst>
+  </p:cSld>
+  <p:clrMapOvr>
+    <a:masterClrMapping/>
+  </p:clrMapOvr>
+</p:sld>
+</file>
+
 <file path=ppt/theme/theme1.xml><?xml version="1.0" encoding="utf-8"?>
 <a:theme xmlns:a="http://schemas.openxmlformats.org/drawingml/2006/main" name="Office Theme">
   <a:themeElements>

</xml_diff>

<commit_message>
did a shed load of work
</commit_message>
<xml_diff>
--- a/Modelling/MyPAM Modelling.pptx
+++ b/Modelling/MyPAM Modelling.pptx
@@ -12,6 +12,8 @@
     <p:sldId id="260" r:id="rId6"/>
     <p:sldId id="261" r:id="rId7"/>
     <p:sldId id="262" r:id="rId8"/>
+    <p:sldId id="263" r:id="rId9"/>
+    <p:sldId id="264" r:id="rId10"/>
   </p:sldIdLst>
   <p:sldSz cx="12192000" cy="6858000"/>
   <p:notesSz cx="6858000" cy="9144000"/>
@@ -267,7 +269,7 @@
           <a:p>
             <a:fld id="{4DCC3765-A771-4BBA-8135-6F2E689117A7}" type="datetimeFigureOut">
               <a:rPr lang="en-GB" smtClean="0"/>
-              <a:t>18/10/2018</a:t>
+              <a:t>19/11/2018</a:t>
             </a:fld>
             <a:endParaRPr lang="en-GB"/>
           </a:p>
@@ -467,7 +469,7 @@
           <a:p>
             <a:fld id="{4DCC3765-A771-4BBA-8135-6F2E689117A7}" type="datetimeFigureOut">
               <a:rPr lang="en-GB" smtClean="0"/>
-              <a:t>18/10/2018</a:t>
+              <a:t>19/11/2018</a:t>
             </a:fld>
             <a:endParaRPr lang="en-GB"/>
           </a:p>
@@ -677,7 +679,7 @@
           <a:p>
             <a:fld id="{4DCC3765-A771-4BBA-8135-6F2E689117A7}" type="datetimeFigureOut">
               <a:rPr lang="en-GB" smtClean="0"/>
-              <a:t>18/10/2018</a:t>
+              <a:t>19/11/2018</a:t>
             </a:fld>
             <a:endParaRPr lang="en-GB"/>
           </a:p>
@@ -877,7 +879,7 @@
           <a:p>
             <a:fld id="{4DCC3765-A771-4BBA-8135-6F2E689117A7}" type="datetimeFigureOut">
               <a:rPr lang="en-GB" smtClean="0"/>
-              <a:t>18/10/2018</a:t>
+              <a:t>19/11/2018</a:t>
             </a:fld>
             <a:endParaRPr lang="en-GB"/>
           </a:p>
@@ -1153,7 +1155,7 @@
           <a:p>
             <a:fld id="{4DCC3765-A771-4BBA-8135-6F2E689117A7}" type="datetimeFigureOut">
               <a:rPr lang="en-GB" smtClean="0"/>
-              <a:t>18/10/2018</a:t>
+              <a:t>19/11/2018</a:t>
             </a:fld>
             <a:endParaRPr lang="en-GB"/>
           </a:p>
@@ -1421,7 +1423,7 @@
           <a:p>
             <a:fld id="{4DCC3765-A771-4BBA-8135-6F2E689117A7}" type="datetimeFigureOut">
               <a:rPr lang="en-GB" smtClean="0"/>
-              <a:t>18/10/2018</a:t>
+              <a:t>19/11/2018</a:t>
             </a:fld>
             <a:endParaRPr lang="en-GB"/>
           </a:p>
@@ -1836,7 +1838,7 @@
           <a:p>
             <a:fld id="{4DCC3765-A771-4BBA-8135-6F2E689117A7}" type="datetimeFigureOut">
               <a:rPr lang="en-GB" smtClean="0"/>
-              <a:t>18/10/2018</a:t>
+              <a:t>19/11/2018</a:t>
             </a:fld>
             <a:endParaRPr lang="en-GB"/>
           </a:p>
@@ -1978,7 +1980,7 @@
           <a:p>
             <a:fld id="{4DCC3765-A771-4BBA-8135-6F2E689117A7}" type="datetimeFigureOut">
               <a:rPr lang="en-GB" smtClean="0"/>
-              <a:t>18/10/2018</a:t>
+              <a:t>19/11/2018</a:t>
             </a:fld>
             <a:endParaRPr lang="en-GB"/>
           </a:p>
@@ -2091,7 +2093,7 @@
           <a:p>
             <a:fld id="{4DCC3765-A771-4BBA-8135-6F2E689117A7}" type="datetimeFigureOut">
               <a:rPr lang="en-GB" smtClean="0"/>
-              <a:t>18/10/2018</a:t>
+              <a:t>19/11/2018</a:t>
             </a:fld>
             <a:endParaRPr lang="en-GB"/>
           </a:p>
@@ -2404,7 +2406,7 @@
           <a:p>
             <a:fld id="{4DCC3765-A771-4BBA-8135-6F2E689117A7}" type="datetimeFigureOut">
               <a:rPr lang="en-GB" smtClean="0"/>
-              <a:t>18/10/2018</a:t>
+              <a:t>19/11/2018</a:t>
             </a:fld>
             <a:endParaRPr lang="en-GB"/>
           </a:p>
@@ -2693,7 +2695,7 @@
           <a:p>
             <a:fld id="{4DCC3765-A771-4BBA-8135-6F2E689117A7}" type="datetimeFigureOut">
               <a:rPr lang="en-GB" smtClean="0"/>
-              <a:t>18/10/2018</a:t>
+              <a:t>19/11/2018</a:t>
             </a:fld>
             <a:endParaRPr lang="en-GB"/>
           </a:p>
@@ -2936,7 +2938,7 @@
           <a:p>
             <a:fld id="{4DCC3765-A771-4BBA-8135-6F2E689117A7}" type="datetimeFigureOut">
               <a:rPr lang="en-GB" smtClean="0"/>
-              <a:t>18/10/2018</a:t>
+              <a:t>19/11/2018</a:t>
             </a:fld>
             <a:endParaRPr lang="en-GB"/>
           </a:p>
@@ -13338,6 +13340,2944 @@
 </p:sld>
 </file>
 
+<file path=ppt/slides/slide8.xml><?xml version="1.0" encoding="utf-8"?>
+<p:sld xmlns:a="http://schemas.openxmlformats.org/drawingml/2006/main" xmlns:r="http://schemas.openxmlformats.org/officeDocument/2006/relationships" xmlns:p="http://schemas.openxmlformats.org/presentationml/2006/main">
+  <p:cSld>
+    <p:spTree>
+      <p:nvGrpSpPr>
+        <p:cNvPr id="1" name=""/>
+        <p:cNvGrpSpPr/>
+        <p:nvPr/>
+      </p:nvGrpSpPr>
+      <p:grpSpPr>
+        <a:xfrm>
+          <a:off x="0" y="0"/>
+          <a:ext cx="0" cy="0"/>
+          <a:chOff x="0" y="0"/>
+          <a:chExt cx="0" cy="0"/>
+        </a:xfrm>
+      </p:grpSpPr>
+      <p:grpSp>
+        <p:nvGrpSpPr>
+          <p:cNvPr id="86" name="Group 85">
+            <a:extLst>
+              <a:ext uri="{FF2B5EF4-FFF2-40B4-BE49-F238E27FC236}">
+                <a16:creationId xmlns:a16="http://schemas.microsoft.com/office/drawing/2014/main" id="{67A3B2BF-9F4A-4817-B0EF-B23F81389E82}"/>
+              </a:ext>
+            </a:extLst>
+          </p:cNvPr>
+          <p:cNvGrpSpPr/>
+          <p:nvPr/>
+        </p:nvGrpSpPr>
+        <p:grpSpPr>
+          <a:xfrm>
+            <a:off x="1325216" y="2160105"/>
+            <a:ext cx="9325119" cy="2537791"/>
+            <a:chOff x="1325216" y="2160105"/>
+            <a:chExt cx="9325119" cy="2537791"/>
+          </a:xfrm>
+        </p:grpSpPr>
+        <p:grpSp>
+          <p:nvGrpSpPr>
+            <p:cNvPr id="45" name="Group 44">
+              <a:extLst>
+                <a:ext uri="{FF2B5EF4-FFF2-40B4-BE49-F238E27FC236}">
+                  <a16:creationId xmlns:a16="http://schemas.microsoft.com/office/drawing/2014/main" id="{2E8664C7-41BF-4511-9515-F1275BA6BA5D}"/>
+                </a:ext>
+              </a:extLst>
+            </p:cNvPr>
+            <p:cNvGrpSpPr/>
+            <p:nvPr/>
+          </p:nvGrpSpPr>
+          <p:grpSpPr>
+            <a:xfrm>
+              <a:off x="1325216" y="2160105"/>
+              <a:ext cx="9325119" cy="2537791"/>
+              <a:chOff x="1484241" y="2027583"/>
+              <a:chExt cx="9325119" cy="2537791"/>
+            </a:xfrm>
+          </p:grpSpPr>
+          <p:sp>
+            <p:nvSpPr>
+              <p:cNvPr id="4" name="Rectangle 3">
+                <a:extLst>
+                  <a:ext uri="{FF2B5EF4-FFF2-40B4-BE49-F238E27FC236}">
+                    <a16:creationId xmlns:a16="http://schemas.microsoft.com/office/drawing/2014/main" id="{88A54850-1F68-45B3-A6EF-0FC5B6CCC094}"/>
+                  </a:ext>
+                </a:extLst>
+              </p:cNvPr>
+              <p:cNvSpPr/>
+              <p:nvPr/>
+            </p:nvSpPr>
+            <p:spPr>
+              <a:xfrm>
+                <a:off x="1484241" y="2030896"/>
+                <a:ext cx="1073427" cy="911087"/>
+              </a:xfrm>
+              <a:prstGeom prst="rect">
+                <a:avLst/>
+              </a:prstGeom>
+            </p:spPr>
+            <p:style>
+              <a:lnRef idx="2">
+                <a:schemeClr val="dk1"/>
+              </a:lnRef>
+              <a:fillRef idx="1">
+                <a:schemeClr val="lt1"/>
+              </a:fillRef>
+              <a:effectRef idx="0">
+                <a:schemeClr val="dk1"/>
+              </a:effectRef>
+              <a:fontRef idx="minor">
+                <a:schemeClr val="dk1"/>
+              </a:fontRef>
+            </p:style>
+            <p:txBody>
+              <a:bodyPr rtlCol="0" anchor="ctr"/>
+              <a:lstStyle/>
+              <a:p>
+                <a:pPr algn="ctr"/>
+                <a:r>
+                  <a:rPr lang="en-GB" dirty="0"/>
+                  <a:t>Desired</a:t>
+                </a:r>
+              </a:p>
+              <a:p>
+                <a:pPr algn="ctr"/>
+                <a:r>
+                  <a:rPr lang="en-GB" dirty="0"/>
+                  <a:t>Global</a:t>
+                </a:r>
+              </a:p>
+              <a:p>
+                <a:pPr algn="ctr"/>
+                <a:r>
+                  <a:rPr lang="en-GB" dirty="0"/>
+                  <a:t>Positions</a:t>
+                </a:r>
+              </a:p>
+            </p:txBody>
+          </p:sp>
+          <p:sp>
+            <p:nvSpPr>
+              <p:cNvPr id="5" name="Rectangle 4">
+                <a:extLst>
+                  <a:ext uri="{FF2B5EF4-FFF2-40B4-BE49-F238E27FC236}">
+                    <a16:creationId xmlns:a16="http://schemas.microsoft.com/office/drawing/2014/main" id="{F7A7768B-17CD-48DB-A6C4-13DAB6366245}"/>
+                  </a:ext>
+                </a:extLst>
+              </p:cNvPr>
+              <p:cNvSpPr/>
+              <p:nvPr/>
+            </p:nvSpPr>
+            <p:spPr>
+              <a:xfrm>
+                <a:off x="3339547" y="2027583"/>
+                <a:ext cx="1232453" cy="914400"/>
+              </a:xfrm>
+              <a:prstGeom prst="rect">
+                <a:avLst/>
+              </a:prstGeom>
+            </p:spPr>
+            <p:style>
+              <a:lnRef idx="2">
+                <a:schemeClr val="dk1"/>
+              </a:lnRef>
+              <a:fillRef idx="1">
+                <a:schemeClr val="lt1"/>
+              </a:fillRef>
+              <a:effectRef idx="0">
+                <a:schemeClr val="dk1"/>
+              </a:effectRef>
+              <a:fontRef idx="minor">
+                <a:schemeClr val="dk1"/>
+              </a:fontRef>
+            </p:style>
+            <p:txBody>
+              <a:bodyPr rtlCol="0" anchor="ctr"/>
+              <a:lstStyle/>
+              <a:p>
+                <a:pPr algn="ctr"/>
+                <a:r>
+                  <a:rPr lang="en-GB" dirty="0"/>
+                  <a:t>Inverse</a:t>
+                </a:r>
+              </a:p>
+              <a:p>
+                <a:pPr algn="ctr"/>
+                <a:r>
+                  <a:rPr lang="en-GB" dirty="0"/>
+                  <a:t>Kinematics</a:t>
+                </a:r>
+              </a:p>
+            </p:txBody>
+          </p:sp>
+          <p:cxnSp>
+            <p:nvCxnSpPr>
+              <p:cNvPr id="7" name="Straight Arrow Connector 6">
+                <a:extLst>
+                  <a:ext uri="{FF2B5EF4-FFF2-40B4-BE49-F238E27FC236}">
+                    <a16:creationId xmlns:a16="http://schemas.microsoft.com/office/drawing/2014/main" id="{B3906CC6-C01B-46D7-A6C7-8935E58F110F}"/>
+                  </a:ext>
+                </a:extLst>
+              </p:cNvPr>
+              <p:cNvCxnSpPr>
+                <a:cxnSpLocks/>
+                <a:stCxn id="4" idx="3"/>
+                <a:endCxn id="5" idx="1"/>
+              </p:cNvCxnSpPr>
+              <p:nvPr/>
+            </p:nvCxnSpPr>
+            <p:spPr>
+              <a:xfrm flipV="1">
+                <a:off x="2557668" y="2484783"/>
+                <a:ext cx="781879" cy="1657"/>
+              </a:xfrm>
+              <a:prstGeom prst="straightConnector1">
+                <a:avLst/>
+              </a:prstGeom>
+              <a:ln>
+                <a:tailEnd type="triangle"/>
+              </a:ln>
+            </p:spPr>
+            <p:style>
+              <a:lnRef idx="1">
+                <a:schemeClr val="dk1"/>
+              </a:lnRef>
+              <a:fillRef idx="0">
+                <a:schemeClr val="dk1"/>
+              </a:fillRef>
+              <a:effectRef idx="0">
+                <a:schemeClr val="dk1"/>
+              </a:effectRef>
+              <a:fontRef idx="minor">
+                <a:schemeClr val="tx1"/>
+              </a:fontRef>
+            </p:style>
+          </p:cxnSp>
+          <p:sp>
+            <p:nvSpPr>
+              <p:cNvPr id="11" name="Rectangle 10">
+                <a:extLst>
+                  <a:ext uri="{FF2B5EF4-FFF2-40B4-BE49-F238E27FC236}">
+                    <a16:creationId xmlns:a16="http://schemas.microsoft.com/office/drawing/2014/main" id="{572F815B-5DC8-4020-9CB6-F4E6F565EF79}"/>
+                  </a:ext>
+                </a:extLst>
+              </p:cNvPr>
+              <p:cNvSpPr/>
+              <p:nvPr/>
+            </p:nvSpPr>
+            <p:spPr>
+              <a:xfrm>
+                <a:off x="6705601" y="2027583"/>
+                <a:ext cx="1232453" cy="914400"/>
+              </a:xfrm>
+              <a:prstGeom prst="rect">
+                <a:avLst/>
+              </a:prstGeom>
+            </p:spPr>
+            <p:style>
+              <a:lnRef idx="2">
+                <a:schemeClr val="dk1"/>
+              </a:lnRef>
+              <a:fillRef idx="1">
+                <a:schemeClr val="lt1"/>
+              </a:fillRef>
+              <a:effectRef idx="0">
+                <a:schemeClr val="dk1"/>
+              </a:effectRef>
+              <a:fontRef idx="minor">
+                <a:schemeClr val="dk1"/>
+              </a:fontRef>
+            </p:style>
+            <p:txBody>
+              <a:bodyPr rtlCol="0" anchor="ctr"/>
+              <a:lstStyle/>
+              <a:p>
+                <a:pPr algn="ctr"/>
+                <a:r>
+                  <a:rPr lang="en-GB" dirty="0"/>
+                  <a:t>PID Joint</a:t>
+                </a:r>
+              </a:p>
+              <a:p>
+                <a:pPr algn="ctr"/>
+                <a:r>
+                  <a:rPr lang="en-GB" dirty="0"/>
+                  <a:t>Position</a:t>
+                </a:r>
+              </a:p>
+              <a:p>
+                <a:pPr algn="ctr"/>
+                <a:r>
+                  <a:rPr lang="en-GB" dirty="0"/>
+                  <a:t>Controllers</a:t>
+                </a:r>
+              </a:p>
+            </p:txBody>
+          </p:sp>
+          <p:sp>
+            <p:nvSpPr>
+              <p:cNvPr id="13" name="Rectangle 12">
+                <a:extLst>
+                  <a:ext uri="{FF2B5EF4-FFF2-40B4-BE49-F238E27FC236}">
+                    <a16:creationId xmlns:a16="http://schemas.microsoft.com/office/drawing/2014/main" id="{BACA8FC3-552C-4BE9-9711-E440C7D96EDE}"/>
+                  </a:ext>
+                </a:extLst>
+              </p:cNvPr>
+              <p:cNvSpPr/>
+              <p:nvPr/>
+            </p:nvSpPr>
+            <p:spPr>
+              <a:xfrm>
+                <a:off x="8719933" y="2027583"/>
+                <a:ext cx="1232453" cy="914400"/>
+              </a:xfrm>
+              <a:prstGeom prst="rect">
+                <a:avLst/>
+              </a:prstGeom>
+            </p:spPr>
+            <p:style>
+              <a:lnRef idx="2">
+                <a:schemeClr val="dk1"/>
+              </a:lnRef>
+              <a:fillRef idx="1">
+                <a:schemeClr val="lt1"/>
+              </a:fillRef>
+              <a:effectRef idx="0">
+                <a:schemeClr val="dk1"/>
+              </a:effectRef>
+              <a:fontRef idx="minor">
+                <a:schemeClr val="dk1"/>
+              </a:fontRef>
+            </p:style>
+            <p:txBody>
+              <a:bodyPr rtlCol="0" anchor="ctr"/>
+              <a:lstStyle/>
+              <a:p>
+                <a:pPr algn="ctr"/>
+                <a:r>
+                  <a:rPr lang="en-GB" dirty="0"/>
+                  <a:t>Plant</a:t>
+                </a:r>
+              </a:p>
+            </p:txBody>
+          </p:sp>
+          <p:cxnSp>
+            <p:nvCxnSpPr>
+              <p:cNvPr id="16" name="Straight Arrow Connector 15">
+                <a:extLst>
+                  <a:ext uri="{FF2B5EF4-FFF2-40B4-BE49-F238E27FC236}">
+                    <a16:creationId xmlns:a16="http://schemas.microsoft.com/office/drawing/2014/main" id="{6A2C2A79-9DF1-4B28-9C0E-0684AF9D5198}"/>
+                  </a:ext>
+                </a:extLst>
+              </p:cNvPr>
+              <p:cNvCxnSpPr>
+                <a:cxnSpLocks/>
+                <a:stCxn id="11" idx="3"/>
+                <a:endCxn id="13" idx="1"/>
+              </p:cNvCxnSpPr>
+              <p:nvPr/>
+            </p:nvCxnSpPr>
+            <p:spPr>
+              <a:xfrm>
+                <a:off x="7938054" y="2484783"/>
+                <a:ext cx="781879" cy="0"/>
+              </a:xfrm>
+              <a:prstGeom prst="straightConnector1">
+                <a:avLst/>
+              </a:prstGeom>
+              <a:ln>
+                <a:tailEnd type="triangle"/>
+              </a:ln>
+            </p:spPr>
+            <p:style>
+              <a:lnRef idx="1">
+                <a:schemeClr val="dk1"/>
+              </a:lnRef>
+              <a:fillRef idx="0">
+                <a:schemeClr val="dk1"/>
+              </a:fillRef>
+              <a:effectRef idx="0">
+                <a:schemeClr val="dk1"/>
+              </a:effectRef>
+              <a:fontRef idx="minor">
+                <a:schemeClr val="tx1"/>
+              </a:fontRef>
+            </p:style>
+          </p:cxnSp>
+          <p:cxnSp>
+            <p:nvCxnSpPr>
+              <p:cNvPr id="27" name="Straight Arrow Connector 26">
+                <a:extLst>
+                  <a:ext uri="{FF2B5EF4-FFF2-40B4-BE49-F238E27FC236}">
+                    <a16:creationId xmlns:a16="http://schemas.microsoft.com/office/drawing/2014/main" id="{64076D96-9FAB-4074-966B-3DE38337D2C6}"/>
+                  </a:ext>
+                </a:extLst>
+              </p:cNvPr>
+              <p:cNvCxnSpPr>
+                <a:cxnSpLocks/>
+                <a:stCxn id="13" idx="3"/>
+              </p:cNvCxnSpPr>
+              <p:nvPr/>
+            </p:nvCxnSpPr>
+            <p:spPr>
+              <a:xfrm>
+                <a:off x="9952386" y="2484783"/>
+                <a:ext cx="856974" cy="0"/>
+              </a:xfrm>
+              <a:prstGeom prst="straightConnector1">
+                <a:avLst/>
+              </a:prstGeom>
+              <a:ln>
+                <a:tailEnd type="triangle"/>
+              </a:ln>
+            </p:spPr>
+            <p:style>
+              <a:lnRef idx="1">
+                <a:schemeClr val="dk1"/>
+              </a:lnRef>
+              <a:fillRef idx="0">
+                <a:schemeClr val="dk1"/>
+              </a:fillRef>
+              <a:effectRef idx="0">
+                <a:schemeClr val="dk1"/>
+              </a:effectRef>
+              <a:fontRef idx="minor">
+                <a:schemeClr val="tx1"/>
+              </a:fontRef>
+            </p:style>
+          </p:cxnSp>
+          <p:sp>
+            <p:nvSpPr>
+              <p:cNvPr id="28" name="Oval 27">
+                <a:extLst>
+                  <a:ext uri="{FF2B5EF4-FFF2-40B4-BE49-F238E27FC236}">
+                    <a16:creationId xmlns:a16="http://schemas.microsoft.com/office/drawing/2014/main" id="{821839F0-70CE-4ABD-9DC0-F56348E7AF80}"/>
+                  </a:ext>
+                </a:extLst>
+              </p:cNvPr>
+              <p:cNvSpPr/>
+              <p:nvPr/>
+            </p:nvSpPr>
+            <p:spPr>
+              <a:xfrm>
+                <a:off x="5353879" y="2186609"/>
+                <a:ext cx="569843" cy="596347"/>
+              </a:xfrm>
+              <a:prstGeom prst="ellipse">
+                <a:avLst/>
+              </a:prstGeom>
+            </p:spPr>
+            <p:style>
+              <a:lnRef idx="2">
+                <a:schemeClr val="dk1"/>
+              </a:lnRef>
+              <a:fillRef idx="1">
+                <a:schemeClr val="lt1"/>
+              </a:fillRef>
+              <a:effectRef idx="0">
+                <a:schemeClr val="dk1"/>
+              </a:effectRef>
+              <a:fontRef idx="minor">
+                <a:schemeClr val="dk1"/>
+              </a:fontRef>
+            </p:style>
+            <p:txBody>
+              <a:bodyPr rtlCol="0" anchor="ctr"/>
+              <a:lstStyle/>
+              <a:p>
+                <a:pPr algn="ctr"/>
+                <a:endParaRPr lang="en-GB"/>
+              </a:p>
+            </p:txBody>
+          </p:sp>
+          <p:cxnSp>
+            <p:nvCxnSpPr>
+              <p:cNvPr id="30" name="Straight Connector 29">
+                <a:extLst>
+                  <a:ext uri="{FF2B5EF4-FFF2-40B4-BE49-F238E27FC236}">
+                    <a16:creationId xmlns:a16="http://schemas.microsoft.com/office/drawing/2014/main" id="{D7192747-629E-44B1-ACE9-6136F05A5B5F}"/>
+                  </a:ext>
+                </a:extLst>
+              </p:cNvPr>
+              <p:cNvCxnSpPr>
+                <a:stCxn id="28" idx="1"/>
+                <a:endCxn id="28" idx="5"/>
+              </p:cNvCxnSpPr>
+              <p:nvPr/>
+            </p:nvCxnSpPr>
+            <p:spPr>
+              <a:xfrm>
+                <a:off x="5437331" y="2273942"/>
+                <a:ext cx="402939" cy="421681"/>
+              </a:xfrm>
+              <a:prstGeom prst="line">
+                <a:avLst/>
+              </a:prstGeom>
+            </p:spPr>
+            <p:style>
+              <a:lnRef idx="2">
+                <a:schemeClr val="dk1"/>
+              </a:lnRef>
+              <a:fillRef idx="1">
+                <a:schemeClr val="lt1"/>
+              </a:fillRef>
+              <a:effectRef idx="0">
+                <a:schemeClr val="dk1"/>
+              </a:effectRef>
+              <a:fontRef idx="minor">
+                <a:schemeClr val="dk1"/>
+              </a:fontRef>
+            </p:style>
+          </p:cxnSp>
+          <p:cxnSp>
+            <p:nvCxnSpPr>
+              <p:cNvPr id="32" name="Straight Connector 31">
+                <a:extLst>
+                  <a:ext uri="{FF2B5EF4-FFF2-40B4-BE49-F238E27FC236}">
+                    <a16:creationId xmlns:a16="http://schemas.microsoft.com/office/drawing/2014/main" id="{CFCE53FF-7E19-4E6B-AC69-5D4DCBC461C4}"/>
+                  </a:ext>
+                </a:extLst>
+              </p:cNvPr>
+              <p:cNvCxnSpPr>
+                <a:stCxn id="28" idx="3"/>
+                <a:endCxn id="28" idx="7"/>
+              </p:cNvCxnSpPr>
+              <p:nvPr/>
+            </p:nvCxnSpPr>
+            <p:spPr>
+              <a:xfrm flipV="1">
+                <a:off x="5437331" y="2273942"/>
+                <a:ext cx="402939" cy="421681"/>
+              </a:xfrm>
+              <a:prstGeom prst="line">
+                <a:avLst/>
+              </a:prstGeom>
+            </p:spPr>
+            <p:style>
+              <a:lnRef idx="2">
+                <a:schemeClr val="dk1"/>
+              </a:lnRef>
+              <a:fillRef idx="1">
+                <a:schemeClr val="lt1"/>
+              </a:fillRef>
+              <a:effectRef idx="0">
+                <a:schemeClr val="dk1"/>
+              </a:effectRef>
+              <a:fontRef idx="minor">
+                <a:schemeClr val="dk1"/>
+              </a:fontRef>
+            </p:style>
+          </p:cxnSp>
+          <p:cxnSp>
+            <p:nvCxnSpPr>
+              <p:cNvPr id="34" name="Straight Arrow Connector 33">
+                <a:extLst>
+                  <a:ext uri="{FF2B5EF4-FFF2-40B4-BE49-F238E27FC236}">
+                    <a16:creationId xmlns:a16="http://schemas.microsoft.com/office/drawing/2014/main" id="{034418F5-4AED-4330-8311-3849EE1C5E97}"/>
+                  </a:ext>
+                </a:extLst>
+              </p:cNvPr>
+              <p:cNvCxnSpPr>
+                <a:cxnSpLocks/>
+                <a:stCxn id="5" idx="3"/>
+                <a:endCxn id="28" idx="2"/>
+              </p:cNvCxnSpPr>
+              <p:nvPr/>
+            </p:nvCxnSpPr>
+            <p:spPr>
+              <a:xfrm>
+                <a:off x="4572000" y="2484783"/>
+                <a:ext cx="781879" cy="0"/>
+              </a:xfrm>
+              <a:prstGeom prst="straightConnector1">
+                <a:avLst/>
+              </a:prstGeom>
+              <a:ln>
+                <a:tailEnd type="triangle"/>
+              </a:ln>
+            </p:spPr>
+            <p:style>
+              <a:lnRef idx="1">
+                <a:schemeClr val="dk1"/>
+              </a:lnRef>
+              <a:fillRef idx="0">
+                <a:schemeClr val="dk1"/>
+              </a:fillRef>
+              <a:effectRef idx="0">
+                <a:schemeClr val="dk1"/>
+              </a:effectRef>
+              <a:fontRef idx="minor">
+                <a:schemeClr val="tx1"/>
+              </a:fontRef>
+            </p:style>
+          </p:cxnSp>
+          <p:cxnSp>
+            <p:nvCxnSpPr>
+              <p:cNvPr id="37" name="Straight Arrow Connector 36">
+                <a:extLst>
+                  <a:ext uri="{FF2B5EF4-FFF2-40B4-BE49-F238E27FC236}">
+                    <a16:creationId xmlns:a16="http://schemas.microsoft.com/office/drawing/2014/main" id="{DBA30C66-EC96-4F49-9CA6-59C18E26D00E}"/>
+                  </a:ext>
+                </a:extLst>
+              </p:cNvPr>
+              <p:cNvCxnSpPr>
+                <a:cxnSpLocks/>
+                <a:stCxn id="28" idx="6"/>
+                <a:endCxn id="11" idx="1"/>
+              </p:cNvCxnSpPr>
+              <p:nvPr/>
+            </p:nvCxnSpPr>
+            <p:spPr>
+              <a:xfrm>
+                <a:off x="5923722" y="2484783"/>
+                <a:ext cx="781879" cy="0"/>
+              </a:xfrm>
+              <a:prstGeom prst="straightConnector1">
+                <a:avLst/>
+              </a:prstGeom>
+              <a:ln>
+                <a:tailEnd type="triangle"/>
+              </a:ln>
+            </p:spPr>
+            <p:style>
+              <a:lnRef idx="1">
+                <a:schemeClr val="dk1"/>
+              </a:lnRef>
+              <a:fillRef idx="0">
+                <a:schemeClr val="dk1"/>
+              </a:fillRef>
+              <a:effectRef idx="0">
+                <a:schemeClr val="dk1"/>
+              </a:effectRef>
+              <a:fontRef idx="minor">
+                <a:schemeClr val="tx1"/>
+              </a:fontRef>
+            </p:style>
+          </p:cxnSp>
+          <p:sp>
+            <p:nvSpPr>
+              <p:cNvPr id="42" name="TextBox 41">
+                <a:extLst>
+                  <a:ext uri="{FF2B5EF4-FFF2-40B4-BE49-F238E27FC236}">
+                    <a16:creationId xmlns:a16="http://schemas.microsoft.com/office/drawing/2014/main" id="{59663CD7-866B-4C3C-B1C4-C4056FF3FE20}"/>
+                  </a:ext>
+                </a:extLst>
+              </p:cNvPr>
+              <p:cNvSpPr txBox="1"/>
+              <p:nvPr/>
+            </p:nvSpPr>
+            <p:spPr>
+              <a:xfrm>
+                <a:off x="5323107" y="2300116"/>
+                <a:ext cx="300082" cy="369332"/>
+              </a:xfrm>
+              <a:prstGeom prst="rect">
+                <a:avLst/>
+              </a:prstGeom>
+              <a:noFill/>
+            </p:spPr>
+            <p:txBody>
+              <a:bodyPr wrap="none" rtlCol="0">
+                <a:spAutoFit/>
+              </a:bodyPr>
+              <a:lstStyle/>
+              <a:p>
+                <a:r>
+                  <a:rPr lang="en-GB" dirty="0"/>
+                  <a:t>+</a:t>
+                </a:r>
+              </a:p>
+            </p:txBody>
+          </p:sp>
+          <p:sp>
+            <p:nvSpPr>
+              <p:cNvPr id="43" name="TextBox 42">
+                <a:extLst>
+                  <a:ext uri="{FF2B5EF4-FFF2-40B4-BE49-F238E27FC236}">
+                    <a16:creationId xmlns:a16="http://schemas.microsoft.com/office/drawing/2014/main" id="{29F2EA1F-79DB-4E74-8BD9-2EA36FE94F93}"/>
+                  </a:ext>
+                </a:extLst>
+              </p:cNvPr>
+              <p:cNvSpPr txBox="1"/>
+              <p:nvPr/>
+            </p:nvSpPr>
+            <p:spPr>
+              <a:xfrm>
+                <a:off x="5511201" y="2457557"/>
+                <a:ext cx="255198" cy="369332"/>
+              </a:xfrm>
+              <a:prstGeom prst="rect">
+                <a:avLst/>
+              </a:prstGeom>
+              <a:noFill/>
+            </p:spPr>
+            <p:txBody>
+              <a:bodyPr wrap="none" rtlCol="0">
+                <a:spAutoFit/>
+              </a:bodyPr>
+              <a:lstStyle/>
+              <a:p>
+                <a:r>
+                  <a:rPr lang="en-GB" dirty="0"/>
+                  <a:t>-</a:t>
+                </a:r>
+              </a:p>
+            </p:txBody>
+          </p:sp>
+          <p:sp>
+            <p:nvSpPr>
+              <p:cNvPr id="67" name="Rectangle 66">
+                <a:extLst>
+                  <a:ext uri="{FF2B5EF4-FFF2-40B4-BE49-F238E27FC236}">
+                    <a16:creationId xmlns:a16="http://schemas.microsoft.com/office/drawing/2014/main" id="{6C9E1516-DCBF-4202-AD55-7927D6F80594}"/>
+                  </a:ext>
+                </a:extLst>
+              </p:cNvPr>
+              <p:cNvSpPr/>
+              <p:nvPr/>
+            </p:nvSpPr>
+            <p:spPr>
+              <a:xfrm>
+                <a:off x="7712766" y="3650974"/>
+                <a:ext cx="1232453" cy="914400"/>
+              </a:xfrm>
+              <a:prstGeom prst="rect">
+                <a:avLst/>
+              </a:prstGeom>
+            </p:spPr>
+            <p:style>
+              <a:lnRef idx="2">
+                <a:schemeClr val="dk1"/>
+              </a:lnRef>
+              <a:fillRef idx="1">
+                <a:schemeClr val="lt1"/>
+              </a:fillRef>
+              <a:effectRef idx="0">
+                <a:schemeClr val="dk1"/>
+              </a:effectRef>
+              <a:fontRef idx="minor">
+                <a:schemeClr val="dk1"/>
+              </a:fontRef>
+            </p:style>
+            <p:txBody>
+              <a:bodyPr rtlCol="0" anchor="ctr"/>
+              <a:lstStyle/>
+              <a:p>
+                <a:pPr algn="ctr"/>
+                <a:r>
+                  <a:rPr lang="en-GB" dirty="0"/>
+                  <a:t>Joint</a:t>
+                </a:r>
+              </a:p>
+              <a:p>
+                <a:pPr algn="ctr"/>
+                <a:r>
+                  <a:rPr lang="en-GB" dirty="0"/>
+                  <a:t>Angle</a:t>
+                </a:r>
+              </a:p>
+              <a:p>
+                <a:pPr algn="ctr"/>
+                <a:r>
+                  <a:rPr lang="en-GB" dirty="0"/>
+                  <a:t>Sensors</a:t>
+                </a:r>
+              </a:p>
+            </p:txBody>
+          </p:sp>
+        </p:grpSp>
+        <p:cxnSp>
+          <p:nvCxnSpPr>
+            <p:cNvPr id="69" name="Straight Arrow Connector 68">
+              <a:extLst>
+                <a:ext uri="{FF2B5EF4-FFF2-40B4-BE49-F238E27FC236}">
+                  <a16:creationId xmlns:a16="http://schemas.microsoft.com/office/drawing/2014/main" id="{FAEB4BCC-076C-414D-9FC5-654DEEDA3F26}"/>
+                </a:ext>
+              </a:extLst>
+            </p:cNvPr>
+            <p:cNvCxnSpPr>
+              <a:endCxn id="67" idx="3"/>
+            </p:cNvCxnSpPr>
+            <p:nvPr/>
+          </p:nvCxnSpPr>
+          <p:spPr>
+            <a:xfrm flipH="1">
+              <a:off x="8786194" y="4240696"/>
+              <a:ext cx="1435654" cy="0"/>
+            </a:xfrm>
+            <a:prstGeom prst="straightConnector1">
+              <a:avLst/>
+            </a:prstGeom>
+            <a:ln>
+              <a:tailEnd type="triangle"/>
+            </a:ln>
+          </p:spPr>
+          <p:style>
+            <a:lnRef idx="1">
+              <a:schemeClr val="dk1"/>
+            </a:lnRef>
+            <a:fillRef idx="0">
+              <a:schemeClr val="dk1"/>
+            </a:fillRef>
+            <a:effectRef idx="0">
+              <a:schemeClr val="dk1"/>
+            </a:effectRef>
+            <a:fontRef idx="minor">
+              <a:schemeClr val="tx1"/>
+            </a:fontRef>
+          </p:style>
+        </p:cxnSp>
+        <p:cxnSp>
+          <p:nvCxnSpPr>
+            <p:cNvPr id="71" name="Straight Connector 70">
+              <a:extLst>
+                <a:ext uri="{FF2B5EF4-FFF2-40B4-BE49-F238E27FC236}">
+                  <a16:creationId xmlns:a16="http://schemas.microsoft.com/office/drawing/2014/main" id="{00AFF150-DFA5-4F0F-9A64-9E144770FBEE}"/>
+                </a:ext>
+              </a:extLst>
+            </p:cNvPr>
+            <p:cNvCxnSpPr>
+              <a:cxnSpLocks/>
+            </p:cNvCxnSpPr>
+            <p:nvPr/>
+          </p:nvCxnSpPr>
+          <p:spPr>
+            <a:xfrm flipV="1">
+              <a:off x="10221848" y="2617304"/>
+              <a:ext cx="0" cy="1623393"/>
+            </a:xfrm>
+            <a:prstGeom prst="line">
+              <a:avLst/>
+            </a:prstGeom>
+          </p:spPr>
+          <p:style>
+            <a:lnRef idx="1">
+              <a:schemeClr val="dk1"/>
+            </a:lnRef>
+            <a:fillRef idx="0">
+              <a:schemeClr val="dk1"/>
+            </a:fillRef>
+            <a:effectRef idx="0">
+              <a:schemeClr val="dk1"/>
+            </a:effectRef>
+            <a:fontRef idx="minor">
+              <a:schemeClr val="tx1"/>
+            </a:fontRef>
+          </p:style>
+        </p:cxnSp>
+        <p:cxnSp>
+          <p:nvCxnSpPr>
+            <p:cNvPr id="75" name="Straight Arrow Connector 74">
+              <a:extLst>
+                <a:ext uri="{FF2B5EF4-FFF2-40B4-BE49-F238E27FC236}">
+                  <a16:creationId xmlns:a16="http://schemas.microsoft.com/office/drawing/2014/main" id="{ED49712C-F1AD-4926-8F79-EB73F3362D0D}"/>
+                </a:ext>
+              </a:extLst>
+            </p:cNvPr>
+            <p:cNvCxnSpPr>
+              <a:cxnSpLocks/>
+              <a:endCxn id="28" idx="4"/>
+            </p:cNvCxnSpPr>
+            <p:nvPr/>
+          </p:nvCxnSpPr>
+          <p:spPr>
+            <a:xfrm flipV="1">
+              <a:off x="5479774" y="2915478"/>
+              <a:ext cx="2" cy="1325218"/>
+            </a:xfrm>
+            <a:prstGeom prst="straightConnector1">
+              <a:avLst/>
+            </a:prstGeom>
+            <a:ln>
+              <a:tailEnd type="triangle"/>
+            </a:ln>
+          </p:spPr>
+          <p:style>
+            <a:lnRef idx="1">
+              <a:schemeClr val="dk1"/>
+            </a:lnRef>
+            <a:fillRef idx="0">
+              <a:schemeClr val="dk1"/>
+            </a:fillRef>
+            <a:effectRef idx="0">
+              <a:schemeClr val="dk1"/>
+            </a:effectRef>
+            <a:fontRef idx="minor">
+              <a:schemeClr val="tx1"/>
+            </a:fontRef>
+          </p:style>
+        </p:cxnSp>
+        <p:cxnSp>
+          <p:nvCxnSpPr>
+            <p:cNvPr id="78" name="Straight Connector 77">
+              <a:extLst>
+                <a:ext uri="{FF2B5EF4-FFF2-40B4-BE49-F238E27FC236}">
+                  <a16:creationId xmlns:a16="http://schemas.microsoft.com/office/drawing/2014/main" id="{A70E8DB1-6ACA-40BF-8436-F0423E85A96A}"/>
+                </a:ext>
+              </a:extLst>
+            </p:cNvPr>
+            <p:cNvCxnSpPr>
+              <a:stCxn id="67" idx="1"/>
+            </p:cNvCxnSpPr>
+            <p:nvPr/>
+          </p:nvCxnSpPr>
+          <p:spPr>
+            <a:xfrm flipH="1">
+              <a:off x="5479775" y="4240696"/>
+              <a:ext cx="2073966" cy="0"/>
+            </a:xfrm>
+            <a:prstGeom prst="line">
+              <a:avLst/>
+            </a:prstGeom>
+          </p:spPr>
+          <p:style>
+            <a:lnRef idx="1">
+              <a:schemeClr val="dk1"/>
+            </a:lnRef>
+            <a:fillRef idx="0">
+              <a:schemeClr val="dk1"/>
+            </a:fillRef>
+            <a:effectRef idx="0">
+              <a:schemeClr val="dk1"/>
+            </a:effectRef>
+            <a:fontRef idx="minor">
+              <a:schemeClr val="tx1"/>
+            </a:fontRef>
+          </p:style>
+        </p:cxnSp>
+      </p:grpSp>
+      <p:sp>
+        <p:nvSpPr>
+          <p:cNvPr id="87" name="TextBox 86">
+            <a:extLst>
+              <a:ext uri="{FF2B5EF4-FFF2-40B4-BE49-F238E27FC236}">
+                <a16:creationId xmlns:a16="http://schemas.microsoft.com/office/drawing/2014/main" id="{29B09FAF-6595-41F3-8D4F-3F9F7B190518}"/>
+              </a:ext>
+            </a:extLst>
+          </p:cNvPr>
+          <p:cNvSpPr txBox="1"/>
+          <p:nvPr/>
+        </p:nvSpPr>
+        <p:spPr>
+          <a:xfrm>
+            <a:off x="2404764" y="2247972"/>
+            <a:ext cx="606256" cy="369332"/>
+          </a:xfrm>
+          <a:prstGeom prst="rect">
+            <a:avLst/>
+          </a:prstGeom>
+          <a:noFill/>
+        </p:spPr>
+        <p:txBody>
+          <a:bodyPr wrap="none" rtlCol="0">
+            <a:spAutoFit/>
+          </a:bodyPr>
+          <a:lstStyle/>
+          <a:p>
+            <a:r>
+              <a:rPr lang="en-GB" dirty="0">
+                <a:solidFill>
+                  <a:srgbClr val="002060"/>
+                </a:solidFill>
+              </a:rPr>
+              <a:t>x</a:t>
+            </a:r>
+            <a:r>
+              <a:rPr lang="en-GB" baseline="-25000" dirty="0">
+                <a:solidFill>
+                  <a:srgbClr val="002060"/>
+                </a:solidFill>
+              </a:rPr>
+              <a:t>d</a:t>
+            </a:r>
+            <a:r>
+              <a:rPr lang="en-GB" dirty="0">
+                <a:solidFill>
+                  <a:srgbClr val="002060"/>
+                </a:solidFill>
+              </a:rPr>
+              <a:t>,y</a:t>
+            </a:r>
+            <a:r>
+              <a:rPr lang="en-GB" baseline="-25000" dirty="0">
+                <a:solidFill>
+                  <a:srgbClr val="002060"/>
+                </a:solidFill>
+              </a:rPr>
+              <a:t>d</a:t>
+            </a:r>
+          </a:p>
+        </p:txBody>
+      </p:sp>
+      <p:sp>
+        <p:nvSpPr>
+          <p:cNvPr id="88" name="TextBox 87">
+            <a:extLst>
+              <a:ext uri="{FF2B5EF4-FFF2-40B4-BE49-F238E27FC236}">
+                <a16:creationId xmlns:a16="http://schemas.microsoft.com/office/drawing/2014/main" id="{86D17476-D79B-4EAE-A6E3-6C90714AC61B}"/>
+              </a:ext>
+            </a:extLst>
+          </p:cNvPr>
+          <p:cNvSpPr txBox="1"/>
+          <p:nvPr/>
+        </p:nvSpPr>
+        <p:spPr>
+          <a:xfrm>
+            <a:off x="4405390" y="2269939"/>
+            <a:ext cx="806631" cy="369332"/>
+          </a:xfrm>
+          <a:prstGeom prst="rect">
+            <a:avLst/>
+          </a:prstGeom>
+          <a:noFill/>
+        </p:spPr>
+        <p:txBody>
+          <a:bodyPr wrap="none" rtlCol="0">
+            <a:spAutoFit/>
+          </a:bodyPr>
+          <a:lstStyle/>
+          <a:p>
+            <a:r>
+              <a:rPr lang="el-GR" dirty="0">
+                <a:solidFill>
+                  <a:srgbClr val="002060"/>
+                </a:solidFill>
+              </a:rPr>
+              <a:t>θ</a:t>
+            </a:r>
+            <a:r>
+              <a:rPr lang="en-GB" baseline="-25000" dirty="0">
+                <a:solidFill>
+                  <a:srgbClr val="002060"/>
+                </a:solidFill>
+              </a:rPr>
+              <a:t>0d</a:t>
+            </a:r>
+            <a:r>
+              <a:rPr lang="en-GB" dirty="0">
+                <a:solidFill>
+                  <a:srgbClr val="002060"/>
+                </a:solidFill>
+              </a:rPr>
+              <a:t>,</a:t>
+            </a:r>
+            <a:r>
+              <a:rPr lang="el-GR" dirty="0">
+                <a:solidFill>
+                  <a:srgbClr val="002060"/>
+                </a:solidFill>
+              </a:rPr>
+              <a:t>θ</a:t>
+            </a:r>
+            <a:r>
+              <a:rPr lang="en-GB" baseline="-25000" dirty="0">
+                <a:solidFill>
+                  <a:srgbClr val="002060"/>
+                </a:solidFill>
+              </a:rPr>
+              <a:t>1d</a:t>
+            </a:r>
+          </a:p>
+        </p:txBody>
+      </p:sp>
+      <p:sp>
+        <p:nvSpPr>
+          <p:cNvPr id="91" name="TextBox 90">
+            <a:extLst>
+              <a:ext uri="{FF2B5EF4-FFF2-40B4-BE49-F238E27FC236}">
+                <a16:creationId xmlns:a16="http://schemas.microsoft.com/office/drawing/2014/main" id="{487295BC-7E38-4F31-A9C3-774753CA5D1D}"/>
+              </a:ext>
+            </a:extLst>
+          </p:cNvPr>
+          <p:cNvSpPr txBox="1"/>
+          <p:nvPr/>
+        </p:nvSpPr>
+        <p:spPr>
+          <a:xfrm>
+            <a:off x="6213710" y="3893859"/>
+            <a:ext cx="827021" cy="369332"/>
+          </a:xfrm>
+          <a:prstGeom prst="rect">
+            <a:avLst/>
+          </a:prstGeom>
+          <a:noFill/>
+        </p:spPr>
+        <p:txBody>
+          <a:bodyPr wrap="none" rtlCol="0">
+            <a:spAutoFit/>
+          </a:bodyPr>
+          <a:lstStyle/>
+          <a:p>
+            <a:r>
+              <a:rPr lang="el-GR" dirty="0">
+                <a:solidFill>
+                  <a:srgbClr val="002060"/>
+                </a:solidFill>
+              </a:rPr>
+              <a:t>θ</a:t>
+            </a:r>
+            <a:r>
+              <a:rPr lang="en-GB" baseline="-25000" dirty="0">
+                <a:solidFill>
+                  <a:srgbClr val="002060"/>
+                </a:solidFill>
+              </a:rPr>
+              <a:t>0A</a:t>
+            </a:r>
+            <a:r>
+              <a:rPr lang="en-GB" dirty="0">
+                <a:solidFill>
+                  <a:srgbClr val="002060"/>
+                </a:solidFill>
+              </a:rPr>
+              <a:t>,</a:t>
+            </a:r>
+            <a:r>
+              <a:rPr lang="el-GR" dirty="0">
+                <a:solidFill>
+                  <a:srgbClr val="002060"/>
+                </a:solidFill>
+              </a:rPr>
+              <a:t>θ</a:t>
+            </a:r>
+            <a:r>
+              <a:rPr lang="en-GB" baseline="-25000" dirty="0">
+                <a:solidFill>
+                  <a:srgbClr val="002060"/>
+                </a:solidFill>
+              </a:rPr>
+              <a:t>1A</a:t>
+            </a:r>
+          </a:p>
+        </p:txBody>
+      </p:sp>
+      <p:sp>
+        <p:nvSpPr>
+          <p:cNvPr id="92" name="TextBox 91">
+            <a:extLst>
+              <a:ext uri="{FF2B5EF4-FFF2-40B4-BE49-F238E27FC236}">
+                <a16:creationId xmlns:a16="http://schemas.microsoft.com/office/drawing/2014/main" id="{BB5E02A7-C41E-4D67-9848-1A82E50F8B1E}"/>
+              </a:ext>
+            </a:extLst>
+          </p:cNvPr>
+          <p:cNvSpPr txBox="1"/>
+          <p:nvPr/>
+        </p:nvSpPr>
+        <p:spPr>
+          <a:xfrm>
+            <a:off x="5735982" y="2286588"/>
+            <a:ext cx="827021" cy="369332"/>
+          </a:xfrm>
+          <a:prstGeom prst="rect">
+            <a:avLst/>
+          </a:prstGeom>
+          <a:noFill/>
+        </p:spPr>
+        <p:txBody>
+          <a:bodyPr wrap="none" rtlCol="0">
+            <a:spAutoFit/>
+          </a:bodyPr>
+          <a:lstStyle/>
+          <a:p>
+            <a:r>
+              <a:rPr lang="el-GR" dirty="0">
+                <a:solidFill>
+                  <a:srgbClr val="002060"/>
+                </a:solidFill>
+              </a:rPr>
+              <a:t>θ</a:t>
+            </a:r>
+            <a:r>
+              <a:rPr lang="en-GB" baseline="-25000" dirty="0">
+                <a:solidFill>
+                  <a:srgbClr val="002060"/>
+                </a:solidFill>
+              </a:rPr>
+              <a:t>0e</a:t>
+            </a:r>
+            <a:r>
+              <a:rPr lang="en-GB" dirty="0">
+                <a:solidFill>
+                  <a:srgbClr val="002060"/>
+                </a:solidFill>
+              </a:rPr>
+              <a:t>,</a:t>
+            </a:r>
+            <a:r>
+              <a:rPr lang="el-GR" dirty="0">
+                <a:solidFill>
+                  <a:srgbClr val="002060"/>
+                </a:solidFill>
+              </a:rPr>
+              <a:t>θ</a:t>
+            </a:r>
+            <a:r>
+              <a:rPr lang="en-GB" baseline="-25000" dirty="0">
+                <a:solidFill>
+                  <a:srgbClr val="002060"/>
+                </a:solidFill>
+              </a:rPr>
+              <a:t>1e</a:t>
+            </a:r>
+          </a:p>
+        </p:txBody>
+      </p:sp>
+      <p:sp>
+        <p:nvSpPr>
+          <p:cNvPr id="93" name="TextBox 92">
+            <a:extLst>
+              <a:ext uri="{FF2B5EF4-FFF2-40B4-BE49-F238E27FC236}">
+                <a16:creationId xmlns:a16="http://schemas.microsoft.com/office/drawing/2014/main" id="{950BABDD-BB15-4141-A6F7-01D6497CB3CE}"/>
+              </a:ext>
+            </a:extLst>
+          </p:cNvPr>
+          <p:cNvSpPr txBox="1"/>
+          <p:nvPr/>
+        </p:nvSpPr>
+        <p:spPr>
+          <a:xfrm>
+            <a:off x="7855943" y="2269939"/>
+            <a:ext cx="643125" cy="369332"/>
+          </a:xfrm>
+          <a:prstGeom prst="rect">
+            <a:avLst/>
+          </a:prstGeom>
+          <a:noFill/>
+        </p:spPr>
+        <p:txBody>
+          <a:bodyPr wrap="none" rtlCol="0">
+            <a:spAutoFit/>
+          </a:bodyPr>
+          <a:lstStyle/>
+          <a:p>
+            <a:r>
+              <a:rPr lang="en-GB" dirty="0">
+                <a:solidFill>
+                  <a:srgbClr val="002060"/>
+                </a:solidFill>
+              </a:rPr>
+              <a:t>u</a:t>
+            </a:r>
+            <a:r>
+              <a:rPr lang="en-GB" baseline="-25000" dirty="0">
+                <a:solidFill>
+                  <a:srgbClr val="002060"/>
+                </a:solidFill>
+              </a:rPr>
+              <a:t>0</a:t>
+            </a:r>
+            <a:r>
+              <a:rPr lang="en-GB" dirty="0">
+                <a:solidFill>
+                  <a:srgbClr val="002060"/>
+                </a:solidFill>
+              </a:rPr>
+              <a:t>,u</a:t>
+            </a:r>
+            <a:r>
+              <a:rPr lang="en-GB" baseline="-25000" dirty="0">
+                <a:solidFill>
+                  <a:srgbClr val="002060"/>
+                </a:solidFill>
+              </a:rPr>
+              <a:t>1</a:t>
+            </a:r>
+          </a:p>
+        </p:txBody>
+      </p:sp>
+      <p:sp>
+        <p:nvSpPr>
+          <p:cNvPr id="29" name="TextBox 28">
+            <a:extLst>
+              <a:ext uri="{FF2B5EF4-FFF2-40B4-BE49-F238E27FC236}">
+                <a16:creationId xmlns:a16="http://schemas.microsoft.com/office/drawing/2014/main" id="{1F9CFA6D-5DC6-4EBE-AAAE-AC1A4CA8C928}"/>
+              </a:ext>
+            </a:extLst>
+          </p:cNvPr>
+          <p:cNvSpPr txBox="1"/>
+          <p:nvPr/>
+        </p:nvSpPr>
+        <p:spPr>
+          <a:xfrm>
+            <a:off x="9912630" y="1963422"/>
+            <a:ext cx="1528239" cy="646331"/>
+          </a:xfrm>
+          <a:prstGeom prst="rect">
+            <a:avLst/>
+          </a:prstGeom>
+          <a:noFill/>
+        </p:spPr>
+        <p:txBody>
+          <a:bodyPr wrap="none" rtlCol="0">
+            <a:spAutoFit/>
+          </a:bodyPr>
+          <a:lstStyle/>
+          <a:p>
+            <a:pPr algn="ctr"/>
+            <a:r>
+              <a:rPr lang="en-GB" dirty="0">
+                <a:solidFill>
+                  <a:srgbClr val="002060"/>
+                </a:solidFill>
+              </a:rPr>
+              <a:t>Motor Shaft </a:t>
+            </a:r>
+          </a:p>
+          <a:p>
+            <a:pPr algn="ctr"/>
+            <a:r>
+              <a:rPr lang="en-GB" dirty="0">
+                <a:solidFill>
+                  <a:srgbClr val="002060"/>
+                </a:solidFill>
+              </a:rPr>
+              <a:t>Positions (rad)</a:t>
+            </a:r>
+            <a:endParaRPr lang="en-GB" baseline="-25000" dirty="0">
+              <a:solidFill>
+                <a:srgbClr val="002060"/>
+              </a:solidFill>
+            </a:endParaRPr>
+          </a:p>
+        </p:txBody>
+      </p:sp>
+    </p:spTree>
+    <p:extLst>
+      <p:ext uri="{BB962C8B-B14F-4D97-AF65-F5344CB8AC3E}">
+        <p14:creationId xmlns:p14="http://schemas.microsoft.com/office/powerpoint/2010/main" val="1456357706"/>
+      </p:ext>
+    </p:extLst>
+  </p:cSld>
+  <p:clrMapOvr>
+    <a:masterClrMapping/>
+  </p:clrMapOvr>
+</p:sld>
+</file>
+
+<file path=ppt/slides/slide9.xml><?xml version="1.0" encoding="utf-8"?>
+<p:sld xmlns:a="http://schemas.openxmlformats.org/drawingml/2006/main" xmlns:r="http://schemas.openxmlformats.org/officeDocument/2006/relationships" xmlns:p="http://schemas.openxmlformats.org/presentationml/2006/main">
+  <p:cSld>
+    <p:spTree>
+      <p:nvGrpSpPr>
+        <p:cNvPr id="1" name=""/>
+        <p:cNvGrpSpPr/>
+        <p:nvPr/>
+      </p:nvGrpSpPr>
+      <p:grpSpPr>
+        <a:xfrm>
+          <a:off x="0" y="0"/>
+          <a:ext cx="0" cy="0"/>
+          <a:chOff x="0" y="0"/>
+          <a:chExt cx="0" cy="0"/>
+        </a:xfrm>
+      </p:grpSpPr>
+      <p:grpSp>
+        <p:nvGrpSpPr>
+          <p:cNvPr id="68" name="Group 67">
+            <a:extLst>
+              <a:ext uri="{FF2B5EF4-FFF2-40B4-BE49-F238E27FC236}">
+                <a16:creationId xmlns:a16="http://schemas.microsoft.com/office/drawing/2014/main" id="{74C73068-4766-4E8D-B0B3-051FEEABBB0C}"/>
+              </a:ext>
+            </a:extLst>
+          </p:cNvPr>
+          <p:cNvGrpSpPr/>
+          <p:nvPr/>
+        </p:nvGrpSpPr>
+        <p:grpSpPr>
+          <a:xfrm>
+            <a:off x="4678846" y="822712"/>
+            <a:ext cx="2824926" cy="914400"/>
+            <a:chOff x="3668643" y="795131"/>
+            <a:chExt cx="2824926" cy="914400"/>
+          </a:xfrm>
+        </p:grpSpPr>
+        <p:sp>
+          <p:nvSpPr>
+            <p:cNvPr id="11" name="Rectangle 10">
+              <a:extLst>
+                <a:ext uri="{FF2B5EF4-FFF2-40B4-BE49-F238E27FC236}">
+                  <a16:creationId xmlns:a16="http://schemas.microsoft.com/office/drawing/2014/main" id="{572F815B-5DC8-4020-9CB6-F4E6F565EF79}"/>
+                </a:ext>
+              </a:extLst>
+            </p:cNvPr>
+            <p:cNvSpPr/>
+            <p:nvPr/>
+          </p:nvSpPr>
+          <p:spPr>
+            <a:xfrm>
+              <a:off x="4479237" y="795131"/>
+              <a:ext cx="1232453" cy="914400"/>
+            </a:xfrm>
+            <a:prstGeom prst="rect">
+              <a:avLst/>
+            </a:prstGeom>
+          </p:spPr>
+          <p:style>
+            <a:lnRef idx="2">
+              <a:schemeClr val="dk1"/>
+            </a:lnRef>
+            <a:fillRef idx="1">
+              <a:schemeClr val="lt1"/>
+            </a:fillRef>
+            <a:effectRef idx="0">
+              <a:schemeClr val="dk1"/>
+            </a:effectRef>
+            <a:fontRef idx="minor">
+              <a:schemeClr val="dk1"/>
+            </a:fontRef>
+          </p:style>
+          <p:txBody>
+            <a:bodyPr rtlCol="0" anchor="ctr"/>
+            <a:lstStyle/>
+            <a:p>
+              <a:pPr algn="ctr"/>
+              <a:r>
+                <a:rPr lang="en-GB" dirty="0"/>
+                <a:t>PID Joint</a:t>
+              </a:r>
+            </a:p>
+            <a:p>
+              <a:pPr algn="ctr"/>
+              <a:r>
+                <a:rPr lang="en-GB" dirty="0"/>
+                <a:t>Position</a:t>
+              </a:r>
+            </a:p>
+            <a:p>
+              <a:pPr algn="ctr"/>
+              <a:r>
+                <a:rPr lang="en-GB" dirty="0"/>
+                <a:t>Controllers</a:t>
+              </a:r>
+            </a:p>
+          </p:txBody>
+        </p:sp>
+        <p:cxnSp>
+          <p:nvCxnSpPr>
+            <p:cNvPr id="16" name="Straight Arrow Connector 15">
+              <a:extLst>
+                <a:ext uri="{FF2B5EF4-FFF2-40B4-BE49-F238E27FC236}">
+                  <a16:creationId xmlns:a16="http://schemas.microsoft.com/office/drawing/2014/main" id="{6A2C2A79-9DF1-4B28-9C0E-0684AF9D5198}"/>
+                </a:ext>
+              </a:extLst>
+            </p:cNvPr>
+            <p:cNvCxnSpPr>
+              <a:cxnSpLocks/>
+              <a:stCxn id="11" idx="3"/>
+            </p:cNvCxnSpPr>
+            <p:nvPr/>
+          </p:nvCxnSpPr>
+          <p:spPr>
+            <a:xfrm>
+              <a:off x="5711690" y="1252331"/>
+              <a:ext cx="781879" cy="0"/>
+            </a:xfrm>
+            <a:prstGeom prst="straightConnector1">
+              <a:avLst/>
+            </a:prstGeom>
+            <a:ln>
+              <a:tailEnd type="triangle"/>
+            </a:ln>
+          </p:spPr>
+          <p:style>
+            <a:lnRef idx="1">
+              <a:schemeClr val="dk1"/>
+            </a:lnRef>
+            <a:fillRef idx="0">
+              <a:schemeClr val="dk1"/>
+            </a:fillRef>
+            <a:effectRef idx="0">
+              <a:schemeClr val="dk1"/>
+            </a:effectRef>
+            <a:fontRef idx="minor">
+              <a:schemeClr val="tx1"/>
+            </a:fontRef>
+          </p:style>
+        </p:cxnSp>
+        <p:cxnSp>
+          <p:nvCxnSpPr>
+            <p:cNvPr id="37" name="Straight Arrow Connector 36">
+              <a:extLst>
+                <a:ext uri="{FF2B5EF4-FFF2-40B4-BE49-F238E27FC236}">
+                  <a16:creationId xmlns:a16="http://schemas.microsoft.com/office/drawing/2014/main" id="{DBA30C66-EC96-4F49-9CA6-59C18E26D00E}"/>
+                </a:ext>
+              </a:extLst>
+            </p:cNvPr>
+            <p:cNvCxnSpPr>
+              <a:cxnSpLocks/>
+              <a:endCxn id="11" idx="1"/>
+            </p:cNvCxnSpPr>
+            <p:nvPr/>
+          </p:nvCxnSpPr>
+          <p:spPr>
+            <a:xfrm>
+              <a:off x="3697358" y="1252331"/>
+              <a:ext cx="781879" cy="0"/>
+            </a:xfrm>
+            <a:prstGeom prst="straightConnector1">
+              <a:avLst/>
+            </a:prstGeom>
+            <a:ln>
+              <a:tailEnd type="triangle"/>
+            </a:ln>
+          </p:spPr>
+          <p:style>
+            <a:lnRef idx="1">
+              <a:schemeClr val="dk1"/>
+            </a:lnRef>
+            <a:fillRef idx="0">
+              <a:schemeClr val="dk1"/>
+            </a:fillRef>
+            <a:effectRef idx="0">
+              <a:schemeClr val="dk1"/>
+            </a:effectRef>
+            <a:fontRef idx="minor">
+              <a:schemeClr val="tx1"/>
+            </a:fontRef>
+          </p:style>
+        </p:cxnSp>
+        <p:sp>
+          <p:nvSpPr>
+            <p:cNvPr id="92" name="TextBox 91">
+              <a:extLst>
+                <a:ext uri="{FF2B5EF4-FFF2-40B4-BE49-F238E27FC236}">
+                  <a16:creationId xmlns:a16="http://schemas.microsoft.com/office/drawing/2014/main" id="{BB5E02A7-C41E-4D67-9848-1A82E50F8B1E}"/>
+                </a:ext>
+              </a:extLst>
+            </p:cNvPr>
+            <p:cNvSpPr txBox="1"/>
+            <p:nvPr/>
+          </p:nvSpPr>
+          <p:spPr>
+            <a:xfrm>
+              <a:off x="3668643" y="921614"/>
+              <a:ext cx="827021" cy="369332"/>
+            </a:xfrm>
+            <a:prstGeom prst="rect">
+              <a:avLst/>
+            </a:prstGeom>
+            <a:noFill/>
+          </p:spPr>
+          <p:txBody>
+            <a:bodyPr wrap="none" rtlCol="0">
+              <a:spAutoFit/>
+            </a:bodyPr>
+            <a:lstStyle/>
+            <a:p>
+              <a:r>
+                <a:rPr lang="el-GR" dirty="0"/>
+                <a:t>θ</a:t>
+              </a:r>
+              <a:r>
+                <a:rPr lang="en-GB" baseline="-25000" dirty="0"/>
+                <a:t>0e</a:t>
+              </a:r>
+              <a:r>
+                <a:rPr lang="en-GB" dirty="0"/>
+                <a:t>,</a:t>
+              </a:r>
+              <a:r>
+                <a:rPr lang="el-GR" dirty="0"/>
+                <a:t>θ</a:t>
+              </a:r>
+              <a:r>
+                <a:rPr lang="en-GB" baseline="-25000" dirty="0"/>
+                <a:t>1e</a:t>
+              </a:r>
+            </a:p>
+          </p:txBody>
+        </p:sp>
+        <p:sp>
+          <p:nvSpPr>
+            <p:cNvPr id="93" name="TextBox 92">
+              <a:extLst>
+                <a:ext uri="{FF2B5EF4-FFF2-40B4-BE49-F238E27FC236}">
+                  <a16:creationId xmlns:a16="http://schemas.microsoft.com/office/drawing/2014/main" id="{950BABDD-BB15-4141-A6F7-01D6497CB3CE}"/>
+                </a:ext>
+              </a:extLst>
+            </p:cNvPr>
+            <p:cNvSpPr txBox="1"/>
+            <p:nvPr/>
+          </p:nvSpPr>
+          <p:spPr>
+            <a:xfrm>
+              <a:off x="5788604" y="904965"/>
+              <a:ext cx="643125" cy="369332"/>
+            </a:xfrm>
+            <a:prstGeom prst="rect">
+              <a:avLst/>
+            </a:prstGeom>
+            <a:noFill/>
+          </p:spPr>
+          <p:txBody>
+            <a:bodyPr wrap="none" rtlCol="0">
+              <a:spAutoFit/>
+            </a:bodyPr>
+            <a:lstStyle/>
+            <a:p>
+              <a:r>
+                <a:rPr lang="en-GB" dirty="0"/>
+                <a:t>u</a:t>
+              </a:r>
+              <a:r>
+                <a:rPr lang="en-GB" baseline="-25000" dirty="0"/>
+                <a:t>0</a:t>
+              </a:r>
+              <a:r>
+                <a:rPr lang="en-GB" dirty="0"/>
+                <a:t>,u</a:t>
+              </a:r>
+              <a:r>
+                <a:rPr lang="en-GB" baseline="-25000" dirty="0"/>
+                <a:t>1</a:t>
+              </a:r>
+            </a:p>
+          </p:txBody>
+        </p:sp>
+      </p:grpSp>
+      <p:grpSp>
+        <p:nvGrpSpPr>
+          <p:cNvPr id="66" name="Group 65">
+            <a:extLst>
+              <a:ext uri="{FF2B5EF4-FFF2-40B4-BE49-F238E27FC236}">
+                <a16:creationId xmlns:a16="http://schemas.microsoft.com/office/drawing/2014/main" id="{1ED9BDB9-453A-4998-88F8-9748B4DCB113}"/>
+              </a:ext>
+            </a:extLst>
+          </p:cNvPr>
+          <p:cNvGrpSpPr/>
+          <p:nvPr/>
+        </p:nvGrpSpPr>
+        <p:grpSpPr>
+          <a:xfrm>
+            <a:off x="3079391" y="2825411"/>
+            <a:ext cx="6023835" cy="2753708"/>
+            <a:chOff x="1666985" y="2729949"/>
+            <a:chExt cx="6023835" cy="2753708"/>
+          </a:xfrm>
+        </p:grpSpPr>
+        <p:cxnSp>
+          <p:nvCxnSpPr>
+            <p:cNvPr id="29" name="Straight Arrow Connector 28">
+              <a:extLst>
+                <a:ext uri="{FF2B5EF4-FFF2-40B4-BE49-F238E27FC236}">
+                  <a16:creationId xmlns:a16="http://schemas.microsoft.com/office/drawing/2014/main" id="{B5186574-C894-456F-AEA1-96C7ECA151FB}"/>
+                </a:ext>
+              </a:extLst>
+            </p:cNvPr>
+            <p:cNvCxnSpPr>
+              <a:cxnSpLocks/>
+              <a:endCxn id="44" idx="1"/>
+            </p:cNvCxnSpPr>
+            <p:nvPr/>
+          </p:nvCxnSpPr>
+          <p:spPr>
+            <a:xfrm>
+              <a:off x="1669774" y="4054025"/>
+              <a:ext cx="2102541" cy="0"/>
+            </a:xfrm>
+            <a:prstGeom prst="straightConnector1">
+              <a:avLst/>
+            </a:prstGeom>
+            <a:ln>
+              <a:tailEnd type="triangle"/>
+            </a:ln>
+          </p:spPr>
+          <p:style>
+            <a:lnRef idx="1">
+              <a:schemeClr val="dk1"/>
+            </a:lnRef>
+            <a:fillRef idx="0">
+              <a:schemeClr val="dk1"/>
+            </a:fillRef>
+            <a:effectRef idx="0">
+              <a:schemeClr val="dk1"/>
+            </a:effectRef>
+            <a:fontRef idx="minor">
+              <a:schemeClr val="tx1"/>
+            </a:fontRef>
+          </p:style>
+        </p:cxnSp>
+        <p:sp>
+          <p:nvSpPr>
+            <p:cNvPr id="31" name="TextBox 30">
+              <a:extLst>
+                <a:ext uri="{FF2B5EF4-FFF2-40B4-BE49-F238E27FC236}">
+                  <a16:creationId xmlns:a16="http://schemas.microsoft.com/office/drawing/2014/main" id="{772D5B13-F0A6-4A2C-982D-A53ABE936BC8}"/>
+                </a:ext>
+              </a:extLst>
+            </p:cNvPr>
+            <p:cNvSpPr txBox="1"/>
+            <p:nvPr/>
+          </p:nvSpPr>
+          <p:spPr>
+            <a:xfrm>
+              <a:off x="1666985" y="3695139"/>
+              <a:ext cx="827021" cy="369332"/>
+            </a:xfrm>
+            <a:prstGeom prst="rect">
+              <a:avLst/>
+            </a:prstGeom>
+            <a:noFill/>
+          </p:spPr>
+          <p:txBody>
+            <a:bodyPr wrap="none" rtlCol="0">
+              <a:spAutoFit/>
+            </a:bodyPr>
+            <a:lstStyle/>
+            <a:p>
+              <a:r>
+                <a:rPr lang="el-GR" dirty="0"/>
+                <a:t>θ</a:t>
+              </a:r>
+              <a:r>
+                <a:rPr lang="en-GB" baseline="-25000" dirty="0"/>
+                <a:t>0e</a:t>
+              </a:r>
+              <a:r>
+                <a:rPr lang="en-GB" dirty="0"/>
+                <a:t>,</a:t>
+              </a:r>
+              <a:r>
+                <a:rPr lang="el-GR" dirty="0"/>
+                <a:t>θ</a:t>
+              </a:r>
+              <a:r>
+                <a:rPr lang="en-GB" baseline="-25000" dirty="0"/>
+                <a:t>1e</a:t>
+              </a:r>
+            </a:p>
+          </p:txBody>
+        </p:sp>
+        <p:cxnSp>
+          <p:nvCxnSpPr>
+            <p:cNvPr id="36" name="Straight Arrow Connector 35">
+              <a:extLst>
+                <a:ext uri="{FF2B5EF4-FFF2-40B4-BE49-F238E27FC236}">
+                  <a16:creationId xmlns:a16="http://schemas.microsoft.com/office/drawing/2014/main" id="{DA0BFE02-35E9-48CD-BB8C-74BEDD235C9E}"/>
+                </a:ext>
+              </a:extLst>
+            </p:cNvPr>
+            <p:cNvCxnSpPr>
+              <a:cxnSpLocks/>
+            </p:cNvCxnSpPr>
+            <p:nvPr/>
+          </p:nvCxnSpPr>
+          <p:spPr>
+            <a:xfrm>
+              <a:off x="6908941" y="4052951"/>
+              <a:ext cx="781879" cy="0"/>
+            </a:xfrm>
+            <a:prstGeom prst="straightConnector1">
+              <a:avLst/>
+            </a:prstGeom>
+            <a:ln>
+              <a:tailEnd type="triangle"/>
+            </a:ln>
+          </p:spPr>
+          <p:style>
+            <a:lnRef idx="1">
+              <a:schemeClr val="dk1"/>
+            </a:lnRef>
+            <a:fillRef idx="0">
+              <a:schemeClr val="dk1"/>
+            </a:fillRef>
+            <a:effectRef idx="0">
+              <a:schemeClr val="dk1"/>
+            </a:effectRef>
+            <a:fontRef idx="minor">
+              <a:schemeClr val="tx1"/>
+            </a:fontRef>
+          </p:style>
+        </p:cxnSp>
+        <p:sp>
+          <p:nvSpPr>
+            <p:cNvPr id="38" name="TextBox 37">
+              <a:extLst>
+                <a:ext uri="{FF2B5EF4-FFF2-40B4-BE49-F238E27FC236}">
+                  <a16:creationId xmlns:a16="http://schemas.microsoft.com/office/drawing/2014/main" id="{C826D759-F5E0-450D-B63C-FC7D4A9386F6}"/>
+                </a:ext>
+              </a:extLst>
+            </p:cNvPr>
+            <p:cNvSpPr txBox="1"/>
+            <p:nvPr/>
+          </p:nvSpPr>
+          <p:spPr>
+            <a:xfrm>
+              <a:off x="6985855" y="3705585"/>
+              <a:ext cx="643125" cy="369332"/>
+            </a:xfrm>
+            <a:prstGeom prst="rect">
+              <a:avLst/>
+            </a:prstGeom>
+            <a:noFill/>
+          </p:spPr>
+          <p:txBody>
+            <a:bodyPr wrap="none" rtlCol="0">
+              <a:spAutoFit/>
+            </a:bodyPr>
+            <a:lstStyle/>
+            <a:p>
+              <a:r>
+                <a:rPr lang="en-GB" dirty="0"/>
+                <a:t>u</a:t>
+              </a:r>
+              <a:r>
+                <a:rPr lang="en-GB" baseline="-25000" dirty="0"/>
+                <a:t>0</a:t>
+              </a:r>
+              <a:r>
+                <a:rPr lang="en-GB" dirty="0"/>
+                <a:t>,u</a:t>
+              </a:r>
+              <a:r>
+                <a:rPr lang="en-GB" baseline="-25000" dirty="0"/>
+                <a:t>1</a:t>
+              </a:r>
+            </a:p>
+          </p:txBody>
+        </p:sp>
+        <p:sp>
+          <p:nvSpPr>
+            <p:cNvPr id="39" name="Rectangle 38">
+              <a:extLst>
+                <a:ext uri="{FF2B5EF4-FFF2-40B4-BE49-F238E27FC236}">
+                  <a16:creationId xmlns:a16="http://schemas.microsoft.com/office/drawing/2014/main" id="{B2FBC36E-DC1D-4399-BD8C-56FCF745E1E9}"/>
+                </a:ext>
+              </a:extLst>
+            </p:cNvPr>
+            <p:cNvSpPr/>
+            <p:nvPr/>
+          </p:nvSpPr>
+          <p:spPr>
+            <a:xfrm>
+              <a:off x="4785625" y="2729949"/>
+              <a:ext cx="619675" cy="490329"/>
+            </a:xfrm>
+            <a:prstGeom prst="rect">
+              <a:avLst/>
+            </a:prstGeom>
+          </p:spPr>
+          <p:style>
+            <a:lnRef idx="2">
+              <a:schemeClr val="dk1"/>
+            </a:lnRef>
+            <a:fillRef idx="1">
+              <a:schemeClr val="lt1"/>
+            </a:fillRef>
+            <a:effectRef idx="0">
+              <a:schemeClr val="dk1"/>
+            </a:effectRef>
+            <a:fontRef idx="minor">
+              <a:schemeClr val="dk1"/>
+            </a:fontRef>
+          </p:style>
+          <p:txBody>
+            <a:bodyPr rtlCol="0" anchor="ctr"/>
+            <a:lstStyle/>
+            <a:p>
+              <a:pPr algn="ctr"/>
+              <a:r>
+                <a:rPr lang="en-GB" dirty="0"/>
+                <a:t>Kp</a:t>
+              </a:r>
+            </a:p>
+          </p:txBody>
+        </p:sp>
+        <p:sp>
+          <p:nvSpPr>
+            <p:cNvPr id="40" name="Rectangle 39">
+              <a:extLst>
+                <a:ext uri="{FF2B5EF4-FFF2-40B4-BE49-F238E27FC236}">
+                  <a16:creationId xmlns:a16="http://schemas.microsoft.com/office/drawing/2014/main" id="{AA898776-0D57-476E-8E86-8E78A59369DA}"/>
+                </a:ext>
+              </a:extLst>
+            </p:cNvPr>
+            <p:cNvSpPr/>
+            <p:nvPr/>
+          </p:nvSpPr>
+          <p:spPr>
+            <a:xfrm>
+              <a:off x="4785624" y="3810001"/>
+              <a:ext cx="619675" cy="490329"/>
+            </a:xfrm>
+            <a:prstGeom prst="rect">
+              <a:avLst/>
+            </a:prstGeom>
+          </p:spPr>
+          <p:style>
+            <a:lnRef idx="2">
+              <a:schemeClr val="dk1"/>
+            </a:lnRef>
+            <a:fillRef idx="1">
+              <a:schemeClr val="lt1"/>
+            </a:fillRef>
+            <a:effectRef idx="0">
+              <a:schemeClr val="dk1"/>
+            </a:effectRef>
+            <a:fontRef idx="minor">
+              <a:schemeClr val="dk1"/>
+            </a:fontRef>
+          </p:style>
+          <p:txBody>
+            <a:bodyPr rtlCol="0" anchor="ctr"/>
+            <a:lstStyle/>
+            <a:p>
+              <a:pPr algn="ctr"/>
+              <a:r>
+                <a:rPr lang="en-GB" dirty="0"/>
+                <a:t>Ki</a:t>
+              </a:r>
+            </a:p>
+          </p:txBody>
+        </p:sp>
+        <p:sp>
+          <p:nvSpPr>
+            <p:cNvPr id="41" name="Rectangle 40">
+              <a:extLst>
+                <a:ext uri="{FF2B5EF4-FFF2-40B4-BE49-F238E27FC236}">
+                  <a16:creationId xmlns:a16="http://schemas.microsoft.com/office/drawing/2014/main" id="{F28E3621-3FD9-4A65-8C9B-18006D79AACF}"/>
+                </a:ext>
+              </a:extLst>
+            </p:cNvPr>
+            <p:cNvSpPr/>
+            <p:nvPr/>
+          </p:nvSpPr>
+          <p:spPr>
+            <a:xfrm>
+              <a:off x="4785624" y="4890054"/>
+              <a:ext cx="619675" cy="490329"/>
+            </a:xfrm>
+            <a:prstGeom prst="rect">
+              <a:avLst/>
+            </a:prstGeom>
+          </p:spPr>
+          <p:style>
+            <a:lnRef idx="2">
+              <a:schemeClr val="dk1"/>
+            </a:lnRef>
+            <a:fillRef idx="1">
+              <a:schemeClr val="lt1"/>
+            </a:fillRef>
+            <a:effectRef idx="0">
+              <a:schemeClr val="dk1"/>
+            </a:effectRef>
+            <a:fontRef idx="minor">
+              <a:schemeClr val="dk1"/>
+            </a:fontRef>
+          </p:style>
+          <p:txBody>
+            <a:bodyPr rtlCol="0" anchor="ctr"/>
+            <a:lstStyle/>
+            <a:p>
+              <a:pPr algn="ctr"/>
+              <a:r>
+                <a:rPr lang="en-GB" dirty="0"/>
+                <a:t>Kd</a:t>
+              </a:r>
+            </a:p>
+          </p:txBody>
+        </p:sp>
+        <mc:AlternateContent xmlns:mc="http://schemas.openxmlformats.org/markup-compatibility/2006" xmlns:a14="http://schemas.microsoft.com/office/drawing/2010/main">
+          <mc:Choice Requires="a14">
+            <p:sp>
+              <p:nvSpPr>
+                <p:cNvPr id="44" name="Rectangle 43">
+                  <a:extLst>
+                    <a:ext uri="{FF2B5EF4-FFF2-40B4-BE49-F238E27FC236}">
+                      <a16:creationId xmlns:a16="http://schemas.microsoft.com/office/drawing/2014/main" id="{8097B666-3EE4-4AF1-921B-D64411133DC6}"/>
+                    </a:ext>
+                  </a:extLst>
+                </p:cNvPr>
+                <p:cNvSpPr/>
+                <p:nvPr/>
+              </p:nvSpPr>
+              <p:spPr>
+                <a:xfrm>
+                  <a:off x="3772315" y="3705585"/>
+                  <a:ext cx="619675" cy="696879"/>
+                </a:xfrm>
+                <a:prstGeom prst="rect">
+                  <a:avLst/>
+                </a:prstGeom>
+              </p:spPr>
+              <p:style>
+                <a:lnRef idx="2">
+                  <a:schemeClr val="dk1"/>
+                </a:lnRef>
+                <a:fillRef idx="1">
+                  <a:schemeClr val="lt1"/>
+                </a:fillRef>
+                <a:effectRef idx="0">
+                  <a:schemeClr val="dk1"/>
+                </a:effectRef>
+                <a:fontRef idx="minor">
+                  <a:schemeClr val="dk1"/>
+                </a:fontRef>
+              </p:style>
+              <p:txBody>
+                <a:bodyPr rtlCol="0" anchor="ctr"/>
+                <a:lstStyle/>
+                <a:p>
+                  <a:pPr algn="ctr"/>
+                  <a14:m>
+                    <m:oMathPara xmlns:m="http://schemas.openxmlformats.org/officeDocument/2006/math">
+                      <m:oMathParaPr>
+                        <m:jc m:val="centerGroup"/>
+                      </m:oMathParaPr>
+                      <m:oMath xmlns:m="http://schemas.openxmlformats.org/officeDocument/2006/math">
+                        <m:f>
+                          <m:fPr>
+                            <m:ctrlPr>
+                              <a:rPr lang="en-GB" i="1" smtClean="0">
+                                <a:latin typeface="Cambria Math" panose="02040503050406030204" pitchFamily="18" charset="0"/>
+                              </a:rPr>
+                            </m:ctrlPr>
+                          </m:fPr>
+                          <m:num>
+                            <m:r>
+                              <a:rPr lang="en-GB" b="0" i="1" smtClean="0">
+                                <a:latin typeface="Cambria Math" panose="02040503050406030204" pitchFamily="18" charset="0"/>
+                              </a:rPr>
+                              <m:t>1</m:t>
+                            </m:r>
+                          </m:num>
+                          <m:den>
+                            <m:r>
+                              <a:rPr lang="en-GB" b="0" i="1" smtClean="0">
+                                <a:latin typeface="Cambria Math" panose="02040503050406030204" pitchFamily="18" charset="0"/>
+                              </a:rPr>
+                              <m:t>𝑠</m:t>
+                            </m:r>
+                          </m:den>
+                        </m:f>
+                      </m:oMath>
+                    </m:oMathPara>
+                  </a14:m>
+                  <a:endParaRPr lang="en-GB" dirty="0"/>
+                </a:p>
+              </p:txBody>
+            </p:sp>
+          </mc:Choice>
+          <mc:Fallback xmlns="">
+            <p:sp>
+              <p:nvSpPr>
+                <p:cNvPr id="44" name="Rectangle 43">
+                  <a:extLst>
+                    <a:ext uri="{FF2B5EF4-FFF2-40B4-BE49-F238E27FC236}">
+                      <a16:creationId xmlns:a16="http://schemas.microsoft.com/office/drawing/2014/main" id="{8097B666-3EE4-4AF1-921B-D64411133DC6}"/>
+                    </a:ext>
+                  </a:extLst>
+                </p:cNvPr>
+                <p:cNvSpPr>
+                  <a:spLocks noRot="1" noChangeAspect="1" noMove="1" noResize="1" noEditPoints="1" noAdjustHandles="1" noChangeArrowheads="1" noChangeShapeType="1" noTextEdit="1"/>
+                </p:cNvSpPr>
+                <p:nvPr/>
+              </p:nvSpPr>
+              <p:spPr>
+                <a:xfrm>
+                  <a:off x="3772315" y="3705585"/>
+                  <a:ext cx="619675" cy="696879"/>
+                </a:xfrm>
+                <a:prstGeom prst="rect">
+                  <a:avLst/>
+                </a:prstGeom>
+                <a:blipFill>
+                  <a:blip r:embed="rId2"/>
+                  <a:stretch>
+                    <a:fillRect/>
+                  </a:stretch>
+                </a:blipFill>
+              </p:spPr>
+              <p:txBody>
+                <a:bodyPr/>
+                <a:lstStyle/>
+                <a:p>
+                  <a:r>
+                    <a:rPr lang="en-GB">
+                      <a:noFill/>
+                    </a:rPr>
+                    <a:t> </a:t>
+                  </a:r>
+                </a:p>
+              </p:txBody>
+            </p:sp>
+          </mc:Fallback>
+        </mc:AlternateContent>
+        <mc:AlternateContent xmlns:mc="http://schemas.openxmlformats.org/markup-compatibility/2006" xmlns:a14="http://schemas.microsoft.com/office/drawing/2010/main">
+          <mc:Choice Requires="a14">
+            <p:sp>
+              <p:nvSpPr>
+                <p:cNvPr id="46" name="Rectangle 45">
+                  <a:extLst>
+                    <a:ext uri="{FF2B5EF4-FFF2-40B4-BE49-F238E27FC236}">
+                      <a16:creationId xmlns:a16="http://schemas.microsoft.com/office/drawing/2014/main" id="{B9EFF07D-AE68-4304-9E5E-51A063FB648F}"/>
+                    </a:ext>
+                  </a:extLst>
+                </p:cNvPr>
+                <p:cNvSpPr/>
+                <p:nvPr/>
+              </p:nvSpPr>
+              <p:spPr>
+                <a:xfrm>
+                  <a:off x="3772315" y="4786778"/>
+                  <a:ext cx="619675" cy="696879"/>
+                </a:xfrm>
+                <a:prstGeom prst="rect">
+                  <a:avLst/>
+                </a:prstGeom>
+              </p:spPr>
+              <p:style>
+                <a:lnRef idx="2">
+                  <a:schemeClr val="dk1"/>
+                </a:lnRef>
+                <a:fillRef idx="1">
+                  <a:schemeClr val="lt1"/>
+                </a:fillRef>
+                <a:effectRef idx="0">
+                  <a:schemeClr val="dk1"/>
+                </a:effectRef>
+                <a:fontRef idx="minor">
+                  <a:schemeClr val="dk1"/>
+                </a:fontRef>
+              </p:style>
+              <p:txBody>
+                <a:bodyPr rtlCol="0" anchor="ctr"/>
+                <a:lstStyle/>
+                <a:p>
+                  <a:pPr algn="ctr"/>
+                  <a14:m>
+                    <m:oMathPara xmlns:m="http://schemas.openxmlformats.org/officeDocument/2006/math">
+                      <m:oMathParaPr>
+                        <m:jc m:val="centerGroup"/>
+                      </m:oMathParaPr>
+                      <m:oMath xmlns:m="http://schemas.openxmlformats.org/officeDocument/2006/math">
+                        <m:r>
+                          <a:rPr lang="en-GB" i="1" smtClean="0">
+                            <a:latin typeface="Cambria Math" panose="02040503050406030204" pitchFamily="18" charset="0"/>
+                          </a:rPr>
+                          <m:t>𝑠</m:t>
+                        </m:r>
+                      </m:oMath>
+                    </m:oMathPara>
+                  </a14:m>
+                  <a:endParaRPr lang="en-GB" dirty="0"/>
+                </a:p>
+              </p:txBody>
+            </p:sp>
+          </mc:Choice>
+          <mc:Fallback xmlns="">
+            <p:sp>
+              <p:nvSpPr>
+                <p:cNvPr id="46" name="Rectangle 45">
+                  <a:extLst>
+                    <a:ext uri="{FF2B5EF4-FFF2-40B4-BE49-F238E27FC236}">
+                      <a16:creationId xmlns:a16="http://schemas.microsoft.com/office/drawing/2014/main" id="{B9EFF07D-AE68-4304-9E5E-51A063FB648F}"/>
+                    </a:ext>
+                  </a:extLst>
+                </p:cNvPr>
+                <p:cNvSpPr>
+                  <a:spLocks noRot="1" noChangeAspect="1" noMove="1" noResize="1" noEditPoints="1" noAdjustHandles="1" noChangeArrowheads="1" noChangeShapeType="1" noTextEdit="1"/>
+                </p:cNvSpPr>
+                <p:nvPr/>
+              </p:nvSpPr>
+              <p:spPr>
+                <a:xfrm>
+                  <a:off x="3772315" y="4786778"/>
+                  <a:ext cx="619675" cy="696879"/>
+                </a:xfrm>
+                <a:prstGeom prst="rect">
+                  <a:avLst/>
+                </a:prstGeom>
+                <a:blipFill>
+                  <a:blip r:embed="rId3"/>
+                  <a:stretch>
+                    <a:fillRect/>
+                  </a:stretch>
+                </a:blipFill>
+              </p:spPr>
+              <p:txBody>
+                <a:bodyPr/>
+                <a:lstStyle/>
+                <a:p>
+                  <a:r>
+                    <a:rPr lang="en-GB">
+                      <a:noFill/>
+                    </a:rPr>
+                    <a:t> </a:t>
+                  </a:r>
+                </a:p>
+              </p:txBody>
+            </p:sp>
+          </mc:Fallback>
+        </mc:AlternateContent>
+        <p:cxnSp>
+          <p:nvCxnSpPr>
+            <p:cNvPr id="12" name="Straight Arrow Connector 11">
+              <a:extLst>
+                <a:ext uri="{FF2B5EF4-FFF2-40B4-BE49-F238E27FC236}">
+                  <a16:creationId xmlns:a16="http://schemas.microsoft.com/office/drawing/2014/main" id="{2E6DB821-A10F-47BD-A0FE-ED110C652BCE}"/>
+                </a:ext>
+              </a:extLst>
+            </p:cNvPr>
+            <p:cNvCxnSpPr>
+              <a:stCxn id="44" idx="3"/>
+              <a:endCxn id="40" idx="1"/>
+            </p:cNvCxnSpPr>
+            <p:nvPr/>
+          </p:nvCxnSpPr>
+          <p:spPr>
+            <a:xfrm>
+              <a:off x="4391990" y="4054025"/>
+              <a:ext cx="393634" cy="1141"/>
+            </a:xfrm>
+            <a:prstGeom prst="straightConnector1">
+              <a:avLst/>
+            </a:prstGeom>
+            <a:ln>
+              <a:tailEnd type="triangle"/>
+            </a:ln>
+          </p:spPr>
+          <p:style>
+            <a:lnRef idx="1">
+              <a:schemeClr val="dk1"/>
+            </a:lnRef>
+            <a:fillRef idx="0">
+              <a:schemeClr val="dk1"/>
+            </a:fillRef>
+            <a:effectRef idx="0">
+              <a:schemeClr val="dk1"/>
+            </a:effectRef>
+            <a:fontRef idx="minor">
+              <a:schemeClr val="tx1"/>
+            </a:fontRef>
+          </p:style>
+        </p:cxnSp>
+        <p:cxnSp>
+          <p:nvCxnSpPr>
+            <p:cNvPr id="18" name="Straight Arrow Connector 17">
+              <a:extLst>
+                <a:ext uri="{FF2B5EF4-FFF2-40B4-BE49-F238E27FC236}">
+                  <a16:creationId xmlns:a16="http://schemas.microsoft.com/office/drawing/2014/main" id="{816129E0-440D-48D0-BBD3-B1A0D2E867B6}"/>
+                </a:ext>
+              </a:extLst>
+            </p:cNvPr>
+            <p:cNvCxnSpPr>
+              <a:endCxn id="46" idx="1"/>
+            </p:cNvCxnSpPr>
+            <p:nvPr/>
+          </p:nvCxnSpPr>
+          <p:spPr>
+            <a:xfrm>
+              <a:off x="3061252" y="5135217"/>
+              <a:ext cx="711063" cy="1"/>
+            </a:xfrm>
+            <a:prstGeom prst="straightConnector1">
+              <a:avLst/>
+            </a:prstGeom>
+            <a:ln>
+              <a:tailEnd type="triangle"/>
+            </a:ln>
+          </p:spPr>
+          <p:style>
+            <a:lnRef idx="1">
+              <a:schemeClr val="dk1"/>
+            </a:lnRef>
+            <a:fillRef idx="0">
+              <a:schemeClr val="dk1"/>
+            </a:fillRef>
+            <a:effectRef idx="0">
+              <a:schemeClr val="dk1"/>
+            </a:effectRef>
+            <a:fontRef idx="minor">
+              <a:schemeClr val="tx1"/>
+            </a:fontRef>
+          </p:style>
+        </p:cxnSp>
+        <p:cxnSp>
+          <p:nvCxnSpPr>
+            <p:cNvPr id="22" name="Straight Arrow Connector 21">
+              <a:extLst>
+                <a:ext uri="{FF2B5EF4-FFF2-40B4-BE49-F238E27FC236}">
+                  <a16:creationId xmlns:a16="http://schemas.microsoft.com/office/drawing/2014/main" id="{E3C86EC1-204B-4C0F-97F9-773CD77EEC24}"/>
+                </a:ext>
+              </a:extLst>
+            </p:cNvPr>
+            <p:cNvCxnSpPr>
+              <a:cxnSpLocks/>
+              <a:endCxn id="39" idx="1"/>
+            </p:cNvCxnSpPr>
+            <p:nvPr/>
+          </p:nvCxnSpPr>
+          <p:spPr>
+            <a:xfrm>
+              <a:off x="3061252" y="2972833"/>
+              <a:ext cx="1724373" cy="2281"/>
+            </a:xfrm>
+            <a:prstGeom prst="straightConnector1">
+              <a:avLst/>
+            </a:prstGeom>
+            <a:ln>
+              <a:tailEnd type="triangle"/>
+            </a:ln>
+          </p:spPr>
+          <p:style>
+            <a:lnRef idx="1">
+              <a:schemeClr val="dk1"/>
+            </a:lnRef>
+            <a:fillRef idx="0">
+              <a:schemeClr val="dk1"/>
+            </a:fillRef>
+            <a:effectRef idx="0">
+              <a:schemeClr val="dk1"/>
+            </a:effectRef>
+            <a:fontRef idx="minor">
+              <a:schemeClr val="tx1"/>
+            </a:fontRef>
+          </p:style>
+        </p:cxnSp>
+        <p:cxnSp>
+          <p:nvCxnSpPr>
+            <p:cNvPr id="24" name="Straight Connector 23">
+              <a:extLst>
+                <a:ext uri="{FF2B5EF4-FFF2-40B4-BE49-F238E27FC236}">
+                  <a16:creationId xmlns:a16="http://schemas.microsoft.com/office/drawing/2014/main" id="{90F73F03-56AD-46D1-9AF2-F04AE190CF80}"/>
+                </a:ext>
+              </a:extLst>
+            </p:cNvPr>
+            <p:cNvCxnSpPr>
+              <a:cxnSpLocks/>
+            </p:cNvCxnSpPr>
+            <p:nvPr/>
+          </p:nvCxnSpPr>
+          <p:spPr>
+            <a:xfrm flipV="1">
+              <a:off x="3061252" y="2975113"/>
+              <a:ext cx="0" cy="2149660"/>
+            </a:xfrm>
+            <a:prstGeom prst="line">
+              <a:avLst/>
+            </a:prstGeom>
+          </p:spPr>
+          <p:style>
+            <a:lnRef idx="1">
+              <a:schemeClr val="dk1"/>
+            </a:lnRef>
+            <a:fillRef idx="0">
+              <a:schemeClr val="dk1"/>
+            </a:fillRef>
+            <a:effectRef idx="0">
+              <a:schemeClr val="dk1"/>
+            </a:effectRef>
+            <a:fontRef idx="minor">
+              <a:schemeClr val="tx1"/>
+            </a:fontRef>
+          </p:style>
+        </p:cxnSp>
+        <p:cxnSp>
+          <p:nvCxnSpPr>
+            <p:cNvPr id="48" name="Straight Arrow Connector 47">
+              <a:extLst>
+                <a:ext uri="{FF2B5EF4-FFF2-40B4-BE49-F238E27FC236}">
+                  <a16:creationId xmlns:a16="http://schemas.microsoft.com/office/drawing/2014/main" id="{9DE2F624-1888-46A1-B9D8-1CB30E112DD2}"/>
+                </a:ext>
+              </a:extLst>
+            </p:cNvPr>
+            <p:cNvCxnSpPr>
+              <a:stCxn id="46" idx="3"/>
+              <a:endCxn id="41" idx="1"/>
+            </p:cNvCxnSpPr>
+            <p:nvPr/>
+          </p:nvCxnSpPr>
+          <p:spPr>
+            <a:xfrm>
+              <a:off x="4391990" y="5135218"/>
+              <a:ext cx="393634" cy="1"/>
+            </a:xfrm>
+            <a:prstGeom prst="straightConnector1">
+              <a:avLst/>
+            </a:prstGeom>
+            <a:ln>
+              <a:tailEnd type="triangle"/>
+            </a:ln>
+          </p:spPr>
+          <p:style>
+            <a:lnRef idx="1">
+              <a:schemeClr val="dk1"/>
+            </a:lnRef>
+            <a:fillRef idx="0">
+              <a:schemeClr val="dk1"/>
+            </a:fillRef>
+            <a:effectRef idx="0">
+              <a:schemeClr val="dk1"/>
+            </a:effectRef>
+            <a:fontRef idx="minor">
+              <a:schemeClr val="tx1"/>
+            </a:fontRef>
+          </p:style>
+        </p:cxnSp>
+        <p:sp>
+          <p:nvSpPr>
+            <p:cNvPr id="60" name="Oval 59">
+              <a:extLst>
+                <a:ext uri="{FF2B5EF4-FFF2-40B4-BE49-F238E27FC236}">
+                  <a16:creationId xmlns:a16="http://schemas.microsoft.com/office/drawing/2014/main" id="{AF06CBAE-3845-43CC-9C14-7BFB315D80DE}"/>
+                </a:ext>
+              </a:extLst>
+            </p:cNvPr>
+            <p:cNvSpPr/>
+            <p:nvPr/>
+          </p:nvSpPr>
+          <p:spPr>
+            <a:xfrm>
+              <a:off x="6366180" y="3751769"/>
+              <a:ext cx="569843" cy="596347"/>
+            </a:xfrm>
+            <a:prstGeom prst="ellipse">
+              <a:avLst/>
+            </a:prstGeom>
+          </p:spPr>
+          <p:style>
+            <a:lnRef idx="2">
+              <a:schemeClr val="dk1"/>
+            </a:lnRef>
+            <a:fillRef idx="1">
+              <a:schemeClr val="lt1"/>
+            </a:fillRef>
+            <a:effectRef idx="0">
+              <a:schemeClr val="dk1"/>
+            </a:effectRef>
+            <a:fontRef idx="minor">
+              <a:schemeClr val="dk1"/>
+            </a:fontRef>
+          </p:style>
+          <p:txBody>
+            <a:bodyPr rtlCol="0" anchor="ctr"/>
+            <a:lstStyle/>
+            <a:p>
+              <a:pPr algn="ctr"/>
+              <a:endParaRPr lang="en-GB"/>
+            </a:p>
+          </p:txBody>
+        </p:sp>
+        <p:cxnSp>
+          <p:nvCxnSpPr>
+            <p:cNvPr id="50" name="Straight Connector 49">
+              <a:extLst>
+                <a:ext uri="{FF2B5EF4-FFF2-40B4-BE49-F238E27FC236}">
+                  <a16:creationId xmlns:a16="http://schemas.microsoft.com/office/drawing/2014/main" id="{270AD6E7-4168-4741-AB47-3FFF0247C026}"/>
+                </a:ext>
+              </a:extLst>
+            </p:cNvPr>
+            <p:cNvCxnSpPr>
+              <a:stCxn id="60" idx="1"/>
+              <a:endCxn id="60" idx="5"/>
+            </p:cNvCxnSpPr>
+            <p:nvPr/>
+          </p:nvCxnSpPr>
+          <p:spPr>
+            <a:xfrm>
+              <a:off x="6449632" y="3839102"/>
+              <a:ext cx="402939" cy="421681"/>
+            </a:xfrm>
+            <a:prstGeom prst="line">
+              <a:avLst/>
+            </a:prstGeom>
+          </p:spPr>
+          <p:style>
+            <a:lnRef idx="2">
+              <a:schemeClr val="dk1"/>
+            </a:lnRef>
+            <a:fillRef idx="1">
+              <a:schemeClr val="lt1"/>
+            </a:fillRef>
+            <a:effectRef idx="0">
+              <a:schemeClr val="dk1"/>
+            </a:effectRef>
+            <a:fontRef idx="minor">
+              <a:schemeClr val="dk1"/>
+            </a:fontRef>
+          </p:style>
+        </p:cxnSp>
+        <p:cxnSp>
+          <p:nvCxnSpPr>
+            <p:cNvPr id="52" name="Straight Connector 51">
+              <a:extLst>
+                <a:ext uri="{FF2B5EF4-FFF2-40B4-BE49-F238E27FC236}">
+                  <a16:creationId xmlns:a16="http://schemas.microsoft.com/office/drawing/2014/main" id="{93CE7A17-CB80-42BF-AE94-BA934373C350}"/>
+                </a:ext>
+              </a:extLst>
+            </p:cNvPr>
+            <p:cNvCxnSpPr>
+              <a:stCxn id="60" idx="3"/>
+              <a:endCxn id="60" idx="7"/>
+            </p:cNvCxnSpPr>
+            <p:nvPr/>
+          </p:nvCxnSpPr>
+          <p:spPr>
+            <a:xfrm flipV="1">
+              <a:off x="6449632" y="3839102"/>
+              <a:ext cx="402939" cy="421681"/>
+            </a:xfrm>
+            <a:prstGeom prst="line">
+              <a:avLst/>
+            </a:prstGeom>
+          </p:spPr>
+          <p:style>
+            <a:lnRef idx="2">
+              <a:schemeClr val="dk1"/>
+            </a:lnRef>
+            <a:fillRef idx="1">
+              <a:schemeClr val="lt1"/>
+            </a:fillRef>
+            <a:effectRef idx="0">
+              <a:schemeClr val="dk1"/>
+            </a:effectRef>
+            <a:fontRef idx="minor">
+              <a:schemeClr val="dk1"/>
+            </a:fontRef>
+          </p:style>
+        </p:cxnSp>
+        <p:cxnSp>
+          <p:nvCxnSpPr>
+            <p:cNvPr id="54" name="Straight Arrow Connector 53">
+              <a:extLst>
+                <a:ext uri="{FF2B5EF4-FFF2-40B4-BE49-F238E27FC236}">
+                  <a16:creationId xmlns:a16="http://schemas.microsoft.com/office/drawing/2014/main" id="{AB9CA7A0-FEF6-413A-B9E3-437A530BCB90}"/>
+                </a:ext>
+              </a:extLst>
+            </p:cNvPr>
+            <p:cNvCxnSpPr>
+              <a:stCxn id="40" idx="3"/>
+              <a:endCxn id="60" idx="2"/>
+            </p:cNvCxnSpPr>
+            <p:nvPr/>
+          </p:nvCxnSpPr>
+          <p:spPr>
+            <a:xfrm flipV="1">
+              <a:off x="5405299" y="4049943"/>
+              <a:ext cx="960881" cy="5223"/>
+            </a:xfrm>
+            <a:prstGeom prst="straightConnector1">
+              <a:avLst/>
+            </a:prstGeom>
+            <a:ln>
+              <a:tailEnd type="triangle"/>
+            </a:ln>
+          </p:spPr>
+          <p:style>
+            <a:lnRef idx="1">
+              <a:schemeClr val="dk1"/>
+            </a:lnRef>
+            <a:fillRef idx="0">
+              <a:schemeClr val="dk1"/>
+            </a:fillRef>
+            <a:effectRef idx="0">
+              <a:schemeClr val="dk1"/>
+            </a:effectRef>
+            <a:fontRef idx="minor">
+              <a:schemeClr val="tx1"/>
+            </a:fontRef>
+          </p:style>
+        </p:cxnSp>
+        <p:cxnSp>
+          <p:nvCxnSpPr>
+            <p:cNvPr id="56" name="Connector: Elbow 55">
+              <a:extLst>
+                <a:ext uri="{FF2B5EF4-FFF2-40B4-BE49-F238E27FC236}">
+                  <a16:creationId xmlns:a16="http://schemas.microsoft.com/office/drawing/2014/main" id="{C1AE2579-CB8B-489D-847D-DBB86FCFF2FD}"/>
+                </a:ext>
+              </a:extLst>
+            </p:cNvPr>
+            <p:cNvCxnSpPr>
+              <a:endCxn id="60" idx="0"/>
+            </p:cNvCxnSpPr>
+            <p:nvPr/>
+          </p:nvCxnSpPr>
+          <p:spPr>
+            <a:xfrm>
+              <a:off x="5405299" y="2972833"/>
+              <a:ext cx="1245803" cy="778936"/>
+            </a:xfrm>
+            <a:prstGeom prst="bentConnector2">
+              <a:avLst/>
+            </a:prstGeom>
+            <a:ln>
+              <a:tailEnd type="triangle"/>
+            </a:ln>
+          </p:spPr>
+          <p:style>
+            <a:lnRef idx="1">
+              <a:schemeClr val="dk1"/>
+            </a:lnRef>
+            <a:fillRef idx="0">
+              <a:schemeClr val="dk1"/>
+            </a:fillRef>
+            <a:effectRef idx="0">
+              <a:schemeClr val="dk1"/>
+            </a:effectRef>
+            <a:fontRef idx="minor">
+              <a:schemeClr val="tx1"/>
+            </a:fontRef>
+          </p:style>
+        </p:cxnSp>
+        <p:cxnSp>
+          <p:nvCxnSpPr>
+            <p:cNvPr id="62" name="Straight Arrow Connector 61">
+              <a:extLst>
+                <a:ext uri="{FF2B5EF4-FFF2-40B4-BE49-F238E27FC236}">
+                  <a16:creationId xmlns:a16="http://schemas.microsoft.com/office/drawing/2014/main" id="{ED54B1EC-4B37-45DE-B77F-9175A2BBABCE}"/>
+                </a:ext>
+              </a:extLst>
+            </p:cNvPr>
+            <p:cNvCxnSpPr>
+              <a:endCxn id="60" idx="4"/>
+            </p:cNvCxnSpPr>
+            <p:nvPr/>
+          </p:nvCxnSpPr>
+          <p:spPr>
+            <a:xfrm flipV="1">
+              <a:off x="6651101" y="4348116"/>
+              <a:ext cx="1" cy="776657"/>
+            </a:xfrm>
+            <a:prstGeom prst="straightConnector1">
+              <a:avLst/>
+            </a:prstGeom>
+            <a:ln>
+              <a:tailEnd type="triangle"/>
+            </a:ln>
+          </p:spPr>
+          <p:style>
+            <a:lnRef idx="1">
+              <a:schemeClr val="dk1"/>
+            </a:lnRef>
+            <a:fillRef idx="0">
+              <a:schemeClr val="dk1"/>
+            </a:fillRef>
+            <a:effectRef idx="0">
+              <a:schemeClr val="dk1"/>
+            </a:effectRef>
+            <a:fontRef idx="minor">
+              <a:schemeClr val="tx1"/>
+            </a:fontRef>
+          </p:style>
+        </p:cxnSp>
+        <p:cxnSp>
+          <p:nvCxnSpPr>
+            <p:cNvPr id="64" name="Straight Connector 63">
+              <a:extLst>
+                <a:ext uri="{FF2B5EF4-FFF2-40B4-BE49-F238E27FC236}">
+                  <a16:creationId xmlns:a16="http://schemas.microsoft.com/office/drawing/2014/main" id="{80880946-96FE-4B28-BBAE-25EA45DC4100}"/>
+                </a:ext>
+              </a:extLst>
+            </p:cNvPr>
+            <p:cNvCxnSpPr>
+              <a:stCxn id="41" idx="3"/>
+            </p:cNvCxnSpPr>
+            <p:nvPr/>
+          </p:nvCxnSpPr>
+          <p:spPr>
+            <a:xfrm flipV="1">
+              <a:off x="5405299" y="5135217"/>
+              <a:ext cx="1245802" cy="2"/>
+            </a:xfrm>
+            <a:prstGeom prst="line">
+              <a:avLst/>
+            </a:prstGeom>
+          </p:spPr>
+          <p:style>
+            <a:lnRef idx="1">
+              <a:schemeClr val="dk1"/>
+            </a:lnRef>
+            <a:fillRef idx="0">
+              <a:schemeClr val="dk1"/>
+            </a:fillRef>
+            <a:effectRef idx="0">
+              <a:schemeClr val="dk1"/>
+            </a:effectRef>
+            <a:fontRef idx="minor">
+              <a:schemeClr val="tx1"/>
+            </a:fontRef>
+          </p:style>
+        </p:cxnSp>
+        <p:sp>
+          <p:nvSpPr>
+            <p:cNvPr id="65" name="TextBox 64">
+              <a:extLst>
+                <a:ext uri="{FF2B5EF4-FFF2-40B4-BE49-F238E27FC236}">
+                  <a16:creationId xmlns:a16="http://schemas.microsoft.com/office/drawing/2014/main" id="{846D667D-F014-4133-970F-C0B96E1A1FAF}"/>
+                </a:ext>
+              </a:extLst>
+            </p:cNvPr>
+            <p:cNvSpPr txBox="1"/>
+            <p:nvPr/>
+          </p:nvSpPr>
+          <p:spPr>
+            <a:xfrm>
+              <a:off x="6510816" y="3705355"/>
+              <a:ext cx="300082" cy="369332"/>
+            </a:xfrm>
+            <a:prstGeom prst="rect">
+              <a:avLst/>
+            </a:prstGeom>
+            <a:noFill/>
+          </p:spPr>
+          <p:txBody>
+            <a:bodyPr wrap="none" rtlCol="0">
+              <a:spAutoFit/>
+            </a:bodyPr>
+            <a:lstStyle/>
+            <a:p>
+              <a:r>
+                <a:rPr lang="en-GB" dirty="0"/>
+                <a:t>+</a:t>
+              </a:r>
+            </a:p>
+          </p:txBody>
+        </p:sp>
+        <p:sp>
+          <p:nvSpPr>
+            <p:cNvPr id="77" name="TextBox 76">
+              <a:extLst>
+                <a:ext uri="{FF2B5EF4-FFF2-40B4-BE49-F238E27FC236}">
+                  <a16:creationId xmlns:a16="http://schemas.microsoft.com/office/drawing/2014/main" id="{77001E40-A728-4FD2-9064-A06C8FA2D7CF}"/>
+                </a:ext>
+              </a:extLst>
+            </p:cNvPr>
+            <p:cNvSpPr txBox="1"/>
+            <p:nvPr/>
+          </p:nvSpPr>
+          <p:spPr>
+            <a:xfrm>
+              <a:off x="6322124" y="3865276"/>
+              <a:ext cx="300082" cy="369332"/>
+            </a:xfrm>
+            <a:prstGeom prst="rect">
+              <a:avLst/>
+            </a:prstGeom>
+            <a:noFill/>
+          </p:spPr>
+          <p:txBody>
+            <a:bodyPr wrap="none" rtlCol="0">
+              <a:spAutoFit/>
+            </a:bodyPr>
+            <a:lstStyle/>
+            <a:p>
+              <a:r>
+                <a:rPr lang="en-GB" dirty="0"/>
+                <a:t>+</a:t>
+              </a:r>
+            </a:p>
+          </p:txBody>
+        </p:sp>
+        <p:sp>
+          <p:nvSpPr>
+            <p:cNvPr id="79" name="TextBox 78">
+              <a:extLst>
+                <a:ext uri="{FF2B5EF4-FFF2-40B4-BE49-F238E27FC236}">
+                  <a16:creationId xmlns:a16="http://schemas.microsoft.com/office/drawing/2014/main" id="{B7DB1285-21E9-49B0-876A-87CC44080495}"/>
+                </a:ext>
+              </a:extLst>
+            </p:cNvPr>
+            <p:cNvSpPr txBox="1"/>
+            <p:nvPr/>
+          </p:nvSpPr>
+          <p:spPr>
+            <a:xfrm>
+              <a:off x="6506737" y="4025198"/>
+              <a:ext cx="300082" cy="369332"/>
+            </a:xfrm>
+            <a:prstGeom prst="rect">
+              <a:avLst/>
+            </a:prstGeom>
+            <a:noFill/>
+          </p:spPr>
+          <p:txBody>
+            <a:bodyPr wrap="none" rtlCol="0">
+              <a:spAutoFit/>
+            </a:bodyPr>
+            <a:lstStyle/>
+            <a:p>
+              <a:r>
+                <a:rPr lang="en-GB" dirty="0"/>
+                <a:t>+</a:t>
+              </a:r>
+            </a:p>
+          </p:txBody>
+        </p:sp>
+      </p:grpSp>
+      <p:sp>
+        <p:nvSpPr>
+          <p:cNvPr id="70" name="TextBox 69">
+            <a:extLst>
+              <a:ext uri="{FF2B5EF4-FFF2-40B4-BE49-F238E27FC236}">
+                <a16:creationId xmlns:a16="http://schemas.microsoft.com/office/drawing/2014/main" id="{23DF510A-08FB-4301-B76E-F82BE50217DB}"/>
+              </a:ext>
+            </a:extLst>
+          </p:cNvPr>
+          <p:cNvSpPr txBox="1"/>
+          <p:nvPr/>
+        </p:nvSpPr>
+        <p:spPr>
+          <a:xfrm>
+            <a:off x="5858713" y="1896541"/>
+            <a:ext cx="465192" cy="769441"/>
+          </a:xfrm>
+          <a:prstGeom prst="rect">
+            <a:avLst/>
+          </a:prstGeom>
+          <a:noFill/>
+        </p:spPr>
+        <p:txBody>
+          <a:bodyPr wrap="none" rtlCol="0">
+            <a:spAutoFit/>
+          </a:bodyPr>
+          <a:lstStyle/>
+          <a:p>
+            <a:r>
+              <a:rPr lang="en-GB" sz="4400" dirty="0"/>
+              <a:t>=</a:t>
+            </a:r>
+          </a:p>
+        </p:txBody>
+      </p:sp>
+      <p:sp>
+        <p:nvSpPr>
+          <p:cNvPr id="2" name="TextBox 1">
+            <a:extLst>
+              <a:ext uri="{FF2B5EF4-FFF2-40B4-BE49-F238E27FC236}">
+                <a16:creationId xmlns:a16="http://schemas.microsoft.com/office/drawing/2014/main" id="{A1727C0E-CFF5-4F88-9009-7C392E5B6E9F}"/>
+              </a:ext>
+            </a:extLst>
+          </p:cNvPr>
+          <p:cNvSpPr txBox="1"/>
+          <p:nvPr/>
+        </p:nvSpPr>
+        <p:spPr>
+          <a:xfrm>
+            <a:off x="6832096" y="2708094"/>
+            <a:ext cx="1362361" cy="369332"/>
+          </a:xfrm>
+          <a:prstGeom prst="rect">
+            <a:avLst/>
+          </a:prstGeom>
+          <a:noFill/>
+        </p:spPr>
+        <p:txBody>
+          <a:bodyPr wrap="none" rtlCol="0">
+            <a:spAutoFit/>
+          </a:bodyPr>
+          <a:lstStyle/>
+          <a:p>
+            <a:r>
+              <a:rPr lang="en-GB" i="1" dirty="0">
+                <a:solidFill>
+                  <a:schemeClr val="accent6">
+                    <a:lumMod val="75000"/>
+                  </a:schemeClr>
+                </a:solidFill>
+              </a:rPr>
+              <a:t>Proportional</a:t>
+            </a:r>
+          </a:p>
+        </p:txBody>
+      </p:sp>
+      <p:sp>
+        <p:nvSpPr>
+          <p:cNvPr id="35" name="TextBox 34">
+            <a:extLst>
+              <a:ext uri="{FF2B5EF4-FFF2-40B4-BE49-F238E27FC236}">
+                <a16:creationId xmlns:a16="http://schemas.microsoft.com/office/drawing/2014/main" id="{728D9B4C-4A26-479D-A49D-F10B1B94089E}"/>
+              </a:ext>
+            </a:extLst>
+          </p:cNvPr>
+          <p:cNvSpPr txBox="1"/>
+          <p:nvPr/>
+        </p:nvSpPr>
+        <p:spPr>
+          <a:xfrm>
+            <a:off x="6815804" y="3811265"/>
+            <a:ext cx="912494" cy="369332"/>
+          </a:xfrm>
+          <a:prstGeom prst="rect">
+            <a:avLst/>
+          </a:prstGeom>
+          <a:noFill/>
+        </p:spPr>
+        <p:txBody>
+          <a:bodyPr wrap="none" rtlCol="0">
+            <a:spAutoFit/>
+          </a:bodyPr>
+          <a:lstStyle/>
+          <a:p>
+            <a:r>
+              <a:rPr lang="en-GB" i="1" dirty="0">
+                <a:solidFill>
+                  <a:schemeClr val="accent6">
+                    <a:lumMod val="75000"/>
+                  </a:schemeClr>
+                </a:solidFill>
+              </a:rPr>
+              <a:t>Integral</a:t>
+            </a:r>
+          </a:p>
+        </p:txBody>
+      </p:sp>
+      <p:sp>
+        <p:nvSpPr>
+          <p:cNvPr id="42" name="TextBox 41">
+            <a:extLst>
+              <a:ext uri="{FF2B5EF4-FFF2-40B4-BE49-F238E27FC236}">
+                <a16:creationId xmlns:a16="http://schemas.microsoft.com/office/drawing/2014/main" id="{3876CBE0-5805-40AA-ADCC-62A24404F2ED}"/>
+              </a:ext>
+            </a:extLst>
+          </p:cNvPr>
+          <p:cNvSpPr txBox="1"/>
+          <p:nvPr/>
+        </p:nvSpPr>
+        <p:spPr>
+          <a:xfrm>
+            <a:off x="6857681" y="4913119"/>
+            <a:ext cx="1133644" cy="369332"/>
+          </a:xfrm>
+          <a:prstGeom prst="rect">
+            <a:avLst/>
+          </a:prstGeom>
+          <a:noFill/>
+        </p:spPr>
+        <p:txBody>
+          <a:bodyPr wrap="none" rtlCol="0">
+            <a:spAutoFit/>
+          </a:bodyPr>
+          <a:lstStyle/>
+          <a:p>
+            <a:r>
+              <a:rPr lang="en-GB" i="1" dirty="0">
+                <a:solidFill>
+                  <a:schemeClr val="accent6">
+                    <a:lumMod val="75000"/>
+                  </a:schemeClr>
+                </a:solidFill>
+              </a:rPr>
+              <a:t>Derivative</a:t>
+            </a:r>
+          </a:p>
+        </p:txBody>
+      </p:sp>
+    </p:spTree>
+    <p:extLst>
+      <p:ext uri="{BB962C8B-B14F-4D97-AF65-F5344CB8AC3E}">
+        <p14:creationId xmlns:p14="http://schemas.microsoft.com/office/powerpoint/2010/main" val="2444917244"/>
+      </p:ext>
+    </p:extLst>
+  </p:cSld>
+  <p:clrMapOvr>
+    <a:masterClrMapping/>
+  </p:clrMapOvr>
+</p:sld>
+</file>
+
 <file path=ppt/theme/theme1.xml><?xml version="1.0" encoding="utf-8"?>
 <a:theme xmlns:a="http://schemas.openxmlformats.org/drawingml/2006/main" name="Office Theme">
   <a:themeElements>

</xml_diff>

<commit_message>
worked on lit review
</commit_message>
<xml_diff>
--- a/Modelling/MyPAM Modelling.pptx
+++ b/Modelling/MyPAM Modelling.pptx
@@ -14,6 +14,9 @@
     <p:sldId id="262" r:id="rId8"/>
     <p:sldId id="263" r:id="rId9"/>
     <p:sldId id="264" r:id="rId10"/>
+    <p:sldId id="265" r:id="rId11"/>
+    <p:sldId id="266" r:id="rId12"/>
+    <p:sldId id="267" r:id="rId13"/>
   </p:sldIdLst>
   <p:sldSz cx="12192000" cy="6858000"/>
   <p:notesSz cx="6858000" cy="9144000"/>
@@ -269,7 +272,7 @@
           <a:p>
             <a:fld id="{4DCC3765-A771-4BBA-8135-6F2E689117A7}" type="datetimeFigureOut">
               <a:rPr lang="en-GB" smtClean="0"/>
-              <a:t>19/11/2018</a:t>
+              <a:t>29/11/2018</a:t>
             </a:fld>
             <a:endParaRPr lang="en-GB"/>
           </a:p>
@@ -469,7 +472,7 @@
           <a:p>
             <a:fld id="{4DCC3765-A771-4BBA-8135-6F2E689117A7}" type="datetimeFigureOut">
               <a:rPr lang="en-GB" smtClean="0"/>
-              <a:t>19/11/2018</a:t>
+              <a:t>29/11/2018</a:t>
             </a:fld>
             <a:endParaRPr lang="en-GB"/>
           </a:p>
@@ -679,7 +682,7 @@
           <a:p>
             <a:fld id="{4DCC3765-A771-4BBA-8135-6F2E689117A7}" type="datetimeFigureOut">
               <a:rPr lang="en-GB" smtClean="0"/>
-              <a:t>19/11/2018</a:t>
+              <a:t>29/11/2018</a:t>
             </a:fld>
             <a:endParaRPr lang="en-GB"/>
           </a:p>
@@ -879,7 +882,7 @@
           <a:p>
             <a:fld id="{4DCC3765-A771-4BBA-8135-6F2E689117A7}" type="datetimeFigureOut">
               <a:rPr lang="en-GB" smtClean="0"/>
-              <a:t>19/11/2018</a:t>
+              <a:t>29/11/2018</a:t>
             </a:fld>
             <a:endParaRPr lang="en-GB"/>
           </a:p>
@@ -1155,7 +1158,7 @@
           <a:p>
             <a:fld id="{4DCC3765-A771-4BBA-8135-6F2E689117A7}" type="datetimeFigureOut">
               <a:rPr lang="en-GB" smtClean="0"/>
-              <a:t>19/11/2018</a:t>
+              <a:t>29/11/2018</a:t>
             </a:fld>
             <a:endParaRPr lang="en-GB"/>
           </a:p>
@@ -1423,7 +1426,7 @@
           <a:p>
             <a:fld id="{4DCC3765-A771-4BBA-8135-6F2E689117A7}" type="datetimeFigureOut">
               <a:rPr lang="en-GB" smtClean="0"/>
-              <a:t>19/11/2018</a:t>
+              <a:t>29/11/2018</a:t>
             </a:fld>
             <a:endParaRPr lang="en-GB"/>
           </a:p>
@@ -1838,7 +1841,7 @@
           <a:p>
             <a:fld id="{4DCC3765-A771-4BBA-8135-6F2E689117A7}" type="datetimeFigureOut">
               <a:rPr lang="en-GB" smtClean="0"/>
-              <a:t>19/11/2018</a:t>
+              <a:t>29/11/2018</a:t>
             </a:fld>
             <a:endParaRPr lang="en-GB"/>
           </a:p>
@@ -1980,7 +1983,7 @@
           <a:p>
             <a:fld id="{4DCC3765-A771-4BBA-8135-6F2E689117A7}" type="datetimeFigureOut">
               <a:rPr lang="en-GB" smtClean="0"/>
-              <a:t>19/11/2018</a:t>
+              <a:t>29/11/2018</a:t>
             </a:fld>
             <a:endParaRPr lang="en-GB"/>
           </a:p>
@@ -2093,7 +2096,7 @@
           <a:p>
             <a:fld id="{4DCC3765-A771-4BBA-8135-6F2E689117A7}" type="datetimeFigureOut">
               <a:rPr lang="en-GB" smtClean="0"/>
-              <a:t>19/11/2018</a:t>
+              <a:t>29/11/2018</a:t>
             </a:fld>
             <a:endParaRPr lang="en-GB"/>
           </a:p>
@@ -2406,7 +2409,7 @@
           <a:p>
             <a:fld id="{4DCC3765-A771-4BBA-8135-6F2E689117A7}" type="datetimeFigureOut">
               <a:rPr lang="en-GB" smtClean="0"/>
-              <a:t>19/11/2018</a:t>
+              <a:t>29/11/2018</a:t>
             </a:fld>
             <a:endParaRPr lang="en-GB"/>
           </a:p>
@@ -2695,7 +2698,7 @@
           <a:p>
             <a:fld id="{4DCC3765-A771-4BBA-8135-6F2E689117A7}" type="datetimeFigureOut">
               <a:rPr lang="en-GB" smtClean="0"/>
-              <a:t>19/11/2018</a:t>
+              <a:t>29/11/2018</a:t>
             </a:fld>
             <a:endParaRPr lang="en-GB"/>
           </a:p>
@@ -2938,7 +2941,7 @@
           <a:p>
             <a:fld id="{4DCC3765-A771-4BBA-8135-6F2E689117A7}" type="datetimeFigureOut">
               <a:rPr lang="en-GB" smtClean="0"/>
-              <a:t>19/11/2018</a:t>
+              <a:t>29/11/2018</a:t>
             </a:fld>
             <a:endParaRPr lang="en-GB"/>
           </a:p>
@@ -4169,6 +4172,3933 @@
     <p:extLst>
       <p:ext uri="{BB962C8B-B14F-4D97-AF65-F5344CB8AC3E}">
         <p14:creationId xmlns:p14="http://schemas.microsoft.com/office/powerpoint/2010/main" val="2487573122"/>
+      </p:ext>
+    </p:extLst>
+  </p:cSld>
+  <p:clrMapOvr>
+    <a:masterClrMapping/>
+  </p:clrMapOvr>
+</p:sld>
+</file>
+
+<file path=ppt/slides/slide10.xml><?xml version="1.0" encoding="utf-8"?>
+<p:sld xmlns:a="http://schemas.openxmlformats.org/drawingml/2006/main" xmlns:r="http://schemas.openxmlformats.org/officeDocument/2006/relationships" xmlns:p="http://schemas.openxmlformats.org/presentationml/2006/main">
+  <p:cSld>
+    <p:spTree>
+      <p:nvGrpSpPr>
+        <p:cNvPr id="1" name=""/>
+        <p:cNvGrpSpPr/>
+        <p:nvPr/>
+      </p:nvGrpSpPr>
+      <p:grpSpPr>
+        <a:xfrm>
+          <a:off x="0" y="0"/>
+          <a:ext cx="0" cy="0"/>
+          <a:chOff x="0" y="0"/>
+          <a:chExt cx="0" cy="0"/>
+        </a:xfrm>
+      </p:grpSpPr>
+      <p:sp>
+        <p:nvSpPr>
+          <p:cNvPr id="5" name="Rectangle 4">
+            <a:extLst>
+              <a:ext uri="{FF2B5EF4-FFF2-40B4-BE49-F238E27FC236}">
+                <a16:creationId xmlns:a16="http://schemas.microsoft.com/office/drawing/2014/main" id="{A5CB8BA4-7982-4EB9-8FE0-5796B7178CEB}"/>
+              </a:ext>
+            </a:extLst>
+          </p:cNvPr>
+          <p:cNvSpPr/>
+          <p:nvPr/>
+        </p:nvSpPr>
+        <p:spPr>
+          <a:xfrm>
+            <a:off x="4691270" y="2186609"/>
+            <a:ext cx="2040834" cy="831574"/>
+          </a:xfrm>
+          <a:prstGeom prst="rect">
+            <a:avLst/>
+          </a:prstGeom>
+          <a:ln>
+            <a:solidFill>
+              <a:schemeClr val="tx1">
+                <a:lumMod val="75000"/>
+                <a:lumOff val="25000"/>
+              </a:schemeClr>
+            </a:solidFill>
+            <a:prstDash val="lgDash"/>
+          </a:ln>
+        </p:spPr>
+        <p:style>
+          <a:lnRef idx="2">
+            <a:schemeClr val="dk1"/>
+          </a:lnRef>
+          <a:fillRef idx="1">
+            <a:schemeClr val="lt1"/>
+          </a:fillRef>
+          <a:effectRef idx="0">
+            <a:schemeClr val="dk1"/>
+          </a:effectRef>
+          <a:fontRef idx="minor">
+            <a:schemeClr val="dk1"/>
+          </a:fontRef>
+        </p:style>
+        <p:txBody>
+          <a:bodyPr rtlCol="0" anchor="ctr"/>
+          <a:lstStyle/>
+          <a:p>
+            <a:pPr algn="ctr"/>
+            <a:endParaRPr lang="en-GB" dirty="0"/>
+          </a:p>
+        </p:txBody>
+      </p:sp>
+      <p:sp>
+        <p:nvSpPr>
+          <p:cNvPr id="4" name="Rectangle 3">
+            <a:extLst>
+              <a:ext uri="{FF2B5EF4-FFF2-40B4-BE49-F238E27FC236}">
+                <a16:creationId xmlns:a16="http://schemas.microsoft.com/office/drawing/2014/main" id="{84B86107-E51F-4DAB-8640-7C448E20EAEC}"/>
+              </a:ext>
+            </a:extLst>
+          </p:cNvPr>
+          <p:cNvSpPr/>
+          <p:nvPr/>
+        </p:nvSpPr>
+        <p:spPr>
+          <a:xfrm>
+            <a:off x="4691270" y="2796209"/>
+            <a:ext cx="2040834" cy="831574"/>
+          </a:xfrm>
+          <a:prstGeom prst="rect">
+            <a:avLst/>
+          </a:prstGeom>
+        </p:spPr>
+        <p:style>
+          <a:lnRef idx="2">
+            <a:schemeClr val="dk1"/>
+          </a:lnRef>
+          <a:fillRef idx="1">
+            <a:schemeClr val="lt1"/>
+          </a:fillRef>
+          <a:effectRef idx="0">
+            <a:schemeClr val="dk1"/>
+          </a:effectRef>
+          <a:fontRef idx="minor">
+            <a:schemeClr val="dk1"/>
+          </a:fontRef>
+        </p:style>
+        <p:txBody>
+          <a:bodyPr rtlCol="0" anchor="ctr"/>
+          <a:lstStyle/>
+          <a:p>
+            <a:pPr algn="ctr"/>
+            <a:r>
+              <a:rPr lang="en-GB" dirty="0"/>
+              <a:t>m</a:t>
+            </a:r>
+          </a:p>
+        </p:txBody>
+      </p:sp>
+      <p:cxnSp>
+        <p:nvCxnSpPr>
+          <p:cNvPr id="7" name="Straight Arrow Connector 6">
+            <a:extLst>
+              <a:ext uri="{FF2B5EF4-FFF2-40B4-BE49-F238E27FC236}">
+                <a16:creationId xmlns:a16="http://schemas.microsoft.com/office/drawing/2014/main" id="{A68D435E-B813-43FC-81BB-D22C24899E43}"/>
+              </a:ext>
+            </a:extLst>
+          </p:cNvPr>
+          <p:cNvCxnSpPr>
+            <a:cxnSpLocks/>
+            <a:endCxn id="5" idx="0"/>
+          </p:cNvCxnSpPr>
+          <p:nvPr/>
+        </p:nvCxnSpPr>
+        <p:spPr>
+          <a:xfrm>
+            <a:off x="5711687" y="1497496"/>
+            <a:ext cx="0" cy="689113"/>
+          </a:xfrm>
+          <a:prstGeom prst="straightConnector1">
+            <a:avLst/>
+          </a:prstGeom>
+          <a:ln>
+            <a:solidFill>
+              <a:schemeClr val="tx1"/>
+            </a:solidFill>
+            <a:tailEnd type="triangle"/>
+          </a:ln>
+        </p:spPr>
+        <p:style>
+          <a:lnRef idx="1">
+            <a:schemeClr val="accent1"/>
+          </a:lnRef>
+          <a:fillRef idx="0">
+            <a:schemeClr val="accent1"/>
+          </a:fillRef>
+          <a:effectRef idx="0">
+            <a:schemeClr val="accent1"/>
+          </a:effectRef>
+          <a:fontRef idx="minor">
+            <a:schemeClr val="tx1"/>
+          </a:fontRef>
+        </p:style>
+      </p:cxnSp>
+      <p:sp>
+        <p:nvSpPr>
+          <p:cNvPr id="9" name="TextBox 8">
+            <a:extLst>
+              <a:ext uri="{FF2B5EF4-FFF2-40B4-BE49-F238E27FC236}">
+                <a16:creationId xmlns:a16="http://schemas.microsoft.com/office/drawing/2014/main" id="{7DD52819-A807-43D7-AE95-87256B980755}"/>
+              </a:ext>
+            </a:extLst>
+          </p:cNvPr>
+          <p:cNvSpPr txBox="1"/>
+          <p:nvPr/>
+        </p:nvSpPr>
+        <p:spPr>
+          <a:xfrm>
+            <a:off x="5471300" y="1128164"/>
+            <a:ext cx="480773" cy="369332"/>
+          </a:xfrm>
+          <a:prstGeom prst="rect">
+            <a:avLst/>
+          </a:prstGeom>
+          <a:noFill/>
+        </p:spPr>
+        <p:txBody>
+          <a:bodyPr wrap="none" rtlCol="0">
+            <a:spAutoFit/>
+          </a:bodyPr>
+          <a:lstStyle/>
+          <a:p>
+            <a:r>
+              <a:rPr lang="en-GB" dirty="0"/>
+              <a:t>F</a:t>
+            </a:r>
+            <a:r>
+              <a:rPr lang="en-GB" baseline="-25000" dirty="0"/>
+              <a:t>ext</a:t>
+            </a:r>
+          </a:p>
+        </p:txBody>
+      </p:sp>
+      <p:cxnSp>
+        <p:nvCxnSpPr>
+          <p:cNvPr id="11" name="Straight Connector 10">
+            <a:extLst>
+              <a:ext uri="{FF2B5EF4-FFF2-40B4-BE49-F238E27FC236}">
+                <a16:creationId xmlns:a16="http://schemas.microsoft.com/office/drawing/2014/main" id="{4AAEEE9D-4867-43C5-BBB4-48A981BC4221}"/>
+              </a:ext>
+            </a:extLst>
+          </p:cNvPr>
+          <p:cNvCxnSpPr>
+            <a:cxnSpLocks/>
+          </p:cNvCxnSpPr>
+          <p:nvPr/>
+        </p:nvCxnSpPr>
+        <p:spPr>
+          <a:xfrm>
+            <a:off x="6732104" y="2186609"/>
+            <a:ext cx="755374" cy="0"/>
+          </a:xfrm>
+          <a:prstGeom prst="line">
+            <a:avLst/>
+          </a:prstGeom>
+          <a:ln w="28575">
+            <a:prstDash val="dash"/>
+          </a:ln>
+        </p:spPr>
+        <p:style>
+          <a:lnRef idx="1">
+            <a:schemeClr val="accent1"/>
+          </a:lnRef>
+          <a:fillRef idx="0">
+            <a:schemeClr val="accent1"/>
+          </a:fillRef>
+          <a:effectRef idx="0">
+            <a:schemeClr val="accent1"/>
+          </a:effectRef>
+          <a:fontRef idx="minor">
+            <a:schemeClr val="tx1"/>
+          </a:fontRef>
+        </p:style>
+      </p:cxnSp>
+      <p:cxnSp>
+        <p:nvCxnSpPr>
+          <p:cNvPr id="12" name="Straight Connector 11">
+            <a:extLst>
+              <a:ext uri="{FF2B5EF4-FFF2-40B4-BE49-F238E27FC236}">
+                <a16:creationId xmlns:a16="http://schemas.microsoft.com/office/drawing/2014/main" id="{80D1EB0B-5525-4D29-A464-EE528FB01E62}"/>
+              </a:ext>
+            </a:extLst>
+          </p:cNvPr>
+          <p:cNvCxnSpPr>
+            <a:cxnSpLocks/>
+          </p:cNvCxnSpPr>
+          <p:nvPr/>
+        </p:nvCxnSpPr>
+        <p:spPr>
+          <a:xfrm>
+            <a:off x="6732104" y="2796209"/>
+            <a:ext cx="755374" cy="0"/>
+          </a:xfrm>
+          <a:prstGeom prst="line">
+            <a:avLst/>
+          </a:prstGeom>
+          <a:ln w="28575">
+            <a:prstDash val="dash"/>
+          </a:ln>
+        </p:spPr>
+        <p:style>
+          <a:lnRef idx="1">
+            <a:schemeClr val="accent1"/>
+          </a:lnRef>
+          <a:fillRef idx="0">
+            <a:schemeClr val="accent1"/>
+          </a:fillRef>
+          <a:effectRef idx="0">
+            <a:schemeClr val="accent1"/>
+          </a:effectRef>
+          <a:fontRef idx="minor">
+            <a:schemeClr val="tx1"/>
+          </a:fontRef>
+        </p:style>
+      </p:cxnSp>
+      <p:grpSp>
+        <p:nvGrpSpPr>
+          <p:cNvPr id="37" name="Group 36">
+            <a:extLst>
+              <a:ext uri="{FF2B5EF4-FFF2-40B4-BE49-F238E27FC236}">
+                <a16:creationId xmlns:a16="http://schemas.microsoft.com/office/drawing/2014/main" id="{3D43381C-3E09-4501-ACA1-74F3A85F0029}"/>
+              </a:ext>
+            </a:extLst>
+          </p:cNvPr>
+          <p:cNvGrpSpPr/>
+          <p:nvPr/>
+        </p:nvGrpSpPr>
+        <p:grpSpPr>
+          <a:xfrm>
+            <a:off x="4062524" y="4446101"/>
+            <a:ext cx="3298323" cy="221974"/>
+            <a:chOff x="3949148" y="4320208"/>
+            <a:chExt cx="3298323" cy="221974"/>
+          </a:xfrm>
+        </p:grpSpPr>
+        <p:cxnSp>
+          <p:nvCxnSpPr>
+            <p:cNvPr id="15" name="Straight Connector 14">
+              <a:extLst>
+                <a:ext uri="{FF2B5EF4-FFF2-40B4-BE49-F238E27FC236}">
+                  <a16:creationId xmlns:a16="http://schemas.microsoft.com/office/drawing/2014/main" id="{C6B5806C-6144-4100-B83B-152047994E8E}"/>
+                </a:ext>
+              </a:extLst>
+            </p:cNvPr>
+            <p:cNvCxnSpPr>
+              <a:cxnSpLocks/>
+            </p:cNvCxnSpPr>
+            <p:nvPr/>
+          </p:nvCxnSpPr>
+          <p:spPr>
+            <a:xfrm flipV="1">
+              <a:off x="3949148" y="4320208"/>
+              <a:ext cx="3298323" cy="1"/>
+            </a:xfrm>
+            <a:prstGeom prst="line">
+              <a:avLst/>
+            </a:prstGeom>
+            <a:ln>
+              <a:solidFill>
+                <a:schemeClr val="tx1"/>
+              </a:solidFill>
+            </a:ln>
+          </p:spPr>
+          <p:style>
+            <a:lnRef idx="1">
+              <a:schemeClr val="accent1"/>
+            </a:lnRef>
+            <a:fillRef idx="0">
+              <a:schemeClr val="accent1"/>
+            </a:fillRef>
+            <a:effectRef idx="0">
+              <a:schemeClr val="accent1"/>
+            </a:effectRef>
+            <a:fontRef idx="minor">
+              <a:schemeClr val="tx1"/>
+            </a:fontRef>
+          </p:style>
+        </p:cxnSp>
+        <p:cxnSp>
+          <p:nvCxnSpPr>
+            <p:cNvPr id="20" name="Straight Connector 19">
+              <a:extLst>
+                <a:ext uri="{FF2B5EF4-FFF2-40B4-BE49-F238E27FC236}">
+                  <a16:creationId xmlns:a16="http://schemas.microsoft.com/office/drawing/2014/main" id="{733F6547-3D96-40D5-B542-3A6460B59343}"/>
+                </a:ext>
+              </a:extLst>
+            </p:cNvPr>
+            <p:cNvCxnSpPr>
+              <a:cxnSpLocks/>
+            </p:cNvCxnSpPr>
+            <p:nvPr/>
+          </p:nvCxnSpPr>
+          <p:spPr>
+            <a:xfrm>
+              <a:off x="4081670" y="4320209"/>
+              <a:ext cx="251791" cy="221973"/>
+            </a:xfrm>
+            <a:prstGeom prst="line">
+              <a:avLst/>
+            </a:prstGeom>
+            <a:ln>
+              <a:solidFill>
+                <a:schemeClr val="tx1"/>
+              </a:solidFill>
+            </a:ln>
+          </p:spPr>
+          <p:style>
+            <a:lnRef idx="1">
+              <a:schemeClr val="accent1"/>
+            </a:lnRef>
+            <a:fillRef idx="0">
+              <a:schemeClr val="accent1"/>
+            </a:fillRef>
+            <a:effectRef idx="0">
+              <a:schemeClr val="accent1"/>
+            </a:effectRef>
+            <a:fontRef idx="minor">
+              <a:schemeClr val="tx1"/>
+            </a:fontRef>
+          </p:style>
+        </p:cxnSp>
+        <p:cxnSp>
+          <p:nvCxnSpPr>
+            <p:cNvPr id="23" name="Straight Connector 22">
+              <a:extLst>
+                <a:ext uri="{FF2B5EF4-FFF2-40B4-BE49-F238E27FC236}">
+                  <a16:creationId xmlns:a16="http://schemas.microsoft.com/office/drawing/2014/main" id="{DD377963-9987-4F13-A518-2188591EC2C3}"/>
+                </a:ext>
+              </a:extLst>
+            </p:cNvPr>
+            <p:cNvCxnSpPr>
+              <a:cxnSpLocks/>
+            </p:cNvCxnSpPr>
+            <p:nvPr/>
+          </p:nvCxnSpPr>
+          <p:spPr>
+            <a:xfrm>
+              <a:off x="4346580" y="4320209"/>
+              <a:ext cx="251791" cy="221973"/>
+            </a:xfrm>
+            <a:prstGeom prst="line">
+              <a:avLst/>
+            </a:prstGeom>
+            <a:ln>
+              <a:solidFill>
+                <a:schemeClr val="tx1"/>
+              </a:solidFill>
+            </a:ln>
+          </p:spPr>
+          <p:style>
+            <a:lnRef idx="1">
+              <a:schemeClr val="accent1"/>
+            </a:lnRef>
+            <a:fillRef idx="0">
+              <a:schemeClr val="accent1"/>
+            </a:fillRef>
+            <a:effectRef idx="0">
+              <a:schemeClr val="accent1"/>
+            </a:effectRef>
+            <a:fontRef idx="minor">
+              <a:schemeClr val="tx1"/>
+            </a:fontRef>
+          </p:style>
+        </p:cxnSp>
+        <p:cxnSp>
+          <p:nvCxnSpPr>
+            <p:cNvPr id="24" name="Straight Connector 23">
+              <a:extLst>
+                <a:ext uri="{FF2B5EF4-FFF2-40B4-BE49-F238E27FC236}">
+                  <a16:creationId xmlns:a16="http://schemas.microsoft.com/office/drawing/2014/main" id="{54288C82-D511-40C5-98BA-932B7AC3282C}"/>
+                </a:ext>
+              </a:extLst>
+            </p:cNvPr>
+            <p:cNvCxnSpPr>
+              <a:cxnSpLocks/>
+            </p:cNvCxnSpPr>
+            <p:nvPr/>
+          </p:nvCxnSpPr>
+          <p:spPr>
+            <a:xfrm>
+              <a:off x="4611490" y="4320209"/>
+              <a:ext cx="251791" cy="221973"/>
+            </a:xfrm>
+            <a:prstGeom prst="line">
+              <a:avLst/>
+            </a:prstGeom>
+            <a:ln>
+              <a:solidFill>
+                <a:schemeClr val="tx1"/>
+              </a:solidFill>
+            </a:ln>
+          </p:spPr>
+          <p:style>
+            <a:lnRef idx="1">
+              <a:schemeClr val="accent1"/>
+            </a:lnRef>
+            <a:fillRef idx="0">
+              <a:schemeClr val="accent1"/>
+            </a:fillRef>
+            <a:effectRef idx="0">
+              <a:schemeClr val="accent1"/>
+            </a:effectRef>
+            <a:fontRef idx="minor">
+              <a:schemeClr val="tx1"/>
+            </a:fontRef>
+          </p:style>
+        </p:cxnSp>
+        <p:cxnSp>
+          <p:nvCxnSpPr>
+            <p:cNvPr id="25" name="Straight Connector 24">
+              <a:extLst>
+                <a:ext uri="{FF2B5EF4-FFF2-40B4-BE49-F238E27FC236}">
+                  <a16:creationId xmlns:a16="http://schemas.microsoft.com/office/drawing/2014/main" id="{708B6A11-FED6-4982-8F60-2346C304F137}"/>
+                </a:ext>
+              </a:extLst>
+            </p:cNvPr>
+            <p:cNvCxnSpPr>
+              <a:cxnSpLocks/>
+            </p:cNvCxnSpPr>
+            <p:nvPr/>
+          </p:nvCxnSpPr>
+          <p:spPr>
+            <a:xfrm>
+              <a:off x="4876400" y="4320209"/>
+              <a:ext cx="251791" cy="221973"/>
+            </a:xfrm>
+            <a:prstGeom prst="line">
+              <a:avLst/>
+            </a:prstGeom>
+            <a:ln>
+              <a:solidFill>
+                <a:schemeClr val="tx1"/>
+              </a:solidFill>
+            </a:ln>
+          </p:spPr>
+          <p:style>
+            <a:lnRef idx="1">
+              <a:schemeClr val="accent1"/>
+            </a:lnRef>
+            <a:fillRef idx="0">
+              <a:schemeClr val="accent1"/>
+            </a:fillRef>
+            <a:effectRef idx="0">
+              <a:schemeClr val="accent1"/>
+            </a:effectRef>
+            <a:fontRef idx="minor">
+              <a:schemeClr val="tx1"/>
+            </a:fontRef>
+          </p:style>
+        </p:cxnSp>
+        <p:cxnSp>
+          <p:nvCxnSpPr>
+            <p:cNvPr id="27" name="Straight Connector 26">
+              <a:extLst>
+                <a:ext uri="{FF2B5EF4-FFF2-40B4-BE49-F238E27FC236}">
+                  <a16:creationId xmlns:a16="http://schemas.microsoft.com/office/drawing/2014/main" id="{134F21D8-4DFB-4C72-A372-585BAAFE8259}"/>
+                </a:ext>
+              </a:extLst>
+            </p:cNvPr>
+            <p:cNvCxnSpPr>
+              <a:cxnSpLocks/>
+            </p:cNvCxnSpPr>
+            <p:nvPr/>
+          </p:nvCxnSpPr>
+          <p:spPr>
+            <a:xfrm>
+              <a:off x="5141310" y="4320209"/>
+              <a:ext cx="251791" cy="221973"/>
+            </a:xfrm>
+            <a:prstGeom prst="line">
+              <a:avLst/>
+            </a:prstGeom>
+            <a:ln>
+              <a:solidFill>
+                <a:schemeClr val="tx1"/>
+              </a:solidFill>
+            </a:ln>
+          </p:spPr>
+          <p:style>
+            <a:lnRef idx="1">
+              <a:schemeClr val="accent1"/>
+            </a:lnRef>
+            <a:fillRef idx="0">
+              <a:schemeClr val="accent1"/>
+            </a:fillRef>
+            <a:effectRef idx="0">
+              <a:schemeClr val="accent1"/>
+            </a:effectRef>
+            <a:fontRef idx="minor">
+              <a:schemeClr val="tx1"/>
+            </a:fontRef>
+          </p:style>
+        </p:cxnSp>
+        <p:cxnSp>
+          <p:nvCxnSpPr>
+            <p:cNvPr id="28" name="Straight Connector 27">
+              <a:extLst>
+                <a:ext uri="{FF2B5EF4-FFF2-40B4-BE49-F238E27FC236}">
+                  <a16:creationId xmlns:a16="http://schemas.microsoft.com/office/drawing/2014/main" id="{C5947CE7-7B9C-471A-AF76-92A2422A82F2}"/>
+                </a:ext>
+              </a:extLst>
+            </p:cNvPr>
+            <p:cNvCxnSpPr>
+              <a:cxnSpLocks/>
+            </p:cNvCxnSpPr>
+            <p:nvPr/>
+          </p:nvCxnSpPr>
+          <p:spPr>
+            <a:xfrm>
+              <a:off x="5406220" y="4320209"/>
+              <a:ext cx="251791" cy="221973"/>
+            </a:xfrm>
+            <a:prstGeom prst="line">
+              <a:avLst/>
+            </a:prstGeom>
+            <a:ln>
+              <a:solidFill>
+                <a:schemeClr val="tx1"/>
+              </a:solidFill>
+            </a:ln>
+          </p:spPr>
+          <p:style>
+            <a:lnRef idx="1">
+              <a:schemeClr val="accent1"/>
+            </a:lnRef>
+            <a:fillRef idx="0">
+              <a:schemeClr val="accent1"/>
+            </a:fillRef>
+            <a:effectRef idx="0">
+              <a:schemeClr val="accent1"/>
+            </a:effectRef>
+            <a:fontRef idx="minor">
+              <a:schemeClr val="tx1"/>
+            </a:fontRef>
+          </p:style>
+        </p:cxnSp>
+        <p:cxnSp>
+          <p:nvCxnSpPr>
+            <p:cNvPr id="29" name="Straight Connector 28">
+              <a:extLst>
+                <a:ext uri="{FF2B5EF4-FFF2-40B4-BE49-F238E27FC236}">
+                  <a16:creationId xmlns:a16="http://schemas.microsoft.com/office/drawing/2014/main" id="{7FBDFC61-F0AE-49CB-B40B-0C8607811F29}"/>
+                </a:ext>
+              </a:extLst>
+            </p:cNvPr>
+            <p:cNvCxnSpPr>
+              <a:cxnSpLocks/>
+            </p:cNvCxnSpPr>
+            <p:nvPr/>
+          </p:nvCxnSpPr>
+          <p:spPr>
+            <a:xfrm>
+              <a:off x="5671130" y="4320209"/>
+              <a:ext cx="251791" cy="221973"/>
+            </a:xfrm>
+            <a:prstGeom prst="line">
+              <a:avLst/>
+            </a:prstGeom>
+            <a:ln>
+              <a:solidFill>
+                <a:schemeClr val="tx1"/>
+              </a:solidFill>
+            </a:ln>
+          </p:spPr>
+          <p:style>
+            <a:lnRef idx="1">
+              <a:schemeClr val="accent1"/>
+            </a:lnRef>
+            <a:fillRef idx="0">
+              <a:schemeClr val="accent1"/>
+            </a:fillRef>
+            <a:effectRef idx="0">
+              <a:schemeClr val="accent1"/>
+            </a:effectRef>
+            <a:fontRef idx="minor">
+              <a:schemeClr val="tx1"/>
+            </a:fontRef>
+          </p:style>
+        </p:cxnSp>
+        <p:cxnSp>
+          <p:nvCxnSpPr>
+            <p:cNvPr id="30" name="Straight Connector 29">
+              <a:extLst>
+                <a:ext uri="{FF2B5EF4-FFF2-40B4-BE49-F238E27FC236}">
+                  <a16:creationId xmlns:a16="http://schemas.microsoft.com/office/drawing/2014/main" id="{B109D5B4-84AA-4159-AA69-6B87BD88AFAD}"/>
+                </a:ext>
+              </a:extLst>
+            </p:cNvPr>
+            <p:cNvCxnSpPr>
+              <a:cxnSpLocks/>
+            </p:cNvCxnSpPr>
+            <p:nvPr/>
+          </p:nvCxnSpPr>
+          <p:spPr>
+            <a:xfrm>
+              <a:off x="5936040" y="4320209"/>
+              <a:ext cx="251791" cy="221973"/>
+            </a:xfrm>
+            <a:prstGeom prst="line">
+              <a:avLst/>
+            </a:prstGeom>
+            <a:ln>
+              <a:solidFill>
+                <a:schemeClr val="tx1"/>
+              </a:solidFill>
+            </a:ln>
+          </p:spPr>
+          <p:style>
+            <a:lnRef idx="1">
+              <a:schemeClr val="accent1"/>
+            </a:lnRef>
+            <a:fillRef idx="0">
+              <a:schemeClr val="accent1"/>
+            </a:fillRef>
+            <a:effectRef idx="0">
+              <a:schemeClr val="accent1"/>
+            </a:effectRef>
+            <a:fontRef idx="minor">
+              <a:schemeClr val="tx1"/>
+            </a:fontRef>
+          </p:style>
+        </p:cxnSp>
+        <p:cxnSp>
+          <p:nvCxnSpPr>
+            <p:cNvPr id="31" name="Straight Connector 30">
+              <a:extLst>
+                <a:ext uri="{FF2B5EF4-FFF2-40B4-BE49-F238E27FC236}">
+                  <a16:creationId xmlns:a16="http://schemas.microsoft.com/office/drawing/2014/main" id="{E16958B7-AA39-401C-8949-4B72C01FEE37}"/>
+                </a:ext>
+              </a:extLst>
+            </p:cNvPr>
+            <p:cNvCxnSpPr>
+              <a:cxnSpLocks/>
+            </p:cNvCxnSpPr>
+            <p:nvPr/>
+          </p:nvCxnSpPr>
+          <p:spPr>
+            <a:xfrm>
+              <a:off x="6200950" y="4320208"/>
+              <a:ext cx="251791" cy="221973"/>
+            </a:xfrm>
+            <a:prstGeom prst="line">
+              <a:avLst/>
+            </a:prstGeom>
+            <a:ln>
+              <a:solidFill>
+                <a:schemeClr val="tx1"/>
+              </a:solidFill>
+            </a:ln>
+          </p:spPr>
+          <p:style>
+            <a:lnRef idx="1">
+              <a:schemeClr val="accent1"/>
+            </a:lnRef>
+            <a:fillRef idx="0">
+              <a:schemeClr val="accent1"/>
+            </a:fillRef>
+            <a:effectRef idx="0">
+              <a:schemeClr val="accent1"/>
+            </a:effectRef>
+            <a:fontRef idx="minor">
+              <a:schemeClr val="tx1"/>
+            </a:fontRef>
+          </p:style>
+        </p:cxnSp>
+        <p:cxnSp>
+          <p:nvCxnSpPr>
+            <p:cNvPr id="32" name="Straight Connector 31">
+              <a:extLst>
+                <a:ext uri="{FF2B5EF4-FFF2-40B4-BE49-F238E27FC236}">
+                  <a16:creationId xmlns:a16="http://schemas.microsoft.com/office/drawing/2014/main" id="{24ADBB52-C307-4B88-9FAC-A9DE1B161F00}"/>
+                </a:ext>
+              </a:extLst>
+            </p:cNvPr>
+            <p:cNvCxnSpPr>
+              <a:cxnSpLocks/>
+            </p:cNvCxnSpPr>
+            <p:nvPr/>
+          </p:nvCxnSpPr>
+          <p:spPr>
+            <a:xfrm>
+              <a:off x="6465860" y="4320208"/>
+              <a:ext cx="251791" cy="221973"/>
+            </a:xfrm>
+            <a:prstGeom prst="line">
+              <a:avLst/>
+            </a:prstGeom>
+            <a:ln>
+              <a:solidFill>
+                <a:schemeClr val="tx1"/>
+              </a:solidFill>
+            </a:ln>
+          </p:spPr>
+          <p:style>
+            <a:lnRef idx="1">
+              <a:schemeClr val="accent1"/>
+            </a:lnRef>
+            <a:fillRef idx="0">
+              <a:schemeClr val="accent1"/>
+            </a:fillRef>
+            <a:effectRef idx="0">
+              <a:schemeClr val="accent1"/>
+            </a:effectRef>
+            <a:fontRef idx="minor">
+              <a:schemeClr val="tx1"/>
+            </a:fontRef>
+          </p:style>
+        </p:cxnSp>
+        <p:cxnSp>
+          <p:nvCxnSpPr>
+            <p:cNvPr id="33" name="Straight Connector 32">
+              <a:extLst>
+                <a:ext uri="{FF2B5EF4-FFF2-40B4-BE49-F238E27FC236}">
+                  <a16:creationId xmlns:a16="http://schemas.microsoft.com/office/drawing/2014/main" id="{24C6E867-91FF-43EF-9305-F41A43A2FB7C}"/>
+                </a:ext>
+              </a:extLst>
+            </p:cNvPr>
+            <p:cNvCxnSpPr>
+              <a:cxnSpLocks/>
+            </p:cNvCxnSpPr>
+            <p:nvPr/>
+          </p:nvCxnSpPr>
+          <p:spPr>
+            <a:xfrm>
+              <a:off x="6730770" y="4320208"/>
+              <a:ext cx="251791" cy="221973"/>
+            </a:xfrm>
+            <a:prstGeom prst="line">
+              <a:avLst/>
+            </a:prstGeom>
+            <a:ln>
+              <a:solidFill>
+                <a:schemeClr val="tx1"/>
+              </a:solidFill>
+            </a:ln>
+          </p:spPr>
+          <p:style>
+            <a:lnRef idx="1">
+              <a:schemeClr val="accent1"/>
+            </a:lnRef>
+            <a:fillRef idx="0">
+              <a:schemeClr val="accent1"/>
+            </a:fillRef>
+            <a:effectRef idx="0">
+              <a:schemeClr val="accent1"/>
+            </a:effectRef>
+            <a:fontRef idx="minor">
+              <a:schemeClr val="tx1"/>
+            </a:fontRef>
+          </p:style>
+        </p:cxnSp>
+        <p:cxnSp>
+          <p:nvCxnSpPr>
+            <p:cNvPr id="34" name="Straight Connector 33">
+              <a:extLst>
+                <a:ext uri="{FF2B5EF4-FFF2-40B4-BE49-F238E27FC236}">
+                  <a16:creationId xmlns:a16="http://schemas.microsoft.com/office/drawing/2014/main" id="{7BD63892-97A0-4A41-B0E1-BBACC2639F7E}"/>
+                </a:ext>
+              </a:extLst>
+            </p:cNvPr>
+            <p:cNvCxnSpPr>
+              <a:cxnSpLocks/>
+            </p:cNvCxnSpPr>
+            <p:nvPr/>
+          </p:nvCxnSpPr>
+          <p:spPr>
+            <a:xfrm>
+              <a:off x="6995680" y="4320208"/>
+              <a:ext cx="251791" cy="221973"/>
+            </a:xfrm>
+            <a:prstGeom prst="line">
+              <a:avLst/>
+            </a:prstGeom>
+            <a:ln>
+              <a:solidFill>
+                <a:schemeClr val="tx1"/>
+              </a:solidFill>
+            </a:ln>
+          </p:spPr>
+          <p:style>
+            <a:lnRef idx="1">
+              <a:schemeClr val="accent1"/>
+            </a:lnRef>
+            <a:fillRef idx="0">
+              <a:schemeClr val="accent1"/>
+            </a:fillRef>
+            <a:effectRef idx="0">
+              <a:schemeClr val="accent1"/>
+            </a:effectRef>
+            <a:fontRef idx="minor">
+              <a:schemeClr val="tx1"/>
+            </a:fontRef>
+          </p:style>
+        </p:cxnSp>
+      </p:grpSp>
+      <p:sp>
+        <p:nvSpPr>
+          <p:cNvPr id="38" name="Rectangle 37">
+            <a:extLst>
+              <a:ext uri="{FF2B5EF4-FFF2-40B4-BE49-F238E27FC236}">
+                <a16:creationId xmlns:a16="http://schemas.microsoft.com/office/drawing/2014/main" id="{FE8F563A-8A10-43AA-A700-B8E4B8853B19}"/>
+              </a:ext>
+            </a:extLst>
+          </p:cNvPr>
+          <p:cNvSpPr/>
+          <p:nvPr/>
+        </p:nvSpPr>
+        <p:spPr>
+          <a:xfrm>
+            <a:off x="6161926" y="3926783"/>
+            <a:ext cx="304800" cy="220317"/>
+          </a:xfrm>
+          <a:prstGeom prst="rect">
+            <a:avLst/>
+          </a:prstGeom>
+          <a:ln>
+            <a:solidFill>
+              <a:schemeClr val="tx1"/>
+            </a:solidFill>
+          </a:ln>
+        </p:spPr>
+        <p:style>
+          <a:lnRef idx="2">
+            <a:schemeClr val="dk1"/>
+          </a:lnRef>
+          <a:fillRef idx="1">
+            <a:schemeClr val="lt1"/>
+          </a:fillRef>
+          <a:effectRef idx="0">
+            <a:schemeClr val="dk1"/>
+          </a:effectRef>
+          <a:fontRef idx="minor">
+            <a:schemeClr val="dk1"/>
+          </a:fontRef>
+        </p:style>
+        <p:txBody>
+          <a:bodyPr rtlCol="0" anchor="ctr"/>
+          <a:lstStyle/>
+          <a:p>
+            <a:pPr algn="ctr"/>
+            <a:endParaRPr lang="en-GB"/>
+          </a:p>
+        </p:txBody>
+      </p:sp>
+      <p:cxnSp>
+        <p:nvCxnSpPr>
+          <p:cNvPr id="40" name="Straight Connector 39">
+            <a:extLst>
+              <a:ext uri="{FF2B5EF4-FFF2-40B4-BE49-F238E27FC236}">
+                <a16:creationId xmlns:a16="http://schemas.microsoft.com/office/drawing/2014/main" id="{1DB0EA42-FEAE-433A-AC87-78B8671CD6E9}"/>
+              </a:ext>
+            </a:extLst>
+          </p:cNvPr>
+          <p:cNvCxnSpPr>
+            <a:stCxn id="38" idx="1"/>
+          </p:cNvCxnSpPr>
+          <p:nvPr/>
+        </p:nvCxnSpPr>
+        <p:spPr>
+          <a:xfrm flipV="1">
+            <a:off x="6161926" y="3736283"/>
+            <a:ext cx="0" cy="300659"/>
+          </a:xfrm>
+          <a:prstGeom prst="line">
+            <a:avLst/>
+          </a:prstGeom>
+          <a:ln>
+            <a:solidFill>
+              <a:schemeClr val="tx1"/>
+            </a:solidFill>
+          </a:ln>
+        </p:spPr>
+        <p:style>
+          <a:lnRef idx="1">
+            <a:schemeClr val="accent1"/>
+          </a:lnRef>
+          <a:fillRef idx="0">
+            <a:schemeClr val="accent1"/>
+          </a:fillRef>
+          <a:effectRef idx="0">
+            <a:schemeClr val="accent1"/>
+          </a:effectRef>
+          <a:fontRef idx="minor">
+            <a:schemeClr val="tx1"/>
+          </a:fontRef>
+        </p:style>
+      </p:cxnSp>
+      <p:cxnSp>
+        <p:nvCxnSpPr>
+          <p:cNvPr id="41" name="Straight Connector 40">
+            <a:extLst>
+              <a:ext uri="{FF2B5EF4-FFF2-40B4-BE49-F238E27FC236}">
+                <a16:creationId xmlns:a16="http://schemas.microsoft.com/office/drawing/2014/main" id="{73401072-DFAF-4F46-BE6A-F02A169B909D}"/>
+              </a:ext>
+            </a:extLst>
+          </p:cNvPr>
+          <p:cNvCxnSpPr/>
+          <p:nvPr/>
+        </p:nvCxnSpPr>
+        <p:spPr>
+          <a:xfrm flipV="1">
+            <a:off x="6466726" y="3736283"/>
+            <a:ext cx="0" cy="300659"/>
+          </a:xfrm>
+          <a:prstGeom prst="line">
+            <a:avLst/>
+          </a:prstGeom>
+          <a:ln>
+            <a:solidFill>
+              <a:schemeClr val="tx1"/>
+            </a:solidFill>
+          </a:ln>
+        </p:spPr>
+        <p:style>
+          <a:lnRef idx="1">
+            <a:schemeClr val="accent1"/>
+          </a:lnRef>
+          <a:fillRef idx="0">
+            <a:schemeClr val="accent1"/>
+          </a:fillRef>
+          <a:effectRef idx="0">
+            <a:schemeClr val="accent1"/>
+          </a:effectRef>
+          <a:fontRef idx="minor">
+            <a:schemeClr val="tx1"/>
+          </a:fontRef>
+        </p:style>
+      </p:cxnSp>
+      <p:cxnSp>
+        <p:nvCxnSpPr>
+          <p:cNvPr id="43" name="Straight Connector 42">
+            <a:extLst>
+              <a:ext uri="{FF2B5EF4-FFF2-40B4-BE49-F238E27FC236}">
+                <a16:creationId xmlns:a16="http://schemas.microsoft.com/office/drawing/2014/main" id="{696F7093-1282-464C-A120-13E90393738B}"/>
+              </a:ext>
+            </a:extLst>
+          </p:cNvPr>
+          <p:cNvCxnSpPr>
+            <a:stCxn id="38" idx="0"/>
+          </p:cNvCxnSpPr>
+          <p:nvPr/>
+        </p:nvCxnSpPr>
+        <p:spPr>
+          <a:xfrm flipV="1">
+            <a:off x="6314326" y="3627783"/>
+            <a:ext cx="0" cy="299000"/>
+          </a:xfrm>
+          <a:prstGeom prst="line">
+            <a:avLst/>
+          </a:prstGeom>
+          <a:ln>
+            <a:solidFill>
+              <a:schemeClr val="tx1"/>
+            </a:solidFill>
+          </a:ln>
+        </p:spPr>
+        <p:style>
+          <a:lnRef idx="1">
+            <a:schemeClr val="accent1"/>
+          </a:lnRef>
+          <a:fillRef idx="0">
+            <a:schemeClr val="accent1"/>
+          </a:fillRef>
+          <a:effectRef idx="0">
+            <a:schemeClr val="accent1"/>
+          </a:effectRef>
+          <a:fontRef idx="minor">
+            <a:schemeClr val="tx1"/>
+          </a:fontRef>
+        </p:style>
+      </p:cxnSp>
+      <p:cxnSp>
+        <p:nvCxnSpPr>
+          <p:cNvPr id="45" name="Straight Connector 44">
+            <a:extLst>
+              <a:ext uri="{FF2B5EF4-FFF2-40B4-BE49-F238E27FC236}">
+                <a16:creationId xmlns:a16="http://schemas.microsoft.com/office/drawing/2014/main" id="{E4C2FF3A-42AD-4D1C-8FA1-9F1E3B84C656}"/>
+              </a:ext>
+            </a:extLst>
+          </p:cNvPr>
+          <p:cNvCxnSpPr>
+            <a:stCxn id="38" idx="2"/>
+          </p:cNvCxnSpPr>
+          <p:nvPr/>
+        </p:nvCxnSpPr>
+        <p:spPr>
+          <a:xfrm>
+            <a:off x="6314326" y="4147100"/>
+            <a:ext cx="0" cy="299001"/>
+          </a:xfrm>
+          <a:prstGeom prst="line">
+            <a:avLst/>
+          </a:prstGeom>
+          <a:ln>
+            <a:solidFill>
+              <a:schemeClr val="tx1"/>
+            </a:solidFill>
+          </a:ln>
+        </p:spPr>
+        <p:style>
+          <a:lnRef idx="1">
+            <a:schemeClr val="accent1"/>
+          </a:lnRef>
+          <a:fillRef idx="0">
+            <a:schemeClr val="accent1"/>
+          </a:fillRef>
+          <a:effectRef idx="0">
+            <a:schemeClr val="accent1"/>
+          </a:effectRef>
+          <a:fontRef idx="minor">
+            <a:schemeClr val="tx1"/>
+          </a:fontRef>
+        </p:style>
+      </p:cxnSp>
+      <p:grpSp>
+        <p:nvGrpSpPr>
+          <p:cNvPr id="54" name="Group 53">
+            <a:extLst>
+              <a:ext uri="{FF2B5EF4-FFF2-40B4-BE49-F238E27FC236}">
+                <a16:creationId xmlns:a16="http://schemas.microsoft.com/office/drawing/2014/main" id="{0D4E14FE-23FB-4A33-B1BF-FD360C80AD8F}"/>
+              </a:ext>
+            </a:extLst>
+          </p:cNvPr>
+          <p:cNvGrpSpPr/>
+          <p:nvPr/>
+        </p:nvGrpSpPr>
+        <p:grpSpPr>
+          <a:xfrm>
+            <a:off x="5188292" y="3760297"/>
+            <a:ext cx="357809" cy="523457"/>
+            <a:chOff x="9528313" y="3627783"/>
+            <a:chExt cx="357809" cy="523457"/>
+          </a:xfrm>
+        </p:grpSpPr>
+        <p:cxnSp>
+          <p:nvCxnSpPr>
+            <p:cNvPr id="47" name="Straight Connector 46">
+              <a:extLst>
+                <a:ext uri="{FF2B5EF4-FFF2-40B4-BE49-F238E27FC236}">
+                  <a16:creationId xmlns:a16="http://schemas.microsoft.com/office/drawing/2014/main" id="{256D5E91-4DDE-4781-B096-165B10D2A618}"/>
+                </a:ext>
+              </a:extLst>
+            </p:cNvPr>
+            <p:cNvCxnSpPr/>
+            <p:nvPr/>
+          </p:nvCxnSpPr>
+          <p:spPr>
+            <a:xfrm>
+              <a:off x="9528313" y="3627783"/>
+              <a:ext cx="357809" cy="108500"/>
+            </a:xfrm>
+            <a:prstGeom prst="line">
+              <a:avLst/>
+            </a:prstGeom>
+            <a:ln>
+              <a:solidFill>
+                <a:schemeClr val="tx1"/>
+              </a:solidFill>
+            </a:ln>
+          </p:spPr>
+          <p:style>
+            <a:lnRef idx="1">
+              <a:schemeClr val="accent1"/>
+            </a:lnRef>
+            <a:fillRef idx="0">
+              <a:schemeClr val="accent1"/>
+            </a:fillRef>
+            <a:effectRef idx="0">
+              <a:schemeClr val="accent1"/>
+            </a:effectRef>
+            <a:fontRef idx="minor">
+              <a:schemeClr val="tx1"/>
+            </a:fontRef>
+          </p:style>
+        </p:cxnSp>
+        <p:cxnSp>
+          <p:nvCxnSpPr>
+            <p:cNvPr id="48" name="Straight Connector 47">
+              <a:extLst>
+                <a:ext uri="{FF2B5EF4-FFF2-40B4-BE49-F238E27FC236}">
+                  <a16:creationId xmlns:a16="http://schemas.microsoft.com/office/drawing/2014/main" id="{54F399F1-E0E7-425E-9EE8-E3ABE45E22C1}"/>
+                </a:ext>
+              </a:extLst>
+            </p:cNvPr>
+            <p:cNvCxnSpPr/>
+            <p:nvPr/>
+          </p:nvCxnSpPr>
+          <p:spPr>
+            <a:xfrm>
+              <a:off x="9528313" y="3835261"/>
+              <a:ext cx="357809" cy="108500"/>
+            </a:xfrm>
+            <a:prstGeom prst="line">
+              <a:avLst/>
+            </a:prstGeom>
+            <a:ln>
+              <a:solidFill>
+                <a:schemeClr val="tx1"/>
+              </a:solidFill>
+            </a:ln>
+          </p:spPr>
+          <p:style>
+            <a:lnRef idx="1">
+              <a:schemeClr val="accent1"/>
+            </a:lnRef>
+            <a:fillRef idx="0">
+              <a:schemeClr val="accent1"/>
+            </a:fillRef>
+            <a:effectRef idx="0">
+              <a:schemeClr val="accent1"/>
+            </a:effectRef>
+            <a:fontRef idx="minor">
+              <a:schemeClr val="tx1"/>
+            </a:fontRef>
+          </p:style>
+        </p:cxnSp>
+        <p:cxnSp>
+          <p:nvCxnSpPr>
+            <p:cNvPr id="49" name="Straight Connector 48">
+              <a:extLst>
+                <a:ext uri="{FF2B5EF4-FFF2-40B4-BE49-F238E27FC236}">
+                  <a16:creationId xmlns:a16="http://schemas.microsoft.com/office/drawing/2014/main" id="{7DE28788-EE1B-46FB-85E0-2EA268CD7C78}"/>
+                </a:ext>
+              </a:extLst>
+            </p:cNvPr>
+            <p:cNvCxnSpPr/>
+            <p:nvPr/>
+          </p:nvCxnSpPr>
+          <p:spPr>
+            <a:xfrm>
+              <a:off x="9528313" y="4042740"/>
+              <a:ext cx="357809" cy="108500"/>
+            </a:xfrm>
+            <a:prstGeom prst="line">
+              <a:avLst/>
+            </a:prstGeom>
+            <a:ln>
+              <a:solidFill>
+                <a:schemeClr val="tx1"/>
+              </a:solidFill>
+            </a:ln>
+          </p:spPr>
+          <p:style>
+            <a:lnRef idx="1">
+              <a:schemeClr val="accent1"/>
+            </a:lnRef>
+            <a:fillRef idx="0">
+              <a:schemeClr val="accent1"/>
+            </a:fillRef>
+            <a:effectRef idx="0">
+              <a:schemeClr val="accent1"/>
+            </a:effectRef>
+            <a:fontRef idx="minor">
+              <a:schemeClr val="tx1"/>
+            </a:fontRef>
+          </p:style>
+        </p:cxnSp>
+        <p:cxnSp>
+          <p:nvCxnSpPr>
+            <p:cNvPr id="51" name="Straight Connector 50">
+              <a:extLst>
+                <a:ext uri="{FF2B5EF4-FFF2-40B4-BE49-F238E27FC236}">
+                  <a16:creationId xmlns:a16="http://schemas.microsoft.com/office/drawing/2014/main" id="{453F11BE-442E-4538-8067-4F3A35BC45EB}"/>
+                </a:ext>
+              </a:extLst>
+            </p:cNvPr>
+            <p:cNvCxnSpPr/>
+            <p:nvPr/>
+          </p:nvCxnSpPr>
+          <p:spPr>
+            <a:xfrm flipV="1">
+              <a:off x="9528313" y="3736283"/>
+              <a:ext cx="357809" cy="98978"/>
+            </a:xfrm>
+            <a:prstGeom prst="line">
+              <a:avLst/>
+            </a:prstGeom>
+            <a:ln>
+              <a:solidFill>
+                <a:schemeClr val="tx1"/>
+              </a:solidFill>
+            </a:ln>
+          </p:spPr>
+          <p:style>
+            <a:lnRef idx="1">
+              <a:schemeClr val="accent1"/>
+            </a:lnRef>
+            <a:fillRef idx="0">
+              <a:schemeClr val="accent1"/>
+            </a:fillRef>
+            <a:effectRef idx="0">
+              <a:schemeClr val="accent1"/>
+            </a:effectRef>
+            <a:fontRef idx="minor">
+              <a:schemeClr val="tx1"/>
+            </a:fontRef>
+          </p:style>
+        </p:cxnSp>
+        <p:cxnSp>
+          <p:nvCxnSpPr>
+            <p:cNvPr id="53" name="Straight Connector 52">
+              <a:extLst>
+                <a:ext uri="{FF2B5EF4-FFF2-40B4-BE49-F238E27FC236}">
+                  <a16:creationId xmlns:a16="http://schemas.microsoft.com/office/drawing/2014/main" id="{CB746F1D-B6A2-4004-9A6E-369DB03C4ABC}"/>
+                </a:ext>
+              </a:extLst>
+            </p:cNvPr>
+            <p:cNvCxnSpPr/>
+            <p:nvPr/>
+          </p:nvCxnSpPr>
+          <p:spPr>
+            <a:xfrm flipV="1">
+              <a:off x="9528313" y="3943761"/>
+              <a:ext cx="357809" cy="93180"/>
+            </a:xfrm>
+            <a:prstGeom prst="line">
+              <a:avLst/>
+            </a:prstGeom>
+            <a:ln>
+              <a:solidFill>
+                <a:schemeClr val="tx1"/>
+              </a:solidFill>
+            </a:ln>
+          </p:spPr>
+          <p:style>
+            <a:lnRef idx="1">
+              <a:schemeClr val="accent1"/>
+            </a:lnRef>
+            <a:fillRef idx="0">
+              <a:schemeClr val="accent1"/>
+            </a:fillRef>
+            <a:effectRef idx="0">
+              <a:schemeClr val="accent1"/>
+            </a:effectRef>
+            <a:fontRef idx="minor">
+              <a:schemeClr val="tx1"/>
+            </a:fontRef>
+          </p:style>
+        </p:cxnSp>
+      </p:grpSp>
+      <p:cxnSp>
+        <p:nvCxnSpPr>
+          <p:cNvPr id="56" name="Straight Connector 55">
+            <a:extLst>
+              <a:ext uri="{FF2B5EF4-FFF2-40B4-BE49-F238E27FC236}">
+                <a16:creationId xmlns:a16="http://schemas.microsoft.com/office/drawing/2014/main" id="{E64840BD-5718-4BF4-B042-B0A257C0DC33}"/>
+              </a:ext>
+            </a:extLst>
+          </p:cNvPr>
+          <p:cNvCxnSpPr/>
+          <p:nvPr/>
+        </p:nvCxnSpPr>
+        <p:spPr>
+          <a:xfrm flipV="1">
+            <a:off x="5188292" y="3627783"/>
+            <a:ext cx="0" cy="132514"/>
+          </a:xfrm>
+          <a:prstGeom prst="line">
+            <a:avLst/>
+          </a:prstGeom>
+          <a:ln>
+            <a:solidFill>
+              <a:schemeClr val="tx1"/>
+            </a:solidFill>
+          </a:ln>
+        </p:spPr>
+        <p:style>
+          <a:lnRef idx="1">
+            <a:schemeClr val="accent1"/>
+          </a:lnRef>
+          <a:fillRef idx="0">
+            <a:schemeClr val="accent1"/>
+          </a:fillRef>
+          <a:effectRef idx="0">
+            <a:schemeClr val="accent1"/>
+          </a:effectRef>
+          <a:fontRef idx="minor">
+            <a:schemeClr val="tx1"/>
+          </a:fontRef>
+        </p:style>
+      </p:cxnSp>
+      <p:cxnSp>
+        <p:nvCxnSpPr>
+          <p:cNvPr id="60" name="Straight Connector 59">
+            <a:extLst>
+              <a:ext uri="{FF2B5EF4-FFF2-40B4-BE49-F238E27FC236}">
+                <a16:creationId xmlns:a16="http://schemas.microsoft.com/office/drawing/2014/main" id="{870ABDC2-40D8-451D-B085-6AB70BE61B83}"/>
+              </a:ext>
+            </a:extLst>
+          </p:cNvPr>
+          <p:cNvCxnSpPr/>
+          <p:nvPr/>
+        </p:nvCxnSpPr>
+        <p:spPr>
+          <a:xfrm>
+            <a:off x="5506477" y="4283754"/>
+            <a:ext cx="0" cy="162347"/>
+          </a:xfrm>
+          <a:prstGeom prst="line">
+            <a:avLst/>
+          </a:prstGeom>
+          <a:ln>
+            <a:solidFill>
+              <a:schemeClr val="tx1"/>
+            </a:solidFill>
+          </a:ln>
+        </p:spPr>
+        <p:style>
+          <a:lnRef idx="1">
+            <a:schemeClr val="accent1"/>
+          </a:lnRef>
+          <a:fillRef idx="0">
+            <a:schemeClr val="accent1"/>
+          </a:fillRef>
+          <a:effectRef idx="0">
+            <a:schemeClr val="accent1"/>
+          </a:effectRef>
+          <a:fontRef idx="minor">
+            <a:schemeClr val="tx1"/>
+          </a:fontRef>
+        </p:style>
+      </p:cxnSp>
+      <p:sp>
+        <p:nvSpPr>
+          <p:cNvPr id="61" name="TextBox 60">
+            <a:extLst>
+              <a:ext uri="{FF2B5EF4-FFF2-40B4-BE49-F238E27FC236}">
+                <a16:creationId xmlns:a16="http://schemas.microsoft.com/office/drawing/2014/main" id="{8562C834-4C35-4AAE-B6FB-CA0573B33F34}"/>
+              </a:ext>
+            </a:extLst>
+          </p:cNvPr>
+          <p:cNvSpPr txBox="1"/>
+          <p:nvPr/>
+        </p:nvSpPr>
+        <p:spPr>
+          <a:xfrm>
+            <a:off x="6489075" y="3821170"/>
+            <a:ext cx="282450" cy="369332"/>
+          </a:xfrm>
+          <a:prstGeom prst="rect">
+            <a:avLst/>
+          </a:prstGeom>
+          <a:noFill/>
+        </p:spPr>
+        <p:txBody>
+          <a:bodyPr wrap="none" rtlCol="0">
+            <a:spAutoFit/>
+          </a:bodyPr>
+          <a:lstStyle/>
+          <a:p>
+            <a:r>
+              <a:rPr lang="en-GB" dirty="0"/>
+              <a:t>c</a:t>
+            </a:r>
+          </a:p>
+        </p:txBody>
+      </p:sp>
+      <p:sp>
+        <p:nvSpPr>
+          <p:cNvPr id="62" name="TextBox 61">
+            <a:extLst>
+              <a:ext uri="{FF2B5EF4-FFF2-40B4-BE49-F238E27FC236}">
+                <a16:creationId xmlns:a16="http://schemas.microsoft.com/office/drawing/2014/main" id="{A154B4F2-507A-4088-8399-40C4A1122A4A}"/>
+              </a:ext>
+            </a:extLst>
+          </p:cNvPr>
+          <p:cNvSpPr txBox="1"/>
+          <p:nvPr/>
+        </p:nvSpPr>
+        <p:spPr>
+          <a:xfrm>
+            <a:off x="5522148" y="3854796"/>
+            <a:ext cx="288862" cy="369332"/>
+          </a:xfrm>
+          <a:prstGeom prst="rect">
+            <a:avLst/>
+          </a:prstGeom>
+          <a:noFill/>
+        </p:spPr>
+        <p:txBody>
+          <a:bodyPr wrap="none" rtlCol="0">
+            <a:spAutoFit/>
+          </a:bodyPr>
+          <a:lstStyle/>
+          <a:p>
+            <a:r>
+              <a:rPr lang="en-GB" dirty="0"/>
+              <a:t>k</a:t>
+            </a:r>
+          </a:p>
+        </p:txBody>
+      </p:sp>
+      <p:sp>
+        <p:nvSpPr>
+          <p:cNvPr id="67" name="TextBox 66">
+            <a:extLst>
+              <a:ext uri="{FF2B5EF4-FFF2-40B4-BE49-F238E27FC236}">
+                <a16:creationId xmlns:a16="http://schemas.microsoft.com/office/drawing/2014/main" id="{459D2B50-3B56-4D1C-B436-B0522368C127}"/>
+              </a:ext>
+            </a:extLst>
+          </p:cNvPr>
+          <p:cNvSpPr txBox="1"/>
+          <p:nvPr/>
+        </p:nvSpPr>
+        <p:spPr>
+          <a:xfrm>
+            <a:off x="7487478" y="2004393"/>
+            <a:ext cx="1704697" cy="369332"/>
+          </a:xfrm>
+          <a:prstGeom prst="rect">
+            <a:avLst/>
+          </a:prstGeom>
+          <a:noFill/>
+        </p:spPr>
+        <p:txBody>
+          <a:bodyPr wrap="none" rtlCol="0">
+            <a:spAutoFit/>
+          </a:bodyPr>
+          <a:lstStyle/>
+          <a:p>
+            <a:r>
+              <a:rPr lang="en-GB" dirty="0"/>
+              <a:t>Desired Position</a:t>
+            </a:r>
+          </a:p>
+        </p:txBody>
+      </p:sp>
+      <p:sp>
+        <p:nvSpPr>
+          <p:cNvPr id="68" name="TextBox 67">
+            <a:extLst>
+              <a:ext uri="{FF2B5EF4-FFF2-40B4-BE49-F238E27FC236}">
+                <a16:creationId xmlns:a16="http://schemas.microsoft.com/office/drawing/2014/main" id="{607576D0-EB72-4396-ACBC-B3288B199E30}"/>
+              </a:ext>
+            </a:extLst>
+          </p:cNvPr>
+          <p:cNvSpPr txBox="1"/>
+          <p:nvPr/>
+        </p:nvSpPr>
+        <p:spPr>
+          <a:xfrm>
+            <a:off x="7487478" y="2602396"/>
+            <a:ext cx="1704697" cy="646331"/>
+          </a:xfrm>
+          <a:prstGeom prst="rect">
+            <a:avLst/>
+          </a:prstGeom>
+          <a:noFill/>
+        </p:spPr>
+        <p:txBody>
+          <a:bodyPr wrap="none" rtlCol="0">
+            <a:spAutoFit/>
+          </a:bodyPr>
+          <a:lstStyle/>
+          <a:p>
+            <a:r>
+              <a:rPr lang="en-GB" dirty="0"/>
+              <a:t>Desired Position</a:t>
+            </a:r>
+          </a:p>
+          <a:p>
+            <a:r>
+              <a:rPr lang="en-GB" dirty="0"/>
+              <a:t>Due to F</a:t>
+            </a:r>
+            <a:r>
+              <a:rPr lang="en-GB" baseline="-25000" dirty="0"/>
+              <a:t>ext</a:t>
+            </a:r>
+          </a:p>
+        </p:txBody>
+      </p:sp>
+    </p:spTree>
+    <p:extLst>
+      <p:ext uri="{BB962C8B-B14F-4D97-AF65-F5344CB8AC3E}">
+        <p14:creationId xmlns:p14="http://schemas.microsoft.com/office/powerpoint/2010/main" val="2351488283"/>
+      </p:ext>
+    </p:extLst>
+  </p:cSld>
+  <p:clrMapOvr>
+    <a:masterClrMapping/>
+  </p:clrMapOvr>
+</p:sld>
+</file>
+
+<file path=ppt/slides/slide11.xml><?xml version="1.0" encoding="utf-8"?>
+<p:sld xmlns:a="http://schemas.openxmlformats.org/drawingml/2006/main" xmlns:r="http://schemas.openxmlformats.org/officeDocument/2006/relationships" xmlns:p="http://schemas.openxmlformats.org/presentationml/2006/main">
+  <p:cSld>
+    <p:spTree>
+      <p:nvGrpSpPr>
+        <p:cNvPr id="1" name=""/>
+        <p:cNvGrpSpPr/>
+        <p:nvPr/>
+      </p:nvGrpSpPr>
+      <p:grpSpPr>
+        <a:xfrm>
+          <a:off x="0" y="0"/>
+          <a:ext cx="0" cy="0"/>
+          <a:chOff x="0" y="0"/>
+          <a:chExt cx="0" cy="0"/>
+        </a:xfrm>
+      </p:grpSpPr>
+      <p:sp>
+        <p:nvSpPr>
+          <p:cNvPr id="6" name="Oval 5">
+            <a:extLst>
+              <a:ext uri="{FF2B5EF4-FFF2-40B4-BE49-F238E27FC236}">
+                <a16:creationId xmlns:a16="http://schemas.microsoft.com/office/drawing/2014/main" id="{314EF023-421C-48F6-B5BB-312BEDC84247}"/>
+              </a:ext>
+            </a:extLst>
+          </p:cNvPr>
+          <p:cNvSpPr/>
+          <p:nvPr/>
+        </p:nvSpPr>
+        <p:spPr>
+          <a:xfrm>
+            <a:off x="4187247" y="3461235"/>
+            <a:ext cx="569843" cy="596347"/>
+          </a:xfrm>
+          <a:prstGeom prst="ellipse">
+            <a:avLst/>
+          </a:prstGeom>
+        </p:spPr>
+        <p:style>
+          <a:lnRef idx="2">
+            <a:schemeClr val="dk1"/>
+          </a:lnRef>
+          <a:fillRef idx="1">
+            <a:schemeClr val="lt1"/>
+          </a:fillRef>
+          <a:effectRef idx="0">
+            <a:schemeClr val="dk1"/>
+          </a:effectRef>
+          <a:fontRef idx="minor">
+            <a:schemeClr val="dk1"/>
+          </a:fontRef>
+        </p:style>
+        <p:txBody>
+          <a:bodyPr rtlCol="0" anchor="ctr"/>
+          <a:lstStyle/>
+          <a:p>
+            <a:pPr algn="ctr"/>
+            <a:endParaRPr lang="en-GB"/>
+          </a:p>
+        </p:txBody>
+      </p:sp>
+      <p:cxnSp>
+        <p:nvCxnSpPr>
+          <p:cNvPr id="7" name="Straight Connector 6">
+            <a:extLst>
+              <a:ext uri="{FF2B5EF4-FFF2-40B4-BE49-F238E27FC236}">
+                <a16:creationId xmlns:a16="http://schemas.microsoft.com/office/drawing/2014/main" id="{16441A50-B1C5-42ED-BEE9-5C6C524C02E3}"/>
+              </a:ext>
+            </a:extLst>
+          </p:cNvPr>
+          <p:cNvCxnSpPr>
+            <a:stCxn id="6" idx="1"/>
+            <a:endCxn id="6" idx="5"/>
+          </p:cNvCxnSpPr>
+          <p:nvPr/>
+        </p:nvCxnSpPr>
+        <p:spPr>
+          <a:xfrm>
+            <a:off x="4270699" y="3548568"/>
+            <a:ext cx="402939" cy="421681"/>
+          </a:xfrm>
+          <a:prstGeom prst="line">
+            <a:avLst/>
+          </a:prstGeom>
+        </p:spPr>
+        <p:style>
+          <a:lnRef idx="2">
+            <a:schemeClr val="dk1"/>
+          </a:lnRef>
+          <a:fillRef idx="1">
+            <a:schemeClr val="lt1"/>
+          </a:fillRef>
+          <a:effectRef idx="0">
+            <a:schemeClr val="dk1"/>
+          </a:effectRef>
+          <a:fontRef idx="minor">
+            <a:schemeClr val="dk1"/>
+          </a:fontRef>
+        </p:style>
+      </p:cxnSp>
+      <p:cxnSp>
+        <p:nvCxnSpPr>
+          <p:cNvPr id="8" name="Straight Connector 7">
+            <a:extLst>
+              <a:ext uri="{FF2B5EF4-FFF2-40B4-BE49-F238E27FC236}">
+                <a16:creationId xmlns:a16="http://schemas.microsoft.com/office/drawing/2014/main" id="{C2787C54-85A0-48A1-81AD-358DB2FEFC2D}"/>
+              </a:ext>
+            </a:extLst>
+          </p:cNvPr>
+          <p:cNvCxnSpPr>
+            <a:stCxn id="6" idx="3"/>
+            <a:endCxn id="6" idx="7"/>
+          </p:cNvCxnSpPr>
+          <p:nvPr/>
+        </p:nvCxnSpPr>
+        <p:spPr>
+          <a:xfrm flipV="1">
+            <a:off x="4270699" y="3548568"/>
+            <a:ext cx="402939" cy="421681"/>
+          </a:xfrm>
+          <a:prstGeom prst="line">
+            <a:avLst/>
+          </a:prstGeom>
+        </p:spPr>
+        <p:style>
+          <a:lnRef idx="2">
+            <a:schemeClr val="dk1"/>
+          </a:lnRef>
+          <a:fillRef idx="1">
+            <a:schemeClr val="lt1"/>
+          </a:fillRef>
+          <a:effectRef idx="0">
+            <a:schemeClr val="dk1"/>
+          </a:effectRef>
+          <a:fontRef idx="minor">
+            <a:schemeClr val="dk1"/>
+          </a:fontRef>
+        </p:style>
+      </p:cxnSp>
+      <p:sp>
+        <p:nvSpPr>
+          <p:cNvPr id="9" name="TextBox 8">
+            <a:extLst>
+              <a:ext uri="{FF2B5EF4-FFF2-40B4-BE49-F238E27FC236}">
+                <a16:creationId xmlns:a16="http://schemas.microsoft.com/office/drawing/2014/main" id="{9F729720-F4AF-42DF-B42D-9AA04A2B592D}"/>
+              </a:ext>
+            </a:extLst>
+          </p:cNvPr>
+          <p:cNvSpPr txBox="1"/>
+          <p:nvPr/>
+        </p:nvSpPr>
+        <p:spPr>
+          <a:xfrm>
+            <a:off x="4327804" y="3396765"/>
+            <a:ext cx="300082" cy="369332"/>
+          </a:xfrm>
+          <a:prstGeom prst="rect">
+            <a:avLst/>
+          </a:prstGeom>
+          <a:noFill/>
+        </p:spPr>
+        <p:txBody>
+          <a:bodyPr wrap="none" rtlCol="0">
+            <a:spAutoFit/>
+          </a:bodyPr>
+          <a:lstStyle/>
+          <a:p>
+            <a:r>
+              <a:rPr lang="en-GB" dirty="0"/>
+              <a:t>+</a:t>
+            </a:r>
+          </a:p>
+        </p:txBody>
+      </p:sp>
+      <p:sp>
+        <p:nvSpPr>
+          <p:cNvPr id="10" name="TextBox 9">
+            <a:extLst>
+              <a:ext uri="{FF2B5EF4-FFF2-40B4-BE49-F238E27FC236}">
+                <a16:creationId xmlns:a16="http://schemas.microsoft.com/office/drawing/2014/main" id="{D7B05199-F7B9-41FE-9A58-538D37ACC53D}"/>
+              </a:ext>
+            </a:extLst>
+          </p:cNvPr>
+          <p:cNvSpPr txBox="1"/>
+          <p:nvPr/>
+        </p:nvSpPr>
+        <p:spPr>
+          <a:xfrm>
+            <a:off x="4140169" y="3568774"/>
+            <a:ext cx="300082" cy="369332"/>
+          </a:xfrm>
+          <a:prstGeom prst="rect">
+            <a:avLst/>
+          </a:prstGeom>
+          <a:noFill/>
+        </p:spPr>
+        <p:txBody>
+          <a:bodyPr wrap="none" rtlCol="0">
+            <a:spAutoFit/>
+          </a:bodyPr>
+          <a:lstStyle/>
+          <a:p>
+            <a:r>
+              <a:rPr lang="en-GB" dirty="0"/>
+              <a:t>+</a:t>
+            </a:r>
+          </a:p>
+        </p:txBody>
+      </p:sp>
+      <p:sp>
+        <p:nvSpPr>
+          <p:cNvPr id="11" name="TextBox 10">
+            <a:extLst>
+              <a:ext uri="{FF2B5EF4-FFF2-40B4-BE49-F238E27FC236}">
+                <a16:creationId xmlns:a16="http://schemas.microsoft.com/office/drawing/2014/main" id="{6853982D-E87A-4B72-BEEC-189B45C6BAAF}"/>
+              </a:ext>
+            </a:extLst>
+          </p:cNvPr>
+          <p:cNvSpPr txBox="1"/>
+          <p:nvPr/>
+        </p:nvSpPr>
+        <p:spPr>
+          <a:xfrm>
+            <a:off x="4357787" y="3747988"/>
+            <a:ext cx="255198" cy="369332"/>
+          </a:xfrm>
+          <a:prstGeom prst="rect">
+            <a:avLst/>
+          </a:prstGeom>
+          <a:noFill/>
+        </p:spPr>
+        <p:txBody>
+          <a:bodyPr wrap="none" rtlCol="0">
+            <a:spAutoFit/>
+          </a:bodyPr>
+          <a:lstStyle/>
+          <a:p>
+            <a:r>
+              <a:rPr lang="en-GB" dirty="0"/>
+              <a:t>-</a:t>
+            </a:r>
+          </a:p>
+        </p:txBody>
+      </p:sp>
+      <p:cxnSp>
+        <p:nvCxnSpPr>
+          <p:cNvPr id="13" name="Straight Arrow Connector 12">
+            <a:extLst>
+              <a:ext uri="{FF2B5EF4-FFF2-40B4-BE49-F238E27FC236}">
+                <a16:creationId xmlns:a16="http://schemas.microsoft.com/office/drawing/2014/main" id="{82741775-B704-4602-B122-0E3F3AC61C75}"/>
+              </a:ext>
+            </a:extLst>
+          </p:cNvPr>
+          <p:cNvCxnSpPr>
+            <a:cxnSpLocks/>
+          </p:cNvCxnSpPr>
+          <p:nvPr/>
+        </p:nvCxnSpPr>
+        <p:spPr>
+          <a:xfrm>
+            <a:off x="3555882" y="3753440"/>
+            <a:ext cx="631365" cy="0"/>
+          </a:xfrm>
+          <a:prstGeom prst="straightConnector1">
+            <a:avLst/>
+          </a:prstGeom>
+          <a:ln>
+            <a:solidFill>
+              <a:schemeClr val="tx1"/>
+            </a:solidFill>
+            <a:tailEnd type="triangle"/>
+          </a:ln>
+        </p:spPr>
+        <p:style>
+          <a:lnRef idx="1">
+            <a:schemeClr val="accent1"/>
+          </a:lnRef>
+          <a:fillRef idx="0">
+            <a:schemeClr val="accent1"/>
+          </a:fillRef>
+          <a:effectRef idx="0">
+            <a:schemeClr val="accent1"/>
+          </a:effectRef>
+          <a:fontRef idx="minor">
+            <a:schemeClr val="tx1"/>
+          </a:fontRef>
+        </p:style>
+      </p:cxnSp>
+      <p:sp>
+        <p:nvSpPr>
+          <p:cNvPr id="17" name="TextBox 16">
+            <a:extLst>
+              <a:ext uri="{FF2B5EF4-FFF2-40B4-BE49-F238E27FC236}">
+                <a16:creationId xmlns:a16="http://schemas.microsoft.com/office/drawing/2014/main" id="{E685E3E1-A3FE-4125-8B34-EE4413B9C7C9}"/>
+              </a:ext>
+            </a:extLst>
+          </p:cNvPr>
+          <p:cNvSpPr txBox="1"/>
+          <p:nvPr/>
+        </p:nvSpPr>
+        <p:spPr>
+          <a:xfrm>
+            <a:off x="2699720" y="3457665"/>
+            <a:ext cx="936667" cy="646331"/>
+          </a:xfrm>
+          <a:prstGeom prst="rect">
+            <a:avLst/>
+          </a:prstGeom>
+          <a:noFill/>
+        </p:spPr>
+        <p:txBody>
+          <a:bodyPr wrap="none" rtlCol="0">
+            <a:spAutoFit/>
+          </a:bodyPr>
+          <a:lstStyle/>
+          <a:p>
+            <a:pPr algn="ctr"/>
+            <a:r>
+              <a:rPr lang="en-GB" dirty="0"/>
+              <a:t>Desired</a:t>
+            </a:r>
+          </a:p>
+          <a:p>
+            <a:pPr algn="ctr"/>
+            <a:r>
+              <a:rPr lang="en-GB" dirty="0"/>
+              <a:t>Position</a:t>
+            </a:r>
+          </a:p>
+        </p:txBody>
+      </p:sp>
+      <p:grpSp>
+        <p:nvGrpSpPr>
+          <p:cNvPr id="18" name="Group 17">
+            <a:extLst>
+              <a:ext uri="{FF2B5EF4-FFF2-40B4-BE49-F238E27FC236}">
+                <a16:creationId xmlns:a16="http://schemas.microsoft.com/office/drawing/2014/main" id="{8F5D31DD-9008-4486-9627-A3079E28C140}"/>
+              </a:ext>
+            </a:extLst>
+          </p:cNvPr>
+          <p:cNvGrpSpPr/>
+          <p:nvPr/>
+        </p:nvGrpSpPr>
+        <p:grpSpPr>
+          <a:xfrm>
+            <a:off x="4756542" y="3296240"/>
+            <a:ext cx="2796211" cy="914400"/>
+            <a:chOff x="3697358" y="795131"/>
+            <a:chExt cx="2796211" cy="914400"/>
+          </a:xfrm>
+        </p:grpSpPr>
+        <p:sp>
+          <p:nvSpPr>
+            <p:cNvPr id="19" name="Rectangle 18">
+              <a:extLst>
+                <a:ext uri="{FF2B5EF4-FFF2-40B4-BE49-F238E27FC236}">
+                  <a16:creationId xmlns:a16="http://schemas.microsoft.com/office/drawing/2014/main" id="{E7BDDB64-C960-47AF-BF55-5B9BFCC4F8E2}"/>
+                </a:ext>
+              </a:extLst>
+            </p:cNvPr>
+            <p:cNvSpPr/>
+            <p:nvPr/>
+          </p:nvSpPr>
+          <p:spPr>
+            <a:xfrm>
+              <a:off x="4479237" y="795131"/>
+              <a:ext cx="1232453" cy="914400"/>
+            </a:xfrm>
+            <a:prstGeom prst="rect">
+              <a:avLst/>
+            </a:prstGeom>
+            <a:ln w="28575"/>
+          </p:spPr>
+          <p:style>
+            <a:lnRef idx="2">
+              <a:schemeClr val="dk1"/>
+            </a:lnRef>
+            <a:fillRef idx="1">
+              <a:schemeClr val="lt1"/>
+            </a:fillRef>
+            <a:effectRef idx="0">
+              <a:schemeClr val="dk1"/>
+            </a:effectRef>
+            <a:fontRef idx="minor">
+              <a:schemeClr val="dk1"/>
+            </a:fontRef>
+          </p:style>
+          <p:txBody>
+            <a:bodyPr rtlCol="0" anchor="ctr"/>
+            <a:lstStyle/>
+            <a:p>
+              <a:pPr algn="ctr"/>
+              <a:r>
+                <a:rPr lang="en-GB" dirty="0"/>
+                <a:t>Position</a:t>
+              </a:r>
+            </a:p>
+            <a:p>
+              <a:pPr algn="ctr"/>
+              <a:r>
+                <a:rPr lang="en-GB" dirty="0"/>
+                <a:t>Controller</a:t>
+              </a:r>
+            </a:p>
+          </p:txBody>
+        </p:sp>
+        <p:cxnSp>
+          <p:nvCxnSpPr>
+            <p:cNvPr id="20" name="Straight Arrow Connector 19">
+              <a:extLst>
+                <a:ext uri="{FF2B5EF4-FFF2-40B4-BE49-F238E27FC236}">
+                  <a16:creationId xmlns:a16="http://schemas.microsoft.com/office/drawing/2014/main" id="{B9C8A729-7B7B-4D52-BD69-5834778D2FDE}"/>
+                </a:ext>
+              </a:extLst>
+            </p:cNvPr>
+            <p:cNvCxnSpPr>
+              <a:cxnSpLocks/>
+              <a:stCxn id="19" idx="3"/>
+            </p:cNvCxnSpPr>
+            <p:nvPr/>
+          </p:nvCxnSpPr>
+          <p:spPr>
+            <a:xfrm>
+              <a:off x="5711690" y="1252331"/>
+              <a:ext cx="781879" cy="0"/>
+            </a:xfrm>
+            <a:prstGeom prst="straightConnector1">
+              <a:avLst/>
+            </a:prstGeom>
+            <a:ln>
+              <a:tailEnd type="triangle"/>
+            </a:ln>
+          </p:spPr>
+          <p:style>
+            <a:lnRef idx="1">
+              <a:schemeClr val="dk1"/>
+            </a:lnRef>
+            <a:fillRef idx="0">
+              <a:schemeClr val="dk1"/>
+            </a:fillRef>
+            <a:effectRef idx="0">
+              <a:schemeClr val="dk1"/>
+            </a:effectRef>
+            <a:fontRef idx="minor">
+              <a:schemeClr val="tx1"/>
+            </a:fontRef>
+          </p:style>
+        </p:cxnSp>
+        <p:cxnSp>
+          <p:nvCxnSpPr>
+            <p:cNvPr id="21" name="Straight Arrow Connector 20">
+              <a:extLst>
+                <a:ext uri="{FF2B5EF4-FFF2-40B4-BE49-F238E27FC236}">
+                  <a16:creationId xmlns:a16="http://schemas.microsoft.com/office/drawing/2014/main" id="{6289796E-F51C-40C5-863B-2624A342E94E}"/>
+                </a:ext>
+              </a:extLst>
+            </p:cNvPr>
+            <p:cNvCxnSpPr>
+              <a:cxnSpLocks/>
+              <a:endCxn id="19" idx="1"/>
+            </p:cNvCxnSpPr>
+            <p:nvPr/>
+          </p:nvCxnSpPr>
+          <p:spPr>
+            <a:xfrm>
+              <a:off x="3697358" y="1252331"/>
+              <a:ext cx="781879" cy="0"/>
+            </a:xfrm>
+            <a:prstGeom prst="straightConnector1">
+              <a:avLst/>
+            </a:prstGeom>
+            <a:ln>
+              <a:tailEnd type="triangle"/>
+            </a:ln>
+          </p:spPr>
+          <p:style>
+            <a:lnRef idx="1">
+              <a:schemeClr val="dk1"/>
+            </a:lnRef>
+            <a:fillRef idx="0">
+              <a:schemeClr val="dk1"/>
+            </a:fillRef>
+            <a:effectRef idx="0">
+              <a:schemeClr val="dk1"/>
+            </a:effectRef>
+            <a:fontRef idx="minor">
+              <a:schemeClr val="tx1"/>
+            </a:fontRef>
+          </p:style>
+        </p:cxnSp>
+      </p:grpSp>
+      <p:sp>
+        <p:nvSpPr>
+          <p:cNvPr id="25" name="Rectangle 24">
+            <a:extLst>
+              <a:ext uri="{FF2B5EF4-FFF2-40B4-BE49-F238E27FC236}">
+                <a16:creationId xmlns:a16="http://schemas.microsoft.com/office/drawing/2014/main" id="{E252D558-31A8-4C8A-B437-96C371EDAD3F}"/>
+              </a:ext>
+            </a:extLst>
+          </p:cNvPr>
+          <p:cNvSpPr/>
+          <p:nvPr/>
+        </p:nvSpPr>
+        <p:spPr>
+          <a:xfrm>
+            <a:off x="7552205" y="3277464"/>
+            <a:ext cx="1232453" cy="914400"/>
+          </a:xfrm>
+          <a:prstGeom prst="rect">
+            <a:avLst/>
+          </a:prstGeom>
+          <a:ln w="28575"/>
+        </p:spPr>
+        <p:style>
+          <a:lnRef idx="2">
+            <a:schemeClr val="dk1"/>
+          </a:lnRef>
+          <a:fillRef idx="1">
+            <a:schemeClr val="lt1"/>
+          </a:fillRef>
+          <a:effectRef idx="0">
+            <a:schemeClr val="dk1"/>
+          </a:effectRef>
+          <a:fontRef idx="minor">
+            <a:schemeClr val="dk1"/>
+          </a:fontRef>
+        </p:style>
+        <p:txBody>
+          <a:bodyPr rtlCol="0" anchor="ctr"/>
+          <a:lstStyle/>
+          <a:p>
+            <a:pPr algn="ctr"/>
+            <a:r>
+              <a:rPr lang="en-GB" dirty="0"/>
+              <a:t>Plant</a:t>
+            </a:r>
+          </a:p>
+        </p:txBody>
+      </p:sp>
+      <mc:AlternateContent xmlns:mc="http://schemas.openxmlformats.org/markup-compatibility/2006">
+        <mc:Choice xmlns:a14="http://schemas.microsoft.com/office/drawing/2010/main" Requires="a14">
+          <p:sp>
+            <p:nvSpPr>
+              <p:cNvPr id="28" name="Rectangle 27">
+                <a:extLst>
+                  <a:ext uri="{FF2B5EF4-FFF2-40B4-BE49-F238E27FC236}">
+                    <a16:creationId xmlns:a16="http://schemas.microsoft.com/office/drawing/2014/main" id="{769F75B1-58AB-43B4-8C02-C96C12F4877E}"/>
+                  </a:ext>
+                </a:extLst>
+              </p:cNvPr>
+              <p:cNvSpPr/>
+              <p:nvPr/>
+            </p:nvSpPr>
+            <p:spPr>
+              <a:xfrm>
+                <a:off x="5266257" y="1686652"/>
+                <a:ext cx="1776779" cy="914400"/>
+              </a:xfrm>
+              <a:prstGeom prst="rect">
+                <a:avLst/>
+              </a:prstGeom>
+              <a:ln w="28575">
+                <a:solidFill>
+                  <a:schemeClr val="tx1"/>
+                </a:solidFill>
+              </a:ln>
+            </p:spPr>
+            <p:style>
+              <a:lnRef idx="2">
+                <a:schemeClr val="dk1"/>
+              </a:lnRef>
+              <a:fillRef idx="1">
+                <a:schemeClr val="lt1"/>
+              </a:fillRef>
+              <a:effectRef idx="0">
+                <a:schemeClr val="dk1"/>
+              </a:effectRef>
+              <a:fontRef idx="minor">
+                <a:schemeClr val="dk1"/>
+              </a:fontRef>
+            </p:style>
+            <p:txBody>
+              <a:bodyPr rtlCol="0" anchor="ctr"/>
+              <a:lstStyle/>
+              <a:p>
+                <a:pPr algn="ctr"/>
+                <a14:m>
+                  <m:oMathPara xmlns:m="http://schemas.openxmlformats.org/officeDocument/2006/math">
+                    <m:oMathParaPr>
+                      <m:jc m:val="centerGroup"/>
+                    </m:oMathParaPr>
+                    <m:oMath xmlns:m="http://schemas.openxmlformats.org/officeDocument/2006/math">
+                      <m:f>
+                        <m:fPr>
+                          <m:ctrlPr>
+                            <a:rPr lang="en-GB" i="1" dirty="0" smtClean="0">
+                              <a:latin typeface="Cambria Math" panose="02040503050406030204" pitchFamily="18" charset="0"/>
+                            </a:rPr>
+                          </m:ctrlPr>
+                        </m:fPr>
+                        <m:num>
+                          <m:r>
+                            <a:rPr lang="en-GB" b="0" i="1" dirty="0" smtClean="0">
+                              <a:latin typeface="Cambria Math" panose="02040503050406030204" pitchFamily="18" charset="0"/>
+                            </a:rPr>
+                            <m:t>1</m:t>
+                          </m:r>
+                        </m:num>
+                        <m:den>
+                          <m:sSup>
+                            <m:sSupPr>
+                              <m:ctrlPr>
+                                <a:rPr lang="en-GB" i="1" dirty="0" smtClean="0">
+                                  <a:latin typeface="Cambria Math" panose="02040503050406030204" pitchFamily="18" charset="0"/>
+                                </a:rPr>
+                              </m:ctrlPr>
+                            </m:sSupPr>
+                            <m:e>
+                              <m:r>
+                                <a:rPr lang="en-GB" b="0" i="1" dirty="0" smtClean="0">
+                                  <a:latin typeface="Cambria Math" panose="02040503050406030204" pitchFamily="18" charset="0"/>
+                                </a:rPr>
+                                <m:t>𝑚𝑠</m:t>
+                              </m:r>
+                            </m:e>
+                            <m:sup>
+                              <m:r>
+                                <a:rPr lang="en-GB" b="0" i="1" dirty="0" smtClean="0">
+                                  <a:latin typeface="Cambria Math" panose="02040503050406030204" pitchFamily="18" charset="0"/>
+                                </a:rPr>
+                                <m:t>2</m:t>
+                              </m:r>
+                            </m:sup>
+                          </m:sSup>
+                          <m:r>
+                            <a:rPr lang="en-GB" b="0" i="1" dirty="0" smtClean="0">
+                              <a:latin typeface="Cambria Math" panose="02040503050406030204" pitchFamily="18" charset="0"/>
+                            </a:rPr>
+                            <m:t>+</m:t>
+                          </m:r>
+                          <m:r>
+                            <a:rPr lang="en-GB" b="0" i="1" dirty="0" smtClean="0">
+                              <a:latin typeface="Cambria Math" panose="02040503050406030204" pitchFamily="18" charset="0"/>
+                            </a:rPr>
+                            <m:t>𝑐𝑠</m:t>
+                          </m:r>
+                          <m:r>
+                            <a:rPr lang="en-GB" b="0" i="1" dirty="0" smtClean="0">
+                              <a:latin typeface="Cambria Math" panose="02040503050406030204" pitchFamily="18" charset="0"/>
+                            </a:rPr>
+                            <m:t>+</m:t>
+                          </m:r>
+                          <m:r>
+                            <a:rPr lang="en-GB" b="0" i="1" dirty="0" smtClean="0">
+                              <a:latin typeface="Cambria Math" panose="02040503050406030204" pitchFamily="18" charset="0"/>
+                            </a:rPr>
+                            <m:t>𝑘</m:t>
+                          </m:r>
+                        </m:den>
+                      </m:f>
+                    </m:oMath>
+                  </m:oMathPara>
+                </a14:m>
+                <a:endParaRPr lang="en-GB" dirty="0"/>
+              </a:p>
+            </p:txBody>
+          </p:sp>
+        </mc:Choice>
+        <mc:Fallback>
+          <p:sp>
+            <p:nvSpPr>
+              <p:cNvPr id="28" name="Rectangle 27">
+                <a:extLst>
+                  <a:ext uri="{FF2B5EF4-FFF2-40B4-BE49-F238E27FC236}">
+                    <a16:creationId xmlns:a16="http://schemas.microsoft.com/office/drawing/2014/main" id="{769F75B1-58AB-43B4-8C02-C96C12F4877E}"/>
+                  </a:ext>
+                </a:extLst>
+              </p:cNvPr>
+              <p:cNvSpPr>
+                <a:spLocks noRot="1" noChangeAspect="1" noMove="1" noResize="1" noEditPoints="1" noAdjustHandles="1" noChangeArrowheads="1" noChangeShapeType="1" noTextEdit="1"/>
+              </p:cNvSpPr>
+              <p:nvPr/>
+            </p:nvSpPr>
+            <p:spPr>
+              <a:xfrm>
+                <a:off x="5266257" y="1686652"/>
+                <a:ext cx="1776779" cy="914400"/>
+              </a:xfrm>
+              <a:prstGeom prst="rect">
+                <a:avLst/>
+              </a:prstGeom>
+              <a:blipFill>
+                <a:blip r:embed="rId2"/>
+                <a:stretch>
+                  <a:fillRect/>
+                </a:stretch>
+              </a:blipFill>
+              <a:ln w="28575">
+                <a:solidFill>
+                  <a:schemeClr val="tx1"/>
+                </a:solidFill>
+              </a:ln>
+            </p:spPr>
+            <p:txBody>
+              <a:bodyPr/>
+              <a:lstStyle/>
+              <a:p>
+                <a:r>
+                  <a:rPr lang="en-GB">
+                    <a:noFill/>
+                  </a:rPr>
+                  <a:t> </a:t>
+                </a:r>
+              </a:p>
+            </p:txBody>
+          </p:sp>
+        </mc:Fallback>
+      </mc:AlternateContent>
+      <p:cxnSp>
+        <p:nvCxnSpPr>
+          <p:cNvPr id="30" name="Straight Arrow Connector 29">
+            <a:extLst>
+              <a:ext uri="{FF2B5EF4-FFF2-40B4-BE49-F238E27FC236}">
+                <a16:creationId xmlns:a16="http://schemas.microsoft.com/office/drawing/2014/main" id="{7311DE7D-687D-481A-BDA5-5BF4E82D1A09}"/>
+              </a:ext>
+            </a:extLst>
+          </p:cNvPr>
+          <p:cNvCxnSpPr>
+            <a:cxnSpLocks/>
+            <a:endCxn id="28" idx="3"/>
+          </p:cNvCxnSpPr>
+          <p:nvPr/>
+        </p:nvCxnSpPr>
+        <p:spPr>
+          <a:xfrm flipH="1">
+            <a:off x="7043036" y="2143852"/>
+            <a:ext cx="2273244" cy="0"/>
+          </a:xfrm>
+          <a:prstGeom prst="straightConnector1">
+            <a:avLst/>
+          </a:prstGeom>
+          <a:ln>
+            <a:solidFill>
+              <a:schemeClr val="tx1"/>
+            </a:solidFill>
+            <a:tailEnd type="triangle"/>
+          </a:ln>
+        </p:spPr>
+        <p:style>
+          <a:lnRef idx="1">
+            <a:schemeClr val="accent1"/>
+          </a:lnRef>
+          <a:fillRef idx="0">
+            <a:schemeClr val="accent1"/>
+          </a:fillRef>
+          <a:effectRef idx="0">
+            <a:schemeClr val="accent1"/>
+          </a:effectRef>
+          <a:fontRef idx="minor">
+            <a:schemeClr val="tx1"/>
+          </a:fontRef>
+        </p:style>
+      </p:cxnSp>
+      <p:sp>
+        <p:nvSpPr>
+          <p:cNvPr id="32" name="TextBox 31">
+            <a:extLst>
+              <a:ext uri="{FF2B5EF4-FFF2-40B4-BE49-F238E27FC236}">
+                <a16:creationId xmlns:a16="http://schemas.microsoft.com/office/drawing/2014/main" id="{DDD782F4-8EBC-457E-8BC0-9721A1892FCF}"/>
+              </a:ext>
+            </a:extLst>
+          </p:cNvPr>
+          <p:cNvSpPr txBox="1"/>
+          <p:nvPr/>
+        </p:nvSpPr>
+        <p:spPr>
+          <a:xfrm>
+            <a:off x="7639496" y="1774520"/>
+            <a:ext cx="480773" cy="369332"/>
+          </a:xfrm>
+          <a:prstGeom prst="rect">
+            <a:avLst/>
+          </a:prstGeom>
+          <a:noFill/>
+          <a:ln>
+            <a:noFill/>
+          </a:ln>
+        </p:spPr>
+        <p:txBody>
+          <a:bodyPr wrap="none" rtlCol="0">
+            <a:spAutoFit/>
+          </a:bodyPr>
+          <a:lstStyle/>
+          <a:p>
+            <a:r>
+              <a:rPr lang="en-GB" dirty="0"/>
+              <a:t>F</a:t>
+            </a:r>
+            <a:r>
+              <a:rPr lang="en-GB" baseline="-25000" dirty="0"/>
+              <a:t>ext</a:t>
+            </a:r>
+          </a:p>
+        </p:txBody>
+      </p:sp>
+      <p:cxnSp>
+        <p:nvCxnSpPr>
+          <p:cNvPr id="34" name="Connector: Elbow 33">
+            <a:extLst>
+              <a:ext uri="{FF2B5EF4-FFF2-40B4-BE49-F238E27FC236}">
+                <a16:creationId xmlns:a16="http://schemas.microsoft.com/office/drawing/2014/main" id="{97B83089-38C8-4833-966B-A5A85E6F8FC4}"/>
+              </a:ext>
+            </a:extLst>
+          </p:cNvPr>
+          <p:cNvCxnSpPr/>
+          <p:nvPr/>
+        </p:nvCxnSpPr>
+        <p:spPr>
+          <a:xfrm rot="5400000" flipH="1" flipV="1">
+            <a:off x="8348110" y="2580400"/>
+            <a:ext cx="1404716" cy="531620"/>
+          </a:xfrm>
+          <a:prstGeom prst="bentConnector3">
+            <a:avLst>
+              <a:gd name="adj1" fmla="val 5660"/>
+            </a:avLst>
+          </a:prstGeom>
+          <a:ln>
+            <a:solidFill>
+              <a:schemeClr val="tx1"/>
+            </a:solidFill>
+          </a:ln>
+        </p:spPr>
+        <p:style>
+          <a:lnRef idx="1">
+            <a:schemeClr val="accent1"/>
+          </a:lnRef>
+          <a:fillRef idx="0">
+            <a:schemeClr val="accent1"/>
+          </a:fillRef>
+          <a:effectRef idx="0">
+            <a:schemeClr val="accent1"/>
+          </a:effectRef>
+          <a:fontRef idx="minor">
+            <a:schemeClr val="tx1"/>
+          </a:fontRef>
+        </p:style>
+      </p:cxnSp>
+      <p:cxnSp>
+        <p:nvCxnSpPr>
+          <p:cNvPr id="38" name="Straight Arrow Connector 37">
+            <a:extLst>
+              <a:ext uri="{FF2B5EF4-FFF2-40B4-BE49-F238E27FC236}">
+                <a16:creationId xmlns:a16="http://schemas.microsoft.com/office/drawing/2014/main" id="{42951A53-C17F-40A7-AEB2-E771101FBD44}"/>
+              </a:ext>
+            </a:extLst>
+          </p:cNvPr>
+          <p:cNvCxnSpPr>
+            <a:cxnSpLocks/>
+          </p:cNvCxnSpPr>
+          <p:nvPr/>
+        </p:nvCxnSpPr>
+        <p:spPr>
+          <a:xfrm>
+            <a:off x="4472941" y="2358887"/>
+            <a:ext cx="0" cy="1098778"/>
+          </a:xfrm>
+          <a:prstGeom prst="straightConnector1">
+            <a:avLst/>
+          </a:prstGeom>
+          <a:ln>
+            <a:solidFill>
+              <a:schemeClr val="tx1"/>
+            </a:solidFill>
+            <a:tailEnd type="triangle"/>
+          </a:ln>
+        </p:spPr>
+        <p:style>
+          <a:lnRef idx="1">
+            <a:schemeClr val="accent1"/>
+          </a:lnRef>
+          <a:fillRef idx="0">
+            <a:schemeClr val="accent1"/>
+          </a:fillRef>
+          <a:effectRef idx="0">
+            <a:schemeClr val="accent1"/>
+          </a:effectRef>
+          <a:fontRef idx="minor">
+            <a:schemeClr val="tx1"/>
+          </a:fontRef>
+        </p:style>
+      </p:cxnSp>
+      <p:cxnSp>
+        <p:nvCxnSpPr>
+          <p:cNvPr id="41" name="Connector: Elbow 40">
+            <a:extLst>
+              <a:ext uri="{FF2B5EF4-FFF2-40B4-BE49-F238E27FC236}">
+                <a16:creationId xmlns:a16="http://schemas.microsoft.com/office/drawing/2014/main" id="{03420312-5FC5-4732-94A0-013DB98448BE}"/>
+              </a:ext>
+            </a:extLst>
+          </p:cNvPr>
+          <p:cNvCxnSpPr>
+            <a:stCxn id="28" idx="1"/>
+          </p:cNvCxnSpPr>
+          <p:nvPr/>
+        </p:nvCxnSpPr>
+        <p:spPr>
+          <a:xfrm rot="10800000" flipV="1">
+            <a:off x="4472169" y="2143851"/>
+            <a:ext cx="794089" cy="215035"/>
+          </a:xfrm>
+          <a:prstGeom prst="bentConnector3">
+            <a:avLst>
+              <a:gd name="adj1" fmla="val 98397"/>
+            </a:avLst>
+          </a:prstGeom>
+          <a:ln>
+            <a:solidFill>
+              <a:schemeClr val="tx1"/>
+            </a:solidFill>
+          </a:ln>
+        </p:spPr>
+        <p:style>
+          <a:lnRef idx="1">
+            <a:schemeClr val="accent1"/>
+          </a:lnRef>
+          <a:fillRef idx="0">
+            <a:schemeClr val="accent1"/>
+          </a:fillRef>
+          <a:effectRef idx="0">
+            <a:schemeClr val="accent1"/>
+          </a:effectRef>
+          <a:fontRef idx="minor">
+            <a:schemeClr val="tx1"/>
+          </a:fontRef>
+        </p:style>
+      </p:cxnSp>
+      <p:sp>
+        <p:nvSpPr>
+          <p:cNvPr id="43" name="TextBox 42">
+            <a:extLst>
+              <a:ext uri="{FF2B5EF4-FFF2-40B4-BE49-F238E27FC236}">
+                <a16:creationId xmlns:a16="http://schemas.microsoft.com/office/drawing/2014/main" id="{28CA8CA2-462B-4B62-96C3-62B5F3B58994}"/>
+              </a:ext>
+            </a:extLst>
+          </p:cNvPr>
+          <p:cNvSpPr txBox="1"/>
+          <p:nvPr/>
+        </p:nvSpPr>
+        <p:spPr>
+          <a:xfrm>
+            <a:off x="5273577" y="1332424"/>
+            <a:ext cx="1769459" cy="369332"/>
+          </a:xfrm>
+          <a:prstGeom prst="rect">
+            <a:avLst/>
+          </a:prstGeom>
+          <a:noFill/>
+        </p:spPr>
+        <p:txBody>
+          <a:bodyPr wrap="none" rtlCol="0">
+            <a:spAutoFit/>
+          </a:bodyPr>
+          <a:lstStyle/>
+          <a:p>
+            <a:r>
+              <a:rPr lang="en-GB" dirty="0"/>
+              <a:t>Admittance filter</a:t>
+            </a:r>
+          </a:p>
+        </p:txBody>
+      </p:sp>
+      <p:cxnSp>
+        <p:nvCxnSpPr>
+          <p:cNvPr id="45" name="Straight Arrow Connector 44">
+            <a:extLst>
+              <a:ext uri="{FF2B5EF4-FFF2-40B4-BE49-F238E27FC236}">
+                <a16:creationId xmlns:a16="http://schemas.microsoft.com/office/drawing/2014/main" id="{B89021DF-5DAD-4B21-9E98-3288E0EFE358}"/>
+              </a:ext>
+            </a:extLst>
+          </p:cNvPr>
+          <p:cNvCxnSpPr>
+            <a:stCxn id="25" idx="3"/>
+          </p:cNvCxnSpPr>
+          <p:nvPr/>
+        </p:nvCxnSpPr>
+        <p:spPr>
+          <a:xfrm>
+            <a:off x="8784658" y="3734664"/>
+            <a:ext cx="1247238" cy="0"/>
+          </a:xfrm>
+          <a:prstGeom prst="straightConnector1">
+            <a:avLst/>
+          </a:prstGeom>
+          <a:ln>
+            <a:solidFill>
+              <a:schemeClr val="tx1"/>
+            </a:solidFill>
+            <a:tailEnd type="triangle"/>
+          </a:ln>
+        </p:spPr>
+        <p:style>
+          <a:lnRef idx="1">
+            <a:schemeClr val="accent1"/>
+          </a:lnRef>
+          <a:fillRef idx="0">
+            <a:schemeClr val="accent1"/>
+          </a:fillRef>
+          <a:effectRef idx="0">
+            <a:schemeClr val="accent1"/>
+          </a:effectRef>
+          <a:fontRef idx="minor">
+            <a:schemeClr val="tx1"/>
+          </a:fontRef>
+        </p:style>
+      </p:cxnSp>
+      <p:sp>
+        <p:nvSpPr>
+          <p:cNvPr id="46" name="TextBox 45">
+            <a:extLst>
+              <a:ext uri="{FF2B5EF4-FFF2-40B4-BE49-F238E27FC236}">
+                <a16:creationId xmlns:a16="http://schemas.microsoft.com/office/drawing/2014/main" id="{C1077C81-17EC-471D-8EE6-004678B2073D}"/>
+              </a:ext>
+            </a:extLst>
+          </p:cNvPr>
+          <p:cNvSpPr txBox="1"/>
+          <p:nvPr/>
+        </p:nvSpPr>
+        <p:spPr>
+          <a:xfrm>
+            <a:off x="6171671" y="4599107"/>
+            <a:ext cx="1590500" cy="369332"/>
+          </a:xfrm>
+          <a:prstGeom prst="rect">
+            <a:avLst/>
+          </a:prstGeom>
+          <a:noFill/>
+        </p:spPr>
+        <p:txBody>
+          <a:bodyPr wrap="none" rtlCol="0">
+            <a:spAutoFit/>
+          </a:bodyPr>
+          <a:lstStyle/>
+          <a:p>
+            <a:r>
+              <a:rPr lang="en-GB" dirty="0"/>
+              <a:t>Actual position</a:t>
+            </a:r>
+          </a:p>
+        </p:txBody>
+      </p:sp>
+      <p:cxnSp>
+        <p:nvCxnSpPr>
+          <p:cNvPr id="48" name="Connector: Elbow 47">
+            <a:extLst>
+              <a:ext uri="{FF2B5EF4-FFF2-40B4-BE49-F238E27FC236}">
+                <a16:creationId xmlns:a16="http://schemas.microsoft.com/office/drawing/2014/main" id="{39DD791D-D3ED-4A09-860C-8FFA88C33337}"/>
+              </a:ext>
+            </a:extLst>
+          </p:cNvPr>
+          <p:cNvCxnSpPr>
+            <a:cxnSpLocks/>
+          </p:cNvCxnSpPr>
+          <p:nvPr/>
+        </p:nvCxnSpPr>
+        <p:spPr>
+          <a:xfrm rot="10800000" flipV="1">
+            <a:off x="4472168" y="3734661"/>
+            <a:ext cx="4844114" cy="1165045"/>
+          </a:xfrm>
+          <a:prstGeom prst="bentConnector3">
+            <a:avLst>
+              <a:gd name="adj1" fmla="val 210"/>
+            </a:avLst>
+          </a:prstGeom>
+          <a:ln>
+            <a:solidFill>
+              <a:schemeClr val="tx1"/>
+            </a:solidFill>
+          </a:ln>
+        </p:spPr>
+        <p:style>
+          <a:lnRef idx="1">
+            <a:schemeClr val="accent1"/>
+          </a:lnRef>
+          <a:fillRef idx="0">
+            <a:schemeClr val="accent1"/>
+          </a:fillRef>
+          <a:effectRef idx="0">
+            <a:schemeClr val="accent1"/>
+          </a:effectRef>
+          <a:fontRef idx="minor">
+            <a:schemeClr val="tx1"/>
+          </a:fontRef>
+        </p:style>
+      </p:cxnSp>
+      <p:cxnSp>
+        <p:nvCxnSpPr>
+          <p:cNvPr id="52" name="Straight Arrow Connector 51">
+            <a:extLst>
+              <a:ext uri="{FF2B5EF4-FFF2-40B4-BE49-F238E27FC236}">
+                <a16:creationId xmlns:a16="http://schemas.microsoft.com/office/drawing/2014/main" id="{429D0E40-6DE7-4726-A352-102088660B06}"/>
+              </a:ext>
+            </a:extLst>
+          </p:cNvPr>
+          <p:cNvCxnSpPr>
+            <a:cxnSpLocks/>
+            <a:endCxn id="6" idx="4"/>
+          </p:cNvCxnSpPr>
+          <p:nvPr/>
+        </p:nvCxnSpPr>
+        <p:spPr>
+          <a:xfrm flipV="1">
+            <a:off x="4472169" y="4057582"/>
+            <a:ext cx="0" cy="842125"/>
+          </a:xfrm>
+          <a:prstGeom prst="straightConnector1">
+            <a:avLst/>
+          </a:prstGeom>
+          <a:ln>
+            <a:solidFill>
+              <a:schemeClr val="tx1"/>
+            </a:solidFill>
+            <a:tailEnd type="triangle"/>
+          </a:ln>
+        </p:spPr>
+        <p:style>
+          <a:lnRef idx="1">
+            <a:schemeClr val="accent1"/>
+          </a:lnRef>
+          <a:fillRef idx="0">
+            <a:schemeClr val="accent1"/>
+          </a:fillRef>
+          <a:effectRef idx="0">
+            <a:schemeClr val="accent1"/>
+          </a:effectRef>
+          <a:fontRef idx="minor">
+            <a:schemeClr val="tx1"/>
+          </a:fontRef>
+        </p:style>
+      </p:cxnSp>
+      <p:sp>
+        <p:nvSpPr>
+          <p:cNvPr id="57" name="TextBox 56">
+            <a:extLst>
+              <a:ext uri="{FF2B5EF4-FFF2-40B4-BE49-F238E27FC236}">
+                <a16:creationId xmlns:a16="http://schemas.microsoft.com/office/drawing/2014/main" id="{9971061F-C17A-422C-A3DF-95B4AD6286BB}"/>
+              </a:ext>
+            </a:extLst>
+          </p:cNvPr>
+          <p:cNvSpPr txBox="1"/>
+          <p:nvPr/>
+        </p:nvSpPr>
+        <p:spPr>
+          <a:xfrm>
+            <a:off x="3579566" y="2123447"/>
+            <a:ext cx="981359" cy="646331"/>
+          </a:xfrm>
+          <a:prstGeom prst="rect">
+            <a:avLst/>
+          </a:prstGeom>
+          <a:noFill/>
+        </p:spPr>
+        <p:txBody>
+          <a:bodyPr wrap="none" rtlCol="0">
+            <a:spAutoFit/>
+          </a:bodyPr>
+          <a:lstStyle/>
+          <a:p>
+            <a:r>
+              <a:rPr lang="en-GB" dirty="0"/>
+              <a:t>Position</a:t>
+            </a:r>
+          </a:p>
+          <a:p>
+            <a:r>
+              <a:rPr lang="en-GB" dirty="0"/>
+              <a:t>Demand</a:t>
+            </a:r>
+          </a:p>
+        </p:txBody>
+      </p:sp>
+    </p:spTree>
+    <p:extLst>
+      <p:ext uri="{BB962C8B-B14F-4D97-AF65-F5344CB8AC3E}">
+        <p14:creationId xmlns:p14="http://schemas.microsoft.com/office/powerpoint/2010/main" val="144723410"/>
+      </p:ext>
+    </p:extLst>
+  </p:cSld>
+  <p:clrMapOvr>
+    <a:masterClrMapping/>
+  </p:clrMapOvr>
+</p:sld>
+</file>
+
+<file path=ppt/slides/slide12.xml><?xml version="1.0" encoding="utf-8"?>
+<p:sld xmlns:a="http://schemas.openxmlformats.org/drawingml/2006/main" xmlns:r="http://schemas.openxmlformats.org/officeDocument/2006/relationships" xmlns:p="http://schemas.openxmlformats.org/presentationml/2006/main">
+  <p:cSld>
+    <p:spTree>
+      <p:nvGrpSpPr>
+        <p:cNvPr id="1" name=""/>
+        <p:cNvGrpSpPr/>
+        <p:nvPr/>
+      </p:nvGrpSpPr>
+      <p:grpSpPr>
+        <a:xfrm>
+          <a:off x="0" y="0"/>
+          <a:ext cx="0" cy="0"/>
+          <a:chOff x="0" y="0"/>
+          <a:chExt cx="0" cy="0"/>
+        </a:xfrm>
+      </p:grpSpPr>
+      <p:sp>
+        <p:nvSpPr>
+          <p:cNvPr id="6" name="Oval 5">
+            <a:extLst>
+              <a:ext uri="{FF2B5EF4-FFF2-40B4-BE49-F238E27FC236}">
+                <a16:creationId xmlns:a16="http://schemas.microsoft.com/office/drawing/2014/main" id="{314EF023-421C-48F6-B5BB-312BEDC84247}"/>
+              </a:ext>
+            </a:extLst>
+          </p:cNvPr>
+          <p:cNvSpPr/>
+          <p:nvPr/>
+        </p:nvSpPr>
+        <p:spPr>
+          <a:xfrm>
+            <a:off x="4187247" y="3461235"/>
+            <a:ext cx="569843" cy="596347"/>
+          </a:xfrm>
+          <a:prstGeom prst="ellipse">
+            <a:avLst/>
+          </a:prstGeom>
+        </p:spPr>
+        <p:style>
+          <a:lnRef idx="2">
+            <a:schemeClr val="dk1"/>
+          </a:lnRef>
+          <a:fillRef idx="1">
+            <a:schemeClr val="lt1"/>
+          </a:fillRef>
+          <a:effectRef idx="0">
+            <a:schemeClr val="dk1"/>
+          </a:effectRef>
+          <a:fontRef idx="minor">
+            <a:schemeClr val="dk1"/>
+          </a:fontRef>
+        </p:style>
+        <p:txBody>
+          <a:bodyPr rtlCol="0" anchor="ctr"/>
+          <a:lstStyle/>
+          <a:p>
+            <a:pPr algn="ctr"/>
+            <a:endParaRPr lang="en-GB"/>
+          </a:p>
+        </p:txBody>
+      </p:sp>
+      <p:cxnSp>
+        <p:nvCxnSpPr>
+          <p:cNvPr id="7" name="Straight Connector 6">
+            <a:extLst>
+              <a:ext uri="{FF2B5EF4-FFF2-40B4-BE49-F238E27FC236}">
+                <a16:creationId xmlns:a16="http://schemas.microsoft.com/office/drawing/2014/main" id="{16441A50-B1C5-42ED-BEE9-5C6C524C02E3}"/>
+              </a:ext>
+            </a:extLst>
+          </p:cNvPr>
+          <p:cNvCxnSpPr>
+            <a:stCxn id="6" idx="1"/>
+            <a:endCxn id="6" idx="5"/>
+          </p:cNvCxnSpPr>
+          <p:nvPr/>
+        </p:nvCxnSpPr>
+        <p:spPr>
+          <a:xfrm>
+            <a:off x="4270699" y="3548568"/>
+            <a:ext cx="402939" cy="421681"/>
+          </a:xfrm>
+          <a:prstGeom prst="line">
+            <a:avLst/>
+          </a:prstGeom>
+        </p:spPr>
+        <p:style>
+          <a:lnRef idx="2">
+            <a:schemeClr val="dk1"/>
+          </a:lnRef>
+          <a:fillRef idx="1">
+            <a:schemeClr val="lt1"/>
+          </a:fillRef>
+          <a:effectRef idx="0">
+            <a:schemeClr val="dk1"/>
+          </a:effectRef>
+          <a:fontRef idx="minor">
+            <a:schemeClr val="dk1"/>
+          </a:fontRef>
+        </p:style>
+      </p:cxnSp>
+      <p:cxnSp>
+        <p:nvCxnSpPr>
+          <p:cNvPr id="8" name="Straight Connector 7">
+            <a:extLst>
+              <a:ext uri="{FF2B5EF4-FFF2-40B4-BE49-F238E27FC236}">
+                <a16:creationId xmlns:a16="http://schemas.microsoft.com/office/drawing/2014/main" id="{C2787C54-85A0-48A1-81AD-358DB2FEFC2D}"/>
+              </a:ext>
+            </a:extLst>
+          </p:cNvPr>
+          <p:cNvCxnSpPr>
+            <a:stCxn id="6" idx="3"/>
+            <a:endCxn id="6" idx="7"/>
+          </p:cNvCxnSpPr>
+          <p:nvPr/>
+        </p:nvCxnSpPr>
+        <p:spPr>
+          <a:xfrm flipV="1">
+            <a:off x="4270699" y="3548568"/>
+            <a:ext cx="402939" cy="421681"/>
+          </a:xfrm>
+          <a:prstGeom prst="line">
+            <a:avLst/>
+          </a:prstGeom>
+        </p:spPr>
+        <p:style>
+          <a:lnRef idx="2">
+            <a:schemeClr val="dk1"/>
+          </a:lnRef>
+          <a:fillRef idx="1">
+            <a:schemeClr val="lt1"/>
+          </a:fillRef>
+          <a:effectRef idx="0">
+            <a:schemeClr val="dk1"/>
+          </a:effectRef>
+          <a:fontRef idx="minor">
+            <a:schemeClr val="dk1"/>
+          </a:fontRef>
+        </p:style>
+      </p:cxnSp>
+      <p:sp>
+        <p:nvSpPr>
+          <p:cNvPr id="9" name="TextBox 8">
+            <a:extLst>
+              <a:ext uri="{FF2B5EF4-FFF2-40B4-BE49-F238E27FC236}">
+                <a16:creationId xmlns:a16="http://schemas.microsoft.com/office/drawing/2014/main" id="{9F729720-F4AF-42DF-B42D-9AA04A2B592D}"/>
+              </a:ext>
+            </a:extLst>
+          </p:cNvPr>
+          <p:cNvSpPr txBox="1"/>
+          <p:nvPr/>
+        </p:nvSpPr>
+        <p:spPr>
+          <a:xfrm>
+            <a:off x="4327804" y="3396765"/>
+            <a:ext cx="300082" cy="369332"/>
+          </a:xfrm>
+          <a:prstGeom prst="rect">
+            <a:avLst/>
+          </a:prstGeom>
+          <a:noFill/>
+        </p:spPr>
+        <p:txBody>
+          <a:bodyPr wrap="none" rtlCol="0">
+            <a:spAutoFit/>
+          </a:bodyPr>
+          <a:lstStyle/>
+          <a:p>
+            <a:r>
+              <a:rPr lang="en-GB" dirty="0"/>
+              <a:t>+</a:t>
+            </a:r>
+          </a:p>
+        </p:txBody>
+      </p:sp>
+      <p:sp>
+        <p:nvSpPr>
+          <p:cNvPr id="10" name="TextBox 9">
+            <a:extLst>
+              <a:ext uri="{FF2B5EF4-FFF2-40B4-BE49-F238E27FC236}">
+                <a16:creationId xmlns:a16="http://schemas.microsoft.com/office/drawing/2014/main" id="{D7B05199-F7B9-41FE-9A58-538D37ACC53D}"/>
+              </a:ext>
+            </a:extLst>
+          </p:cNvPr>
+          <p:cNvSpPr txBox="1"/>
+          <p:nvPr/>
+        </p:nvSpPr>
+        <p:spPr>
+          <a:xfrm>
+            <a:off x="4140169" y="3568774"/>
+            <a:ext cx="300082" cy="369332"/>
+          </a:xfrm>
+          <a:prstGeom prst="rect">
+            <a:avLst/>
+          </a:prstGeom>
+          <a:noFill/>
+        </p:spPr>
+        <p:txBody>
+          <a:bodyPr wrap="none" rtlCol="0">
+            <a:spAutoFit/>
+          </a:bodyPr>
+          <a:lstStyle/>
+          <a:p>
+            <a:r>
+              <a:rPr lang="en-GB" dirty="0"/>
+              <a:t>+</a:t>
+            </a:r>
+          </a:p>
+        </p:txBody>
+      </p:sp>
+      <p:sp>
+        <p:nvSpPr>
+          <p:cNvPr id="11" name="TextBox 10">
+            <a:extLst>
+              <a:ext uri="{FF2B5EF4-FFF2-40B4-BE49-F238E27FC236}">
+                <a16:creationId xmlns:a16="http://schemas.microsoft.com/office/drawing/2014/main" id="{6853982D-E87A-4B72-BEEC-189B45C6BAAF}"/>
+              </a:ext>
+            </a:extLst>
+          </p:cNvPr>
+          <p:cNvSpPr txBox="1"/>
+          <p:nvPr/>
+        </p:nvSpPr>
+        <p:spPr>
+          <a:xfrm>
+            <a:off x="4357787" y="3747988"/>
+            <a:ext cx="255198" cy="369332"/>
+          </a:xfrm>
+          <a:prstGeom prst="rect">
+            <a:avLst/>
+          </a:prstGeom>
+          <a:noFill/>
+        </p:spPr>
+        <p:txBody>
+          <a:bodyPr wrap="none" rtlCol="0">
+            <a:spAutoFit/>
+          </a:bodyPr>
+          <a:lstStyle/>
+          <a:p>
+            <a:r>
+              <a:rPr lang="en-GB" dirty="0"/>
+              <a:t>-</a:t>
+            </a:r>
+          </a:p>
+        </p:txBody>
+      </p:sp>
+      <p:cxnSp>
+        <p:nvCxnSpPr>
+          <p:cNvPr id="13" name="Straight Arrow Connector 12">
+            <a:extLst>
+              <a:ext uri="{FF2B5EF4-FFF2-40B4-BE49-F238E27FC236}">
+                <a16:creationId xmlns:a16="http://schemas.microsoft.com/office/drawing/2014/main" id="{82741775-B704-4602-B122-0E3F3AC61C75}"/>
+              </a:ext>
+            </a:extLst>
+          </p:cNvPr>
+          <p:cNvCxnSpPr>
+            <a:cxnSpLocks/>
+          </p:cNvCxnSpPr>
+          <p:nvPr/>
+        </p:nvCxnSpPr>
+        <p:spPr>
+          <a:xfrm>
+            <a:off x="3555882" y="3753440"/>
+            <a:ext cx="631365" cy="0"/>
+          </a:xfrm>
+          <a:prstGeom prst="straightConnector1">
+            <a:avLst/>
+          </a:prstGeom>
+          <a:ln>
+            <a:solidFill>
+              <a:schemeClr val="tx1"/>
+            </a:solidFill>
+            <a:tailEnd type="triangle"/>
+          </a:ln>
+        </p:spPr>
+        <p:style>
+          <a:lnRef idx="1">
+            <a:schemeClr val="accent1"/>
+          </a:lnRef>
+          <a:fillRef idx="0">
+            <a:schemeClr val="accent1"/>
+          </a:fillRef>
+          <a:effectRef idx="0">
+            <a:schemeClr val="accent1"/>
+          </a:effectRef>
+          <a:fontRef idx="minor">
+            <a:schemeClr val="tx1"/>
+          </a:fontRef>
+        </p:style>
+      </p:cxnSp>
+      <p:sp>
+        <p:nvSpPr>
+          <p:cNvPr id="17" name="TextBox 16">
+            <a:extLst>
+              <a:ext uri="{FF2B5EF4-FFF2-40B4-BE49-F238E27FC236}">
+                <a16:creationId xmlns:a16="http://schemas.microsoft.com/office/drawing/2014/main" id="{E685E3E1-A3FE-4125-8B34-EE4413B9C7C9}"/>
+              </a:ext>
+            </a:extLst>
+          </p:cNvPr>
+          <p:cNvSpPr txBox="1"/>
+          <p:nvPr/>
+        </p:nvSpPr>
+        <p:spPr>
+          <a:xfrm>
+            <a:off x="2718154" y="3457665"/>
+            <a:ext cx="899798" cy="646331"/>
+          </a:xfrm>
+          <a:prstGeom prst="rect">
+            <a:avLst/>
+          </a:prstGeom>
+          <a:noFill/>
+        </p:spPr>
+        <p:txBody>
+          <a:bodyPr wrap="none" rtlCol="0">
+            <a:spAutoFit/>
+          </a:bodyPr>
+          <a:lstStyle/>
+          <a:p>
+            <a:pPr algn="ctr"/>
+            <a:r>
+              <a:rPr lang="en-GB" dirty="0"/>
+              <a:t>Desired</a:t>
+            </a:r>
+          </a:p>
+          <a:p>
+            <a:pPr algn="ctr"/>
+            <a:r>
+              <a:rPr lang="en-GB" dirty="0"/>
+              <a:t>Force</a:t>
+            </a:r>
+          </a:p>
+        </p:txBody>
+      </p:sp>
+      <p:grpSp>
+        <p:nvGrpSpPr>
+          <p:cNvPr id="18" name="Group 17">
+            <a:extLst>
+              <a:ext uri="{FF2B5EF4-FFF2-40B4-BE49-F238E27FC236}">
+                <a16:creationId xmlns:a16="http://schemas.microsoft.com/office/drawing/2014/main" id="{8F5D31DD-9008-4486-9627-A3079E28C140}"/>
+              </a:ext>
+            </a:extLst>
+          </p:cNvPr>
+          <p:cNvGrpSpPr/>
+          <p:nvPr/>
+        </p:nvGrpSpPr>
+        <p:grpSpPr>
+          <a:xfrm>
+            <a:off x="4756542" y="3296240"/>
+            <a:ext cx="2796211" cy="914400"/>
+            <a:chOff x="3697358" y="795131"/>
+            <a:chExt cx="2796211" cy="914400"/>
+          </a:xfrm>
+        </p:grpSpPr>
+        <p:sp>
+          <p:nvSpPr>
+            <p:cNvPr id="19" name="Rectangle 18">
+              <a:extLst>
+                <a:ext uri="{FF2B5EF4-FFF2-40B4-BE49-F238E27FC236}">
+                  <a16:creationId xmlns:a16="http://schemas.microsoft.com/office/drawing/2014/main" id="{E7BDDB64-C960-47AF-BF55-5B9BFCC4F8E2}"/>
+                </a:ext>
+              </a:extLst>
+            </p:cNvPr>
+            <p:cNvSpPr/>
+            <p:nvPr/>
+          </p:nvSpPr>
+          <p:spPr>
+            <a:xfrm>
+              <a:off x="4479237" y="795131"/>
+              <a:ext cx="1232453" cy="914400"/>
+            </a:xfrm>
+            <a:prstGeom prst="rect">
+              <a:avLst/>
+            </a:prstGeom>
+            <a:ln w="28575"/>
+          </p:spPr>
+          <p:style>
+            <a:lnRef idx="2">
+              <a:schemeClr val="dk1"/>
+            </a:lnRef>
+            <a:fillRef idx="1">
+              <a:schemeClr val="lt1"/>
+            </a:fillRef>
+            <a:effectRef idx="0">
+              <a:schemeClr val="dk1"/>
+            </a:effectRef>
+            <a:fontRef idx="minor">
+              <a:schemeClr val="dk1"/>
+            </a:fontRef>
+          </p:style>
+          <p:txBody>
+            <a:bodyPr rtlCol="0" anchor="ctr"/>
+            <a:lstStyle/>
+            <a:p>
+              <a:pPr algn="ctr"/>
+              <a:r>
+                <a:rPr lang="en-GB" dirty="0"/>
+                <a:t>Force</a:t>
+              </a:r>
+            </a:p>
+            <a:p>
+              <a:pPr algn="ctr"/>
+              <a:r>
+                <a:rPr lang="en-GB" dirty="0"/>
+                <a:t>Controller</a:t>
+              </a:r>
+            </a:p>
+          </p:txBody>
+        </p:sp>
+        <p:cxnSp>
+          <p:nvCxnSpPr>
+            <p:cNvPr id="20" name="Straight Arrow Connector 19">
+              <a:extLst>
+                <a:ext uri="{FF2B5EF4-FFF2-40B4-BE49-F238E27FC236}">
+                  <a16:creationId xmlns:a16="http://schemas.microsoft.com/office/drawing/2014/main" id="{B9C8A729-7B7B-4D52-BD69-5834778D2FDE}"/>
+                </a:ext>
+              </a:extLst>
+            </p:cNvPr>
+            <p:cNvCxnSpPr>
+              <a:cxnSpLocks/>
+              <a:stCxn id="19" idx="3"/>
+            </p:cNvCxnSpPr>
+            <p:nvPr/>
+          </p:nvCxnSpPr>
+          <p:spPr>
+            <a:xfrm>
+              <a:off x="5711690" y="1252331"/>
+              <a:ext cx="781879" cy="0"/>
+            </a:xfrm>
+            <a:prstGeom prst="straightConnector1">
+              <a:avLst/>
+            </a:prstGeom>
+            <a:ln>
+              <a:tailEnd type="triangle"/>
+            </a:ln>
+          </p:spPr>
+          <p:style>
+            <a:lnRef idx="1">
+              <a:schemeClr val="dk1"/>
+            </a:lnRef>
+            <a:fillRef idx="0">
+              <a:schemeClr val="dk1"/>
+            </a:fillRef>
+            <a:effectRef idx="0">
+              <a:schemeClr val="dk1"/>
+            </a:effectRef>
+            <a:fontRef idx="minor">
+              <a:schemeClr val="tx1"/>
+            </a:fontRef>
+          </p:style>
+        </p:cxnSp>
+        <p:cxnSp>
+          <p:nvCxnSpPr>
+            <p:cNvPr id="21" name="Straight Arrow Connector 20">
+              <a:extLst>
+                <a:ext uri="{FF2B5EF4-FFF2-40B4-BE49-F238E27FC236}">
+                  <a16:creationId xmlns:a16="http://schemas.microsoft.com/office/drawing/2014/main" id="{6289796E-F51C-40C5-863B-2624A342E94E}"/>
+                </a:ext>
+              </a:extLst>
+            </p:cNvPr>
+            <p:cNvCxnSpPr>
+              <a:cxnSpLocks/>
+              <a:endCxn id="19" idx="1"/>
+            </p:cNvCxnSpPr>
+            <p:nvPr/>
+          </p:nvCxnSpPr>
+          <p:spPr>
+            <a:xfrm>
+              <a:off x="3697358" y="1252331"/>
+              <a:ext cx="781879" cy="0"/>
+            </a:xfrm>
+            <a:prstGeom prst="straightConnector1">
+              <a:avLst/>
+            </a:prstGeom>
+            <a:ln>
+              <a:tailEnd type="triangle"/>
+            </a:ln>
+          </p:spPr>
+          <p:style>
+            <a:lnRef idx="1">
+              <a:schemeClr val="dk1"/>
+            </a:lnRef>
+            <a:fillRef idx="0">
+              <a:schemeClr val="dk1"/>
+            </a:fillRef>
+            <a:effectRef idx="0">
+              <a:schemeClr val="dk1"/>
+            </a:effectRef>
+            <a:fontRef idx="minor">
+              <a:schemeClr val="tx1"/>
+            </a:fontRef>
+          </p:style>
+        </p:cxnSp>
+      </p:grpSp>
+      <p:sp>
+        <p:nvSpPr>
+          <p:cNvPr id="25" name="Rectangle 24">
+            <a:extLst>
+              <a:ext uri="{FF2B5EF4-FFF2-40B4-BE49-F238E27FC236}">
+                <a16:creationId xmlns:a16="http://schemas.microsoft.com/office/drawing/2014/main" id="{E252D558-31A8-4C8A-B437-96C371EDAD3F}"/>
+              </a:ext>
+            </a:extLst>
+          </p:cNvPr>
+          <p:cNvSpPr/>
+          <p:nvPr/>
+        </p:nvSpPr>
+        <p:spPr>
+          <a:xfrm>
+            <a:off x="7552205" y="3277464"/>
+            <a:ext cx="1232453" cy="914400"/>
+          </a:xfrm>
+          <a:prstGeom prst="rect">
+            <a:avLst/>
+          </a:prstGeom>
+          <a:ln w="28575"/>
+        </p:spPr>
+        <p:style>
+          <a:lnRef idx="2">
+            <a:schemeClr val="dk1"/>
+          </a:lnRef>
+          <a:fillRef idx="1">
+            <a:schemeClr val="lt1"/>
+          </a:fillRef>
+          <a:effectRef idx="0">
+            <a:schemeClr val="dk1"/>
+          </a:effectRef>
+          <a:fontRef idx="minor">
+            <a:schemeClr val="dk1"/>
+          </a:fontRef>
+        </p:style>
+        <p:txBody>
+          <a:bodyPr rtlCol="0" anchor="ctr"/>
+          <a:lstStyle/>
+          <a:p>
+            <a:pPr algn="ctr"/>
+            <a:r>
+              <a:rPr lang="en-GB" dirty="0"/>
+              <a:t>Plant</a:t>
+            </a:r>
+          </a:p>
+        </p:txBody>
+      </p:sp>
+      <mc:AlternateContent xmlns:mc="http://schemas.openxmlformats.org/markup-compatibility/2006">
+        <mc:Choice xmlns:a14="http://schemas.microsoft.com/office/drawing/2010/main" Requires="a14">
+          <p:sp>
+            <p:nvSpPr>
+              <p:cNvPr id="28" name="Rectangle 27">
+                <a:extLst>
+                  <a:ext uri="{FF2B5EF4-FFF2-40B4-BE49-F238E27FC236}">
+                    <a16:creationId xmlns:a16="http://schemas.microsoft.com/office/drawing/2014/main" id="{769F75B1-58AB-43B4-8C02-C96C12F4877E}"/>
+                  </a:ext>
+                </a:extLst>
+              </p:cNvPr>
+              <p:cNvSpPr/>
+              <p:nvPr/>
+            </p:nvSpPr>
+            <p:spPr>
+              <a:xfrm>
+                <a:off x="5266257" y="1686652"/>
+                <a:ext cx="1776779" cy="914400"/>
+              </a:xfrm>
+              <a:prstGeom prst="rect">
+                <a:avLst/>
+              </a:prstGeom>
+              <a:ln w="28575">
+                <a:solidFill>
+                  <a:schemeClr val="tx1"/>
+                </a:solidFill>
+              </a:ln>
+            </p:spPr>
+            <p:style>
+              <a:lnRef idx="2">
+                <a:schemeClr val="dk1"/>
+              </a:lnRef>
+              <a:fillRef idx="1">
+                <a:schemeClr val="lt1"/>
+              </a:fillRef>
+              <a:effectRef idx="0">
+                <a:schemeClr val="dk1"/>
+              </a:effectRef>
+              <a:fontRef idx="minor">
+                <a:schemeClr val="dk1"/>
+              </a:fontRef>
+            </p:style>
+            <p:txBody>
+              <a:bodyPr rtlCol="0" anchor="ctr"/>
+              <a:lstStyle/>
+              <a:p>
+                <a:pPr algn="ctr"/>
+                <a14:m>
+                  <m:oMathPara xmlns:m="http://schemas.openxmlformats.org/officeDocument/2006/math">
+                    <m:oMathParaPr>
+                      <m:jc m:val="centerGroup"/>
+                    </m:oMathParaPr>
+                    <m:oMath xmlns:m="http://schemas.openxmlformats.org/officeDocument/2006/math">
+                      <m:sSup>
+                        <m:sSupPr>
+                          <m:ctrlPr>
+                            <a:rPr lang="en-GB" i="1" dirty="0" smtClean="0">
+                              <a:latin typeface="Cambria Math" panose="02040503050406030204" pitchFamily="18" charset="0"/>
+                            </a:rPr>
+                          </m:ctrlPr>
+                        </m:sSupPr>
+                        <m:e>
+                          <m:r>
+                            <a:rPr lang="en-GB" i="1" dirty="0">
+                              <a:latin typeface="Cambria Math" panose="02040503050406030204" pitchFamily="18" charset="0"/>
+                            </a:rPr>
+                            <m:t>𝑚𝑠</m:t>
+                          </m:r>
+                        </m:e>
+                        <m:sup>
+                          <m:r>
+                            <a:rPr lang="en-GB" i="1" dirty="0">
+                              <a:latin typeface="Cambria Math" panose="02040503050406030204" pitchFamily="18" charset="0"/>
+                            </a:rPr>
+                            <m:t>2</m:t>
+                          </m:r>
+                        </m:sup>
+                      </m:sSup>
+                      <m:r>
+                        <a:rPr lang="en-GB" i="1" dirty="0">
+                          <a:latin typeface="Cambria Math" panose="02040503050406030204" pitchFamily="18" charset="0"/>
+                        </a:rPr>
+                        <m:t>+</m:t>
+                      </m:r>
+                      <m:r>
+                        <a:rPr lang="en-GB" i="1" dirty="0">
+                          <a:latin typeface="Cambria Math" panose="02040503050406030204" pitchFamily="18" charset="0"/>
+                        </a:rPr>
+                        <m:t>𝑐𝑠</m:t>
+                      </m:r>
+                      <m:r>
+                        <a:rPr lang="en-GB" i="1" dirty="0">
+                          <a:latin typeface="Cambria Math" panose="02040503050406030204" pitchFamily="18" charset="0"/>
+                        </a:rPr>
+                        <m:t>+</m:t>
+                      </m:r>
+                      <m:r>
+                        <m:rPr>
+                          <m:sty m:val="p"/>
+                        </m:rPr>
+                        <a:rPr lang="en-GB" b="0" i="0" dirty="0" smtClean="0">
+                          <a:latin typeface="Cambria Math" panose="02040503050406030204" pitchFamily="18" charset="0"/>
+                        </a:rPr>
+                        <m:t>k</m:t>
+                      </m:r>
+                    </m:oMath>
+                  </m:oMathPara>
+                </a14:m>
+                <a:endParaRPr lang="en-GB" dirty="0"/>
+              </a:p>
+            </p:txBody>
+          </p:sp>
+        </mc:Choice>
+        <mc:Fallback>
+          <p:sp>
+            <p:nvSpPr>
+              <p:cNvPr id="28" name="Rectangle 27">
+                <a:extLst>
+                  <a:ext uri="{FF2B5EF4-FFF2-40B4-BE49-F238E27FC236}">
+                    <a16:creationId xmlns:a16="http://schemas.microsoft.com/office/drawing/2014/main" id="{769F75B1-58AB-43B4-8C02-C96C12F4877E}"/>
+                  </a:ext>
+                </a:extLst>
+              </p:cNvPr>
+              <p:cNvSpPr>
+                <a:spLocks noRot="1" noChangeAspect="1" noMove="1" noResize="1" noEditPoints="1" noAdjustHandles="1" noChangeArrowheads="1" noChangeShapeType="1" noTextEdit="1"/>
+              </p:cNvSpPr>
+              <p:nvPr/>
+            </p:nvSpPr>
+            <p:spPr>
+              <a:xfrm>
+                <a:off x="5266257" y="1686652"/>
+                <a:ext cx="1776779" cy="914400"/>
+              </a:xfrm>
+              <a:prstGeom prst="rect">
+                <a:avLst/>
+              </a:prstGeom>
+              <a:blipFill>
+                <a:blip r:embed="rId2"/>
+                <a:stretch>
+                  <a:fillRect/>
+                </a:stretch>
+              </a:blipFill>
+              <a:ln w="28575">
+                <a:solidFill>
+                  <a:schemeClr val="tx1"/>
+                </a:solidFill>
+              </a:ln>
+            </p:spPr>
+            <p:txBody>
+              <a:bodyPr/>
+              <a:lstStyle/>
+              <a:p>
+                <a:r>
+                  <a:rPr lang="en-GB">
+                    <a:noFill/>
+                  </a:rPr>
+                  <a:t> </a:t>
+                </a:r>
+              </a:p>
+            </p:txBody>
+          </p:sp>
+        </mc:Fallback>
+      </mc:AlternateContent>
+      <p:cxnSp>
+        <p:nvCxnSpPr>
+          <p:cNvPr id="30" name="Straight Arrow Connector 29">
+            <a:extLst>
+              <a:ext uri="{FF2B5EF4-FFF2-40B4-BE49-F238E27FC236}">
+                <a16:creationId xmlns:a16="http://schemas.microsoft.com/office/drawing/2014/main" id="{7311DE7D-687D-481A-BDA5-5BF4E82D1A09}"/>
+              </a:ext>
+            </a:extLst>
+          </p:cNvPr>
+          <p:cNvCxnSpPr>
+            <a:cxnSpLocks/>
+            <a:endCxn id="28" idx="3"/>
+          </p:cNvCxnSpPr>
+          <p:nvPr/>
+        </p:nvCxnSpPr>
+        <p:spPr>
+          <a:xfrm flipH="1">
+            <a:off x="7043036" y="2143852"/>
+            <a:ext cx="2273244" cy="0"/>
+          </a:xfrm>
+          <a:prstGeom prst="straightConnector1">
+            <a:avLst/>
+          </a:prstGeom>
+          <a:ln>
+            <a:solidFill>
+              <a:schemeClr val="tx1"/>
+            </a:solidFill>
+            <a:tailEnd type="triangle"/>
+          </a:ln>
+        </p:spPr>
+        <p:style>
+          <a:lnRef idx="1">
+            <a:schemeClr val="accent1"/>
+          </a:lnRef>
+          <a:fillRef idx="0">
+            <a:schemeClr val="accent1"/>
+          </a:fillRef>
+          <a:effectRef idx="0">
+            <a:schemeClr val="accent1"/>
+          </a:effectRef>
+          <a:fontRef idx="minor">
+            <a:schemeClr val="tx1"/>
+          </a:fontRef>
+        </p:style>
+      </p:cxnSp>
+      <p:sp>
+        <p:nvSpPr>
+          <p:cNvPr id="32" name="TextBox 31">
+            <a:extLst>
+              <a:ext uri="{FF2B5EF4-FFF2-40B4-BE49-F238E27FC236}">
+                <a16:creationId xmlns:a16="http://schemas.microsoft.com/office/drawing/2014/main" id="{DDD782F4-8EBC-457E-8BC0-9721A1892FCF}"/>
+              </a:ext>
+            </a:extLst>
+          </p:cNvPr>
+          <p:cNvSpPr txBox="1"/>
+          <p:nvPr/>
+        </p:nvSpPr>
+        <p:spPr>
+          <a:xfrm>
+            <a:off x="7639496" y="1774520"/>
+            <a:ext cx="492379" cy="369332"/>
+          </a:xfrm>
+          <a:prstGeom prst="rect">
+            <a:avLst/>
+          </a:prstGeom>
+          <a:noFill/>
+          <a:ln>
+            <a:noFill/>
+          </a:ln>
+        </p:spPr>
+        <p:txBody>
+          <a:bodyPr wrap="none" rtlCol="0">
+            <a:spAutoFit/>
+          </a:bodyPr>
+          <a:lstStyle/>
+          <a:p>
+            <a:r>
+              <a:rPr lang="en-GB" dirty="0"/>
+              <a:t>P</a:t>
+            </a:r>
+            <a:r>
+              <a:rPr lang="en-GB" baseline="-25000" dirty="0"/>
+              <a:t>ext</a:t>
+            </a:r>
+          </a:p>
+        </p:txBody>
+      </p:sp>
+      <p:cxnSp>
+        <p:nvCxnSpPr>
+          <p:cNvPr id="34" name="Connector: Elbow 33">
+            <a:extLst>
+              <a:ext uri="{FF2B5EF4-FFF2-40B4-BE49-F238E27FC236}">
+                <a16:creationId xmlns:a16="http://schemas.microsoft.com/office/drawing/2014/main" id="{97B83089-38C8-4833-966B-A5A85E6F8FC4}"/>
+              </a:ext>
+            </a:extLst>
+          </p:cNvPr>
+          <p:cNvCxnSpPr/>
+          <p:nvPr/>
+        </p:nvCxnSpPr>
+        <p:spPr>
+          <a:xfrm rot="5400000" flipH="1" flipV="1">
+            <a:off x="8348110" y="2580400"/>
+            <a:ext cx="1404716" cy="531620"/>
+          </a:xfrm>
+          <a:prstGeom prst="bentConnector3">
+            <a:avLst>
+              <a:gd name="adj1" fmla="val 5660"/>
+            </a:avLst>
+          </a:prstGeom>
+          <a:ln>
+            <a:solidFill>
+              <a:schemeClr val="tx1"/>
+            </a:solidFill>
+          </a:ln>
+        </p:spPr>
+        <p:style>
+          <a:lnRef idx="1">
+            <a:schemeClr val="accent1"/>
+          </a:lnRef>
+          <a:fillRef idx="0">
+            <a:schemeClr val="accent1"/>
+          </a:fillRef>
+          <a:effectRef idx="0">
+            <a:schemeClr val="accent1"/>
+          </a:effectRef>
+          <a:fontRef idx="minor">
+            <a:schemeClr val="tx1"/>
+          </a:fontRef>
+        </p:style>
+      </p:cxnSp>
+      <p:cxnSp>
+        <p:nvCxnSpPr>
+          <p:cNvPr id="38" name="Straight Arrow Connector 37">
+            <a:extLst>
+              <a:ext uri="{FF2B5EF4-FFF2-40B4-BE49-F238E27FC236}">
+                <a16:creationId xmlns:a16="http://schemas.microsoft.com/office/drawing/2014/main" id="{42951A53-C17F-40A7-AEB2-E771101FBD44}"/>
+              </a:ext>
+            </a:extLst>
+          </p:cNvPr>
+          <p:cNvCxnSpPr>
+            <a:cxnSpLocks/>
+          </p:cNvCxnSpPr>
+          <p:nvPr/>
+        </p:nvCxnSpPr>
+        <p:spPr>
+          <a:xfrm>
+            <a:off x="4472941" y="2358887"/>
+            <a:ext cx="0" cy="1098778"/>
+          </a:xfrm>
+          <a:prstGeom prst="straightConnector1">
+            <a:avLst/>
+          </a:prstGeom>
+          <a:ln>
+            <a:solidFill>
+              <a:schemeClr val="tx1"/>
+            </a:solidFill>
+            <a:tailEnd type="triangle"/>
+          </a:ln>
+        </p:spPr>
+        <p:style>
+          <a:lnRef idx="1">
+            <a:schemeClr val="accent1"/>
+          </a:lnRef>
+          <a:fillRef idx="0">
+            <a:schemeClr val="accent1"/>
+          </a:fillRef>
+          <a:effectRef idx="0">
+            <a:schemeClr val="accent1"/>
+          </a:effectRef>
+          <a:fontRef idx="minor">
+            <a:schemeClr val="tx1"/>
+          </a:fontRef>
+        </p:style>
+      </p:cxnSp>
+      <p:cxnSp>
+        <p:nvCxnSpPr>
+          <p:cNvPr id="41" name="Connector: Elbow 40">
+            <a:extLst>
+              <a:ext uri="{FF2B5EF4-FFF2-40B4-BE49-F238E27FC236}">
+                <a16:creationId xmlns:a16="http://schemas.microsoft.com/office/drawing/2014/main" id="{03420312-5FC5-4732-94A0-013DB98448BE}"/>
+              </a:ext>
+            </a:extLst>
+          </p:cNvPr>
+          <p:cNvCxnSpPr>
+            <a:stCxn id="28" idx="1"/>
+          </p:cNvCxnSpPr>
+          <p:nvPr/>
+        </p:nvCxnSpPr>
+        <p:spPr>
+          <a:xfrm rot="10800000" flipV="1">
+            <a:off x="4472169" y="2143851"/>
+            <a:ext cx="794089" cy="215035"/>
+          </a:xfrm>
+          <a:prstGeom prst="bentConnector3">
+            <a:avLst>
+              <a:gd name="adj1" fmla="val 98397"/>
+            </a:avLst>
+          </a:prstGeom>
+          <a:ln>
+            <a:solidFill>
+              <a:schemeClr val="tx1"/>
+            </a:solidFill>
+          </a:ln>
+        </p:spPr>
+        <p:style>
+          <a:lnRef idx="1">
+            <a:schemeClr val="accent1"/>
+          </a:lnRef>
+          <a:fillRef idx="0">
+            <a:schemeClr val="accent1"/>
+          </a:fillRef>
+          <a:effectRef idx="0">
+            <a:schemeClr val="accent1"/>
+          </a:effectRef>
+          <a:fontRef idx="minor">
+            <a:schemeClr val="tx1"/>
+          </a:fontRef>
+        </p:style>
+      </p:cxnSp>
+      <p:sp>
+        <p:nvSpPr>
+          <p:cNvPr id="43" name="TextBox 42">
+            <a:extLst>
+              <a:ext uri="{FF2B5EF4-FFF2-40B4-BE49-F238E27FC236}">
+                <a16:creationId xmlns:a16="http://schemas.microsoft.com/office/drawing/2014/main" id="{28CA8CA2-462B-4B62-96C3-62B5F3B58994}"/>
+              </a:ext>
+            </a:extLst>
+          </p:cNvPr>
+          <p:cNvSpPr txBox="1"/>
+          <p:nvPr/>
+        </p:nvSpPr>
+        <p:spPr>
+          <a:xfrm>
+            <a:off x="5273577" y="1332424"/>
+            <a:ext cx="1730667" cy="369332"/>
+          </a:xfrm>
+          <a:prstGeom prst="rect">
+            <a:avLst/>
+          </a:prstGeom>
+          <a:noFill/>
+        </p:spPr>
+        <p:txBody>
+          <a:bodyPr wrap="none" rtlCol="0">
+            <a:spAutoFit/>
+          </a:bodyPr>
+          <a:lstStyle/>
+          <a:p>
+            <a:r>
+              <a:rPr lang="en-GB" dirty="0"/>
+              <a:t>Impedance filter</a:t>
+            </a:r>
+          </a:p>
+        </p:txBody>
+      </p:sp>
+      <p:cxnSp>
+        <p:nvCxnSpPr>
+          <p:cNvPr id="45" name="Straight Arrow Connector 44">
+            <a:extLst>
+              <a:ext uri="{FF2B5EF4-FFF2-40B4-BE49-F238E27FC236}">
+                <a16:creationId xmlns:a16="http://schemas.microsoft.com/office/drawing/2014/main" id="{B89021DF-5DAD-4B21-9E98-3288E0EFE358}"/>
+              </a:ext>
+            </a:extLst>
+          </p:cNvPr>
+          <p:cNvCxnSpPr>
+            <a:stCxn id="25" idx="3"/>
+          </p:cNvCxnSpPr>
+          <p:nvPr/>
+        </p:nvCxnSpPr>
+        <p:spPr>
+          <a:xfrm>
+            <a:off x="8784658" y="3734664"/>
+            <a:ext cx="1247238" cy="0"/>
+          </a:xfrm>
+          <a:prstGeom prst="straightConnector1">
+            <a:avLst/>
+          </a:prstGeom>
+          <a:ln>
+            <a:solidFill>
+              <a:schemeClr val="tx1"/>
+            </a:solidFill>
+            <a:tailEnd type="triangle"/>
+          </a:ln>
+        </p:spPr>
+        <p:style>
+          <a:lnRef idx="1">
+            <a:schemeClr val="accent1"/>
+          </a:lnRef>
+          <a:fillRef idx="0">
+            <a:schemeClr val="accent1"/>
+          </a:fillRef>
+          <a:effectRef idx="0">
+            <a:schemeClr val="accent1"/>
+          </a:effectRef>
+          <a:fontRef idx="minor">
+            <a:schemeClr val="tx1"/>
+          </a:fontRef>
+        </p:style>
+      </p:cxnSp>
+      <p:sp>
+        <p:nvSpPr>
+          <p:cNvPr id="46" name="TextBox 45">
+            <a:extLst>
+              <a:ext uri="{FF2B5EF4-FFF2-40B4-BE49-F238E27FC236}">
+                <a16:creationId xmlns:a16="http://schemas.microsoft.com/office/drawing/2014/main" id="{C1077C81-17EC-471D-8EE6-004678B2073D}"/>
+              </a:ext>
+            </a:extLst>
+          </p:cNvPr>
+          <p:cNvSpPr txBox="1"/>
+          <p:nvPr/>
+        </p:nvSpPr>
+        <p:spPr>
+          <a:xfrm>
+            <a:off x="6171671" y="4599107"/>
+            <a:ext cx="1345112" cy="369332"/>
+          </a:xfrm>
+          <a:prstGeom prst="rect">
+            <a:avLst/>
+          </a:prstGeom>
+          <a:noFill/>
+        </p:spPr>
+        <p:txBody>
+          <a:bodyPr wrap="none" rtlCol="0">
+            <a:spAutoFit/>
+          </a:bodyPr>
+          <a:lstStyle/>
+          <a:p>
+            <a:r>
+              <a:rPr lang="en-GB" dirty="0"/>
+              <a:t>Actual Force</a:t>
+            </a:r>
+          </a:p>
+        </p:txBody>
+      </p:sp>
+      <p:cxnSp>
+        <p:nvCxnSpPr>
+          <p:cNvPr id="48" name="Connector: Elbow 47">
+            <a:extLst>
+              <a:ext uri="{FF2B5EF4-FFF2-40B4-BE49-F238E27FC236}">
+                <a16:creationId xmlns:a16="http://schemas.microsoft.com/office/drawing/2014/main" id="{39DD791D-D3ED-4A09-860C-8FFA88C33337}"/>
+              </a:ext>
+            </a:extLst>
+          </p:cNvPr>
+          <p:cNvCxnSpPr>
+            <a:cxnSpLocks/>
+          </p:cNvCxnSpPr>
+          <p:nvPr/>
+        </p:nvCxnSpPr>
+        <p:spPr>
+          <a:xfrm rot="10800000" flipV="1">
+            <a:off x="4472168" y="3734661"/>
+            <a:ext cx="4844114" cy="1165045"/>
+          </a:xfrm>
+          <a:prstGeom prst="bentConnector3">
+            <a:avLst>
+              <a:gd name="adj1" fmla="val 210"/>
+            </a:avLst>
+          </a:prstGeom>
+          <a:ln>
+            <a:solidFill>
+              <a:schemeClr val="tx1"/>
+            </a:solidFill>
+          </a:ln>
+        </p:spPr>
+        <p:style>
+          <a:lnRef idx="1">
+            <a:schemeClr val="accent1"/>
+          </a:lnRef>
+          <a:fillRef idx="0">
+            <a:schemeClr val="accent1"/>
+          </a:fillRef>
+          <a:effectRef idx="0">
+            <a:schemeClr val="accent1"/>
+          </a:effectRef>
+          <a:fontRef idx="minor">
+            <a:schemeClr val="tx1"/>
+          </a:fontRef>
+        </p:style>
+      </p:cxnSp>
+      <p:cxnSp>
+        <p:nvCxnSpPr>
+          <p:cNvPr id="52" name="Straight Arrow Connector 51">
+            <a:extLst>
+              <a:ext uri="{FF2B5EF4-FFF2-40B4-BE49-F238E27FC236}">
+                <a16:creationId xmlns:a16="http://schemas.microsoft.com/office/drawing/2014/main" id="{429D0E40-6DE7-4726-A352-102088660B06}"/>
+              </a:ext>
+            </a:extLst>
+          </p:cNvPr>
+          <p:cNvCxnSpPr>
+            <a:cxnSpLocks/>
+            <a:endCxn id="6" idx="4"/>
+          </p:cNvCxnSpPr>
+          <p:nvPr/>
+        </p:nvCxnSpPr>
+        <p:spPr>
+          <a:xfrm flipV="1">
+            <a:off x="4472169" y="4057582"/>
+            <a:ext cx="0" cy="842125"/>
+          </a:xfrm>
+          <a:prstGeom prst="straightConnector1">
+            <a:avLst/>
+          </a:prstGeom>
+          <a:ln>
+            <a:solidFill>
+              <a:schemeClr val="tx1"/>
+            </a:solidFill>
+            <a:tailEnd type="triangle"/>
+          </a:ln>
+        </p:spPr>
+        <p:style>
+          <a:lnRef idx="1">
+            <a:schemeClr val="accent1"/>
+          </a:lnRef>
+          <a:fillRef idx="0">
+            <a:schemeClr val="accent1"/>
+          </a:fillRef>
+          <a:effectRef idx="0">
+            <a:schemeClr val="accent1"/>
+          </a:effectRef>
+          <a:fontRef idx="minor">
+            <a:schemeClr val="tx1"/>
+          </a:fontRef>
+        </p:style>
+      </p:cxnSp>
+      <p:sp>
+        <p:nvSpPr>
+          <p:cNvPr id="57" name="TextBox 56">
+            <a:extLst>
+              <a:ext uri="{FF2B5EF4-FFF2-40B4-BE49-F238E27FC236}">
+                <a16:creationId xmlns:a16="http://schemas.microsoft.com/office/drawing/2014/main" id="{9971061F-C17A-422C-A3DF-95B4AD6286BB}"/>
+              </a:ext>
+            </a:extLst>
+          </p:cNvPr>
+          <p:cNvSpPr txBox="1"/>
+          <p:nvPr/>
+        </p:nvSpPr>
+        <p:spPr>
+          <a:xfrm>
+            <a:off x="3579566" y="2123447"/>
+            <a:ext cx="981359" cy="646331"/>
+          </a:xfrm>
+          <a:prstGeom prst="rect">
+            <a:avLst/>
+          </a:prstGeom>
+          <a:noFill/>
+        </p:spPr>
+        <p:txBody>
+          <a:bodyPr wrap="none" rtlCol="0">
+            <a:spAutoFit/>
+          </a:bodyPr>
+          <a:lstStyle/>
+          <a:p>
+            <a:r>
+              <a:rPr lang="en-GB" dirty="0"/>
+              <a:t>Force</a:t>
+            </a:r>
+          </a:p>
+          <a:p>
+            <a:r>
+              <a:rPr lang="en-GB" dirty="0"/>
+              <a:t>Demand</a:t>
+            </a:r>
+          </a:p>
+        </p:txBody>
+      </p:sp>
+    </p:spTree>
+    <p:extLst>
+      <p:ext uri="{BB962C8B-B14F-4D97-AF65-F5344CB8AC3E}">
+        <p14:creationId xmlns:p14="http://schemas.microsoft.com/office/powerpoint/2010/main" val="3376178807"/>
       </p:ext>
     </p:extLst>
   </p:cSld>
@@ -14937,12 +18867,47 @@
           </p:txBody>
         </p:sp>
       </p:grpSp>
+      <p:sp>
+        <p:nvSpPr>
+          <p:cNvPr id="70" name="TextBox 69">
+            <a:extLst>
+              <a:ext uri="{FF2B5EF4-FFF2-40B4-BE49-F238E27FC236}">
+                <a16:creationId xmlns:a16="http://schemas.microsoft.com/office/drawing/2014/main" id="{23DF510A-08FB-4301-B76E-F82BE50217DB}"/>
+              </a:ext>
+            </a:extLst>
+          </p:cNvPr>
+          <p:cNvSpPr txBox="1"/>
+          <p:nvPr/>
+        </p:nvSpPr>
+        <p:spPr>
+          <a:xfrm>
+            <a:off x="5858713" y="1896541"/>
+            <a:ext cx="465192" cy="769441"/>
+          </a:xfrm>
+          <a:prstGeom prst="rect">
+            <a:avLst/>
+          </a:prstGeom>
+          <a:noFill/>
+        </p:spPr>
+        <p:txBody>
+          <a:bodyPr wrap="none" rtlCol="0">
+            <a:spAutoFit/>
+          </a:bodyPr>
+          <a:lstStyle/>
+          <a:p>
+            <a:r>
+              <a:rPr lang="en-GB" sz="4400" dirty="0"/>
+              <a:t>=</a:t>
+            </a:r>
+          </a:p>
+        </p:txBody>
+      </p:sp>
       <p:grpSp>
         <p:nvGrpSpPr>
-          <p:cNvPr id="66" name="Group 65">
-            <a:extLst>
-              <a:ext uri="{FF2B5EF4-FFF2-40B4-BE49-F238E27FC236}">
-                <a16:creationId xmlns:a16="http://schemas.microsoft.com/office/drawing/2014/main" id="{1ED9BDB9-453A-4998-88F8-9748B4DCB113}"/>
+          <p:cNvPr id="3" name="Group 2">
+            <a:extLst>
+              <a:ext uri="{FF2B5EF4-FFF2-40B4-BE49-F238E27FC236}">
+                <a16:creationId xmlns:a16="http://schemas.microsoft.com/office/drawing/2014/main" id="{C2F6688C-021F-4834-A894-BE9098595E14}"/>
               </a:ext>
             </a:extLst>
           </p:cNvPr>
@@ -14951,10 +18916,10 @@
         </p:nvGrpSpPr>
         <p:grpSpPr>
           <a:xfrm>
-            <a:off x="3079391" y="2825411"/>
-            <a:ext cx="6023835" cy="2753708"/>
-            <a:chOff x="1666985" y="2729949"/>
-            <a:chExt cx="6023835" cy="2753708"/>
+            <a:off x="3079391" y="2708094"/>
+            <a:ext cx="6023835" cy="2871025"/>
+            <a:chOff x="3079391" y="2708094"/>
+            <a:chExt cx="6023835" cy="2871025"/>
           </a:xfrm>
         </p:grpSpPr>
         <p:cxnSp>
@@ -14974,7 +18939,7 @@
           </p:nvCxnSpPr>
           <p:spPr>
             <a:xfrm>
-              <a:off x="1669774" y="4054025"/>
+              <a:off x="3082180" y="4149487"/>
               <a:ext cx="2102541" cy="0"/>
             </a:xfrm>
             <a:prstGeom prst="straightConnector1">
@@ -15013,7 +18978,7 @@
           </p:nvSpPr>
           <p:spPr>
             <a:xfrm>
-              <a:off x="1666985" y="3695139"/>
+              <a:off x="3079391" y="3790601"/>
               <a:ext cx="827021" cy="369332"/>
             </a:xfrm>
             <a:prstGeom prst="rect">
@@ -15066,7 +19031,7 @@
           </p:nvCxnSpPr>
           <p:spPr>
             <a:xfrm>
-              <a:off x="6908941" y="4052951"/>
+              <a:off x="8321347" y="4148413"/>
               <a:ext cx="781879" cy="0"/>
             </a:xfrm>
             <a:prstGeom prst="straightConnector1">
@@ -15105,7 +19070,7 @@
           </p:nvSpPr>
           <p:spPr>
             <a:xfrm>
-              <a:off x="6985855" y="3705585"/>
+              <a:off x="8398261" y="3801047"/>
               <a:ext cx="643125" cy="369332"/>
             </a:xfrm>
             <a:prstGeom prst="rect">
@@ -15152,7 +19117,7 @@
           </p:nvSpPr>
           <p:spPr>
             <a:xfrm>
-              <a:off x="4785625" y="2729949"/>
+              <a:off x="6198031" y="2825411"/>
               <a:ext cx="619675" cy="490329"/>
             </a:xfrm>
             <a:prstGeom prst="rect">
@@ -15199,7 +19164,7 @@
           </p:nvSpPr>
           <p:spPr>
             <a:xfrm>
-              <a:off x="4785624" y="3810001"/>
+              <a:off x="6198030" y="3905463"/>
               <a:ext cx="619675" cy="490329"/>
             </a:xfrm>
             <a:prstGeom prst="rect">
@@ -15246,7 +19211,7 @@
           </p:nvSpPr>
           <p:spPr>
             <a:xfrm>
-              <a:off x="4785624" y="4890054"/>
+              <a:off x="6198030" y="4985516"/>
               <a:ext cx="619675" cy="490329"/>
             </a:xfrm>
             <a:prstGeom prst="rect">
@@ -15279,8 +19244,8 @@
             </a:p>
           </p:txBody>
         </p:sp>
-        <mc:AlternateContent xmlns:mc="http://schemas.openxmlformats.org/markup-compatibility/2006" xmlns:a14="http://schemas.microsoft.com/office/drawing/2010/main">
-          <mc:Choice Requires="a14">
+        <mc:AlternateContent xmlns:mc="http://schemas.openxmlformats.org/markup-compatibility/2006">
+          <mc:Choice xmlns:a14="http://schemas.microsoft.com/office/drawing/2010/main" Requires="a14">
             <p:sp>
               <p:nvSpPr>
                 <p:cNvPr id="44" name="Rectangle 43">
@@ -15295,7 +19260,7 @@
               </p:nvSpPr>
               <p:spPr>
                 <a:xfrm>
-                  <a:off x="3772315" y="3705585"/>
+                  <a:off x="5184721" y="3801047"/>
                   <a:ext cx="619675" cy="696879"/>
                 </a:xfrm>
                 <a:prstGeom prst="rect">
@@ -15360,7 +19325,7 @@
               </p:txBody>
             </p:sp>
           </mc:Choice>
-          <mc:Fallback xmlns="">
+          <mc:Fallback>
             <p:sp>
               <p:nvSpPr>
                 <p:cNvPr id="44" name="Rectangle 43">
@@ -15377,7 +19342,7 @@
               </p:nvSpPr>
               <p:spPr>
                 <a:xfrm>
-                  <a:off x="3772315" y="3705585"/>
+                  <a:off x="5184721" y="3801047"/>
                   <a:ext cx="619675" cy="696879"/>
                 </a:xfrm>
                 <a:prstGeom prst="rect">
@@ -15405,8 +19370,8 @@
             </p:sp>
           </mc:Fallback>
         </mc:AlternateContent>
-        <mc:AlternateContent xmlns:mc="http://schemas.openxmlformats.org/markup-compatibility/2006" xmlns:a14="http://schemas.microsoft.com/office/drawing/2010/main">
-          <mc:Choice Requires="a14">
+        <mc:AlternateContent xmlns:mc="http://schemas.openxmlformats.org/markup-compatibility/2006">
+          <mc:Choice xmlns:a14="http://schemas.microsoft.com/office/drawing/2010/main" Requires="a14">
             <p:sp>
               <p:nvSpPr>
                 <p:cNvPr id="46" name="Rectangle 45">
@@ -15421,7 +19386,7 @@
               </p:nvSpPr>
               <p:spPr>
                 <a:xfrm>
-                  <a:off x="3772315" y="4786778"/>
+                  <a:off x="5184721" y="4882240"/>
                   <a:ext cx="619675" cy="696879"/>
                 </a:xfrm>
                 <a:prstGeom prst="rect">
@@ -15467,7 +19432,7 @@
               </p:txBody>
             </p:sp>
           </mc:Choice>
-          <mc:Fallback xmlns="">
+          <mc:Fallback>
             <p:sp>
               <p:nvSpPr>
                 <p:cNvPr id="46" name="Rectangle 45">
@@ -15484,7 +19449,7 @@
               </p:nvSpPr>
               <p:spPr>
                 <a:xfrm>
-                  <a:off x="3772315" y="4786778"/>
+                  <a:off x="5184721" y="4882240"/>
                   <a:ext cx="619675" cy="696879"/>
                 </a:xfrm>
                 <a:prstGeom prst="rect">
@@ -15529,7 +19494,7 @@
           </p:nvCxnSpPr>
           <p:spPr>
             <a:xfrm>
-              <a:off x="4391990" y="4054025"/>
+              <a:off x="5804396" y="4149487"/>
               <a:ext cx="393634" cy="1141"/>
             </a:xfrm>
             <a:prstGeom prst="straightConnector1">
@@ -15570,7 +19535,7 @@
           </p:nvCxnSpPr>
           <p:spPr>
             <a:xfrm>
-              <a:off x="3061252" y="5135217"/>
+              <a:off x="4473658" y="5230679"/>
               <a:ext cx="711063" cy="1"/>
             </a:xfrm>
             <a:prstGeom prst="straightConnector1">
@@ -15612,7 +19577,7 @@
           </p:nvCxnSpPr>
           <p:spPr>
             <a:xfrm>
-              <a:off x="3061252" y="2972833"/>
+              <a:off x="4473658" y="3068295"/>
               <a:ext cx="1724373" cy="2281"/>
             </a:xfrm>
             <a:prstGeom prst="straightConnector1">
@@ -15653,7 +19618,7 @@
           </p:nvCxnSpPr>
           <p:spPr>
             <a:xfrm flipV="1">
-              <a:off x="3061252" y="2975113"/>
+              <a:off x="4473658" y="3070575"/>
               <a:ext cx="0" cy="2149660"/>
             </a:xfrm>
             <a:prstGeom prst="line">
@@ -15692,7 +19657,7 @@
           </p:nvCxnSpPr>
           <p:spPr>
             <a:xfrm>
-              <a:off x="4391990" y="5135218"/>
+              <a:off x="5804396" y="5230680"/>
               <a:ext cx="393634" cy="1"/>
             </a:xfrm>
             <a:prstGeom prst="straightConnector1">
@@ -15731,7 +19696,7 @@
           </p:nvSpPr>
           <p:spPr>
             <a:xfrm>
-              <a:off x="6366180" y="3751769"/>
+              <a:off x="7778586" y="3847231"/>
               <a:ext cx="569843" cy="596347"/>
             </a:xfrm>
             <a:prstGeom prst="ellipse">
@@ -15778,7 +19743,7 @@
           </p:nvCxnSpPr>
           <p:spPr>
             <a:xfrm>
-              <a:off x="6449632" y="3839102"/>
+              <a:off x="7862038" y="3934564"/>
               <a:ext cx="402939" cy="421681"/>
             </a:xfrm>
             <a:prstGeom prst="line">
@@ -15817,7 +19782,7 @@
           </p:nvCxnSpPr>
           <p:spPr>
             <a:xfrm flipV="1">
-              <a:off x="6449632" y="3839102"/>
+              <a:off x="7862038" y="3934564"/>
               <a:ext cx="402939" cy="421681"/>
             </a:xfrm>
             <a:prstGeom prst="line">
@@ -15856,7 +19821,7 @@
           </p:nvCxnSpPr>
           <p:spPr>
             <a:xfrm flipV="1">
-              <a:off x="5405299" y="4049943"/>
+              <a:off x="6817705" y="4145405"/>
               <a:ext cx="960881" cy="5223"/>
             </a:xfrm>
             <a:prstGeom prst="straightConnector1">
@@ -15897,7 +19862,7 @@
           </p:nvCxnSpPr>
           <p:spPr>
             <a:xfrm>
-              <a:off x="5405299" y="2972833"/>
+              <a:off x="6817705" y="3068295"/>
               <a:ext cx="1245803" cy="778936"/>
             </a:xfrm>
             <a:prstGeom prst="bentConnector2">
@@ -15938,7 +19903,7 @@
           </p:nvCxnSpPr>
           <p:spPr>
             <a:xfrm flipV="1">
-              <a:off x="6651101" y="4348116"/>
+              <a:off x="8063507" y="4443578"/>
               <a:ext cx="1" cy="776657"/>
             </a:xfrm>
             <a:prstGeom prst="straightConnector1">
@@ -15979,7 +19944,7 @@
           </p:nvCxnSpPr>
           <p:spPr>
             <a:xfrm flipV="1">
-              <a:off x="5405299" y="5135217"/>
+              <a:off x="6817705" y="5230679"/>
               <a:ext cx="1245802" cy="2"/>
             </a:xfrm>
             <a:prstGeom prst="line">
@@ -16015,7 +19980,7 @@
           </p:nvSpPr>
           <p:spPr>
             <a:xfrm>
-              <a:off x="6510816" y="3705355"/>
+              <a:off x="7923222" y="3800817"/>
               <a:ext cx="300082" cy="369332"/>
             </a:xfrm>
             <a:prstGeom prst="rect">
@@ -16050,7 +20015,7 @@
           </p:nvSpPr>
           <p:spPr>
             <a:xfrm>
-              <a:off x="6322124" y="3865276"/>
+              <a:off x="7734530" y="3960738"/>
               <a:ext cx="300082" cy="369332"/>
             </a:xfrm>
             <a:prstGeom prst="rect">
@@ -16085,7 +20050,7 @@
           </p:nvSpPr>
           <p:spPr>
             <a:xfrm>
-              <a:off x="6506737" y="4025198"/>
+              <a:off x="7919143" y="4120660"/>
               <a:ext cx="300082" cy="369332"/>
             </a:xfrm>
             <a:prstGeom prst="rect">
@@ -16106,165 +20071,130 @@
             </a:p>
           </p:txBody>
         </p:sp>
+        <p:sp>
+          <p:nvSpPr>
+            <p:cNvPr id="2" name="TextBox 1">
+              <a:extLst>
+                <a:ext uri="{FF2B5EF4-FFF2-40B4-BE49-F238E27FC236}">
+                  <a16:creationId xmlns:a16="http://schemas.microsoft.com/office/drawing/2014/main" id="{A1727C0E-CFF5-4F88-9009-7C392E5B6E9F}"/>
+                </a:ext>
+              </a:extLst>
+            </p:cNvPr>
+            <p:cNvSpPr txBox="1"/>
+            <p:nvPr/>
+          </p:nvSpPr>
+          <p:spPr>
+            <a:xfrm>
+              <a:off x="6832096" y="2708094"/>
+              <a:ext cx="1362361" cy="369332"/>
+            </a:xfrm>
+            <a:prstGeom prst="rect">
+              <a:avLst/>
+            </a:prstGeom>
+            <a:noFill/>
+          </p:spPr>
+          <p:txBody>
+            <a:bodyPr wrap="none" rtlCol="0">
+              <a:spAutoFit/>
+            </a:bodyPr>
+            <a:lstStyle/>
+            <a:p>
+              <a:r>
+                <a:rPr lang="en-GB" i="1" dirty="0">
+                  <a:solidFill>
+                    <a:schemeClr val="accent6">
+                      <a:lumMod val="75000"/>
+                    </a:schemeClr>
+                  </a:solidFill>
+                </a:rPr>
+                <a:t>Proportional</a:t>
+              </a:r>
+            </a:p>
+          </p:txBody>
+        </p:sp>
+        <p:sp>
+          <p:nvSpPr>
+            <p:cNvPr id="35" name="TextBox 34">
+              <a:extLst>
+                <a:ext uri="{FF2B5EF4-FFF2-40B4-BE49-F238E27FC236}">
+                  <a16:creationId xmlns:a16="http://schemas.microsoft.com/office/drawing/2014/main" id="{728D9B4C-4A26-479D-A49D-F10B1B94089E}"/>
+                </a:ext>
+              </a:extLst>
+            </p:cNvPr>
+            <p:cNvSpPr txBox="1"/>
+            <p:nvPr/>
+          </p:nvSpPr>
+          <p:spPr>
+            <a:xfrm>
+              <a:off x="6815804" y="3811265"/>
+              <a:ext cx="912494" cy="369332"/>
+            </a:xfrm>
+            <a:prstGeom prst="rect">
+              <a:avLst/>
+            </a:prstGeom>
+            <a:noFill/>
+          </p:spPr>
+          <p:txBody>
+            <a:bodyPr wrap="none" rtlCol="0">
+              <a:spAutoFit/>
+            </a:bodyPr>
+            <a:lstStyle/>
+            <a:p>
+              <a:r>
+                <a:rPr lang="en-GB" i="1" dirty="0">
+                  <a:solidFill>
+                    <a:schemeClr val="accent6">
+                      <a:lumMod val="75000"/>
+                    </a:schemeClr>
+                  </a:solidFill>
+                </a:rPr>
+                <a:t>Integral</a:t>
+              </a:r>
+            </a:p>
+          </p:txBody>
+        </p:sp>
+        <p:sp>
+          <p:nvSpPr>
+            <p:cNvPr id="42" name="TextBox 41">
+              <a:extLst>
+                <a:ext uri="{FF2B5EF4-FFF2-40B4-BE49-F238E27FC236}">
+                  <a16:creationId xmlns:a16="http://schemas.microsoft.com/office/drawing/2014/main" id="{3876CBE0-5805-40AA-ADCC-62A24404F2ED}"/>
+                </a:ext>
+              </a:extLst>
+            </p:cNvPr>
+            <p:cNvSpPr txBox="1"/>
+            <p:nvPr/>
+          </p:nvSpPr>
+          <p:spPr>
+            <a:xfrm>
+              <a:off x="6857681" y="4913119"/>
+              <a:ext cx="1133644" cy="369332"/>
+            </a:xfrm>
+            <a:prstGeom prst="rect">
+              <a:avLst/>
+            </a:prstGeom>
+            <a:noFill/>
+          </p:spPr>
+          <p:txBody>
+            <a:bodyPr wrap="none" rtlCol="0">
+              <a:spAutoFit/>
+            </a:bodyPr>
+            <a:lstStyle/>
+            <a:p>
+              <a:r>
+                <a:rPr lang="en-GB" i="1" dirty="0">
+                  <a:solidFill>
+                    <a:schemeClr val="accent6">
+                      <a:lumMod val="75000"/>
+                    </a:schemeClr>
+                  </a:solidFill>
+                </a:rPr>
+                <a:t>Derivative</a:t>
+              </a:r>
+            </a:p>
+          </p:txBody>
+        </p:sp>
       </p:grpSp>
-      <p:sp>
-        <p:nvSpPr>
-          <p:cNvPr id="70" name="TextBox 69">
-            <a:extLst>
-              <a:ext uri="{FF2B5EF4-FFF2-40B4-BE49-F238E27FC236}">
-                <a16:creationId xmlns:a16="http://schemas.microsoft.com/office/drawing/2014/main" id="{23DF510A-08FB-4301-B76E-F82BE50217DB}"/>
-              </a:ext>
-            </a:extLst>
-          </p:cNvPr>
-          <p:cNvSpPr txBox="1"/>
-          <p:nvPr/>
-        </p:nvSpPr>
-        <p:spPr>
-          <a:xfrm>
-            <a:off x="5858713" y="1896541"/>
-            <a:ext cx="465192" cy="769441"/>
-          </a:xfrm>
-          <a:prstGeom prst="rect">
-            <a:avLst/>
-          </a:prstGeom>
-          <a:noFill/>
-        </p:spPr>
-        <p:txBody>
-          <a:bodyPr wrap="none" rtlCol="0">
-            <a:spAutoFit/>
-          </a:bodyPr>
-          <a:lstStyle/>
-          <a:p>
-            <a:r>
-              <a:rPr lang="en-GB" sz="4400" dirty="0"/>
-              <a:t>=</a:t>
-            </a:r>
-          </a:p>
-        </p:txBody>
-      </p:sp>
-      <p:sp>
-        <p:nvSpPr>
-          <p:cNvPr id="2" name="TextBox 1">
-            <a:extLst>
-              <a:ext uri="{FF2B5EF4-FFF2-40B4-BE49-F238E27FC236}">
-                <a16:creationId xmlns:a16="http://schemas.microsoft.com/office/drawing/2014/main" id="{A1727C0E-CFF5-4F88-9009-7C392E5B6E9F}"/>
-              </a:ext>
-            </a:extLst>
-          </p:cNvPr>
-          <p:cNvSpPr txBox="1"/>
-          <p:nvPr/>
-        </p:nvSpPr>
-        <p:spPr>
-          <a:xfrm>
-            <a:off x="6832096" y="2708094"/>
-            <a:ext cx="1362361" cy="369332"/>
-          </a:xfrm>
-          <a:prstGeom prst="rect">
-            <a:avLst/>
-          </a:prstGeom>
-          <a:noFill/>
-        </p:spPr>
-        <p:txBody>
-          <a:bodyPr wrap="none" rtlCol="0">
-            <a:spAutoFit/>
-          </a:bodyPr>
-          <a:lstStyle/>
-          <a:p>
-            <a:r>
-              <a:rPr lang="en-GB" i="1" dirty="0">
-                <a:solidFill>
-                  <a:schemeClr val="accent6">
-                    <a:lumMod val="75000"/>
-                  </a:schemeClr>
-                </a:solidFill>
-              </a:rPr>
-              <a:t>Proportional</a:t>
-            </a:r>
-          </a:p>
-        </p:txBody>
-      </p:sp>
-      <p:sp>
-        <p:nvSpPr>
-          <p:cNvPr id="35" name="TextBox 34">
-            <a:extLst>
-              <a:ext uri="{FF2B5EF4-FFF2-40B4-BE49-F238E27FC236}">
-                <a16:creationId xmlns:a16="http://schemas.microsoft.com/office/drawing/2014/main" id="{728D9B4C-4A26-479D-A49D-F10B1B94089E}"/>
-              </a:ext>
-            </a:extLst>
-          </p:cNvPr>
-          <p:cNvSpPr txBox="1"/>
-          <p:nvPr/>
-        </p:nvSpPr>
-        <p:spPr>
-          <a:xfrm>
-            <a:off x="6815804" y="3811265"/>
-            <a:ext cx="912494" cy="369332"/>
-          </a:xfrm>
-          <a:prstGeom prst="rect">
-            <a:avLst/>
-          </a:prstGeom>
-          <a:noFill/>
-        </p:spPr>
-        <p:txBody>
-          <a:bodyPr wrap="none" rtlCol="0">
-            <a:spAutoFit/>
-          </a:bodyPr>
-          <a:lstStyle/>
-          <a:p>
-            <a:r>
-              <a:rPr lang="en-GB" i="1" dirty="0">
-                <a:solidFill>
-                  <a:schemeClr val="accent6">
-                    <a:lumMod val="75000"/>
-                  </a:schemeClr>
-                </a:solidFill>
-              </a:rPr>
-              <a:t>Integral</a:t>
-            </a:r>
-          </a:p>
-        </p:txBody>
-      </p:sp>
-      <p:sp>
-        <p:nvSpPr>
-          <p:cNvPr id="42" name="TextBox 41">
-            <a:extLst>
-              <a:ext uri="{FF2B5EF4-FFF2-40B4-BE49-F238E27FC236}">
-                <a16:creationId xmlns:a16="http://schemas.microsoft.com/office/drawing/2014/main" id="{3876CBE0-5805-40AA-ADCC-62A24404F2ED}"/>
-              </a:ext>
-            </a:extLst>
-          </p:cNvPr>
-          <p:cNvSpPr txBox="1"/>
-          <p:nvPr/>
-        </p:nvSpPr>
-        <p:spPr>
-          <a:xfrm>
-            <a:off x="6857681" y="4913119"/>
-            <a:ext cx="1133644" cy="369332"/>
-          </a:xfrm>
-          <a:prstGeom prst="rect">
-            <a:avLst/>
-          </a:prstGeom>
-          <a:noFill/>
-        </p:spPr>
-        <p:txBody>
-          <a:bodyPr wrap="none" rtlCol="0">
-            <a:spAutoFit/>
-          </a:bodyPr>
-          <a:lstStyle/>
-          <a:p>
-            <a:r>
-              <a:rPr lang="en-GB" i="1" dirty="0">
-                <a:solidFill>
-                  <a:schemeClr val="accent6">
-                    <a:lumMod val="75000"/>
-                  </a:schemeClr>
-                </a:solidFill>
-              </a:rPr>
-              <a:t>Derivative</a:t>
-            </a:r>
-          </a:p>
-        </p:txBody>
-      </p:sp>
     </p:spTree>
     <p:extLst>
       <p:ext uri="{BB962C8B-B14F-4D97-AF65-F5344CB8AC3E}">

</xml_diff>

<commit_message>
lots more work done
</commit_message>
<xml_diff>
--- a/Modelling/MyPAM Modelling.pptx
+++ b/Modelling/MyPAM Modelling.pptx
@@ -17,6 +17,8 @@
     <p:sldId id="265" r:id="rId11"/>
     <p:sldId id="266" r:id="rId12"/>
     <p:sldId id="267" r:id="rId13"/>
+    <p:sldId id="268" r:id="rId14"/>
+    <p:sldId id="269" r:id="rId15"/>
   </p:sldIdLst>
   <p:sldSz cx="12192000" cy="6858000"/>
   <p:notesSz cx="6858000" cy="9144000"/>
@@ -272,7 +274,7 @@
           <a:p>
             <a:fld id="{4DCC3765-A771-4BBA-8135-6F2E689117A7}" type="datetimeFigureOut">
               <a:rPr lang="en-GB" smtClean="0"/>
-              <a:t>29/11/2018</a:t>
+              <a:t>04/12/2018</a:t>
             </a:fld>
             <a:endParaRPr lang="en-GB"/>
           </a:p>
@@ -472,7 +474,7 @@
           <a:p>
             <a:fld id="{4DCC3765-A771-4BBA-8135-6F2E689117A7}" type="datetimeFigureOut">
               <a:rPr lang="en-GB" smtClean="0"/>
-              <a:t>29/11/2018</a:t>
+              <a:t>04/12/2018</a:t>
             </a:fld>
             <a:endParaRPr lang="en-GB"/>
           </a:p>
@@ -682,7 +684,7 @@
           <a:p>
             <a:fld id="{4DCC3765-A771-4BBA-8135-6F2E689117A7}" type="datetimeFigureOut">
               <a:rPr lang="en-GB" smtClean="0"/>
-              <a:t>29/11/2018</a:t>
+              <a:t>04/12/2018</a:t>
             </a:fld>
             <a:endParaRPr lang="en-GB"/>
           </a:p>
@@ -882,7 +884,7 @@
           <a:p>
             <a:fld id="{4DCC3765-A771-4BBA-8135-6F2E689117A7}" type="datetimeFigureOut">
               <a:rPr lang="en-GB" smtClean="0"/>
-              <a:t>29/11/2018</a:t>
+              <a:t>04/12/2018</a:t>
             </a:fld>
             <a:endParaRPr lang="en-GB"/>
           </a:p>
@@ -1158,7 +1160,7 @@
           <a:p>
             <a:fld id="{4DCC3765-A771-4BBA-8135-6F2E689117A7}" type="datetimeFigureOut">
               <a:rPr lang="en-GB" smtClean="0"/>
-              <a:t>29/11/2018</a:t>
+              <a:t>04/12/2018</a:t>
             </a:fld>
             <a:endParaRPr lang="en-GB"/>
           </a:p>
@@ -1426,7 +1428,7 @@
           <a:p>
             <a:fld id="{4DCC3765-A771-4BBA-8135-6F2E689117A7}" type="datetimeFigureOut">
               <a:rPr lang="en-GB" smtClean="0"/>
-              <a:t>29/11/2018</a:t>
+              <a:t>04/12/2018</a:t>
             </a:fld>
             <a:endParaRPr lang="en-GB"/>
           </a:p>
@@ -1841,7 +1843,7 @@
           <a:p>
             <a:fld id="{4DCC3765-A771-4BBA-8135-6F2E689117A7}" type="datetimeFigureOut">
               <a:rPr lang="en-GB" smtClean="0"/>
-              <a:t>29/11/2018</a:t>
+              <a:t>04/12/2018</a:t>
             </a:fld>
             <a:endParaRPr lang="en-GB"/>
           </a:p>
@@ -1983,7 +1985,7 @@
           <a:p>
             <a:fld id="{4DCC3765-A771-4BBA-8135-6F2E689117A7}" type="datetimeFigureOut">
               <a:rPr lang="en-GB" smtClean="0"/>
-              <a:t>29/11/2018</a:t>
+              <a:t>04/12/2018</a:t>
             </a:fld>
             <a:endParaRPr lang="en-GB"/>
           </a:p>
@@ -2096,7 +2098,7 @@
           <a:p>
             <a:fld id="{4DCC3765-A771-4BBA-8135-6F2E689117A7}" type="datetimeFigureOut">
               <a:rPr lang="en-GB" smtClean="0"/>
-              <a:t>29/11/2018</a:t>
+              <a:t>04/12/2018</a:t>
             </a:fld>
             <a:endParaRPr lang="en-GB"/>
           </a:p>
@@ -2409,7 +2411,7 @@
           <a:p>
             <a:fld id="{4DCC3765-A771-4BBA-8135-6F2E689117A7}" type="datetimeFigureOut">
               <a:rPr lang="en-GB" smtClean="0"/>
-              <a:t>29/11/2018</a:t>
+              <a:t>04/12/2018</a:t>
             </a:fld>
             <a:endParaRPr lang="en-GB"/>
           </a:p>
@@ -2698,7 +2700,7 @@
           <a:p>
             <a:fld id="{4DCC3765-A771-4BBA-8135-6F2E689117A7}" type="datetimeFigureOut">
               <a:rPr lang="en-GB" smtClean="0"/>
-              <a:t>29/11/2018</a:t>
+              <a:t>04/12/2018</a:t>
             </a:fld>
             <a:endParaRPr lang="en-GB"/>
           </a:p>
@@ -2941,7 +2943,7 @@
           <a:p>
             <a:fld id="{4DCC3765-A771-4BBA-8135-6F2E689117A7}" type="datetimeFigureOut">
               <a:rPr lang="en-GB" smtClean="0"/>
-              <a:t>29/11/2018</a:t>
+              <a:t>04/12/2018</a:t>
             </a:fld>
             <a:endParaRPr lang="en-GB"/>
           </a:p>
@@ -6273,8 +6275,8 @@
           </a:p>
         </p:txBody>
       </p:sp>
-      <mc:AlternateContent xmlns:mc="http://schemas.openxmlformats.org/markup-compatibility/2006">
-        <mc:Choice xmlns:a14="http://schemas.microsoft.com/office/drawing/2010/main" Requires="a14">
+      <mc:AlternateContent xmlns:mc="http://schemas.openxmlformats.org/markup-compatibility/2006" xmlns:a14="http://schemas.microsoft.com/office/drawing/2010/main">
+        <mc:Choice Requires="a14">
           <p:sp>
             <p:nvSpPr>
               <p:cNvPr id="28" name="Rectangle 27">
@@ -6402,7 +6404,7 @@
             </p:txBody>
           </p:sp>
         </mc:Choice>
-        <mc:Fallback>
+        <mc:Fallback xmlns="">
           <p:sp>
             <p:nvSpPr>
               <p:cNvPr id="28" name="Rectangle 27">
@@ -7468,8 +7470,8 @@
           </a:p>
         </p:txBody>
       </p:sp>
-      <mc:AlternateContent xmlns:mc="http://schemas.openxmlformats.org/markup-compatibility/2006">
-        <mc:Choice xmlns:a14="http://schemas.microsoft.com/office/drawing/2010/main" Requires="a14">
+      <mc:AlternateContent xmlns:mc="http://schemas.openxmlformats.org/markup-compatibility/2006" xmlns:a14="http://schemas.microsoft.com/office/drawing/2010/main">
+        <mc:Choice Requires="a14">
           <p:sp>
             <p:nvSpPr>
               <p:cNvPr id="28" name="Rectangle 27">
@@ -7581,7 +7583,7 @@
             </p:txBody>
           </p:sp>
         </mc:Choice>
-        <mc:Fallback>
+        <mc:Fallback xmlns="">
           <p:sp>
             <p:nvSpPr>
               <p:cNvPr id="28" name="Rectangle 27">
@@ -8099,6 +8101,2238 @@
     <p:extLst>
       <p:ext uri="{BB962C8B-B14F-4D97-AF65-F5344CB8AC3E}">
         <p14:creationId xmlns:p14="http://schemas.microsoft.com/office/powerpoint/2010/main" val="3376178807"/>
+      </p:ext>
+    </p:extLst>
+  </p:cSld>
+  <p:clrMapOvr>
+    <a:masterClrMapping/>
+  </p:clrMapOvr>
+</p:sld>
+</file>
+
+<file path=ppt/slides/slide13.xml><?xml version="1.0" encoding="utf-8"?>
+<p:sld xmlns:a="http://schemas.openxmlformats.org/drawingml/2006/main" xmlns:r="http://schemas.openxmlformats.org/officeDocument/2006/relationships" xmlns:p="http://schemas.openxmlformats.org/presentationml/2006/main">
+  <p:cSld>
+    <p:spTree>
+      <p:nvGrpSpPr>
+        <p:cNvPr id="1" name=""/>
+        <p:cNvGrpSpPr/>
+        <p:nvPr/>
+      </p:nvGrpSpPr>
+      <p:grpSpPr>
+        <a:xfrm>
+          <a:off x="0" y="0"/>
+          <a:ext cx="0" cy="0"/>
+          <a:chOff x="0" y="0"/>
+          <a:chExt cx="0" cy="0"/>
+        </a:xfrm>
+      </p:grpSpPr>
+      <p:sp>
+        <p:nvSpPr>
+          <p:cNvPr id="4" name="Rectangle 3">
+            <a:extLst>
+              <a:ext uri="{FF2B5EF4-FFF2-40B4-BE49-F238E27FC236}">
+                <a16:creationId xmlns:a16="http://schemas.microsoft.com/office/drawing/2014/main" id="{F7DCFB41-CE55-4281-A58E-EF6257BC63EA}"/>
+              </a:ext>
+            </a:extLst>
+          </p:cNvPr>
+          <p:cNvSpPr/>
+          <p:nvPr/>
+        </p:nvSpPr>
+        <p:spPr>
+          <a:xfrm>
+            <a:off x="5320747" y="954157"/>
+            <a:ext cx="1550505" cy="848139"/>
+          </a:xfrm>
+          <a:prstGeom prst="rect">
+            <a:avLst/>
+          </a:prstGeom>
+        </p:spPr>
+        <p:style>
+          <a:lnRef idx="2">
+            <a:schemeClr val="dk1"/>
+          </a:lnRef>
+          <a:fillRef idx="1">
+            <a:schemeClr val="lt1"/>
+          </a:fillRef>
+          <a:effectRef idx="0">
+            <a:schemeClr val="dk1"/>
+          </a:effectRef>
+          <a:fontRef idx="minor">
+            <a:schemeClr val="dk1"/>
+          </a:fontRef>
+        </p:style>
+        <p:txBody>
+          <a:bodyPr rtlCol="0" anchor="ctr"/>
+          <a:lstStyle/>
+          <a:p>
+            <a:pPr algn="ctr"/>
+            <a:r>
+              <a:rPr lang="en-GB" dirty="0"/>
+              <a:t>High Level Controller</a:t>
+            </a:r>
+          </a:p>
+        </p:txBody>
+      </p:sp>
+      <p:sp>
+        <p:nvSpPr>
+          <p:cNvPr id="5" name="Rectangle 4">
+            <a:extLst>
+              <a:ext uri="{FF2B5EF4-FFF2-40B4-BE49-F238E27FC236}">
+                <a16:creationId xmlns:a16="http://schemas.microsoft.com/office/drawing/2014/main" id="{9EF5490B-E10C-463E-AA4C-B0BDD9C9379B}"/>
+              </a:ext>
+            </a:extLst>
+          </p:cNvPr>
+          <p:cNvSpPr/>
+          <p:nvPr/>
+        </p:nvSpPr>
+        <p:spPr>
+          <a:xfrm>
+            <a:off x="5320746" y="2014330"/>
+            <a:ext cx="1550505" cy="848139"/>
+          </a:xfrm>
+          <a:prstGeom prst="rect">
+            <a:avLst/>
+          </a:prstGeom>
+        </p:spPr>
+        <p:style>
+          <a:lnRef idx="2">
+            <a:schemeClr val="dk1"/>
+          </a:lnRef>
+          <a:fillRef idx="1">
+            <a:schemeClr val="lt1"/>
+          </a:fillRef>
+          <a:effectRef idx="0">
+            <a:schemeClr val="dk1"/>
+          </a:effectRef>
+          <a:fontRef idx="minor">
+            <a:schemeClr val="dk1"/>
+          </a:fontRef>
+        </p:style>
+        <p:txBody>
+          <a:bodyPr rtlCol="0" anchor="ctr"/>
+          <a:lstStyle/>
+          <a:p>
+            <a:pPr algn="ctr"/>
+            <a:r>
+              <a:rPr lang="en-GB" dirty="0"/>
+              <a:t>Task Encoding</a:t>
+            </a:r>
+          </a:p>
+        </p:txBody>
+      </p:sp>
+      <p:sp>
+        <p:nvSpPr>
+          <p:cNvPr id="6" name="Rectangle 5">
+            <a:extLst>
+              <a:ext uri="{FF2B5EF4-FFF2-40B4-BE49-F238E27FC236}">
+                <a16:creationId xmlns:a16="http://schemas.microsoft.com/office/drawing/2014/main" id="{EF2F63D0-7A9B-4AD7-A693-68D3C829B8DC}"/>
+              </a:ext>
+            </a:extLst>
+          </p:cNvPr>
+          <p:cNvSpPr/>
+          <p:nvPr/>
+        </p:nvSpPr>
+        <p:spPr>
+          <a:xfrm>
+            <a:off x="5320745" y="3074503"/>
+            <a:ext cx="1550505" cy="848139"/>
+          </a:xfrm>
+          <a:prstGeom prst="rect">
+            <a:avLst/>
+          </a:prstGeom>
+        </p:spPr>
+        <p:style>
+          <a:lnRef idx="2">
+            <a:schemeClr val="dk1"/>
+          </a:lnRef>
+          <a:fillRef idx="1">
+            <a:schemeClr val="lt1"/>
+          </a:fillRef>
+          <a:effectRef idx="0">
+            <a:schemeClr val="dk1"/>
+          </a:effectRef>
+          <a:fontRef idx="minor">
+            <a:schemeClr val="dk1"/>
+          </a:fontRef>
+        </p:style>
+        <p:txBody>
+          <a:bodyPr rtlCol="0" anchor="ctr"/>
+          <a:lstStyle/>
+          <a:p>
+            <a:pPr algn="ctr"/>
+            <a:r>
+              <a:rPr lang="en-GB" dirty="0"/>
+              <a:t>Low Level Controller</a:t>
+            </a:r>
+          </a:p>
+        </p:txBody>
+      </p:sp>
+      <p:sp>
+        <p:nvSpPr>
+          <p:cNvPr id="7" name="Rectangle 6">
+            <a:extLst>
+              <a:ext uri="{FF2B5EF4-FFF2-40B4-BE49-F238E27FC236}">
+                <a16:creationId xmlns:a16="http://schemas.microsoft.com/office/drawing/2014/main" id="{DB0EAEF0-827D-4C3B-91FB-257560CA82D5}"/>
+              </a:ext>
+            </a:extLst>
+          </p:cNvPr>
+          <p:cNvSpPr/>
+          <p:nvPr/>
+        </p:nvSpPr>
+        <p:spPr>
+          <a:xfrm>
+            <a:off x="5320743" y="5194849"/>
+            <a:ext cx="3346179" cy="848139"/>
+          </a:xfrm>
+          <a:prstGeom prst="rect">
+            <a:avLst/>
+          </a:prstGeom>
+        </p:spPr>
+        <p:style>
+          <a:lnRef idx="2">
+            <a:schemeClr val="dk1"/>
+          </a:lnRef>
+          <a:fillRef idx="1">
+            <a:schemeClr val="lt1"/>
+          </a:fillRef>
+          <a:effectRef idx="0">
+            <a:schemeClr val="dk1"/>
+          </a:effectRef>
+          <a:fontRef idx="minor">
+            <a:schemeClr val="dk1"/>
+          </a:fontRef>
+        </p:style>
+        <p:txBody>
+          <a:bodyPr rtlCol="0" anchor="ctr"/>
+          <a:lstStyle/>
+          <a:p>
+            <a:pPr algn="ctr"/>
+            <a:r>
+              <a:rPr lang="en-GB" dirty="0"/>
+              <a:t>External Environment</a:t>
+            </a:r>
+          </a:p>
+        </p:txBody>
+      </p:sp>
+      <p:sp>
+        <p:nvSpPr>
+          <p:cNvPr id="8" name="Rectangle 7">
+            <a:extLst>
+              <a:ext uri="{FF2B5EF4-FFF2-40B4-BE49-F238E27FC236}">
+                <a16:creationId xmlns:a16="http://schemas.microsoft.com/office/drawing/2014/main" id="{3A53D390-AD45-470C-BC81-6CED208FFA89}"/>
+              </a:ext>
+            </a:extLst>
+          </p:cNvPr>
+          <p:cNvSpPr/>
+          <p:nvPr/>
+        </p:nvSpPr>
+        <p:spPr>
+          <a:xfrm>
+            <a:off x="5320744" y="4134676"/>
+            <a:ext cx="1550505" cy="848139"/>
+          </a:xfrm>
+          <a:prstGeom prst="rect">
+            <a:avLst/>
+          </a:prstGeom>
+        </p:spPr>
+        <p:style>
+          <a:lnRef idx="2">
+            <a:schemeClr val="dk1"/>
+          </a:lnRef>
+          <a:fillRef idx="1">
+            <a:schemeClr val="lt1"/>
+          </a:fillRef>
+          <a:effectRef idx="0">
+            <a:schemeClr val="dk1"/>
+          </a:effectRef>
+          <a:fontRef idx="minor">
+            <a:schemeClr val="dk1"/>
+          </a:fontRef>
+        </p:style>
+        <p:txBody>
+          <a:bodyPr rtlCol="0" anchor="ctr"/>
+          <a:lstStyle/>
+          <a:p>
+            <a:pPr algn="ctr"/>
+            <a:r>
+              <a:rPr lang="en-GB" dirty="0"/>
+              <a:t>Hardware</a:t>
+            </a:r>
+          </a:p>
+        </p:txBody>
+      </p:sp>
+      <p:cxnSp>
+        <p:nvCxnSpPr>
+          <p:cNvPr id="10" name="Straight Arrow Connector 9">
+            <a:extLst>
+              <a:ext uri="{FF2B5EF4-FFF2-40B4-BE49-F238E27FC236}">
+                <a16:creationId xmlns:a16="http://schemas.microsoft.com/office/drawing/2014/main" id="{B4C791CA-A894-4B3B-BE00-8E08E6A71F30}"/>
+              </a:ext>
+            </a:extLst>
+          </p:cNvPr>
+          <p:cNvCxnSpPr>
+            <a:stCxn id="4" idx="2"/>
+            <a:endCxn id="5" idx="0"/>
+          </p:cNvCxnSpPr>
+          <p:nvPr/>
+        </p:nvCxnSpPr>
+        <p:spPr>
+          <a:xfrm flipH="1">
+            <a:off x="6095999" y="1802296"/>
+            <a:ext cx="1" cy="212034"/>
+          </a:xfrm>
+          <a:prstGeom prst="straightConnector1">
+            <a:avLst/>
+          </a:prstGeom>
+          <a:ln>
+            <a:tailEnd type="triangle"/>
+          </a:ln>
+        </p:spPr>
+        <p:style>
+          <a:lnRef idx="3">
+            <a:schemeClr val="dk1"/>
+          </a:lnRef>
+          <a:fillRef idx="0">
+            <a:schemeClr val="dk1"/>
+          </a:fillRef>
+          <a:effectRef idx="2">
+            <a:schemeClr val="dk1"/>
+          </a:effectRef>
+          <a:fontRef idx="minor">
+            <a:schemeClr val="tx1"/>
+          </a:fontRef>
+        </p:style>
+      </p:cxnSp>
+      <p:cxnSp>
+        <p:nvCxnSpPr>
+          <p:cNvPr id="12" name="Straight Arrow Connector 11">
+            <a:extLst>
+              <a:ext uri="{FF2B5EF4-FFF2-40B4-BE49-F238E27FC236}">
+                <a16:creationId xmlns:a16="http://schemas.microsoft.com/office/drawing/2014/main" id="{0C761C54-4CBC-41D7-8A56-EBE4D107F42E}"/>
+              </a:ext>
+            </a:extLst>
+          </p:cNvPr>
+          <p:cNvCxnSpPr>
+            <a:stCxn id="5" idx="2"/>
+            <a:endCxn id="6" idx="0"/>
+          </p:cNvCxnSpPr>
+          <p:nvPr/>
+        </p:nvCxnSpPr>
+        <p:spPr>
+          <a:xfrm flipH="1">
+            <a:off x="6095998" y="2862469"/>
+            <a:ext cx="1" cy="212034"/>
+          </a:xfrm>
+          <a:prstGeom prst="straightConnector1">
+            <a:avLst/>
+          </a:prstGeom>
+          <a:ln>
+            <a:tailEnd type="triangle"/>
+          </a:ln>
+        </p:spPr>
+        <p:style>
+          <a:lnRef idx="3">
+            <a:schemeClr val="dk1"/>
+          </a:lnRef>
+          <a:fillRef idx="0">
+            <a:schemeClr val="dk1"/>
+          </a:fillRef>
+          <a:effectRef idx="2">
+            <a:schemeClr val="dk1"/>
+          </a:effectRef>
+          <a:fontRef idx="minor">
+            <a:schemeClr val="tx1"/>
+          </a:fontRef>
+        </p:style>
+      </p:cxnSp>
+      <p:cxnSp>
+        <p:nvCxnSpPr>
+          <p:cNvPr id="14" name="Straight Arrow Connector 13">
+            <a:extLst>
+              <a:ext uri="{FF2B5EF4-FFF2-40B4-BE49-F238E27FC236}">
+                <a16:creationId xmlns:a16="http://schemas.microsoft.com/office/drawing/2014/main" id="{E450E69D-53F3-4499-8AD6-32ADD2EB9EF1}"/>
+              </a:ext>
+            </a:extLst>
+          </p:cNvPr>
+          <p:cNvCxnSpPr>
+            <a:stCxn id="6" idx="2"/>
+            <a:endCxn id="8" idx="0"/>
+          </p:cNvCxnSpPr>
+          <p:nvPr/>
+        </p:nvCxnSpPr>
+        <p:spPr>
+          <a:xfrm flipH="1">
+            <a:off x="6095997" y="3922642"/>
+            <a:ext cx="1" cy="212034"/>
+          </a:xfrm>
+          <a:prstGeom prst="straightConnector1">
+            <a:avLst/>
+          </a:prstGeom>
+          <a:ln>
+            <a:tailEnd type="triangle"/>
+          </a:ln>
+        </p:spPr>
+        <p:style>
+          <a:lnRef idx="3">
+            <a:schemeClr val="dk1"/>
+          </a:lnRef>
+          <a:fillRef idx="0">
+            <a:schemeClr val="dk1"/>
+          </a:fillRef>
+          <a:effectRef idx="2">
+            <a:schemeClr val="dk1"/>
+          </a:effectRef>
+          <a:fontRef idx="minor">
+            <a:schemeClr val="tx1"/>
+          </a:fontRef>
+        </p:style>
+      </p:cxnSp>
+      <p:cxnSp>
+        <p:nvCxnSpPr>
+          <p:cNvPr id="16" name="Straight Arrow Connector 15">
+            <a:extLst>
+              <a:ext uri="{FF2B5EF4-FFF2-40B4-BE49-F238E27FC236}">
+                <a16:creationId xmlns:a16="http://schemas.microsoft.com/office/drawing/2014/main" id="{16414719-84AF-4146-88D4-7598285EF86E}"/>
+              </a:ext>
+            </a:extLst>
+          </p:cNvPr>
+          <p:cNvCxnSpPr>
+            <a:cxnSpLocks/>
+            <a:stCxn id="8" idx="2"/>
+          </p:cNvCxnSpPr>
+          <p:nvPr/>
+        </p:nvCxnSpPr>
+        <p:spPr>
+          <a:xfrm>
+            <a:off x="6095997" y="4982815"/>
+            <a:ext cx="0" cy="212034"/>
+          </a:xfrm>
+          <a:prstGeom prst="straightConnector1">
+            <a:avLst/>
+          </a:prstGeom>
+          <a:ln>
+            <a:tailEnd type="triangle"/>
+          </a:ln>
+        </p:spPr>
+        <p:style>
+          <a:lnRef idx="3">
+            <a:schemeClr val="dk1"/>
+          </a:lnRef>
+          <a:fillRef idx="0">
+            <a:schemeClr val="dk1"/>
+          </a:fillRef>
+          <a:effectRef idx="2">
+            <a:schemeClr val="dk1"/>
+          </a:effectRef>
+          <a:fontRef idx="minor">
+            <a:schemeClr val="tx1"/>
+          </a:fontRef>
+        </p:style>
+      </p:cxnSp>
+      <p:sp>
+        <p:nvSpPr>
+          <p:cNvPr id="20" name="Rectangle 19">
+            <a:extLst>
+              <a:ext uri="{FF2B5EF4-FFF2-40B4-BE49-F238E27FC236}">
+                <a16:creationId xmlns:a16="http://schemas.microsoft.com/office/drawing/2014/main" id="{B1ECF50E-A914-4DEC-B2E7-6E8D7B78E649}"/>
+              </a:ext>
+            </a:extLst>
+          </p:cNvPr>
+          <p:cNvSpPr/>
+          <p:nvPr/>
+        </p:nvSpPr>
+        <p:spPr>
+          <a:xfrm>
+            <a:off x="7096536" y="4134676"/>
+            <a:ext cx="1550505" cy="848139"/>
+          </a:xfrm>
+          <a:prstGeom prst="rect">
+            <a:avLst/>
+          </a:prstGeom>
+        </p:spPr>
+        <p:style>
+          <a:lnRef idx="2">
+            <a:schemeClr val="dk1"/>
+          </a:lnRef>
+          <a:fillRef idx="1">
+            <a:schemeClr val="lt1"/>
+          </a:fillRef>
+          <a:effectRef idx="0">
+            <a:schemeClr val="dk1"/>
+          </a:effectRef>
+          <a:fontRef idx="minor">
+            <a:schemeClr val="dk1"/>
+          </a:fontRef>
+        </p:style>
+        <p:txBody>
+          <a:bodyPr rtlCol="0" anchor="ctr"/>
+          <a:lstStyle/>
+          <a:p>
+            <a:pPr algn="ctr"/>
+            <a:r>
+              <a:rPr lang="en-GB" dirty="0"/>
+              <a:t>Work Object</a:t>
+            </a:r>
+          </a:p>
+        </p:txBody>
+      </p:sp>
+      <p:cxnSp>
+        <p:nvCxnSpPr>
+          <p:cNvPr id="22" name="Straight Arrow Connector 21">
+            <a:extLst>
+              <a:ext uri="{FF2B5EF4-FFF2-40B4-BE49-F238E27FC236}">
+                <a16:creationId xmlns:a16="http://schemas.microsoft.com/office/drawing/2014/main" id="{73B5E1F5-8C14-44B9-BA29-22D8A25448D3}"/>
+              </a:ext>
+            </a:extLst>
+          </p:cNvPr>
+          <p:cNvCxnSpPr>
+            <a:stCxn id="8" idx="3"/>
+            <a:endCxn id="20" idx="1"/>
+          </p:cNvCxnSpPr>
+          <p:nvPr/>
+        </p:nvCxnSpPr>
+        <p:spPr>
+          <a:xfrm>
+            <a:off x="6871249" y="4558746"/>
+            <a:ext cx="225287" cy="0"/>
+          </a:xfrm>
+          <a:prstGeom prst="straightConnector1">
+            <a:avLst/>
+          </a:prstGeom>
+          <a:ln>
+            <a:tailEnd type="triangle"/>
+          </a:ln>
+        </p:spPr>
+        <p:style>
+          <a:lnRef idx="3">
+            <a:schemeClr val="dk1"/>
+          </a:lnRef>
+          <a:fillRef idx="0">
+            <a:schemeClr val="dk1"/>
+          </a:fillRef>
+          <a:effectRef idx="2">
+            <a:schemeClr val="dk1"/>
+          </a:effectRef>
+          <a:fontRef idx="minor">
+            <a:schemeClr val="tx1"/>
+          </a:fontRef>
+        </p:style>
+      </p:cxnSp>
+      <p:cxnSp>
+        <p:nvCxnSpPr>
+          <p:cNvPr id="24" name="Straight Arrow Connector 23">
+            <a:extLst>
+              <a:ext uri="{FF2B5EF4-FFF2-40B4-BE49-F238E27FC236}">
+                <a16:creationId xmlns:a16="http://schemas.microsoft.com/office/drawing/2014/main" id="{421D0D7C-AD69-44C8-89A4-6EAF3030C603}"/>
+              </a:ext>
+            </a:extLst>
+          </p:cNvPr>
+          <p:cNvCxnSpPr>
+            <a:stCxn id="20" idx="2"/>
+          </p:cNvCxnSpPr>
+          <p:nvPr/>
+        </p:nvCxnSpPr>
+        <p:spPr>
+          <a:xfrm>
+            <a:off x="7871789" y="4982815"/>
+            <a:ext cx="2" cy="212034"/>
+          </a:xfrm>
+          <a:prstGeom prst="straightConnector1">
+            <a:avLst/>
+          </a:prstGeom>
+          <a:ln>
+            <a:tailEnd type="triangle"/>
+          </a:ln>
+        </p:spPr>
+        <p:style>
+          <a:lnRef idx="3">
+            <a:schemeClr val="dk1"/>
+          </a:lnRef>
+          <a:fillRef idx="0">
+            <a:schemeClr val="dk1"/>
+          </a:fillRef>
+          <a:effectRef idx="2">
+            <a:schemeClr val="dk1"/>
+          </a:effectRef>
+          <a:fontRef idx="minor">
+            <a:schemeClr val="tx1"/>
+          </a:fontRef>
+        </p:style>
+      </p:cxnSp>
+      <p:cxnSp>
+        <p:nvCxnSpPr>
+          <p:cNvPr id="29" name="Straight Arrow Connector 28">
+            <a:extLst>
+              <a:ext uri="{FF2B5EF4-FFF2-40B4-BE49-F238E27FC236}">
+                <a16:creationId xmlns:a16="http://schemas.microsoft.com/office/drawing/2014/main" id="{5DC43BFA-4CC4-450D-A4B7-46BCB73D2437}"/>
+              </a:ext>
+            </a:extLst>
+          </p:cNvPr>
+          <p:cNvCxnSpPr>
+            <a:cxnSpLocks/>
+            <a:endCxn id="4" idx="1"/>
+          </p:cNvCxnSpPr>
+          <p:nvPr/>
+        </p:nvCxnSpPr>
+        <p:spPr>
+          <a:xfrm>
+            <a:off x="4518991" y="1378227"/>
+            <a:ext cx="801756" cy="0"/>
+          </a:xfrm>
+          <a:prstGeom prst="straightConnector1">
+            <a:avLst/>
+          </a:prstGeom>
+          <a:ln>
+            <a:tailEnd type="triangle"/>
+          </a:ln>
+        </p:spPr>
+        <p:style>
+          <a:lnRef idx="3">
+            <a:schemeClr val="dk1"/>
+          </a:lnRef>
+          <a:fillRef idx="0">
+            <a:schemeClr val="dk1"/>
+          </a:fillRef>
+          <a:effectRef idx="2">
+            <a:schemeClr val="dk1"/>
+          </a:effectRef>
+          <a:fontRef idx="minor">
+            <a:schemeClr val="tx1"/>
+          </a:fontRef>
+        </p:style>
+      </p:cxnSp>
+      <p:cxnSp>
+        <p:nvCxnSpPr>
+          <p:cNvPr id="32" name="Straight Arrow Connector 31">
+            <a:extLst>
+              <a:ext uri="{FF2B5EF4-FFF2-40B4-BE49-F238E27FC236}">
+                <a16:creationId xmlns:a16="http://schemas.microsoft.com/office/drawing/2014/main" id="{36F52357-DBEE-4E10-A41C-FD29492B2129}"/>
+              </a:ext>
+            </a:extLst>
+          </p:cNvPr>
+          <p:cNvCxnSpPr/>
+          <p:nvPr/>
+        </p:nvCxnSpPr>
+        <p:spPr>
+          <a:xfrm flipH="1">
+            <a:off x="6871249" y="3491948"/>
+            <a:ext cx="2259499" cy="0"/>
+          </a:xfrm>
+          <a:prstGeom prst="straightConnector1">
+            <a:avLst/>
+          </a:prstGeom>
+          <a:ln>
+            <a:tailEnd type="triangle"/>
+          </a:ln>
+        </p:spPr>
+        <p:style>
+          <a:lnRef idx="3">
+            <a:schemeClr val="dk1"/>
+          </a:lnRef>
+          <a:fillRef idx="0">
+            <a:schemeClr val="dk1"/>
+          </a:fillRef>
+          <a:effectRef idx="2">
+            <a:schemeClr val="dk1"/>
+          </a:effectRef>
+          <a:fontRef idx="minor">
+            <a:schemeClr val="tx1"/>
+          </a:fontRef>
+        </p:style>
+      </p:cxnSp>
+      <p:cxnSp>
+        <p:nvCxnSpPr>
+          <p:cNvPr id="33" name="Straight Arrow Connector 32">
+            <a:extLst>
+              <a:ext uri="{FF2B5EF4-FFF2-40B4-BE49-F238E27FC236}">
+                <a16:creationId xmlns:a16="http://schemas.microsoft.com/office/drawing/2014/main" id="{CDF5F6DE-6570-4032-9166-5D0E81EA5C96}"/>
+              </a:ext>
+            </a:extLst>
+          </p:cNvPr>
+          <p:cNvCxnSpPr/>
+          <p:nvPr/>
+        </p:nvCxnSpPr>
+        <p:spPr>
+          <a:xfrm flipH="1">
+            <a:off x="6871249" y="1378227"/>
+            <a:ext cx="2259499" cy="0"/>
+          </a:xfrm>
+          <a:prstGeom prst="straightConnector1">
+            <a:avLst/>
+          </a:prstGeom>
+          <a:ln>
+            <a:tailEnd type="triangle"/>
+          </a:ln>
+        </p:spPr>
+        <p:style>
+          <a:lnRef idx="3">
+            <a:schemeClr val="dk1"/>
+          </a:lnRef>
+          <a:fillRef idx="0">
+            <a:schemeClr val="dk1"/>
+          </a:fillRef>
+          <a:effectRef idx="2">
+            <a:schemeClr val="dk1"/>
+          </a:effectRef>
+          <a:fontRef idx="minor">
+            <a:schemeClr val="tx1"/>
+          </a:fontRef>
+        </p:style>
+      </p:cxnSp>
+      <p:cxnSp>
+        <p:nvCxnSpPr>
+          <p:cNvPr id="34" name="Straight Arrow Connector 33">
+            <a:extLst>
+              <a:ext uri="{FF2B5EF4-FFF2-40B4-BE49-F238E27FC236}">
+                <a16:creationId xmlns:a16="http://schemas.microsoft.com/office/drawing/2014/main" id="{D5B6872D-7615-4937-A65C-BBE9F9022D3B}"/>
+              </a:ext>
+            </a:extLst>
+          </p:cNvPr>
+          <p:cNvCxnSpPr>
+            <a:cxnSpLocks/>
+          </p:cNvCxnSpPr>
+          <p:nvPr/>
+        </p:nvCxnSpPr>
+        <p:spPr>
+          <a:xfrm flipH="1">
+            <a:off x="6871250" y="1192697"/>
+            <a:ext cx="3200402" cy="0"/>
+          </a:xfrm>
+          <a:prstGeom prst="straightConnector1">
+            <a:avLst/>
+          </a:prstGeom>
+          <a:ln>
+            <a:tailEnd type="triangle"/>
+          </a:ln>
+        </p:spPr>
+        <p:style>
+          <a:lnRef idx="3">
+            <a:schemeClr val="dk1"/>
+          </a:lnRef>
+          <a:fillRef idx="0">
+            <a:schemeClr val="dk1"/>
+          </a:fillRef>
+          <a:effectRef idx="2">
+            <a:schemeClr val="dk1"/>
+          </a:effectRef>
+          <a:fontRef idx="minor">
+            <a:schemeClr val="tx1"/>
+          </a:fontRef>
+        </p:style>
+      </p:cxnSp>
+      <p:cxnSp>
+        <p:nvCxnSpPr>
+          <p:cNvPr id="39" name="Straight Arrow Connector 38">
+            <a:extLst>
+              <a:ext uri="{FF2B5EF4-FFF2-40B4-BE49-F238E27FC236}">
+                <a16:creationId xmlns:a16="http://schemas.microsoft.com/office/drawing/2014/main" id="{04F23AF8-FF68-44D2-929D-7EEADF9B13B3}"/>
+              </a:ext>
+            </a:extLst>
+          </p:cNvPr>
+          <p:cNvCxnSpPr>
+            <a:cxnSpLocks/>
+          </p:cNvCxnSpPr>
+          <p:nvPr/>
+        </p:nvCxnSpPr>
+        <p:spPr>
+          <a:xfrm flipH="1">
+            <a:off x="6871250" y="3299793"/>
+            <a:ext cx="2168247" cy="0"/>
+          </a:xfrm>
+          <a:prstGeom prst="straightConnector1">
+            <a:avLst/>
+          </a:prstGeom>
+          <a:ln>
+            <a:tailEnd type="triangle"/>
+          </a:ln>
+        </p:spPr>
+        <p:style>
+          <a:lnRef idx="3">
+            <a:schemeClr val="dk1"/>
+          </a:lnRef>
+          <a:fillRef idx="0">
+            <a:schemeClr val="dk1"/>
+          </a:fillRef>
+          <a:effectRef idx="2">
+            <a:schemeClr val="dk1"/>
+          </a:effectRef>
+          <a:fontRef idx="minor">
+            <a:schemeClr val="tx1"/>
+          </a:fontRef>
+        </p:style>
+      </p:cxnSp>
+      <p:cxnSp>
+        <p:nvCxnSpPr>
+          <p:cNvPr id="41" name="Connector: Elbow 40">
+            <a:extLst>
+              <a:ext uri="{FF2B5EF4-FFF2-40B4-BE49-F238E27FC236}">
+                <a16:creationId xmlns:a16="http://schemas.microsoft.com/office/drawing/2014/main" id="{38FDA47C-4E45-4C45-B7DE-5AB8AA07EA64}"/>
+              </a:ext>
+            </a:extLst>
+          </p:cNvPr>
+          <p:cNvCxnSpPr>
+            <a:stCxn id="8" idx="1"/>
+          </p:cNvCxnSpPr>
+          <p:nvPr/>
+        </p:nvCxnSpPr>
+        <p:spPr>
+          <a:xfrm rot="10800000">
+            <a:off x="4518992" y="1378228"/>
+            <a:ext cx="801753" cy="3180519"/>
+          </a:xfrm>
+          <a:prstGeom prst="bentConnector2">
+            <a:avLst/>
+          </a:prstGeom>
+        </p:spPr>
+        <p:style>
+          <a:lnRef idx="3">
+            <a:schemeClr val="dk1"/>
+          </a:lnRef>
+          <a:fillRef idx="0">
+            <a:schemeClr val="dk1"/>
+          </a:fillRef>
+          <a:effectRef idx="2">
+            <a:schemeClr val="dk1"/>
+          </a:effectRef>
+          <a:fontRef idx="minor">
+            <a:schemeClr val="tx1"/>
+          </a:fontRef>
+        </p:style>
+      </p:cxnSp>
+      <p:cxnSp>
+        <p:nvCxnSpPr>
+          <p:cNvPr id="43" name="Connector: Elbow 42">
+            <a:extLst>
+              <a:ext uri="{FF2B5EF4-FFF2-40B4-BE49-F238E27FC236}">
+                <a16:creationId xmlns:a16="http://schemas.microsoft.com/office/drawing/2014/main" id="{0623A002-5736-4A73-9B66-BB9C8723BC2D}"/>
+              </a:ext>
+            </a:extLst>
+          </p:cNvPr>
+          <p:cNvCxnSpPr>
+            <a:stCxn id="20" idx="3"/>
+          </p:cNvCxnSpPr>
+          <p:nvPr/>
+        </p:nvCxnSpPr>
+        <p:spPr>
+          <a:xfrm flipV="1">
+            <a:off x="8647041" y="1378227"/>
+            <a:ext cx="483707" cy="3180519"/>
+          </a:xfrm>
+          <a:prstGeom prst="bentConnector2">
+            <a:avLst/>
+          </a:prstGeom>
+        </p:spPr>
+        <p:style>
+          <a:lnRef idx="3">
+            <a:schemeClr val="dk1"/>
+          </a:lnRef>
+          <a:fillRef idx="0">
+            <a:schemeClr val="dk1"/>
+          </a:fillRef>
+          <a:effectRef idx="2">
+            <a:schemeClr val="dk1"/>
+          </a:effectRef>
+          <a:fontRef idx="minor">
+            <a:schemeClr val="tx1"/>
+          </a:fontRef>
+        </p:style>
+      </p:cxnSp>
+      <p:cxnSp>
+        <p:nvCxnSpPr>
+          <p:cNvPr id="48" name="Connector: Elbow 47">
+            <a:extLst>
+              <a:ext uri="{FF2B5EF4-FFF2-40B4-BE49-F238E27FC236}">
+                <a16:creationId xmlns:a16="http://schemas.microsoft.com/office/drawing/2014/main" id="{5939BBCA-7319-4AD7-9018-6209E18B1B21}"/>
+              </a:ext>
+            </a:extLst>
+          </p:cNvPr>
+          <p:cNvCxnSpPr>
+            <a:stCxn id="7" idx="3"/>
+          </p:cNvCxnSpPr>
+          <p:nvPr/>
+        </p:nvCxnSpPr>
+        <p:spPr>
+          <a:xfrm flipV="1">
+            <a:off x="8666922" y="1192697"/>
+            <a:ext cx="1404730" cy="4426222"/>
+          </a:xfrm>
+          <a:prstGeom prst="bentConnector2">
+            <a:avLst/>
+          </a:prstGeom>
+        </p:spPr>
+        <p:style>
+          <a:lnRef idx="3">
+            <a:schemeClr val="dk1"/>
+          </a:lnRef>
+          <a:fillRef idx="0">
+            <a:schemeClr val="dk1"/>
+          </a:fillRef>
+          <a:effectRef idx="2">
+            <a:schemeClr val="dk1"/>
+          </a:effectRef>
+          <a:fontRef idx="minor">
+            <a:schemeClr val="tx1"/>
+          </a:fontRef>
+        </p:style>
+      </p:cxnSp>
+      <p:cxnSp>
+        <p:nvCxnSpPr>
+          <p:cNvPr id="50" name="Straight Connector 49">
+            <a:extLst>
+              <a:ext uri="{FF2B5EF4-FFF2-40B4-BE49-F238E27FC236}">
+                <a16:creationId xmlns:a16="http://schemas.microsoft.com/office/drawing/2014/main" id="{7A614E65-166E-48F1-9A36-CA9B3281009F}"/>
+              </a:ext>
+            </a:extLst>
+          </p:cNvPr>
+          <p:cNvCxnSpPr>
+            <a:cxnSpLocks/>
+          </p:cNvCxnSpPr>
+          <p:nvPr/>
+        </p:nvCxnSpPr>
+        <p:spPr>
+          <a:xfrm>
+            <a:off x="9213669" y="3299793"/>
+            <a:ext cx="857983" cy="0"/>
+          </a:xfrm>
+          <a:prstGeom prst="line">
+            <a:avLst/>
+          </a:prstGeom>
+        </p:spPr>
+        <p:style>
+          <a:lnRef idx="3">
+            <a:schemeClr val="dk1"/>
+          </a:lnRef>
+          <a:fillRef idx="0">
+            <a:schemeClr val="dk1"/>
+          </a:fillRef>
+          <a:effectRef idx="2">
+            <a:schemeClr val="dk1"/>
+          </a:effectRef>
+          <a:fontRef idx="minor">
+            <a:schemeClr val="tx1"/>
+          </a:fontRef>
+        </p:style>
+      </p:cxnSp>
+    </p:spTree>
+    <p:extLst>
+      <p:ext uri="{BB962C8B-B14F-4D97-AF65-F5344CB8AC3E}">
+        <p14:creationId xmlns:p14="http://schemas.microsoft.com/office/powerpoint/2010/main" val="2379045487"/>
+      </p:ext>
+    </p:extLst>
+  </p:cSld>
+  <p:clrMapOvr>
+    <a:masterClrMapping/>
+  </p:clrMapOvr>
+</p:sld>
+</file>
+
+<file path=ppt/slides/slide14.xml><?xml version="1.0" encoding="utf-8"?>
+<p:sld xmlns:a="http://schemas.openxmlformats.org/drawingml/2006/main" xmlns:r="http://schemas.openxmlformats.org/officeDocument/2006/relationships" xmlns:p="http://schemas.openxmlformats.org/presentationml/2006/main">
+  <p:cSld>
+    <p:spTree>
+      <p:nvGrpSpPr>
+        <p:cNvPr id="1" name=""/>
+        <p:cNvGrpSpPr/>
+        <p:nvPr/>
+      </p:nvGrpSpPr>
+      <p:grpSpPr>
+        <a:xfrm>
+          <a:off x="0" y="0"/>
+          <a:ext cx="0" cy="0"/>
+          <a:chOff x="0" y="0"/>
+          <a:chExt cx="0" cy="0"/>
+        </a:xfrm>
+      </p:grpSpPr>
+      <p:sp>
+        <p:nvSpPr>
+          <p:cNvPr id="5" name="Rectangle 4">
+            <a:extLst>
+              <a:ext uri="{FF2B5EF4-FFF2-40B4-BE49-F238E27FC236}">
+                <a16:creationId xmlns:a16="http://schemas.microsoft.com/office/drawing/2014/main" id="{6F9AF2CF-F203-48FC-834F-0B72A27D0FE3}"/>
+              </a:ext>
+            </a:extLst>
+          </p:cNvPr>
+          <p:cNvSpPr/>
+          <p:nvPr/>
+        </p:nvSpPr>
+        <p:spPr>
+          <a:xfrm>
+            <a:off x="1669774" y="2239617"/>
+            <a:ext cx="1431235" cy="980661"/>
+          </a:xfrm>
+          <a:prstGeom prst="rect">
+            <a:avLst/>
+          </a:prstGeom>
+        </p:spPr>
+        <p:style>
+          <a:lnRef idx="2">
+            <a:schemeClr val="dk1"/>
+          </a:lnRef>
+          <a:fillRef idx="1">
+            <a:schemeClr val="lt1"/>
+          </a:fillRef>
+          <a:effectRef idx="0">
+            <a:schemeClr val="dk1"/>
+          </a:effectRef>
+          <a:fontRef idx="minor">
+            <a:schemeClr val="dk1"/>
+          </a:fontRef>
+        </p:style>
+        <p:txBody>
+          <a:bodyPr rtlCol="0" anchor="ctr"/>
+          <a:lstStyle/>
+          <a:p>
+            <a:pPr algn="ctr"/>
+            <a:r>
+              <a:rPr lang="en-GB" dirty="0"/>
+              <a:t>Geometric Calculation</a:t>
+            </a:r>
+          </a:p>
+        </p:txBody>
+      </p:sp>
+      <p:sp>
+        <p:nvSpPr>
+          <p:cNvPr id="6" name="Rectangle 5">
+            <a:extLst>
+              <a:ext uri="{FF2B5EF4-FFF2-40B4-BE49-F238E27FC236}">
+                <a16:creationId xmlns:a16="http://schemas.microsoft.com/office/drawing/2014/main" id="{D97560E7-D9E5-446E-9B73-EFDCA98BBAA1}"/>
+              </a:ext>
+            </a:extLst>
+          </p:cNvPr>
+          <p:cNvSpPr/>
+          <p:nvPr/>
+        </p:nvSpPr>
+        <p:spPr>
+          <a:xfrm>
+            <a:off x="3684411" y="2239617"/>
+            <a:ext cx="1152940" cy="980661"/>
+          </a:xfrm>
+          <a:prstGeom prst="rect">
+            <a:avLst/>
+          </a:prstGeom>
+        </p:spPr>
+        <p:style>
+          <a:lnRef idx="2">
+            <a:schemeClr val="dk1"/>
+          </a:lnRef>
+          <a:fillRef idx="1">
+            <a:schemeClr val="lt1"/>
+          </a:fillRef>
+          <a:effectRef idx="0">
+            <a:schemeClr val="dk1"/>
+          </a:effectRef>
+          <a:fontRef idx="minor">
+            <a:schemeClr val="dk1"/>
+          </a:fontRef>
+        </p:style>
+        <p:txBody>
+          <a:bodyPr rtlCol="0" anchor="ctr"/>
+          <a:lstStyle/>
+          <a:p>
+            <a:pPr algn="ctr"/>
+            <a:r>
+              <a:rPr lang="en-GB" dirty="0"/>
+              <a:t>k</a:t>
+            </a:r>
+            <a:r>
+              <a:rPr lang="en-GB" baseline="-25000" dirty="0"/>
+              <a:t>imp</a:t>
+            </a:r>
+            <a:endParaRPr lang="en-GB" dirty="0"/>
+          </a:p>
+        </p:txBody>
+      </p:sp>
+      <p:sp>
+        <p:nvSpPr>
+          <p:cNvPr id="7" name="Rectangle 6">
+            <a:extLst>
+              <a:ext uri="{FF2B5EF4-FFF2-40B4-BE49-F238E27FC236}">
+                <a16:creationId xmlns:a16="http://schemas.microsoft.com/office/drawing/2014/main" id="{E3397A66-E560-45E9-82DC-218EEFA6C02E}"/>
+              </a:ext>
+            </a:extLst>
+          </p:cNvPr>
+          <p:cNvSpPr/>
+          <p:nvPr/>
+        </p:nvSpPr>
+        <p:spPr>
+          <a:xfrm>
+            <a:off x="5420753" y="2239616"/>
+            <a:ext cx="1152940" cy="980661"/>
+          </a:xfrm>
+          <a:prstGeom prst="rect">
+            <a:avLst/>
+          </a:prstGeom>
+        </p:spPr>
+        <p:style>
+          <a:lnRef idx="2">
+            <a:schemeClr val="dk1"/>
+          </a:lnRef>
+          <a:fillRef idx="1">
+            <a:schemeClr val="lt1"/>
+          </a:fillRef>
+          <a:effectRef idx="0">
+            <a:schemeClr val="dk1"/>
+          </a:effectRef>
+          <a:fontRef idx="minor">
+            <a:schemeClr val="dk1"/>
+          </a:fontRef>
+        </p:style>
+        <p:txBody>
+          <a:bodyPr rtlCol="0" anchor="ctr"/>
+          <a:lstStyle/>
+          <a:p>
+            <a:pPr algn="ctr"/>
+            <a:r>
+              <a:rPr lang="en-GB" dirty="0"/>
+              <a:t>System Model</a:t>
+            </a:r>
+          </a:p>
+        </p:txBody>
+      </p:sp>
+      <p:sp>
+        <p:nvSpPr>
+          <p:cNvPr id="8" name="Rectangle 7">
+            <a:extLst>
+              <a:ext uri="{FF2B5EF4-FFF2-40B4-BE49-F238E27FC236}">
+                <a16:creationId xmlns:a16="http://schemas.microsoft.com/office/drawing/2014/main" id="{46D9041A-D4A1-4F51-B855-BED7E887F169}"/>
+              </a:ext>
+            </a:extLst>
+          </p:cNvPr>
+          <p:cNvSpPr/>
+          <p:nvPr/>
+        </p:nvSpPr>
+        <p:spPr>
+          <a:xfrm>
+            <a:off x="8341938" y="2239616"/>
+            <a:ext cx="1152940" cy="980661"/>
+          </a:xfrm>
+          <a:prstGeom prst="rect">
+            <a:avLst/>
+          </a:prstGeom>
+        </p:spPr>
+        <p:style>
+          <a:lnRef idx="2">
+            <a:schemeClr val="dk1"/>
+          </a:lnRef>
+          <a:fillRef idx="1">
+            <a:schemeClr val="lt1"/>
+          </a:fillRef>
+          <a:effectRef idx="0">
+            <a:schemeClr val="dk1"/>
+          </a:effectRef>
+          <a:fontRef idx="minor">
+            <a:schemeClr val="dk1"/>
+          </a:fontRef>
+        </p:style>
+        <p:txBody>
+          <a:bodyPr rtlCol="0" anchor="ctr"/>
+          <a:lstStyle/>
+          <a:p>
+            <a:pPr algn="ctr"/>
+            <a:r>
+              <a:rPr lang="en-GB" dirty="0"/>
+              <a:t>PI Controller</a:t>
+            </a:r>
+          </a:p>
+        </p:txBody>
+      </p:sp>
+      <p:sp>
+        <p:nvSpPr>
+          <p:cNvPr id="9" name="Rectangle 8">
+            <a:extLst>
+              <a:ext uri="{FF2B5EF4-FFF2-40B4-BE49-F238E27FC236}">
+                <a16:creationId xmlns:a16="http://schemas.microsoft.com/office/drawing/2014/main" id="{948F6C04-50C3-4CE4-81DF-350F569844E0}"/>
+              </a:ext>
+            </a:extLst>
+          </p:cNvPr>
+          <p:cNvSpPr/>
+          <p:nvPr/>
+        </p:nvSpPr>
+        <p:spPr>
+          <a:xfrm>
+            <a:off x="10078278" y="2239616"/>
+            <a:ext cx="1152940" cy="980661"/>
+          </a:xfrm>
+          <a:prstGeom prst="rect">
+            <a:avLst/>
+          </a:prstGeom>
+        </p:spPr>
+        <p:style>
+          <a:lnRef idx="2">
+            <a:schemeClr val="dk1"/>
+          </a:lnRef>
+          <a:fillRef idx="1">
+            <a:schemeClr val="lt1"/>
+          </a:fillRef>
+          <a:effectRef idx="0">
+            <a:schemeClr val="dk1"/>
+          </a:effectRef>
+          <a:fontRef idx="minor">
+            <a:schemeClr val="dk1"/>
+          </a:fontRef>
+        </p:style>
+        <p:txBody>
+          <a:bodyPr rtlCol="0" anchor="ctr"/>
+          <a:lstStyle/>
+          <a:p>
+            <a:pPr algn="ctr"/>
+            <a:r>
+              <a:rPr lang="en-GB" dirty="0"/>
+              <a:t>System</a:t>
+            </a:r>
+          </a:p>
+        </p:txBody>
+      </p:sp>
+      <p:cxnSp>
+        <p:nvCxnSpPr>
+          <p:cNvPr id="11" name="Straight Arrow Connector 10">
+            <a:extLst>
+              <a:ext uri="{FF2B5EF4-FFF2-40B4-BE49-F238E27FC236}">
+                <a16:creationId xmlns:a16="http://schemas.microsoft.com/office/drawing/2014/main" id="{85E0A697-E388-45F7-AF39-C4D2352CDF1E}"/>
+              </a:ext>
+            </a:extLst>
+          </p:cNvPr>
+          <p:cNvCxnSpPr>
+            <a:cxnSpLocks/>
+            <a:endCxn id="5" idx="1"/>
+          </p:cNvCxnSpPr>
+          <p:nvPr/>
+        </p:nvCxnSpPr>
+        <p:spPr>
+          <a:xfrm>
+            <a:off x="410817" y="2729948"/>
+            <a:ext cx="1258957" cy="0"/>
+          </a:xfrm>
+          <a:prstGeom prst="straightConnector1">
+            <a:avLst/>
+          </a:prstGeom>
+          <a:ln>
+            <a:tailEnd type="triangle"/>
+          </a:ln>
+        </p:spPr>
+        <p:style>
+          <a:lnRef idx="1">
+            <a:schemeClr val="dk1"/>
+          </a:lnRef>
+          <a:fillRef idx="0">
+            <a:schemeClr val="dk1"/>
+          </a:fillRef>
+          <a:effectRef idx="0">
+            <a:schemeClr val="dk1"/>
+          </a:effectRef>
+          <a:fontRef idx="minor">
+            <a:schemeClr val="tx1"/>
+          </a:fontRef>
+        </p:style>
+      </p:cxnSp>
+      <p:cxnSp>
+        <p:nvCxnSpPr>
+          <p:cNvPr id="14" name="Straight Arrow Connector 13">
+            <a:extLst>
+              <a:ext uri="{FF2B5EF4-FFF2-40B4-BE49-F238E27FC236}">
+                <a16:creationId xmlns:a16="http://schemas.microsoft.com/office/drawing/2014/main" id="{CCB7235E-B016-4F00-966D-B2DF794488DB}"/>
+              </a:ext>
+            </a:extLst>
+          </p:cNvPr>
+          <p:cNvCxnSpPr>
+            <a:stCxn id="5" idx="3"/>
+            <a:endCxn id="6" idx="1"/>
+          </p:cNvCxnSpPr>
+          <p:nvPr/>
+        </p:nvCxnSpPr>
+        <p:spPr>
+          <a:xfrm>
+            <a:off x="3101009" y="2729948"/>
+            <a:ext cx="583402" cy="0"/>
+          </a:xfrm>
+          <a:prstGeom prst="straightConnector1">
+            <a:avLst/>
+          </a:prstGeom>
+          <a:ln>
+            <a:tailEnd type="triangle"/>
+          </a:ln>
+        </p:spPr>
+        <p:style>
+          <a:lnRef idx="1">
+            <a:schemeClr val="dk1"/>
+          </a:lnRef>
+          <a:fillRef idx="0">
+            <a:schemeClr val="dk1"/>
+          </a:fillRef>
+          <a:effectRef idx="0">
+            <a:schemeClr val="dk1"/>
+          </a:effectRef>
+          <a:fontRef idx="minor">
+            <a:schemeClr val="tx1"/>
+          </a:fontRef>
+        </p:style>
+      </p:cxnSp>
+      <p:cxnSp>
+        <p:nvCxnSpPr>
+          <p:cNvPr id="16" name="Straight Arrow Connector 15">
+            <a:extLst>
+              <a:ext uri="{FF2B5EF4-FFF2-40B4-BE49-F238E27FC236}">
+                <a16:creationId xmlns:a16="http://schemas.microsoft.com/office/drawing/2014/main" id="{9A0DB6FC-125F-42BE-A56D-1BF4A0F60E81}"/>
+              </a:ext>
+            </a:extLst>
+          </p:cNvPr>
+          <p:cNvCxnSpPr>
+            <a:stCxn id="6" idx="3"/>
+            <a:endCxn id="7" idx="1"/>
+          </p:cNvCxnSpPr>
+          <p:nvPr/>
+        </p:nvCxnSpPr>
+        <p:spPr>
+          <a:xfrm flipV="1">
+            <a:off x="4837351" y="2729947"/>
+            <a:ext cx="583402" cy="1"/>
+          </a:xfrm>
+          <a:prstGeom prst="straightConnector1">
+            <a:avLst/>
+          </a:prstGeom>
+          <a:ln>
+            <a:tailEnd type="triangle"/>
+          </a:ln>
+        </p:spPr>
+        <p:style>
+          <a:lnRef idx="1">
+            <a:schemeClr val="dk1"/>
+          </a:lnRef>
+          <a:fillRef idx="0">
+            <a:schemeClr val="dk1"/>
+          </a:fillRef>
+          <a:effectRef idx="0">
+            <a:schemeClr val="dk1"/>
+          </a:effectRef>
+          <a:fontRef idx="minor">
+            <a:schemeClr val="tx1"/>
+          </a:fontRef>
+        </p:style>
+      </p:cxnSp>
+      <p:cxnSp>
+        <p:nvCxnSpPr>
+          <p:cNvPr id="22" name="Straight Arrow Connector 21">
+            <a:extLst>
+              <a:ext uri="{FF2B5EF4-FFF2-40B4-BE49-F238E27FC236}">
+                <a16:creationId xmlns:a16="http://schemas.microsoft.com/office/drawing/2014/main" id="{172F54A6-98AF-4900-B7FB-C87415163693}"/>
+              </a:ext>
+            </a:extLst>
+          </p:cNvPr>
+          <p:cNvCxnSpPr>
+            <a:stCxn id="8" idx="3"/>
+            <a:endCxn id="9" idx="1"/>
+          </p:cNvCxnSpPr>
+          <p:nvPr/>
+        </p:nvCxnSpPr>
+        <p:spPr>
+          <a:xfrm>
+            <a:off x="9494878" y="2729947"/>
+            <a:ext cx="583400" cy="0"/>
+          </a:xfrm>
+          <a:prstGeom prst="straightConnector1">
+            <a:avLst/>
+          </a:prstGeom>
+          <a:ln>
+            <a:tailEnd type="triangle"/>
+          </a:ln>
+        </p:spPr>
+        <p:style>
+          <a:lnRef idx="1">
+            <a:schemeClr val="dk1"/>
+          </a:lnRef>
+          <a:fillRef idx="0">
+            <a:schemeClr val="dk1"/>
+          </a:fillRef>
+          <a:effectRef idx="0">
+            <a:schemeClr val="dk1"/>
+          </a:effectRef>
+          <a:fontRef idx="minor">
+            <a:schemeClr val="tx1"/>
+          </a:fontRef>
+        </p:style>
+      </p:cxnSp>
+      <p:grpSp>
+        <p:nvGrpSpPr>
+          <p:cNvPr id="36" name="Group 35">
+            <a:extLst>
+              <a:ext uri="{FF2B5EF4-FFF2-40B4-BE49-F238E27FC236}">
+                <a16:creationId xmlns:a16="http://schemas.microsoft.com/office/drawing/2014/main" id="{E04E5C7E-A825-4422-9AE2-362765F288C2}"/>
+              </a:ext>
+            </a:extLst>
+          </p:cNvPr>
+          <p:cNvGrpSpPr/>
+          <p:nvPr/>
+        </p:nvGrpSpPr>
+        <p:grpSpPr>
+          <a:xfrm>
+            <a:off x="7157095" y="2431773"/>
+            <a:ext cx="601441" cy="666188"/>
+            <a:chOff x="7188352" y="2431773"/>
+            <a:chExt cx="601441" cy="666188"/>
+          </a:xfrm>
+        </p:grpSpPr>
+        <p:sp>
+          <p:nvSpPr>
+            <p:cNvPr id="23" name="Oval 22">
+              <a:extLst>
+                <a:ext uri="{FF2B5EF4-FFF2-40B4-BE49-F238E27FC236}">
+                  <a16:creationId xmlns:a16="http://schemas.microsoft.com/office/drawing/2014/main" id="{91229E74-A47E-427A-B0EB-77972972CAE7}"/>
+                </a:ext>
+              </a:extLst>
+            </p:cNvPr>
+            <p:cNvSpPr/>
+            <p:nvPr/>
+          </p:nvSpPr>
+          <p:spPr>
+            <a:xfrm>
+              <a:off x="7219950" y="2431773"/>
+              <a:ext cx="569843" cy="596347"/>
+            </a:xfrm>
+            <a:prstGeom prst="ellipse">
+              <a:avLst/>
+            </a:prstGeom>
+          </p:spPr>
+          <p:style>
+            <a:lnRef idx="2">
+              <a:schemeClr val="dk1"/>
+            </a:lnRef>
+            <a:fillRef idx="1">
+              <a:schemeClr val="lt1"/>
+            </a:fillRef>
+            <a:effectRef idx="0">
+              <a:schemeClr val="dk1"/>
+            </a:effectRef>
+            <a:fontRef idx="minor">
+              <a:schemeClr val="dk1"/>
+            </a:fontRef>
+          </p:style>
+          <p:txBody>
+            <a:bodyPr rtlCol="0" anchor="ctr"/>
+            <a:lstStyle/>
+            <a:p>
+              <a:pPr algn="ctr"/>
+              <a:endParaRPr lang="en-GB"/>
+            </a:p>
+          </p:txBody>
+        </p:sp>
+        <p:cxnSp>
+          <p:nvCxnSpPr>
+            <p:cNvPr id="24" name="Straight Connector 23">
+              <a:extLst>
+                <a:ext uri="{FF2B5EF4-FFF2-40B4-BE49-F238E27FC236}">
+                  <a16:creationId xmlns:a16="http://schemas.microsoft.com/office/drawing/2014/main" id="{F41E73E1-1D97-4E4E-9793-46362CDFDEF7}"/>
+                </a:ext>
+              </a:extLst>
+            </p:cNvPr>
+            <p:cNvCxnSpPr>
+              <a:stCxn id="23" idx="1"/>
+              <a:endCxn id="23" idx="5"/>
+            </p:cNvCxnSpPr>
+            <p:nvPr/>
+          </p:nvCxnSpPr>
+          <p:spPr>
+            <a:xfrm>
+              <a:off x="7303402" y="2519106"/>
+              <a:ext cx="402939" cy="421681"/>
+            </a:xfrm>
+            <a:prstGeom prst="line">
+              <a:avLst/>
+            </a:prstGeom>
+          </p:spPr>
+          <p:style>
+            <a:lnRef idx="2">
+              <a:schemeClr val="dk1"/>
+            </a:lnRef>
+            <a:fillRef idx="1">
+              <a:schemeClr val="lt1"/>
+            </a:fillRef>
+            <a:effectRef idx="0">
+              <a:schemeClr val="dk1"/>
+            </a:effectRef>
+            <a:fontRef idx="minor">
+              <a:schemeClr val="dk1"/>
+            </a:fontRef>
+          </p:style>
+        </p:cxnSp>
+        <p:cxnSp>
+          <p:nvCxnSpPr>
+            <p:cNvPr id="25" name="Straight Connector 24">
+              <a:extLst>
+                <a:ext uri="{FF2B5EF4-FFF2-40B4-BE49-F238E27FC236}">
+                  <a16:creationId xmlns:a16="http://schemas.microsoft.com/office/drawing/2014/main" id="{483BDC05-04A1-4230-9A56-6F33313ADF8E}"/>
+                </a:ext>
+              </a:extLst>
+            </p:cNvPr>
+            <p:cNvCxnSpPr>
+              <a:stCxn id="23" idx="3"/>
+              <a:endCxn id="23" idx="7"/>
+            </p:cNvCxnSpPr>
+            <p:nvPr/>
+          </p:nvCxnSpPr>
+          <p:spPr>
+            <a:xfrm flipV="1">
+              <a:off x="7303402" y="2519106"/>
+              <a:ext cx="402939" cy="421681"/>
+            </a:xfrm>
+            <a:prstGeom prst="line">
+              <a:avLst/>
+            </a:prstGeom>
+          </p:spPr>
+          <p:style>
+            <a:lnRef idx="2">
+              <a:schemeClr val="dk1"/>
+            </a:lnRef>
+            <a:fillRef idx="1">
+              <a:schemeClr val="lt1"/>
+            </a:fillRef>
+            <a:effectRef idx="0">
+              <a:schemeClr val="dk1"/>
+            </a:effectRef>
+            <a:fontRef idx="minor">
+              <a:schemeClr val="dk1"/>
+            </a:fontRef>
+          </p:style>
+        </p:cxnSp>
+        <p:sp>
+          <p:nvSpPr>
+            <p:cNvPr id="27" name="TextBox 26">
+              <a:extLst>
+                <a:ext uri="{FF2B5EF4-FFF2-40B4-BE49-F238E27FC236}">
+                  <a16:creationId xmlns:a16="http://schemas.microsoft.com/office/drawing/2014/main" id="{E850286B-3AD4-4578-851E-BDE15E63E787}"/>
+                </a:ext>
+              </a:extLst>
+            </p:cNvPr>
+            <p:cNvSpPr txBox="1"/>
+            <p:nvPr/>
+          </p:nvSpPr>
+          <p:spPr>
+            <a:xfrm>
+              <a:off x="7188352" y="2519106"/>
+              <a:ext cx="300082" cy="369332"/>
+            </a:xfrm>
+            <a:prstGeom prst="rect">
+              <a:avLst/>
+            </a:prstGeom>
+            <a:noFill/>
+          </p:spPr>
+          <p:txBody>
+            <a:bodyPr wrap="none" rtlCol="0">
+              <a:spAutoFit/>
+            </a:bodyPr>
+            <a:lstStyle/>
+            <a:p>
+              <a:r>
+                <a:rPr lang="en-GB" dirty="0"/>
+                <a:t>+</a:t>
+              </a:r>
+            </a:p>
+          </p:txBody>
+        </p:sp>
+        <p:sp>
+          <p:nvSpPr>
+            <p:cNvPr id="28" name="TextBox 27">
+              <a:extLst>
+                <a:ext uri="{FF2B5EF4-FFF2-40B4-BE49-F238E27FC236}">
+                  <a16:creationId xmlns:a16="http://schemas.microsoft.com/office/drawing/2014/main" id="{62252297-EF37-4247-AD05-245F00ECA590}"/>
+                </a:ext>
+              </a:extLst>
+            </p:cNvPr>
+            <p:cNvSpPr txBox="1"/>
+            <p:nvPr/>
+          </p:nvSpPr>
+          <p:spPr>
+            <a:xfrm>
+              <a:off x="7377272" y="2728629"/>
+              <a:ext cx="255198" cy="369332"/>
+            </a:xfrm>
+            <a:prstGeom prst="rect">
+              <a:avLst/>
+            </a:prstGeom>
+            <a:noFill/>
+          </p:spPr>
+          <p:txBody>
+            <a:bodyPr wrap="none" rtlCol="0">
+              <a:spAutoFit/>
+            </a:bodyPr>
+            <a:lstStyle/>
+            <a:p>
+              <a:r>
+                <a:rPr lang="en-GB" dirty="0"/>
+                <a:t>-</a:t>
+              </a:r>
+            </a:p>
+          </p:txBody>
+        </p:sp>
+      </p:grpSp>
+      <p:cxnSp>
+        <p:nvCxnSpPr>
+          <p:cNvPr id="30" name="Straight Arrow Connector 29">
+            <a:extLst>
+              <a:ext uri="{FF2B5EF4-FFF2-40B4-BE49-F238E27FC236}">
+                <a16:creationId xmlns:a16="http://schemas.microsoft.com/office/drawing/2014/main" id="{0C310FBF-7879-496C-A880-866E8EC92DA2}"/>
+              </a:ext>
+            </a:extLst>
+          </p:cNvPr>
+          <p:cNvCxnSpPr>
+            <a:stCxn id="7" idx="3"/>
+            <a:endCxn id="23" idx="2"/>
+          </p:cNvCxnSpPr>
+          <p:nvPr/>
+        </p:nvCxnSpPr>
+        <p:spPr>
+          <a:xfrm>
+            <a:off x="6573693" y="2729947"/>
+            <a:ext cx="615000" cy="0"/>
+          </a:xfrm>
+          <a:prstGeom prst="straightConnector1">
+            <a:avLst/>
+          </a:prstGeom>
+          <a:ln>
+            <a:tailEnd type="triangle"/>
+          </a:ln>
+        </p:spPr>
+        <p:style>
+          <a:lnRef idx="1">
+            <a:schemeClr val="dk1"/>
+          </a:lnRef>
+          <a:fillRef idx="0">
+            <a:schemeClr val="dk1"/>
+          </a:fillRef>
+          <a:effectRef idx="0">
+            <a:schemeClr val="dk1"/>
+          </a:effectRef>
+          <a:fontRef idx="minor">
+            <a:schemeClr val="tx1"/>
+          </a:fontRef>
+        </p:style>
+      </p:cxnSp>
+      <p:cxnSp>
+        <p:nvCxnSpPr>
+          <p:cNvPr id="32" name="Straight Arrow Connector 31">
+            <a:extLst>
+              <a:ext uri="{FF2B5EF4-FFF2-40B4-BE49-F238E27FC236}">
+                <a16:creationId xmlns:a16="http://schemas.microsoft.com/office/drawing/2014/main" id="{E3C0261F-7FF9-4F7C-835F-625FD03E7B36}"/>
+              </a:ext>
+            </a:extLst>
+          </p:cNvPr>
+          <p:cNvCxnSpPr>
+            <a:stCxn id="23" idx="6"/>
+            <a:endCxn id="8" idx="1"/>
+          </p:cNvCxnSpPr>
+          <p:nvPr/>
+        </p:nvCxnSpPr>
+        <p:spPr>
+          <a:xfrm>
+            <a:off x="7758536" y="2729947"/>
+            <a:ext cx="583402" cy="0"/>
+          </a:xfrm>
+          <a:prstGeom prst="straightConnector1">
+            <a:avLst/>
+          </a:prstGeom>
+          <a:ln>
+            <a:tailEnd type="triangle"/>
+          </a:ln>
+        </p:spPr>
+        <p:style>
+          <a:lnRef idx="1">
+            <a:schemeClr val="dk1"/>
+          </a:lnRef>
+          <a:fillRef idx="0">
+            <a:schemeClr val="dk1"/>
+          </a:fillRef>
+          <a:effectRef idx="0">
+            <a:schemeClr val="dk1"/>
+          </a:effectRef>
+          <a:fontRef idx="minor">
+            <a:schemeClr val="tx1"/>
+          </a:fontRef>
+        </p:style>
+      </p:cxnSp>
+      <p:cxnSp>
+        <p:nvCxnSpPr>
+          <p:cNvPr id="34" name="Straight Arrow Connector 33">
+            <a:extLst>
+              <a:ext uri="{FF2B5EF4-FFF2-40B4-BE49-F238E27FC236}">
+                <a16:creationId xmlns:a16="http://schemas.microsoft.com/office/drawing/2014/main" id="{A72B27B9-4719-4C48-98BD-8FF6C2352F92}"/>
+              </a:ext>
+            </a:extLst>
+          </p:cNvPr>
+          <p:cNvCxnSpPr>
+            <a:cxnSpLocks/>
+            <a:endCxn id="23" idx="4"/>
+          </p:cNvCxnSpPr>
+          <p:nvPr/>
+        </p:nvCxnSpPr>
+        <p:spPr>
+          <a:xfrm flipV="1">
+            <a:off x="7473615" y="3028120"/>
+            <a:ext cx="0" cy="889094"/>
+          </a:xfrm>
+          <a:prstGeom prst="straightConnector1">
+            <a:avLst/>
+          </a:prstGeom>
+          <a:ln>
+            <a:tailEnd type="triangle"/>
+          </a:ln>
+        </p:spPr>
+        <p:style>
+          <a:lnRef idx="1">
+            <a:schemeClr val="dk1"/>
+          </a:lnRef>
+          <a:fillRef idx="0">
+            <a:schemeClr val="dk1"/>
+          </a:fillRef>
+          <a:effectRef idx="0">
+            <a:schemeClr val="dk1"/>
+          </a:effectRef>
+          <a:fontRef idx="minor">
+            <a:schemeClr val="tx1"/>
+          </a:fontRef>
+        </p:style>
+      </p:cxnSp>
+      <p:cxnSp>
+        <p:nvCxnSpPr>
+          <p:cNvPr id="39" name="Straight Connector 38">
+            <a:extLst>
+              <a:ext uri="{FF2B5EF4-FFF2-40B4-BE49-F238E27FC236}">
+                <a16:creationId xmlns:a16="http://schemas.microsoft.com/office/drawing/2014/main" id="{569FFCB3-951A-435C-9784-713A8193D26E}"/>
+              </a:ext>
+            </a:extLst>
+          </p:cNvPr>
+          <p:cNvCxnSpPr/>
+          <p:nvPr/>
+        </p:nvCxnSpPr>
+        <p:spPr>
+          <a:xfrm>
+            <a:off x="11231218" y="2940787"/>
+            <a:ext cx="470452" cy="0"/>
+          </a:xfrm>
+          <a:prstGeom prst="line">
+            <a:avLst/>
+          </a:prstGeom>
+        </p:spPr>
+        <p:style>
+          <a:lnRef idx="1">
+            <a:schemeClr val="dk1"/>
+          </a:lnRef>
+          <a:fillRef idx="0">
+            <a:schemeClr val="dk1"/>
+          </a:fillRef>
+          <a:effectRef idx="0">
+            <a:schemeClr val="dk1"/>
+          </a:effectRef>
+          <a:fontRef idx="minor">
+            <a:schemeClr val="tx1"/>
+          </a:fontRef>
+        </p:style>
+      </p:cxnSp>
+      <p:cxnSp>
+        <p:nvCxnSpPr>
+          <p:cNvPr id="41" name="Connector: Elbow 40">
+            <a:extLst>
+              <a:ext uri="{FF2B5EF4-FFF2-40B4-BE49-F238E27FC236}">
+                <a16:creationId xmlns:a16="http://schemas.microsoft.com/office/drawing/2014/main" id="{1397F2C5-35A9-4B43-9A08-BA78268F43A5}"/>
+              </a:ext>
+            </a:extLst>
+          </p:cNvPr>
+          <p:cNvCxnSpPr/>
+          <p:nvPr/>
+        </p:nvCxnSpPr>
+        <p:spPr>
+          <a:xfrm rot="10800000" flipV="1">
+            <a:off x="7457178" y="2940786"/>
+            <a:ext cx="4244493" cy="976427"/>
+          </a:xfrm>
+          <a:prstGeom prst="bentConnector3">
+            <a:avLst>
+              <a:gd name="adj1" fmla="val -267"/>
+            </a:avLst>
+          </a:prstGeom>
+        </p:spPr>
+        <p:style>
+          <a:lnRef idx="1">
+            <a:schemeClr val="dk1"/>
+          </a:lnRef>
+          <a:fillRef idx="0">
+            <a:schemeClr val="dk1"/>
+          </a:fillRef>
+          <a:effectRef idx="0">
+            <a:schemeClr val="dk1"/>
+          </a:effectRef>
+          <a:fontRef idx="minor">
+            <a:schemeClr val="tx1"/>
+          </a:fontRef>
+        </p:style>
+      </p:cxnSp>
+      <p:cxnSp>
+        <p:nvCxnSpPr>
+          <p:cNvPr id="44" name="Straight Arrow Connector 43">
+            <a:extLst>
+              <a:ext uri="{FF2B5EF4-FFF2-40B4-BE49-F238E27FC236}">
+                <a16:creationId xmlns:a16="http://schemas.microsoft.com/office/drawing/2014/main" id="{51D1E6E4-5677-45C7-BF74-3E0C9E4DD540}"/>
+              </a:ext>
+            </a:extLst>
+          </p:cNvPr>
+          <p:cNvCxnSpPr>
+            <a:endCxn id="5" idx="2"/>
+          </p:cNvCxnSpPr>
+          <p:nvPr/>
+        </p:nvCxnSpPr>
+        <p:spPr>
+          <a:xfrm flipV="1">
+            <a:off x="2385391" y="3220278"/>
+            <a:ext cx="1" cy="1736035"/>
+          </a:xfrm>
+          <a:prstGeom prst="straightConnector1">
+            <a:avLst/>
+          </a:prstGeom>
+          <a:ln>
+            <a:tailEnd type="triangle"/>
+          </a:ln>
+        </p:spPr>
+        <p:style>
+          <a:lnRef idx="1">
+            <a:schemeClr val="dk1"/>
+          </a:lnRef>
+          <a:fillRef idx="0">
+            <a:schemeClr val="dk1"/>
+          </a:fillRef>
+          <a:effectRef idx="0">
+            <a:schemeClr val="dk1"/>
+          </a:effectRef>
+          <a:fontRef idx="minor">
+            <a:schemeClr val="tx1"/>
+          </a:fontRef>
+        </p:style>
+      </p:cxnSp>
+      <p:cxnSp>
+        <p:nvCxnSpPr>
+          <p:cNvPr id="46" name="Straight Connector 45">
+            <a:extLst>
+              <a:ext uri="{FF2B5EF4-FFF2-40B4-BE49-F238E27FC236}">
+                <a16:creationId xmlns:a16="http://schemas.microsoft.com/office/drawing/2014/main" id="{893885B6-FDC8-4B16-AF02-F5BCEB7883A7}"/>
+              </a:ext>
+            </a:extLst>
+          </p:cNvPr>
+          <p:cNvCxnSpPr>
+            <a:stCxn id="9" idx="3"/>
+          </p:cNvCxnSpPr>
+          <p:nvPr/>
+        </p:nvCxnSpPr>
+        <p:spPr>
+          <a:xfrm flipV="1">
+            <a:off x="11231218" y="2728629"/>
+            <a:ext cx="695739" cy="1318"/>
+          </a:xfrm>
+          <a:prstGeom prst="line">
+            <a:avLst/>
+          </a:prstGeom>
+        </p:spPr>
+        <p:style>
+          <a:lnRef idx="1">
+            <a:schemeClr val="dk1"/>
+          </a:lnRef>
+          <a:fillRef idx="0">
+            <a:schemeClr val="dk1"/>
+          </a:fillRef>
+          <a:effectRef idx="0">
+            <a:schemeClr val="dk1"/>
+          </a:effectRef>
+          <a:fontRef idx="minor">
+            <a:schemeClr val="tx1"/>
+          </a:fontRef>
+        </p:style>
+      </p:cxnSp>
+      <p:cxnSp>
+        <p:nvCxnSpPr>
+          <p:cNvPr id="48" name="Connector: Elbow 47">
+            <a:extLst>
+              <a:ext uri="{FF2B5EF4-FFF2-40B4-BE49-F238E27FC236}">
+                <a16:creationId xmlns:a16="http://schemas.microsoft.com/office/drawing/2014/main" id="{96D0834C-BD65-443B-9C9B-F42281C03AFB}"/>
+              </a:ext>
+            </a:extLst>
+          </p:cNvPr>
+          <p:cNvCxnSpPr>
+            <a:cxnSpLocks/>
+          </p:cNvCxnSpPr>
+          <p:nvPr/>
+        </p:nvCxnSpPr>
+        <p:spPr>
+          <a:xfrm rot="10800000" flipV="1">
+            <a:off x="2366979" y="2728629"/>
+            <a:ext cx="9559978" cy="2227684"/>
+          </a:xfrm>
+          <a:prstGeom prst="bentConnector3">
+            <a:avLst>
+              <a:gd name="adj1" fmla="val -181"/>
+            </a:avLst>
+          </a:prstGeom>
+        </p:spPr>
+        <p:style>
+          <a:lnRef idx="1">
+            <a:schemeClr val="dk1"/>
+          </a:lnRef>
+          <a:fillRef idx="0">
+            <a:schemeClr val="dk1"/>
+          </a:fillRef>
+          <a:effectRef idx="0">
+            <a:schemeClr val="dk1"/>
+          </a:effectRef>
+          <a:fontRef idx="minor">
+            <a:schemeClr val="tx1"/>
+          </a:fontRef>
+        </p:style>
+      </p:cxnSp>
+      <p:cxnSp>
+        <p:nvCxnSpPr>
+          <p:cNvPr id="53" name="Straight Arrow Connector 52">
+            <a:extLst>
+              <a:ext uri="{FF2B5EF4-FFF2-40B4-BE49-F238E27FC236}">
+                <a16:creationId xmlns:a16="http://schemas.microsoft.com/office/drawing/2014/main" id="{DB8479F3-D5FF-41F3-80DC-580827622B2A}"/>
+              </a:ext>
+            </a:extLst>
+          </p:cNvPr>
+          <p:cNvCxnSpPr/>
+          <p:nvPr/>
+        </p:nvCxnSpPr>
+        <p:spPr>
+          <a:xfrm>
+            <a:off x="11231218" y="2431773"/>
+            <a:ext cx="695739" cy="0"/>
+          </a:xfrm>
+          <a:prstGeom prst="straightConnector1">
+            <a:avLst/>
+          </a:prstGeom>
+          <a:ln>
+            <a:tailEnd type="triangle"/>
+          </a:ln>
+        </p:spPr>
+        <p:style>
+          <a:lnRef idx="1">
+            <a:schemeClr val="dk1"/>
+          </a:lnRef>
+          <a:fillRef idx="0">
+            <a:schemeClr val="dk1"/>
+          </a:fillRef>
+          <a:effectRef idx="0">
+            <a:schemeClr val="dk1"/>
+          </a:effectRef>
+          <a:fontRef idx="minor">
+            <a:schemeClr val="tx1"/>
+          </a:fontRef>
+        </p:style>
+      </p:cxnSp>
+      <p:sp>
+        <p:nvSpPr>
+          <p:cNvPr id="54" name="TextBox 53">
+            <a:extLst>
+              <a:ext uri="{FF2B5EF4-FFF2-40B4-BE49-F238E27FC236}">
+                <a16:creationId xmlns:a16="http://schemas.microsoft.com/office/drawing/2014/main" id="{FE44ABD9-A591-4204-BA43-61FEA1AA59C4}"/>
+              </a:ext>
+            </a:extLst>
+          </p:cNvPr>
+          <p:cNvSpPr txBox="1"/>
+          <p:nvPr/>
+        </p:nvSpPr>
+        <p:spPr>
+          <a:xfrm>
+            <a:off x="11466444" y="2114790"/>
+            <a:ext cx="357983" cy="369332"/>
+          </a:xfrm>
+          <a:prstGeom prst="rect">
+            <a:avLst/>
+          </a:prstGeom>
+          <a:noFill/>
+        </p:spPr>
+        <p:txBody>
+          <a:bodyPr wrap="none" rtlCol="0">
+            <a:spAutoFit/>
+          </a:bodyPr>
+          <a:lstStyle/>
+          <a:p>
+            <a:r>
+              <a:rPr lang="en-GB" dirty="0"/>
+              <a:t>F</a:t>
+            </a:r>
+            <a:r>
+              <a:rPr lang="en-GB" baseline="-25000" dirty="0"/>
+              <a:t>a</a:t>
+            </a:r>
+          </a:p>
+        </p:txBody>
+      </p:sp>
+      <p:sp>
+        <p:nvSpPr>
+          <p:cNvPr id="55" name="TextBox 54">
+            <a:extLst>
+              <a:ext uri="{FF2B5EF4-FFF2-40B4-BE49-F238E27FC236}">
+                <a16:creationId xmlns:a16="http://schemas.microsoft.com/office/drawing/2014/main" id="{EEDC645B-4BC8-44E1-AF4B-DFE1C972B5E8}"/>
+              </a:ext>
+            </a:extLst>
+          </p:cNvPr>
+          <p:cNvSpPr txBox="1"/>
+          <p:nvPr/>
+        </p:nvSpPr>
+        <p:spPr>
+          <a:xfrm>
+            <a:off x="7457177" y="3217640"/>
+            <a:ext cx="237566" cy="369332"/>
+          </a:xfrm>
+          <a:prstGeom prst="rect">
+            <a:avLst/>
+          </a:prstGeom>
+          <a:noFill/>
+        </p:spPr>
+        <p:txBody>
+          <a:bodyPr wrap="none" rtlCol="0">
+            <a:spAutoFit/>
+          </a:bodyPr>
+          <a:lstStyle/>
+          <a:p>
+            <a:r>
+              <a:rPr lang="en-GB" dirty="0"/>
+              <a:t>i</a:t>
+            </a:r>
+          </a:p>
+        </p:txBody>
+      </p:sp>
+      <p:sp>
+        <p:nvSpPr>
+          <p:cNvPr id="56" name="TextBox 55">
+            <a:extLst>
+              <a:ext uri="{FF2B5EF4-FFF2-40B4-BE49-F238E27FC236}">
+                <a16:creationId xmlns:a16="http://schemas.microsoft.com/office/drawing/2014/main" id="{7676083D-294C-4D6B-A38E-1077E968F5C4}"/>
+              </a:ext>
+            </a:extLst>
+          </p:cNvPr>
+          <p:cNvSpPr txBox="1"/>
+          <p:nvPr/>
+        </p:nvSpPr>
+        <p:spPr>
+          <a:xfrm>
+            <a:off x="6685576" y="2359295"/>
+            <a:ext cx="317716" cy="369332"/>
+          </a:xfrm>
+          <a:prstGeom prst="rect">
+            <a:avLst/>
+          </a:prstGeom>
+          <a:noFill/>
+        </p:spPr>
+        <p:txBody>
+          <a:bodyPr wrap="none" rtlCol="0">
+            <a:spAutoFit/>
+          </a:bodyPr>
+          <a:lstStyle/>
+          <a:p>
+            <a:r>
+              <a:rPr lang="en-GB" dirty="0"/>
+              <a:t>i</a:t>
+            </a:r>
+            <a:r>
+              <a:rPr lang="en-GB" baseline="-25000" dirty="0"/>
+              <a:t>d</a:t>
+            </a:r>
+          </a:p>
+        </p:txBody>
+      </p:sp>
+      <p:sp>
+        <p:nvSpPr>
+          <p:cNvPr id="57" name="TextBox 56">
+            <a:extLst>
+              <a:ext uri="{FF2B5EF4-FFF2-40B4-BE49-F238E27FC236}">
+                <a16:creationId xmlns:a16="http://schemas.microsoft.com/office/drawing/2014/main" id="{3B1FA2DD-B6C7-49B0-9B80-8ECFC640B512}"/>
+              </a:ext>
+            </a:extLst>
+          </p:cNvPr>
+          <p:cNvSpPr txBox="1"/>
+          <p:nvPr/>
+        </p:nvSpPr>
+        <p:spPr>
+          <a:xfrm>
+            <a:off x="7870103" y="2359295"/>
+            <a:ext cx="314510" cy="369332"/>
+          </a:xfrm>
+          <a:prstGeom prst="rect">
+            <a:avLst/>
+          </a:prstGeom>
+          <a:noFill/>
+        </p:spPr>
+        <p:txBody>
+          <a:bodyPr wrap="none" rtlCol="0">
+            <a:spAutoFit/>
+          </a:bodyPr>
+          <a:lstStyle/>
+          <a:p>
+            <a:r>
+              <a:rPr lang="en-GB" dirty="0"/>
+              <a:t>i</a:t>
+            </a:r>
+            <a:r>
+              <a:rPr lang="en-GB" baseline="-25000" dirty="0"/>
+              <a:t>e</a:t>
+            </a:r>
+          </a:p>
+        </p:txBody>
+      </p:sp>
+      <p:sp>
+        <p:nvSpPr>
+          <p:cNvPr id="58" name="TextBox 57">
+            <a:extLst>
+              <a:ext uri="{FF2B5EF4-FFF2-40B4-BE49-F238E27FC236}">
+                <a16:creationId xmlns:a16="http://schemas.microsoft.com/office/drawing/2014/main" id="{D1B1781E-21C0-436A-A258-577684EC6CD6}"/>
+              </a:ext>
+            </a:extLst>
+          </p:cNvPr>
+          <p:cNvSpPr txBox="1"/>
+          <p:nvPr/>
+        </p:nvSpPr>
+        <p:spPr>
+          <a:xfrm>
+            <a:off x="4912970" y="2358637"/>
+            <a:ext cx="368371" cy="369332"/>
+          </a:xfrm>
+          <a:prstGeom prst="rect">
+            <a:avLst/>
+          </a:prstGeom>
+          <a:noFill/>
+        </p:spPr>
+        <p:txBody>
+          <a:bodyPr wrap="none" rtlCol="0">
+            <a:spAutoFit/>
+          </a:bodyPr>
+          <a:lstStyle/>
+          <a:p>
+            <a:r>
+              <a:rPr lang="en-GB" dirty="0"/>
+              <a:t>F</a:t>
+            </a:r>
+            <a:r>
+              <a:rPr lang="en-GB" baseline="-25000" dirty="0"/>
+              <a:t>d</a:t>
+            </a:r>
+          </a:p>
+        </p:txBody>
+      </p:sp>
+      <p:sp>
+        <p:nvSpPr>
+          <p:cNvPr id="59" name="TextBox 58">
+            <a:extLst>
+              <a:ext uri="{FF2B5EF4-FFF2-40B4-BE49-F238E27FC236}">
+                <a16:creationId xmlns:a16="http://schemas.microsoft.com/office/drawing/2014/main" id="{6268F7A5-9506-420D-9E42-A9D245A7C924}"/>
+              </a:ext>
+            </a:extLst>
+          </p:cNvPr>
+          <p:cNvSpPr txBox="1"/>
+          <p:nvPr/>
+        </p:nvSpPr>
+        <p:spPr>
+          <a:xfrm>
+            <a:off x="3193433" y="2358637"/>
+            <a:ext cx="394660" cy="369332"/>
+          </a:xfrm>
+          <a:prstGeom prst="rect">
+            <a:avLst/>
+          </a:prstGeom>
+          <a:noFill/>
+        </p:spPr>
+        <p:txBody>
+          <a:bodyPr wrap="none" rtlCol="0">
+            <a:spAutoFit/>
+          </a:bodyPr>
+          <a:lstStyle/>
+          <a:p>
+            <a:r>
+              <a:rPr lang="el-GR" dirty="0"/>
+              <a:t>Δ</a:t>
+            </a:r>
+            <a:r>
+              <a:rPr lang="en-GB" dirty="0"/>
+              <a:t>r</a:t>
+            </a:r>
+          </a:p>
+        </p:txBody>
+      </p:sp>
+      <p:sp>
+        <p:nvSpPr>
+          <p:cNvPr id="60" name="TextBox 59">
+            <a:extLst>
+              <a:ext uri="{FF2B5EF4-FFF2-40B4-BE49-F238E27FC236}">
+                <a16:creationId xmlns:a16="http://schemas.microsoft.com/office/drawing/2014/main" id="{8FA97812-5606-479D-B38B-55ABDA1FD3EC}"/>
+              </a:ext>
+            </a:extLst>
+          </p:cNvPr>
+          <p:cNvSpPr txBox="1"/>
+          <p:nvPr/>
+        </p:nvSpPr>
+        <p:spPr>
+          <a:xfrm>
+            <a:off x="2620862" y="4644966"/>
+            <a:ext cx="1282210" cy="369332"/>
+          </a:xfrm>
+          <a:prstGeom prst="rect">
+            <a:avLst/>
+          </a:prstGeom>
+          <a:noFill/>
+        </p:spPr>
+        <p:txBody>
+          <a:bodyPr wrap="none" rtlCol="0">
+            <a:spAutoFit/>
+          </a:bodyPr>
+          <a:lstStyle/>
+          <a:p>
+            <a:r>
+              <a:rPr lang="en-GB" dirty="0"/>
+              <a:t>Joint angles</a:t>
+            </a:r>
+          </a:p>
+        </p:txBody>
+      </p:sp>
+      <p:sp>
+        <p:nvSpPr>
+          <p:cNvPr id="61" name="TextBox 60">
+            <a:extLst>
+              <a:ext uri="{FF2B5EF4-FFF2-40B4-BE49-F238E27FC236}">
+                <a16:creationId xmlns:a16="http://schemas.microsoft.com/office/drawing/2014/main" id="{AA54C6AD-4E04-4C04-A301-F6B5B2F41175}"/>
+              </a:ext>
+            </a:extLst>
+          </p:cNvPr>
+          <p:cNvSpPr txBox="1"/>
+          <p:nvPr/>
+        </p:nvSpPr>
+        <p:spPr>
+          <a:xfrm>
+            <a:off x="247969" y="2127793"/>
+            <a:ext cx="1373646" cy="646331"/>
+          </a:xfrm>
+          <a:prstGeom prst="rect">
+            <a:avLst/>
+          </a:prstGeom>
+          <a:noFill/>
+        </p:spPr>
+        <p:txBody>
+          <a:bodyPr wrap="none" rtlCol="0">
+            <a:spAutoFit/>
+          </a:bodyPr>
+          <a:lstStyle/>
+          <a:p>
+            <a:r>
+              <a:rPr lang="en-GB" dirty="0"/>
+              <a:t>End Effector</a:t>
+            </a:r>
+          </a:p>
+          <a:p>
+            <a:r>
+              <a:rPr lang="en-GB" dirty="0"/>
+              <a:t>Desired Path</a:t>
+            </a:r>
+          </a:p>
+        </p:txBody>
+      </p:sp>
+    </p:spTree>
+    <p:extLst>
+      <p:ext uri="{BB962C8B-B14F-4D97-AF65-F5344CB8AC3E}">
+        <p14:creationId xmlns:p14="http://schemas.microsoft.com/office/powerpoint/2010/main" val="3648516875"/>
       </p:ext>
     </p:extLst>
   </p:cSld>
@@ -19244,8 +21478,8 @@
             </a:p>
           </p:txBody>
         </p:sp>
-        <mc:AlternateContent xmlns:mc="http://schemas.openxmlformats.org/markup-compatibility/2006">
-          <mc:Choice xmlns:a14="http://schemas.microsoft.com/office/drawing/2010/main" Requires="a14">
+        <mc:AlternateContent xmlns:mc="http://schemas.openxmlformats.org/markup-compatibility/2006" xmlns:a14="http://schemas.microsoft.com/office/drawing/2010/main">
+          <mc:Choice Requires="a14">
             <p:sp>
               <p:nvSpPr>
                 <p:cNvPr id="44" name="Rectangle 43">
@@ -19325,7 +21559,7 @@
               </p:txBody>
             </p:sp>
           </mc:Choice>
-          <mc:Fallback>
+          <mc:Fallback xmlns="">
             <p:sp>
               <p:nvSpPr>
                 <p:cNvPr id="44" name="Rectangle 43">
@@ -19370,8 +21604,8 @@
             </p:sp>
           </mc:Fallback>
         </mc:AlternateContent>
-        <mc:AlternateContent xmlns:mc="http://schemas.openxmlformats.org/markup-compatibility/2006">
-          <mc:Choice xmlns:a14="http://schemas.microsoft.com/office/drawing/2010/main" Requires="a14">
+        <mc:AlternateContent xmlns:mc="http://schemas.openxmlformats.org/markup-compatibility/2006" xmlns:a14="http://schemas.microsoft.com/office/drawing/2010/main">
+          <mc:Choice Requires="a14">
             <p:sp>
               <p:nvSpPr>
                 <p:cNvPr id="46" name="Rectangle 45">
@@ -19432,7 +21666,7 @@
               </p:txBody>
             </p:sp>
           </mc:Choice>
-          <mc:Fallback>
+          <mc:Fallback xmlns="">
             <p:sp>
               <p:nvSpPr>
                 <p:cNvPr id="46" name="Rectangle 45">

</xml_diff>

<commit_message>
significant tidying up and rearchitectures of mypam new. Lots of documentation completed
Did a lot of tidying. reorganised folders. lots of work completed.
</commit_message>
<xml_diff>
--- a/Modelling/MyPAM Modelling.pptx
+++ b/Modelling/MyPAM Modelling.pptx
@@ -283,7 +283,7 @@
           <a:p>
             <a:fld id="{4DCC3765-A771-4BBA-8135-6F2E689117A7}" type="datetimeFigureOut">
               <a:rPr lang="en-GB" smtClean="0"/>
-              <a:t>28/05/2019</a:t>
+              <a:t>01/07/2019</a:t>
             </a:fld>
             <a:endParaRPr lang="en-GB"/>
           </a:p>
@@ -483,7 +483,7 @@
           <a:p>
             <a:fld id="{4DCC3765-A771-4BBA-8135-6F2E689117A7}" type="datetimeFigureOut">
               <a:rPr lang="en-GB" smtClean="0"/>
-              <a:t>28/05/2019</a:t>
+              <a:t>01/07/2019</a:t>
             </a:fld>
             <a:endParaRPr lang="en-GB"/>
           </a:p>
@@ -693,7 +693,7 @@
           <a:p>
             <a:fld id="{4DCC3765-A771-4BBA-8135-6F2E689117A7}" type="datetimeFigureOut">
               <a:rPr lang="en-GB" smtClean="0"/>
-              <a:t>28/05/2019</a:t>
+              <a:t>01/07/2019</a:t>
             </a:fld>
             <a:endParaRPr lang="en-GB"/>
           </a:p>
@@ -893,7 +893,7 @@
           <a:p>
             <a:fld id="{4DCC3765-A771-4BBA-8135-6F2E689117A7}" type="datetimeFigureOut">
               <a:rPr lang="en-GB" smtClean="0"/>
-              <a:t>28/05/2019</a:t>
+              <a:t>01/07/2019</a:t>
             </a:fld>
             <a:endParaRPr lang="en-GB"/>
           </a:p>
@@ -1169,7 +1169,7 @@
           <a:p>
             <a:fld id="{4DCC3765-A771-4BBA-8135-6F2E689117A7}" type="datetimeFigureOut">
               <a:rPr lang="en-GB" smtClean="0"/>
-              <a:t>28/05/2019</a:t>
+              <a:t>01/07/2019</a:t>
             </a:fld>
             <a:endParaRPr lang="en-GB"/>
           </a:p>
@@ -1437,7 +1437,7 @@
           <a:p>
             <a:fld id="{4DCC3765-A771-4BBA-8135-6F2E689117A7}" type="datetimeFigureOut">
               <a:rPr lang="en-GB" smtClean="0"/>
-              <a:t>28/05/2019</a:t>
+              <a:t>01/07/2019</a:t>
             </a:fld>
             <a:endParaRPr lang="en-GB"/>
           </a:p>
@@ -1852,7 +1852,7 @@
           <a:p>
             <a:fld id="{4DCC3765-A771-4BBA-8135-6F2E689117A7}" type="datetimeFigureOut">
               <a:rPr lang="en-GB" smtClean="0"/>
-              <a:t>28/05/2019</a:t>
+              <a:t>01/07/2019</a:t>
             </a:fld>
             <a:endParaRPr lang="en-GB"/>
           </a:p>
@@ -1994,7 +1994,7 @@
           <a:p>
             <a:fld id="{4DCC3765-A771-4BBA-8135-6F2E689117A7}" type="datetimeFigureOut">
               <a:rPr lang="en-GB" smtClean="0"/>
-              <a:t>28/05/2019</a:t>
+              <a:t>01/07/2019</a:t>
             </a:fld>
             <a:endParaRPr lang="en-GB"/>
           </a:p>
@@ -2107,7 +2107,7 @@
           <a:p>
             <a:fld id="{4DCC3765-A771-4BBA-8135-6F2E689117A7}" type="datetimeFigureOut">
               <a:rPr lang="en-GB" smtClean="0"/>
-              <a:t>28/05/2019</a:t>
+              <a:t>01/07/2019</a:t>
             </a:fld>
             <a:endParaRPr lang="en-GB"/>
           </a:p>
@@ -2420,7 +2420,7 @@
           <a:p>
             <a:fld id="{4DCC3765-A771-4BBA-8135-6F2E689117A7}" type="datetimeFigureOut">
               <a:rPr lang="en-GB" smtClean="0"/>
-              <a:t>28/05/2019</a:t>
+              <a:t>01/07/2019</a:t>
             </a:fld>
             <a:endParaRPr lang="en-GB"/>
           </a:p>
@@ -2709,7 +2709,7 @@
           <a:p>
             <a:fld id="{4DCC3765-A771-4BBA-8135-6F2E689117A7}" type="datetimeFigureOut">
               <a:rPr lang="en-GB" smtClean="0"/>
-              <a:t>28/05/2019</a:t>
+              <a:t>01/07/2019</a:t>
             </a:fld>
             <a:endParaRPr lang="en-GB"/>
           </a:p>
@@ -2952,7 +2952,7 @@
           <a:p>
             <a:fld id="{4DCC3765-A771-4BBA-8135-6F2E689117A7}" type="datetimeFigureOut">
               <a:rPr lang="en-GB" smtClean="0"/>
-              <a:t>28/05/2019</a:t>
+              <a:t>01/07/2019</a:t>
             </a:fld>
             <a:endParaRPr lang="en-GB"/>
           </a:p>
@@ -7084,348 +7084,12 @@
           <a:chExt cx="0" cy="0"/>
         </a:xfrm>
       </p:grpSpPr>
-      <p:sp>
-        <p:nvSpPr>
-          <p:cNvPr id="6" name="Oval 5">
-            <a:extLst>
-              <a:ext uri="{FF2B5EF4-FFF2-40B4-BE49-F238E27FC236}">
-                <a16:creationId xmlns:a16="http://schemas.microsoft.com/office/drawing/2014/main" id="{314EF023-421C-48F6-B5BB-312BEDC84247}"/>
-              </a:ext>
-            </a:extLst>
-          </p:cNvPr>
-          <p:cNvSpPr/>
-          <p:nvPr/>
-        </p:nvSpPr>
-        <p:spPr>
-          <a:xfrm>
-            <a:off x="3683663" y="3461235"/>
-            <a:ext cx="569843" cy="596347"/>
-          </a:xfrm>
-          <a:prstGeom prst="ellipse">
-            <a:avLst/>
-          </a:prstGeom>
-          <a:ln w="28575"/>
-        </p:spPr>
-        <p:style>
-          <a:lnRef idx="2">
-            <a:schemeClr val="dk1"/>
-          </a:lnRef>
-          <a:fillRef idx="1">
-            <a:schemeClr val="lt1"/>
-          </a:fillRef>
-          <a:effectRef idx="0">
-            <a:schemeClr val="dk1"/>
-          </a:effectRef>
-          <a:fontRef idx="minor">
-            <a:schemeClr val="dk1"/>
-          </a:fontRef>
-        </p:style>
-        <p:txBody>
-          <a:bodyPr rtlCol="0" anchor="ctr"/>
-          <a:lstStyle/>
-          <a:p>
-            <a:pPr algn="ctr"/>
-            <a:endParaRPr lang="en-GB"/>
-          </a:p>
-        </p:txBody>
-      </p:sp>
-      <p:cxnSp>
-        <p:nvCxnSpPr>
-          <p:cNvPr id="7" name="Straight Connector 6">
-            <a:extLst>
-              <a:ext uri="{FF2B5EF4-FFF2-40B4-BE49-F238E27FC236}">
-                <a16:creationId xmlns:a16="http://schemas.microsoft.com/office/drawing/2014/main" id="{16441A50-B1C5-42ED-BEE9-5C6C524C02E3}"/>
-              </a:ext>
-            </a:extLst>
-          </p:cNvPr>
-          <p:cNvCxnSpPr>
-            <a:stCxn id="6" idx="1"/>
-            <a:endCxn id="6" idx="5"/>
-          </p:cNvCxnSpPr>
-          <p:nvPr/>
-        </p:nvCxnSpPr>
-        <p:spPr>
-          <a:xfrm>
-            <a:off x="3767115" y="3548568"/>
-            <a:ext cx="402939" cy="421681"/>
-          </a:xfrm>
-          <a:prstGeom prst="line">
-            <a:avLst/>
-          </a:prstGeom>
-          <a:ln w="28575"/>
-        </p:spPr>
-        <p:style>
-          <a:lnRef idx="2">
-            <a:schemeClr val="dk1"/>
-          </a:lnRef>
-          <a:fillRef idx="1">
-            <a:schemeClr val="lt1"/>
-          </a:fillRef>
-          <a:effectRef idx="0">
-            <a:schemeClr val="dk1"/>
-          </a:effectRef>
-          <a:fontRef idx="minor">
-            <a:schemeClr val="dk1"/>
-          </a:fontRef>
-        </p:style>
-      </p:cxnSp>
-      <p:cxnSp>
-        <p:nvCxnSpPr>
-          <p:cNvPr id="8" name="Straight Connector 7">
-            <a:extLst>
-              <a:ext uri="{FF2B5EF4-FFF2-40B4-BE49-F238E27FC236}">
-                <a16:creationId xmlns:a16="http://schemas.microsoft.com/office/drawing/2014/main" id="{C2787C54-85A0-48A1-81AD-358DB2FEFC2D}"/>
-              </a:ext>
-            </a:extLst>
-          </p:cNvPr>
-          <p:cNvCxnSpPr>
-            <a:stCxn id="6" idx="3"/>
-            <a:endCxn id="6" idx="7"/>
-          </p:cNvCxnSpPr>
-          <p:nvPr/>
-        </p:nvCxnSpPr>
-        <p:spPr>
-          <a:xfrm flipV="1">
-            <a:off x="3767115" y="3548568"/>
-            <a:ext cx="402939" cy="421681"/>
-          </a:xfrm>
-          <a:prstGeom prst="line">
-            <a:avLst/>
-          </a:prstGeom>
-          <a:ln w="28575">
-            <a:solidFill>
-              <a:schemeClr val="tx1"/>
-            </a:solidFill>
-          </a:ln>
-        </p:spPr>
-        <p:style>
-          <a:lnRef idx="2">
-            <a:schemeClr val="dk1"/>
-          </a:lnRef>
-          <a:fillRef idx="1">
-            <a:schemeClr val="lt1"/>
-          </a:fillRef>
-          <a:effectRef idx="0">
-            <a:schemeClr val="dk1"/>
-          </a:effectRef>
-          <a:fontRef idx="minor">
-            <a:schemeClr val="dk1"/>
-          </a:fontRef>
-        </p:style>
-      </p:cxnSp>
-      <p:sp>
-        <p:nvSpPr>
-          <p:cNvPr id="9" name="TextBox 8">
-            <a:extLst>
-              <a:ext uri="{FF2B5EF4-FFF2-40B4-BE49-F238E27FC236}">
-                <a16:creationId xmlns:a16="http://schemas.microsoft.com/office/drawing/2014/main" id="{9F729720-F4AF-42DF-B42D-9AA04A2B592D}"/>
-              </a:ext>
-            </a:extLst>
-          </p:cNvPr>
-          <p:cNvSpPr txBox="1"/>
-          <p:nvPr/>
-        </p:nvSpPr>
-        <p:spPr>
-          <a:xfrm>
-            <a:off x="3824220" y="3396765"/>
-            <a:ext cx="300082" cy="369332"/>
-          </a:xfrm>
-          <a:prstGeom prst="rect">
-            <a:avLst/>
-          </a:prstGeom>
-          <a:noFill/>
-        </p:spPr>
-        <p:txBody>
-          <a:bodyPr wrap="none" rtlCol="0">
-            <a:spAutoFit/>
-          </a:bodyPr>
-          <a:lstStyle/>
-          <a:p>
-            <a:r>
-              <a:rPr lang="en-GB" dirty="0"/>
-              <a:t>+</a:t>
-            </a:r>
-          </a:p>
-        </p:txBody>
-      </p:sp>
-      <p:sp>
-        <p:nvSpPr>
-          <p:cNvPr id="10" name="TextBox 9">
-            <a:extLst>
-              <a:ext uri="{FF2B5EF4-FFF2-40B4-BE49-F238E27FC236}">
-                <a16:creationId xmlns:a16="http://schemas.microsoft.com/office/drawing/2014/main" id="{D7B05199-F7B9-41FE-9A58-538D37ACC53D}"/>
-              </a:ext>
-            </a:extLst>
-          </p:cNvPr>
-          <p:cNvSpPr txBox="1"/>
-          <p:nvPr/>
-        </p:nvSpPr>
-        <p:spPr>
-          <a:xfrm>
-            <a:off x="3636585" y="3568774"/>
-            <a:ext cx="300082" cy="369332"/>
-          </a:xfrm>
-          <a:prstGeom prst="rect">
-            <a:avLst/>
-          </a:prstGeom>
-          <a:noFill/>
-        </p:spPr>
-        <p:txBody>
-          <a:bodyPr wrap="none" rtlCol="0">
-            <a:spAutoFit/>
-          </a:bodyPr>
-          <a:lstStyle/>
-          <a:p>
-            <a:r>
-              <a:rPr lang="en-GB" dirty="0"/>
-              <a:t>+</a:t>
-            </a:r>
-          </a:p>
-        </p:txBody>
-      </p:sp>
-      <p:sp>
-        <p:nvSpPr>
-          <p:cNvPr id="11" name="TextBox 10">
-            <a:extLst>
-              <a:ext uri="{FF2B5EF4-FFF2-40B4-BE49-F238E27FC236}">
-                <a16:creationId xmlns:a16="http://schemas.microsoft.com/office/drawing/2014/main" id="{6853982D-E87A-4B72-BEEC-189B45C6BAAF}"/>
-              </a:ext>
-            </a:extLst>
-          </p:cNvPr>
-          <p:cNvSpPr txBox="1"/>
-          <p:nvPr/>
-        </p:nvSpPr>
-        <p:spPr>
-          <a:xfrm>
-            <a:off x="3854203" y="3747988"/>
-            <a:ext cx="255198" cy="369332"/>
-          </a:xfrm>
-          <a:prstGeom prst="rect">
-            <a:avLst/>
-          </a:prstGeom>
-          <a:noFill/>
-        </p:spPr>
-        <p:txBody>
-          <a:bodyPr wrap="none" rtlCol="0">
-            <a:spAutoFit/>
-          </a:bodyPr>
-          <a:lstStyle/>
-          <a:p>
-            <a:r>
-              <a:rPr lang="en-GB" dirty="0"/>
-              <a:t>-</a:t>
-            </a:r>
-          </a:p>
-        </p:txBody>
-      </p:sp>
-      <p:cxnSp>
-        <p:nvCxnSpPr>
-          <p:cNvPr id="13" name="Straight Arrow Connector 12">
-            <a:extLst>
-              <a:ext uri="{FF2B5EF4-FFF2-40B4-BE49-F238E27FC236}">
-                <a16:creationId xmlns:a16="http://schemas.microsoft.com/office/drawing/2014/main" id="{82741775-B704-4602-B122-0E3F3AC61C75}"/>
-              </a:ext>
-            </a:extLst>
-          </p:cNvPr>
-          <p:cNvCxnSpPr>
-            <a:cxnSpLocks/>
-          </p:cNvCxnSpPr>
-          <p:nvPr/>
-        </p:nvCxnSpPr>
-        <p:spPr>
-          <a:xfrm>
-            <a:off x="3052298" y="3753440"/>
-            <a:ext cx="631365" cy="0"/>
-          </a:xfrm>
-          <a:prstGeom prst="straightConnector1">
-            <a:avLst/>
-          </a:prstGeom>
-          <a:ln w="38100">
-            <a:solidFill>
-              <a:schemeClr val="tx1"/>
-            </a:solidFill>
-            <a:tailEnd type="triangle"/>
-          </a:ln>
-        </p:spPr>
-        <p:style>
-          <a:lnRef idx="1">
-            <a:schemeClr val="accent1"/>
-          </a:lnRef>
-          <a:fillRef idx="0">
-            <a:schemeClr val="accent1"/>
-          </a:fillRef>
-          <a:effectRef idx="0">
-            <a:schemeClr val="accent1"/>
-          </a:effectRef>
-          <a:fontRef idx="minor">
-            <a:schemeClr val="tx1"/>
-          </a:fontRef>
-        </p:style>
-      </p:cxnSp>
-      <p:sp>
-        <p:nvSpPr>
-          <p:cNvPr id="17" name="TextBox 16">
-            <a:extLst>
-              <a:ext uri="{FF2B5EF4-FFF2-40B4-BE49-F238E27FC236}">
-                <a16:creationId xmlns:a16="http://schemas.microsoft.com/office/drawing/2014/main" id="{E685E3E1-A3FE-4125-8B34-EE4413B9C7C9}"/>
-              </a:ext>
-            </a:extLst>
-          </p:cNvPr>
-          <p:cNvSpPr txBox="1"/>
-          <p:nvPr/>
-        </p:nvSpPr>
-        <p:spPr>
-          <a:xfrm>
-            <a:off x="2162147" y="3286323"/>
-            <a:ext cx="899798" cy="923330"/>
-          </a:xfrm>
-          <a:prstGeom prst="rect">
-            <a:avLst/>
-          </a:prstGeom>
-          <a:noFill/>
-        </p:spPr>
-        <p:txBody>
-          <a:bodyPr wrap="none" rtlCol="0">
-            <a:spAutoFit/>
-          </a:bodyPr>
-          <a:lstStyle/>
-          <a:p>
-            <a:pPr algn="ctr"/>
-            <a:r>
-              <a:rPr lang="en-GB" dirty="0"/>
-              <a:t>Desired</a:t>
-            </a:r>
-          </a:p>
-          <a:p>
-            <a:pPr algn="ctr"/>
-            <a:r>
-              <a:rPr lang="en-GB" dirty="0"/>
-              <a:t>Force</a:t>
-            </a:r>
-          </a:p>
-          <a:p>
-            <a:pPr algn="ctr"/>
-            <a:r>
-              <a:rPr lang="en-GB" dirty="0"/>
-              <a:t>(F</a:t>
-            </a:r>
-            <a:r>
-              <a:rPr lang="en-GB" baseline="-25000" dirty="0"/>
-              <a:t>T</a:t>
-            </a:r>
-            <a:r>
-              <a:rPr lang="en-GB" dirty="0"/>
-              <a:t>)</a:t>
-            </a:r>
-          </a:p>
-        </p:txBody>
-      </p:sp>
       <p:grpSp>
         <p:nvGrpSpPr>
-          <p:cNvPr id="18" name="Group 17">
-            <a:extLst>
-              <a:ext uri="{FF2B5EF4-FFF2-40B4-BE49-F238E27FC236}">
-                <a16:creationId xmlns:a16="http://schemas.microsoft.com/office/drawing/2014/main" id="{8F5D31DD-9008-4486-9627-A3079E28C140}"/>
+          <p:cNvPr id="2" name="Group 1">
+            <a:extLst>
+              <a:ext uri="{FF2B5EF4-FFF2-40B4-BE49-F238E27FC236}">
+                <a16:creationId xmlns:a16="http://schemas.microsoft.com/office/drawing/2014/main" id="{A6B590DB-3A43-49A5-8952-3DC84A0D9A20}"/>
               </a:ext>
             </a:extLst>
           </p:cNvPr>
@@ -7434,48 +7098,284 @@
         </p:nvGrpSpPr>
         <p:grpSpPr>
           <a:xfrm>
-            <a:off x="4261543" y="3296240"/>
-            <a:ext cx="2899996" cy="914400"/>
-            <a:chOff x="3202359" y="795131"/>
-            <a:chExt cx="2899996" cy="914400"/>
+            <a:off x="2162147" y="1385206"/>
+            <a:ext cx="7611566" cy="3736731"/>
+            <a:chOff x="2162147" y="1385206"/>
+            <a:chExt cx="7611566" cy="3736731"/>
           </a:xfrm>
         </p:grpSpPr>
+        <p:sp>
+          <p:nvSpPr>
+            <p:cNvPr id="6" name="Oval 5">
+              <a:extLst>
+                <a:ext uri="{FF2B5EF4-FFF2-40B4-BE49-F238E27FC236}">
+                  <a16:creationId xmlns:a16="http://schemas.microsoft.com/office/drawing/2014/main" id="{314EF023-421C-48F6-B5BB-312BEDC84247}"/>
+                </a:ext>
+              </a:extLst>
+            </p:cNvPr>
+            <p:cNvSpPr/>
+            <p:nvPr/>
+          </p:nvSpPr>
+          <p:spPr>
+            <a:xfrm>
+              <a:off x="3683663" y="3461235"/>
+              <a:ext cx="569843" cy="596347"/>
+            </a:xfrm>
+            <a:prstGeom prst="ellipse">
+              <a:avLst/>
+            </a:prstGeom>
+            <a:ln w="28575"/>
+          </p:spPr>
+          <p:style>
+            <a:lnRef idx="2">
+              <a:schemeClr val="dk1"/>
+            </a:lnRef>
+            <a:fillRef idx="1">
+              <a:schemeClr val="lt1"/>
+            </a:fillRef>
+            <a:effectRef idx="0">
+              <a:schemeClr val="dk1"/>
+            </a:effectRef>
+            <a:fontRef idx="minor">
+              <a:schemeClr val="dk1"/>
+            </a:fontRef>
+          </p:style>
+          <p:txBody>
+            <a:bodyPr rtlCol="0" anchor="ctr"/>
+            <a:lstStyle/>
+            <a:p>
+              <a:pPr algn="ctr"/>
+              <a:endParaRPr lang="en-GB"/>
+            </a:p>
+          </p:txBody>
+        </p:sp>
         <p:cxnSp>
           <p:nvCxnSpPr>
-            <p:cNvPr id="21" name="Straight Arrow Connector 20">
+            <p:cNvPr id="7" name="Straight Connector 6">
               <a:extLst>
                 <a:ext uri="{FF2B5EF4-FFF2-40B4-BE49-F238E27FC236}">
-                  <a16:creationId xmlns:a16="http://schemas.microsoft.com/office/drawing/2014/main" id="{6289796E-F51C-40C5-863B-2624A342E94E}"/>
+                  <a16:creationId xmlns:a16="http://schemas.microsoft.com/office/drawing/2014/main" id="{16441A50-B1C5-42ED-BEE9-5C6C524C02E3}"/>
+                </a:ext>
+              </a:extLst>
+            </p:cNvPr>
+            <p:cNvCxnSpPr>
+              <a:stCxn id="6" idx="1"/>
+              <a:endCxn id="6" idx="5"/>
+            </p:cNvCxnSpPr>
+            <p:nvPr/>
+          </p:nvCxnSpPr>
+          <p:spPr>
+            <a:xfrm>
+              <a:off x="3767115" y="3548568"/>
+              <a:ext cx="402939" cy="421681"/>
+            </a:xfrm>
+            <a:prstGeom prst="line">
+              <a:avLst/>
+            </a:prstGeom>
+            <a:ln w="28575"/>
+          </p:spPr>
+          <p:style>
+            <a:lnRef idx="2">
+              <a:schemeClr val="dk1"/>
+            </a:lnRef>
+            <a:fillRef idx="1">
+              <a:schemeClr val="lt1"/>
+            </a:fillRef>
+            <a:effectRef idx="0">
+              <a:schemeClr val="dk1"/>
+            </a:effectRef>
+            <a:fontRef idx="minor">
+              <a:schemeClr val="dk1"/>
+            </a:fontRef>
+          </p:style>
+        </p:cxnSp>
+        <p:cxnSp>
+          <p:nvCxnSpPr>
+            <p:cNvPr id="8" name="Straight Connector 7">
+              <a:extLst>
+                <a:ext uri="{FF2B5EF4-FFF2-40B4-BE49-F238E27FC236}">
+                  <a16:creationId xmlns:a16="http://schemas.microsoft.com/office/drawing/2014/main" id="{C2787C54-85A0-48A1-81AD-358DB2FEFC2D}"/>
+                </a:ext>
+              </a:extLst>
+            </p:cNvPr>
+            <p:cNvCxnSpPr>
+              <a:stCxn id="6" idx="3"/>
+              <a:endCxn id="6" idx="7"/>
+            </p:cNvCxnSpPr>
+            <p:nvPr/>
+          </p:nvCxnSpPr>
+          <p:spPr>
+            <a:xfrm flipV="1">
+              <a:off x="3767115" y="3548568"/>
+              <a:ext cx="402939" cy="421681"/>
+            </a:xfrm>
+            <a:prstGeom prst="line">
+              <a:avLst/>
+            </a:prstGeom>
+            <a:ln w="28575">
+              <a:solidFill>
+                <a:schemeClr val="tx1"/>
+              </a:solidFill>
+            </a:ln>
+          </p:spPr>
+          <p:style>
+            <a:lnRef idx="2">
+              <a:schemeClr val="dk1"/>
+            </a:lnRef>
+            <a:fillRef idx="1">
+              <a:schemeClr val="lt1"/>
+            </a:fillRef>
+            <a:effectRef idx="0">
+              <a:schemeClr val="dk1"/>
+            </a:effectRef>
+            <a:fontRef idx="minor">
+              <a:schemeClr val="dk1"/>
+            </a:fontRef>
+          </p:style>
+        </p:cxnSp>
+        <p:sp>
+          <p:nvSpPr>
+            <p:cNvPr id="9" name="TextBox 8">
+              <a:extLst>
+                <a:ext uri="{FF2B5EF4-FFF2-40B4-BE49-F238E27FC236}">
+                  <a16:creationId xmlns:a16="http://schemas.microsoft.com/office/drawing/2014/main" id="{9F729720-F4AF-42DF-B42D-9AA04A2B592D}"/>
+                </a:ext>
+              </a:extLst>
+            </p:cNvPr>
+            <p:cNvSpPr txBox="1"/>
+            <p:nvPr/>
+          </p:nvSpPr>
+          <p:spPr>
+            <a:xfrm>
+              <a:off x="3824220" y="3396765"/>
+              <a:ext cx="300082" cy="369332"/>
+            </a:xfrm>
+            <a:prstGeom prst="rect">
+              <a:avLst/>
+            </a:prstGeom>
+            <a:noFill/>
+          </p:spPr>
+          <p:txBody>
+            <a:bodyPr wrap="none" rtlCol="0">
+              <a:spAutoFit/>
+            </a:bodyPr>
+            <a:lstStyle/>
+            <a:p>
+              <a:r>
+                <a:rPr lang="en-GB" dirty="0"/>
+                <a:t>+</a:t>
+              </a:r>
+            </a:p>
+          </p:txBody>
+        </p:sp>
+        <p:sp>
+          <p:nvSpPr>
+            <p:cNvPr id="10" name="TextBox 9">
+              <a:extLst>
+                <a:ext uri="{FF2B5EF4-FFF2-40B4-BE49-F238E27FC236}">
+                  <a16:creationId xmlns:a16="http://schemas.microsoft.com/office/drawing/2014/main" id="{D7B05199-F7B9-41FE-9A58-538D37ACC53D}"/>
+                </a:ext>
+              </a:extLst>
+            </p:cNvPr>
+            <p:cNvSpPr txBox="1"/>
+            <p:nvPr/>
+          </p:nvSpPr>
+          <p:spPr>
+            <a:xfrm>
+              <a:off x="3636585" y="3568774"/>
+              <a:ext cx="300082" cy="369332"/>
+            </a:xfrm>
+            <a:prstGeom prst="rect">
+              <a:avLst/>
+            </a:prstGeom>
+            <a:noFill/>
+          </p:spPr>
+          <p:txBody>
+            <a:bodyPr wrap="none" rtlCol="0">
+              <a:spAutoFit/>
+            </a:bodyPr>
+            <a:lstStyle/>
+            <a:p>
+              <a:r>
+                <a:rPr lang="en-GB" dirty="0"/>
+                <a:t>+</a:t>
+              </a:r>
+            </a:p>
+          </p:txBody>
+        </p:sp>
+        <p:sp>
+          <p:nvSpPr>
+            <p:cNvPr id="11" name="TextBox 10">
+              <a:extLst>
+                <a:ext uri="{FF2B5EF4-FFF2-40B4-BE49-F238E27FC236}">
+                  <a16:creationId xmlns:a16="http://schemas.microsoft.com/office/drawing/2014/main" id="{6853982D-E87A-4B72-BEEC-189B45C6BAAF}"/>
+                </a:ext>
+              </a:extLst>
+            </p:cNvPr>
+            <p:cNvSpPr txBox="1"/>
+            <p:nvPr/>
+          </p:nvSpPr>
+          <p:spPr>
+            <a:xfrm>
+              <a:off x="3854203" y="3747988"/>
+              <a:ext cx="255198" cy="369332"/>
+            </a:xfrm>
+            <a:prstGeom prst="rect">
+              <a:avLst/>
+            </a:prstGeom>
+            <a:noFill/>
+          </p:spPr>
+          <p:txBody>
+            <a:bodyPr wrap="none" rtlCol="0">
+              <a:spAutoFit/>
+            </a:bodyPr>
+            <a:lstStyle/>
+            <a:p>
+              <a:r>
+                <a:rPr lang="en-GB" dirty="0"/>
+                <a:t>-</a:t>
+              </a:r>
+            </a:p>
+          </p:txBody>
+        </p:sp>
+        <p:cxnSp>
+          <p:nvCxnSpPr>
+            <p:cNvPr id="13" name="Straight Arrow Connector 12">
+              <a:extLst>
+                <a:ext uri="{FF2B5EF4-FFF2-40B4-BE49-F238E27FC236}">
+                  <a16:creationId xmlns:a16="http://schemas.microsoft.com/office/drawing/2014/main" id="{82741775-B704-4602-B122-0E3F3AC61C75}"/>
                 </a:ext>
               </a:extLst>
             </p:cNvPr>
             <p:cNvCxnSpPr>
               <a:cxnSpLocks/>
-              <a:endCxn id="19" idx="1"/>
             </p:cNvCxnSpPr>
             <p:nvPr/>
           </p:nvCxnSpPr>
           <p:spPr>
             <a:xfrm>
-              <a:off x="3202359" y="1246879"/>
-              <a:ext cx="1276878" cy="5452"/>
+              <a:off x="3052298" y="3753440"/>
+              <a:ext cx="631365" cy="0"/>
             </a:xfrm>
             <a:prstGeom prst="straightConnector1">
               <a:avLst/>
             </a:prstGeom>
             <a:ln w="38100">
+              <a:solidFill>
+                <a:schemeClr val="tx1"/>
+              </a:solidFill>
               <a:tailEnd type="triangle"/>
             </a:ln>
           </p:spPr>
           <p:style>
             <a:lnRef idx="1">
-              <a:schemeClr val="dk1"/>
+              <a:schemeClr val="accent1"/>
             </a:lnRef>
             <a:fillRef idx="0">
-              <a:schemeClr val="dk1"/>
+              <a:schemeClr val="accent1"/>
             </a:fillRef>
             <a:effectRef idx="0">
-              <a:schemeClr val="dk1"/>
+              <a:schemeClr val="accent1"/>
             </a:effectRef>
             <a:fontRef idx="minor">
               <a:schemeClr val="tx1"/>
@@ -7484,10 +7384,229 @@
         </p:cxnSp>
         <p:sp>
           <p:nvSpPr>
-            <p:cNvPr id="19" name="Rectangle 18">
+            <p:cNvPr id="17" name="TextBox 16">
               <a:extLst>
                 <a:ext uri="{FF2B5EF4-FFF2-40B4-BE49-F238E27FC236}">
-                  <a16:creationId xmlns:a16="http://schemas.microsoft.com/office/drawing/2014/main" id="{E7BDDB64-C960-47AF-BF55-5B9BFCC4F8E2}"/>
+                  <a16:creationId xmlns:a16="http://schemas.microsoft.com/office/drawing/2014/main" id="{E685E3E1-A3FE-4125-8B34-EE4413B9C7C9}"/>
+                </a:ext>
+              </a:extLst>
+            </p:cNvPr>
+            <p:cNvSpPr txBox="1"/>
+            <p:nvPr/>
+          </p:nvSpPr>
+          <p:spPr>
+            <a:xfrm>
+              <a:off x="2162147" y="3286323"/>
+              <a:ext cx="899798" cy="923330"/>
+            </a:xfrm>
+            <a:prstGeom prst="rect">
+              <a:avLst/>
+            </a:prstGeom>
+            <a:noFill/>
+          </p:spPr>
+          <p:txBody>
+            <a:bodyPr wrap="none" rtlCol="0">
+              <a:spAutoFit/>
+            </a:bodyPr>
+            <a:lstStyle/>
+            <a:p>
+              <a:pPr algn="ctr"/>
+              <a:r>
+                <a:rPr lang="en-GB" dirty="0"/>
+                <a:t>Desired</a:t>
+              </a:r>
+            </a:p>
+            <a:p>
+              <a:pPr algn="ctr"/>
+              <a:r>
+                <a:rPr lang="en-GB" dirty="0"/>
+                <a:t>Force</a:t>
+              </a:r>
+            </a:p>
+            <a:p>
+              <a:pPr algn="ctr"/>
+              <a:r>
+                <a:rPr lang="en-GB" dirty="0"/>
+                <a:t>(F</a:t>
+              </a:r>
+              <a:r>
+                <a:rPr lang="en-GB" baseline="-25000" dirty="0"/>
+                <a:t>T</a:t>
+              </a:r>
+              <a:r>
+                <a:rPr lang="en-GB" dirty="0"/>
+                <a:t>)</a:t>
+              </a:r>
+            </a:p>
+          </p:txBody>
+        </p:sp>
+        <p:grpSp>
+          <p:nvGrpSpPr>
+            <p:cNvPr id="18" name="Group 17">
+              <a:extLst>
+                <a:ext uri="{FF2B5EF4-FFF2-40B4-BE49-F238E27FC236}">
+                  <a16:creationId xmlns:a16="http://schemas.microsoft.com/office/drawing/2014/main" id="{8F5D31DD-9008-4486-9627-A3079E28C140}"/>
+                </a:ext>
+              </a:extLst>
+            </p:cNvPr>
+            <p:cNvGrpSpPr/>
+            <p:nvPr/>
+          </p:nvGrpSpPr>
+          <p:grpSpPr>
+            <a:xfrm>
+              <a:off x="4261543" y="3296240"/>
+              <a:ext cx="2899996" cy="914400"/>
+              <a:chOff x="3202359" y="795131"/>
+              <a:chExt cx="2899996" cy="914400"/>
+            </a:xfrm>
+          </p:grpSpPr>
+          <p:cxnSp>
+            <p:nvCxnSpPr>
+              <p:cNvPr id="21" name="Straight Arrow Connector 20">
+                <a:extLst>
+                  <a:ext uri="{FF2B5EF4-FFF2-40B4-BE49-F238E27FC236}">
+                    <a16:creationId xmlns:a16="http://schemas.microsoft.com/office/drawing/2014/main" id="{6289796E-F51C-40C5-863B-2624A342E94E}"/>
+                  </a:ext>
+                </a:extLst>
+              </p:cNvPr>
+              <p:cNvCxnSpPr>
+                <a:cxnSpLocks/>
+                <a:endCxn id="19" idx="1"/>
+              </p:cNvCxnSpPr>
+              <p:nvPr/>
+            </p:nvCxnSpPr>
+            <p:spPr>
+              <a:xfrm>
+                <a:off x="3202359" y="1246879"/>
+                <a:ext cx="1276878" cy="5452"/>
+              </a:xfrm>
+              <a:prstGeom prst="straightConnector1">
+                <a:avLst/>
+              </a:prstGeom>
+              <a:ln w="38100">
+                <a:tailEnd type="triangle"/>
+              </a:ln>
+            </p:spPr>
+            <p:style>
+              <a:lnRef idx="1">
+                <a:schemeClr val="dk1"/>
+              </a:lnRef>
+              <a:fillRef idx="0">
+                <a:schemeClr val="dk1"/>
+              </a:fillRef>
+              <a:effectRef idx="0">
+                <a:schemeClr val="dk1"/>
+              </a:effectRef>
+              <a:fontRef idx="minor">
+                <a:schemeClr val="tx1"/>
+              </a:fontRef>
+            </p:style>
+          </p:cxnSp>
+          <p:sp>
+            <p:nvSpPr>
+              <p:cNvPr id="19" name="Rectangle 18">
+                <a:extLst>
+                  <a:ext uri="{FF2B5EF4-FFF2-40B4-BE49-F238E27FC236}">
+                    <a16:creationId xmlns:a16="http://schemas.microsoft.com/office/drawing/2014/main" id="{E7BDDB64-C960-47AF-BF55-5B9BFCC4F8E2}"/>
+                  </a:ext>
+                </a:extLst>
+              </p:cNvPr>
+              <p:cNvSpPr/>
+              <p:nvPr/>
+            </p:nvSpPr>
+            <p:spPr>
+              <a:xfrm>
+                <a:off x="4479237" y="795131"/>
+                <a:ext cx="1232453" cy="914400"/>
+              </a:xfrm>
+              <a:prstGeom prst="rect">
+                <a:avLst/>
+              </a:prstGeom>
+              <a:ln w="28575"/>
+            </p:spPr>
+            <p:style>
+              <a:lnRef idx="2">
+                <a:schemeClr val="dk1"/>
+              </a:lnRef>
+              <a:fillRef idx="1">
+                <a:schemeClr val="lt1"/>
+              </a:fillRef>
+              <a:effectRef idx="0">
+                <a:schemeClr val="dk1"/>
+              </a:effectRef>
+              <a:fontRef idx="minor">
+                <a:schemeClr val="dk1"/>
+              </a:fontRef>
+            </p:style>
+            <p:txBody>
+              <a:bodyPr rtlCol="0" anchor="ctr"/>
+              <a:lstStyle/>
+              <a:p>
+                <a:pPr algn="ctr"/>
+                <a:r>
+                  <a:rPr lang="en-GB" dirty="0"/>
+                  <a:t>Force</a:t>
+                </a:r>
+              </a:p>
+              <a:p>
+                <a:pPr algn="ctr"/>
+                <a:r>
+                  <a:rPr lang="en-GB" dirty="0"/>
+                  <a:t>Controller</a:t>
+                </a:r>
+              </a:p>
+            </p:txBody>
+          </p:sp>
+          <p:cxnSp>
+            <p:nvCxnSpPr>
+              <p:cNvPr id="20" name="Straight Arrow Connector 19">
+                <a:extLst>
+                  <a:ext uri="{FF2B5EF4-FFF2-40B4-BE49-F238E27FC236}">
+                    <a16:creationId xmlns:a16="http://schemas.microsoft.com/office/drawing/2014/main" id="{B9C8A729-7B7B-4D52-BD69-5834778D2FDE}"/>
+                  </a:ext>
+                </a:extLst>
+              </p:cNvPr>
+              <p:cNvCxnSpPr>
+                <a:cxnSpLocks/>
+                <a:stCxn id="19" idx="3"/>
+                <a:endCxn id="25" idx="1"/>
+              </p:cNvCxnSpPr>
+              <p:nvPr/>
+            </p:nvCxnSpPr>
+            <p:spPr>
+              <a:xfrm>
+                <a:off x="5711690" y="1252331"/>
+                <a:ext cx="390665" cy="4177"/>
+              </a:xfrm>
+              <a:prstGeom prst="straightConnector1">
+                <a:avLst/>
+              </a:prstGeom>
+              <a:ln w="38100">
+                <a:tailEnd type="triangle"/>
+              </a:ln>
+            </p:spPr>
+            <p:style>
+              <a:lnRef idx="3">
+                <a:schemeClr val="dk1"/>
+              </a:lnRef>
+              <a:fillRef idx="0">
+                <a:schemeClr val="dk1"/>
+              </a:fillRef>
+              <a:effectRef idx="2">
+                <a:schemeClr val="dk1"/>
+              </a:effectRef>
+              <a:fontRef idx="minor">
+                <a:schemeClr val="tx1"/>
+              </a:fontRef>
+            </p:style>
+          </p:cxnSp>
+        </p:grpSp>
+        <p:sp>
+          <p:nvSpPr>
+            <p:cNvPr id="25" name="Rectangle 24">
+              <a:extLst>
+                <a:ext uri="{FF2B5EF4-FFF2-40B4-BE49-F238E27FC236}">
+                  <a16:creationId xmlns:a16="http://schemas.microsoft.com/office/drawing/2014/main" id="{E252D558-31A8-4C8A-B437-96C371EDAD3F}"/>
                 </a:ext>
               </a:extLst>
             </p:cNvPr>
@@ -7496,7 +7615,7 @@
           </p:nvSpPr>
           <p:spPr>
             <a:xfrm>
-              <a:off x="4479237" y="795131"/>
+              <a:off x="7161539" y="3300417"/>
               <a:ext cx="1232453" cy="914400"/>
             </a:xfrm>
             <a:prstGeom prst="rect">
@@ -7525,6 +7644,503 @@
               <a:pPr algn="ctr"/>
               <a:r>
                 <a:rPr lang="en-GB" dirty="0"/>
+                <a:t>Plant</a:t>
+              </a:r>
+            </a:p>
+          </p:txBody>
+        </p:sp>
+        <mc:AlternateContent xmlns:mc="http://schemas.openxmlformats.org/markup-compatibility/2006">
+          <mc:Choice xmlns:a14="http://schemas.microsoft.com/office/drawing/2010/main" Requires="a14">
+            <p:sp>
+              <p:nvSpPr>
+                <p:cNvPr id="28" name="Rectangle 27">
+                  <a:extLst>
+                    <a:ext uri="{FF2B5EF4-FFF2-40B4-BE49-F238E27FC236}">
+                      <a16:creationId xmlns:a16="http://schemas.microsoft.com/office/drawing/2014/main" id="{769F75B1-58AB-43B4-8C02-C96C12F4877E}"/>
+                    </a:ext>
+                  </a:extLst>
+                </p:cNvPr>
+                <p:cNvSpPr/>
+                <p:nvPr/>
+              </p:nvSpPr>
+              <p:spPr>
+                <a:xfrm>
+                  <a:off x="6096000" y="1721962"/>
+                  <a:ext cx="1776779" cy="914400"/>
+                </a:xfrm>
+                <a:prstGeom prst="rect">
+                  <a:avLst/>
+                </a:prstGeom>
+                <a:ln w="28575">
+                  <a:solidFill>
+                    <a:schemeClr val="tx1"/>
+                  </a:solidFill>
+                </a:ln>
+              </p:spPr>
+              <p:style>
+                <a:lnRef idx="2">
+                  <a:schemeClr val="dk1"/>
+                </a:lnRef>
+                <a:fillRef idx="1">
+                  <a:schemeClr val="lt1"/>
+                </a:fillRef>
+                <a:effectRef idx="0">
+                  <a:schemeClr val="dk1"/>
+                </a:effectRef>
+                <a:fontRef idx="minor">
+                  <a:schemeClr val="dk1"/>
+                </a:fontRef>
+              </p:style>
+              <p:txBody>
+                <a:bodyPr rtlCol="0" anchor="ctr"/>
+                <a:lstStyle/>
+                <a:p>
+                  <a:pPr algn="ctr"/>
+                  <a14:m>
+                    <m:oMathPara xmlns:m="http://schemas.openxmlformats.org/officeDocument/2006/math">
+                      <m:oMathParaPr>
+                        <m:jc m:val="centerGroup"/>
+                      </m:oMathParaPr>
+                      <m:oMath xmlns:m="http://schemas.openxmlformats.org/officeDocument/2006/math">
+                        <m:sSup>
+                          <m:sSupPr>
+                            <m:ctrlPr>
+                              <a:rPr lang="en-GB" i="1" dirty="0">
+                                <a:latin typeface="Cambria Math" panose="02040503050406030204" pitchFamily="18" charset="0"/>
+                              </a:rPr>
+                            </m:ctrlPr>
+                          </m:sSupPr>
+                          <m:e>
+                            <m:r>
+                              <a:rPr lang="en-GB" i="1" dirty="0">
+                                <a:latin typeface="Cambria Math" panose="02040503050406030204" pitchFamily="18" charset="0"/>
+                              </a:rPr>
+                              <m:t>𝑚𝑠</m:t>
+                            </m:r>
+                          </m:e>
+                          <m:sup>
+                            <m:r>
+                              <a:rPr lang="en-GB" i="1" dirty="0">
+                                <a:latin typeface="Cambria Math" panose="02040503050406030204" pitchFamily="18" charset="0"/>
+                              </a:rPr>
+                              <m:t>2</m:t>
+                            </m:r>
+                          </m:sup>
+                        </m:sSup>
+                        <m:r>
+                          <a:rPr lang="en-GB" i="1" dirty="0">
+                            <a:latin typeface="Cambria Math" panose="02040503050406030204" pitchFamily="18" charset="0"/>
+                          </a:rPr>
+                          <m:t>+</m:t>
+                        </m:r>
+                        <m:r>
+                          <a:rPr lang="en-GB" i="1" dirty="0">
+                            <a:latin typeface="Cambria Math" panose="02040503050406030204" pitchFamily="18" charset="0"/>
+                          </a:rPr>
+                          <m:t>𝑐𝑠</m:t>
+                        </m:r>
+                        <m:r>
+                          <a:rPr lang="en-GB" i="1" dirty="0">
+                            <a:latin typeface="Cambria Math" panose="02040503050406030204" pitchFamily="18" charset="0"/>
+                          </a:rPr>
+                          <m:t>+</m:t>
+                        </m:r>
+                        <m:r>
+                          <m:rPr>
+                            <m:sty m:val="p"/>
+                          </m:rPr>
+                          <a:rPr lang="en-GB" dirty="0">
+                            <a:latin typeface="Cambria Math" panose="02040503050406030204" pitchFamily="18" charset="0"/>
+                          </a:rPr>
+                          <m:t>k</m:t>
+                        </m:r>
+                      </m:oMath>
+                    </m:oMathPara>
+                  </a14:m>
+                  <a:endParaRPr lang="en-GB" dirty="0"/>
+                </a:p>
+              </p:txBody>
+            </p:sp>
+          </mc:Choice>
+          <mc:Fallback>
+            <p:sp>
+              <p:nvSpPr>
+                <p:cNvPr id="28" name="Rectangle 27">
+                  <a:extLst>
+                    <a:ext uri="{FF2B5EF4-FFF2-40B4-BE49-F238E27FC236}">
+                      <a16:creationId xmlns:a16="http://schemas.microsoft.com/office/drawing/2014/main" id="{769F75B1-58AB-43B4-8C02-C96C12F4877E}"/>
+                    </a:ext>
+                  </a:extLst>
+                </p:cNvPr>
+                <p:cNvSpPr>
+                  <a:spLocks noRot="1" noChangeAspect="1" noMove="1" noResize="1" noEditPoints="1" noAdjustHandles="1" noChangeArrowheads="1" noChangeShapeType="1" noTextEdit="1"/>
+                </p:cNvSpPr>
+                <p:nvPr/>
+              </p:nvSpPr>
+              <p:spPr>
+                <a:xfrm>
+                  <a:off x="6096000" y="1721962"/>
+                  <a:ext cx="1776779" cy="914400"/>
+                </a:xfrm>
+                <a:prstGeom prst="rect">
+                  <a:avLst/>
+                </a:prstGeom>
+                <a:blipFill>
+                  <a:blip r:embed="rId2"/>
+                  <a:stretch>
+                    <a:fillRect/>
+                  </a:stretch>
+                </a:blipFill>
+                <a:ln w="28575">
+                  <a:solidFill>
+                    <a:schemeClr val="tx1"/>
+                  </a:solidFill>
+                </a:ln>
+              </p:spPr>
+              <p:txBody>
+                <a:bodyPr/>
+                <a:lstStyle/>
+                <a:p>
+                  <a:r>
+                    <a:rPr lang="en-GB">
+                      <a:noFill/>
+                    </a:rPr>
+                    <a:t> </a:t>
+                  </a:r>
+                </a:p>
+              </p:txBody>
+            </p:sp>
+          </mc:Fallback>
+        </mc:AlternateContent>
+        <p:cxnSp>
+          <p:nvCxnSpPr>
+            <p:cNvPr id="30" name="Straight Arrow Connector 29">
+              <a:extLst>
+                <a:ext uri="{FF2B5EF4-FFF2-40B4-BE49-F238E27FC236}">
+                  <a16:creationId xmlns:a16="http://schemas.microsoft.com/office/drawing/2014/main" id="{7311DE7D-687D-481A-BDA5-5BF4E82D1A09}"/>
+                </a:ext>
+              </a:extLst>
+            </p:cNvPr>
+            <p:cNvCxnSpPr>
+              <a:cxnSpLocks/>
+              <a:endCxn id="28" idx="3"/>
+            </p:cNvCxnSpPr>
+            <p:nvPr/>
+          </p:nvCxnSpPr>
+          <p:spPr>
+            <a:xfrm flipH="1">
+              <a:off x="7872779" y="2179162"/>
+              <a:ext cx="1443500" cy="0"/>
+            </a:xfrm>
+            <a:prstGeom prst="straightConnector1">
+              <a:avLst/>
+            </a:prstGeom>
+            <a:ln w="38100">
+              <a:solidFill>
+                <a:schemeClr val="tx1"/>
+              </a:solidFill>
+              <a:tailEnd type="triangle"/>
+            </a:ln>
+          </p:spPr>
+          <p:style>
+            <a:lnRef idx="1">
+              <a:schemeClr val="accent1"/>
+            </a:lnRef>
+            <a:fillRef idx="0">
+              <a:schemeClr val="accent1"/>
+            </a:fillRef>
+            <a:effectRef idx="0">
+              <a:schemeClr val="accent1"/>
+            </a:effectRef>
+            <a:fontRef idx="minor">
+              <a:schemeClr val="tx1"/>
+            </a:fontRef>
+          </p:style>
+        </p:cxnSp>
+        <p:sp>
+          <p:nvSpPr>
+            <p:cNvPr id="32" name="TextBox 31">
+              <a:extLst>
+                <a:ext uri="{FF2B5EF4-FFF2-40B4-BE49-F238E27FC236}">
+                  <a16:creationId xmlns:a16="http://schemas.microsoft.com/office/drawing/2014/main" id="{DDD782F4-8EBC-457E-8BC0-9721A1892FCF}"/>
+                </a:ext>
+              </a:extLst>
+            </p:cNvPr>
+            <p:cNvSpPr txBox="1"/>
+            <p:nvPr/>
+          </p:nvSpPr>
+          <p:spPr>
+            <a:xfrm>
+              <a:off x="9281334" y="2686744"/>
+              <a:ext cx="492379" cy="369332"/>
+            </a:xfrm>
+            <a:prstGeom prst="rect">
+              <a:avLst/>
+            </a:prstGeom>
+            <a:noFill/>
+            <a:ln>
+              <a:noFill/>
+            </a:ln>
+          </p:spPr>
+          <p:txBody>
+            <a:bodyPr wrap="none" rtlCol="0">
+              <a:spAutoFit/>
+            </a:bodyPr>
+            <a:lstStyle/>
+            <a:p>
+              <a:r>
+                <a:rPr lang="en-GB" dirty="0"/>
+                <a:t>P</a:t>
+              </a:r>
+              <a:r>
+                <a:rPr lang="en-GB" baseline="-25000" dirty="0"/>
+                <a:t>ext</a:t>
+              </a:r>
+            </a:p>
+          </p:txBody>
+        </p:sp>
+        <p:cxnSp>
+          <p:nvCxnSpPr>
+            <p:cNvPr id="38" name="Straight Arrow Connector 37">
+              <a:extLst>
+                <a:ext uri="{FF2B5EF4-FFF2-40B4-BE49-F238E27FC236}">
+                  <a16:creationId xmlns:a16="http://schemas.microsoft.com/office/drawing/2014/main" id="{42951A53-C17F-40A7-AEB2-E771101FBD44}"/>
+                </a:ext>
+              </a:extLst>
+            </p:cNvPr>
+            <p:cNvCxnSpPr>
+              <a:cxnSpLocks/>
+            </p:cNvCxnSpPr>
+            <p:nvPr/>
+          </p:nvCxnSpPr>
+          <p:spPr>
+            <a:xfrm>
+              <a:off x="3963523" y="2179161"/>
+              <a:ext cx="5835" cy="1278504"/>
+            </a:xfrm>
+            <a:prstGeom prst="straightConnector1">
+              <a:avLst/>
+            </a:prstGeom>
+            <a:ln w="38100">
+              <a:solidFill>
+                <a:schemeClr val="tx1"/>
+              </a:solidFill>
+              <a:tailEnd type="triangle"/>
+            </a:ln>
+          </p:spPr>
+          <p:style>
+            <a:lnRef idx="1">
+              <a:schemeClr val="accent1"/>
+            </a:lnRef>
+            <a:fillRef idx="0">
+              <a:schemeClr val="accent1"/>
+            </a:fillRef>
+            <a:effectRef idx="0">
+              <a:schemeClr val="accent1"/>
+            </a:effectRef>
+            <a:fontRef idx="minor">
+              <a:schemeClr val="tx1"/>
+            </a:fontRef>
+          </p:style>
+        </p:cxnSp>
+        <p:sp>
+          <p:nvSpPr>
+            <p:cNvPr id="43" name="TextBox 42">
+              <a:extLst>
+                <a:ext uri="{FF2B5EF4-FFF2-40B4-BE49-F238E27FC236}">
+                  <a16:creationId xmlns:a16="http://schemas.microsoft.com/office/drawing/2014/main" id="{28CA8CA2-462B-4B62-96C3-62B5F3B58994}"/>
+                </a:ext>
+              </a:extLst>
+            </p:cNvPr>
+            <p:cNvSpPr txBox="1"/>
+            <p:nvPr/>
+          </p:nvSpPr>
+          <p:spPr>
+            <a:xfrm>
+              <a:off x="6103320" y="1385206"/>
+              <a:ext cx="1730667" cy="369332"/>
+            </a:xfrm>
+            <a:prstGeom prst="rect">
+              <a:avLst/>
+            </a:prstGeom>
+            <a:noFill/>
+          </p:spPr>
+          <p:txBody>
+            <a:bodyPr wrap="none" rtlCol="0">
+              <a:spAutoFit/>
+            </a:bodyPr>
+            <a:lstStyle/>
+            <a:p>
+              <a:r>
+                <a:rPr lang="en-GB" dirty="0"/>
+                <a:t>Impedance filter</a:t>
+              </a:r>
+            </a:p>
+          </p:txBody>
+        </p:sp>
+        <p:cxnSp>
+          <p:nvCxnSpPr>
+            <p:cNvPr id="45" name="Straight Arrow Connector 44">
+              <a:extLst>
+                <a:ext uri="{FF2B5EF4-FFF2-40B4-BE49-F238E27FC236}">
+                  <a16:creationId xmlns:a16="http://schemas.microsoft.com/office/drawing/2014/main" id="{B89021DF-5DAD-4B21-9E98-3288E0EFE358}"/>
+                </a:ext>
+              </a:extLst>
+            </p:cNvPr>
+            <p:cNvCxnSpPr>
+              <a:stCxn id="25" idx="3"/>
+            </p:cNvCxnSpPr>
+            <p:nvPr/>
+          </p:nvCxnSpPr>
+          <p:spPr>
+            <a:xfrm>
+              <a:off x="8393992" y="3757617"/>
+              <a:ext cx="1247238" cy="0"/>
+            </a:xfrm>
+            <a:prstGeom prst="straightConnector1">
+              <a:avLst/>
+            </a:prstGeom>
+            <a:ln w="38100">
+              <a:solidFill>
+                <a:schemeClr val="tx1"/>
+              </a:solidFill>
+              <a:tailEnd type="triangle"/>
+            </a:ln>
+          </p:spPr>
+          <p:style>
+            <a:lnRef idx="1">
+              <a:schemeClr val="accent1"/>
+            </a:lnRef>
+            <a:fillRef idx="0">
+              <a:schemeClr val="accent1"/>
+            </a:fillRef>
+            <a:effectRef idx="0">
+              <a:schemeClr val="accent1"/>
+            </a:effectRef>
+            <a:fontRef idx="minor">
+              <a:schemeClr val="tx1"/>
+            </a:fontRef>
+          </p:style>
+        </p:cxnSp>
+        <p:sp>
+          <p:nvSpPr>
+            <p:cNvPr id="46" name="TextBox 45">
+              <a:extLst>
+                <a:ext uri="{FF2B5EF4-FFF2-40B4-BE49-F238E27FC236}">
+                  <a16:creationId xmlns:a16="http://schemas.microsoft.com/office/drawing/2014/main" id="{C1077C81-17EC-471D-8EE6-004678B2073D}"/>
+                </a:ext>
+              </a:extLst>
+            </p:cNvPr>
+            <p:cNvSpPr txBox="1"/>
+            <p:nvPr/>
+          </p:nvSpPr>
+          <p:spPr>
+            <a:xfrm>
+              <a:off x="5974818" y="4752605"/>
+              <a:ext cx="1721690" cy="369332"/>
+            </a:xfrm>
+            <a:prstGeom prst="rect">
+              <a:avLst/>
+            </a:prstGeom>
+            <a:noFill/>
+          </p:spPr>
+          <p:txBody>
+            <a:bodyPr wrap="none" rtlCol="0">
+              <a:spAutoFit/>
+            </a:bodyPr>
+            <a:lstStyle/>
+            <a:p>
+              <a:r>
+                <a:rPr lang="en-GB" dirty="0"/>
+                <a:t>Actual Force (F</a:t>
+              </a:r>
+              <a:r>
+                <a:rPr lang="en-GB" baseline="-25000" dirty="0"/>
+                <a:t>A</a:t>
+              </a:r>
+              <a:r>
+                <a:rPr lang="en-GB" dirty="0"/>
+                <a:t>)</a:t>
+              </a:r>
+            </a:p>
+          </p:txBody>
+        </p:sp>
+        <p:cxnSp>
+          <p:nvCxnSpPr>
+            <p:cNvPr id="52" name="Straight Arrow Connector 51">
+              <a:extLst>
+                <a:ext uri="{FF2B5EF4-FFF2-40B4-BE49-F238E27FC236}">
+                  <a16:creationId xmlns:a16="http://schemas.microsoft.com/office/drawing/2014/main" id="{429D0E40-6DE7-4726-A352-102088660B06}"/>
+                </a:ext>
+              </a:extLst>
+            </p:cNvPr>
+            <p:cNvCxnSpPr>
+              <a:cxnSpLocks/>
+              <a:endCxn id="6" idx="4"/>
+            </p:cNvCxnSpPr>
+            <p:nvPr/>
+          </p:nvCxnSpPr>
+          <p:spPr>
+            <a:xfrm flipV="1">
+              <a:off x="3968584" y="4057582"/>
+              <a:ext cx="1" cy="633688"/>
+            </a:xfrm>
+            <a:prstGeom prst="straightConnector1">
+              <a:avLst/>
+            </a:prstGeom>
+            <a:ln w="38100">
+              <a:solidFill>
+                <a:schemeClr val="tx1"/>
+              </a:solidFill>
+              <a:tailEnd type="triangle"/>
+            </a:ln>
+          </p:spPr>
+          <p:style>
+            <a:lnRef idx="1">
+              <a:schemeClr val="accent1"/>
+            </a:lnRef>
+            <a:fillRef idx="0">
+              <a:schemeClr val="accent1"/>
+            </a:fillRef>
+            <a:effectRef idx="0">
+              <a:schemeClr val="accent1"/>
+            </a:effectRef>
+            <a:fontRef idx="minor">
+              <a:schemeClr val="tx1"/>
+            </a:fontRef>
+          </p:style>
+        </p:cxnSp>
+        <p:sp>
+          <p:nvSpPr>
+            <p:cNvPr id="57" name="TextBox 56">
+              <a:extLst>
+                <a:ext uri="{FF2B5EF4-FFF2-40B4-BE49-F238E27FC236}">
+                  <a16:creationId xmlns:a16="http://schemas.microsoft.com/office/drawing/2014/main" id="{9971061F-C17A-422C-A3DF-95B4AD6286BB}"/>
+                </a:ext>
+              </a:extLst>
+            </p:cNvPr>
+            <p:cNvSpPr txBox="1"/>
+            <p:nvPr/>
+          </p:nvSpPr>
+          <p:spPr>
+            <a:xfrm>
+              <a:off x="4392544" y="2832198"/>
+              <a:ext cx="981359" cy="923330"/>
+            </a:xfrm>
+            <a:prstGeom prst="rect">
+              <a:avLst/>
+            </a:prstGeom>
+            <a:noFill/>
+          </p:spPr>
+          <p:txBody>
+            <a:bodyPr wrap="none" rtlCol="0">
+              <a:spAutoFit/>
+            </a:bodyPr>
+            <a:lstStyle/>
+            <a:p>
+              <a:pPr algn="ctr"/>
+              <a:r>
+                <a:rPr lang="en-GB" dirty="0"/>
                 <a:t>Force</a:t>
               </a:r>
             </a:p>
@@ -7532,48 +8148,232 @@
               <a:pPr algn="ctr"/>
               <a:r>
                 <a:rPr lang="en-GB" dirty="0"/>
-                <a:t>Controller</a:t>
+                <a:t>Demand</a:t>
+              </a:r>
+            </a:p>
+            <a:p>
+              <a:pPr algn="ctr"/>
+              <a:r>
+                <a:rPr lang="en-GB" dirty="0"/>
+                <a:t>(F</a:t>
+              </a:r>
+              <a:r>
+                <a:rPr lang="en-GB" baseline="-25000" dirty="0"/>
+                <a:t>D</a:t>
+              </a:r>
+              <a:r>
+                <a:rPr lang="en-GB" dirty="0"/>
+                <a:t>)</a:t>
               </a:r>
             </a:p>
           </p:txBody>
         </p:sp>
         <p:cxnSp>
           <p:nvCxnSpPr>
-            <p:cNvPr id="20" name="Straight Arrow Connector 19">
+            <p:cNvPr id="36" name="Straight Connector 35">
               <a:extLst>
                 <a:ext uri="{FF2B5EF4-FFF2-40B4-BE49-F238E27FC236}">
-                  <a16:creationId xmlns:a16="http://schemas.microsoft.com/office/drawing/2014/main" id="{B9C8A729-7B7B-4D52-BD69-5834778D2FDE}"/>
+                  <a16:creationId xmlns:a16="http://schemas.microsoft.com/office/drawing/2014/main" id="{DBC7FE70-9F9B-4AA8-B566-51C3223ACB08}"/>
                 </a:ext>
               </a:extLst>
             </p:cNvPr>
             <p:cNvCxnSpPr>
               <a:cxnSpLocks/>
-              <a:stCxn id="19" idx="3"/>
-              <a:endCxn id="25" idx="1"/>
             </p:cNvCxnSpPr>
             <p:nvPr/>
           </p:nvCxnSpPr>
           <p:spPr>
             <a:xfrm>
-              <a:off x="5711690" y="1252331"/>
-              <a:ext cx="390665" cy="4177"/>
+              <a:off x="9316279" y="2179161"/>
+              <a:ext cx="0" cy="1369407"/>
             </a:xfrm>
-            <a:prstGeom prst="straightConnector1">
+            <a:prstGeom prst="line">
               <a:avLst/>
             </a:prstGeom>
             <a:ln w="38100">
-              <a:tailEnd type="triangle"/>
+              <a:solidFill>
+                <a:schemeClr val="tx1"/>
+              </a:solidFill>
             </a:ln>
           </p:spPr>
           <p:style>
-            <a:lnRef idx="3">
-              <a:schemeClr val="dk1"/>
+            <a:lnRef idx="1">
+              <a:schemeClr val="accent1"/>
             </a:lnRef>
             <a:fillRef idx="0">
-              <a:schemeClr val="dk1"/>
+              <a:schemeClr val="accent1"/>
             </a:fillRef>
-            <a:effectRef idx="2">
-              <a:schemeClr val="dk1"/>
+            <a:effectRef idx="0">
+              <a:schemeClr val="accent1"/>
+            </a:effectRef>
+            <a:fontRef idx="minor">
+              <a:schemeClr val="tx1"/>
+            </a:fontRef>
+          </p:style>
+        </p:cxnSp>
+        <p:cxnSp>
+          <p:nvCxnSpPr>
+            <p:cNvPr id="40" name="Straight Connector 39">
+              <a:extLst>
+                <a:ext uri="{FF2B5EF4-FFF2-40B4-BE49-F238E27FC236}">
+                  <a16:creationId xmlns:a16="http://schemas.microsoft.com/office/drawing/2014/main" id="{0860DC1A-21C9-4D38-88FC-FD4DAE9358D4}"/>
+                </a:ext>
+              </a:extLst>
+            </p:cNvPr>
+            <p:cNvCxnSpPr/>
+            <p:nvPr/>
+          </p:nvCxnSpPr>
+          <p:spPr>
+            <a:xfrm flipH="1">
+              <a:off x="8393992" y="3548568"/>
+              <a:ext cx="922287" cy="0"/>
+            </a:xfrm>
+            <a:prstGeom prst="line">
+              <a:avLst/>
+            </a:prstGeom>
+            <a:ln w="38100">
+              <a:solidFill>
+                <a:schemeClr val="tx1"/>
+              </a:solidFill>
+            </a:ln>
+          </p:spPr>
+          <p:style>
+            <a:lnRef idx="1">
+              <a:schemeClr val="accent1"/>
+            </a:lnRef>
+            <a:fillRef idx="0">
+              <a:schemeClr val="accent1"/>
+            </a:fillRef>
+            <a:effectRef idx="0">
+              <a:schemeClr val="accent1"/>
+            </a:effectRef>
+            <a:fontRef idx="minor">
+              <a:schemeClr val="tx1"/>
+            </a:fontRef>
+          </p:style>
+        </p:cxnSp>
+        <p:cxnSp>
+          <p:nvCxnSpPr>
+            <p:cNvPr id="47" name="Straight Connector 46">
+              <a:extLst>
+                <a:ext uri="{FF2B5EF4-FFF2-40B4-BE49-F238E27FC236}">
+                  <a16:creationId xmlns:a16="http://schemas.microsoft.com/office/drawing/2014/main" id="{ECA3E01D-2BD3-4D6D-966C-0488668C9D39}"/>
+                </a:ext>
+              </a:extLst>
+            </p:cNvPr>
+            <p:cNvCxnSpPr>
+              <a:cxnSpLocks/>
+            </p:cNvCxnSpPr>
+            <p:nvPr/>
+          </p:nvCxnSpPr>
+          <p:spPr>
+            <a:xfrm>
+              <a:off x="3969980" y="4691270"/>
+              <a:ext cx="5346299" cy="0"/>
+            </a:xfrm>
+            <a:prstGeom prst="line">
+              <a:avLst/>
+            </a:prstGeom>
+            <a:ln w="38100">
+              <a:solidFill>
+                <a:schemeClr val="tx1"/>
+              </a:solidFill>
+            </a:ln>
+          </p:spPr>
+          <p:style>
+            <a:lnRef idx="1">
+              <a:schemeClr val="accent1"/>
+            </a:lnRef>
+            <a:fillRef idx="0">
+              <a:schemeClr val="accent1"/>
+            </a:fillRef>
+            <a:effectRef idx="0">
+              <a:schemeClr val="accent1"/>
+            </a:effectRef>
+            <a:fontRef idx="minor">
+              <a:schemeClr val="tx1"/>
+            </a:fontRef>
+          </p:style>
+        </p:cxnSp>
+        <p:cxnSp>
+          <p:nvCxnSpPr>
+            <p:cNvPr id="50" name="Straight Connector 49">
+              <a:extLst>
+                <a:ext uri="{FF2B5EF4-FFF2-40B4-BE49-F238E27FC236}">
+                  <a16:creationId xmlns:a16="http://schemas.microsoft.com/office/drawing/2014/main" id="{E1D87BEC-48FB-4599-85F8-4014752CC3F0}"/>
+                </a:ext>
+              </a:extLst>
+            </p:cNvPr>
+            <p:cNvCxnSpPr/>
+            <p:nvPr/>
+          </p:nvCxnSpPr>
+          <p:spPr>
+            <a:xfrm flipV="1">
+              <a:off x="9321090" y="3766097"/>
+              <a:ext cx="0" cy="925173"/>
+            </a:xfrm>
+            <a:prstGeom prst="line">
+              <a:avLst/>
+            </a:prstGeom>
+            <a:ln w="38100">
+              <a:solidFill>
+                <a:schemeClr val="tx1"/>
+              </a:solidFill>
+            </a:ln>
+          </p:spPr>
+          <p:style>
+            <a:lnRef idx="1">
+              <a:schemeClr val="accent1"/>
+            </a:lnRef>
+            <a:fillRef idx="0">
+              <a:schemeClr val="accent1"/>
+            </a:fillRef>
+            <a:effectRef idx="0">
+              <a:schemeClr val="accent1"/>
+            </a:effectRef>
+            <a:fontRef idx="minor">
+              <a:schemeClr val="tx1"/>
+            </a:fontRef>
+          </p:style>
+        </p:cxnSp>
+        <p:cxnSp>
+          <p:nvCxnSpPr>
+            <p:cNvPr id="54" name="Straight Connector 53">
+              <a:extLst>
+                <a:ext uri="{FF2B5EF4-FFF2-40B4-BE49-F238E27FC236}">
+                  <a16:creationId xmlns:a16="http://schemas.microsoft.com/office/drawing/2014/main" id="{2097F77C-B8C7-485C-AA47-BF8AC3DE7CBE}"/>
+                </a:ext>
+              </a:extLst>
+            </p:cNvPr>
+            <p:cNvCxnSpPr>
+              <a:cxnSpLocks/>
+              <a:stCxn id="28" idx="1"/>
+            </p:cNvCxnSpPr>
+            <p:nvPr/>
+          </p:nvCxnSpPr>
+          <p:spPr>
+            <a:xfrm flipH="1" flipV="1">
+              <a:off x="3963522" y="2179161"/>
+              <a:ext cx="2132478" cy="1"/>
+            </a:xfrm>
+            <a:prstGeom prst="line">
+              <a:avLst/>
+            </a:prstGeom>
+            <a:ln w="38100">
+              <a:solidFill>
+                <a:schemeClr val="tx1"/>
+              </a:solidFill>
+            </a:ln>
+          </p:spPr>
+          <p:style>
+            <a:lnRef idx="1">
+              <a:schemeClr val="accent1"/>
+            </a:lnRef>
+            <a:fillRef idx="0">
+              <a:schemeClr val="accent1"/>
+            </a:fillRef>
+            <a:effectRef idx="0">
+              <a:schemeClr val="accent1"/>
             </a:effectRef>
             <a:fontRef idx="minor">
               <a:schemeClr val="tx1"/>
@@ -7581,785 +8381,6 @@
           </p:style>
         </p:cxnSp>
       </p:grpSp>
-      <p:sp>
-        <p:nvSpPr>
-          <p:cNvPr id="25" name="Rectangle 24">
-            <a:extLst>
-              <a:ext uri="{FF2B5EF4-FFF2-40B4-BE49-F238E27FC236}">
-                <a16:creationId xmlns:a16="http://schemas.microsoft.com/office/drawing/2014/main" id="{E252D558-31A8-4C8A-B437-96C371EDAD3F}"/>
-              </a:ext>
-            </a:extLst>
-          </p:cNvPr>
-          <p:cNvSpPr/>
-          <p:nvPr/>
-        </p:nvSpPr>
-        <p:spPr>
-          <a:xfrm>
-            <a:off x="7161539" y="3300417"/>
-            <a:ext cx="1232453" cy="914400"/>
-          </a:xfrm>
-          <a:prstGeom prst="rect">
-            <a:avLst/>
-          </a:prstGeom>
-          <a:ln w="28575"/>
-        </p:spPr>
-        <p:style>
-          <a:lnRef idx="2">
-            <a:schemeClr val="dk1"/>
-          </a:lnRef>
-          <a:fillRef idx="1">
-            <a:schemeClr val="lt1"/>
-          </a:fillRef>
-          <a:effectRef idx="0">
-            <a:schemeClr val="dk1"/>
-          </a:effectRef>
-          <a:fontRef idx="minor">
-            <a:schemeClr val="dk1"/>
-          </a:fontRef>
-        </p:style>
-        <p:txBody>
-          <a:bodyPr rtlCol="0" anchor="ctr"/>
-          <a:lstStyle/>
-          <a:p>
-            <a:pPr algn="ctr"/>
-            <a:r>
-              <a:rPr lang="en-GB" dirty="0"/>
-              <a:t>Plant</a:t>
-            </a:r>
-          </a:p>
-        </p:txBody>
-      </p:sp>
-      <mc:AlternateContent xmlns:mc="http://schemas.openxmlformats.org/markup-compatibility/2006" xmlns:a14="http://schemas.microsoft.com/office/drawing/2010/main">
-        <mc:Choice Requires="a14">
-          <p:sp>
-            <p:nvSpPr>
-              <p:cNvPr id="28" name="Rectangle 27">
-                <a:extLst>
-                  <a:ext uri="{FF2B5EF4-FFF2-40B4-BE49-F238E27FC236}">
-                    <a16:creationId xmlns:a16="http://schemas.microsoft.com/office/drawing/2014/main" id="{769F75B1-58AB-43B4-8C02-C96C12F4877E}"/>
-                  </a:ext>
-                </a:extLst>
-              </p:cNvPr>
-              <p:cNvSpPr/>
-              <p:nvPr/>
-            </p:nvSpPr>
-            <p:spPr>
-              <a:xfrm>
-                <a:off x="6096000" y="1721962"/>
-                <a:ext cx="1776779" cy="914400"/>
-              </a:xfrm>
-              <a:prstGeom prst="rect">
-                <a:avLst/>
-              </a:prstGeom>
-              <a:ln w="28575">
-                <a:solidFill>
-                  <a:schemeClr val="tx1"/>
-                </a:solidFill>
-              </a:ln>
-            </p:spPr>
-            <p:style>
-              <a:lnRef idx="2">
-                <a:schemeClr val="dk1"/>
-              </a:lnRef>
-              <a:fillRef idx="1">
-                <a:schemeClr val="lt1"/>
-              </a:fillRef>
-              <a:effectRef idx="0">
-                <a:schemeClr val="dk1"/>
-              </a:effectRef>
-              <a:fontRef idx="minor">
-                <a:schemeClr val="dk1"/>
-              </a:fontRef>
-            </p:style>
-            <p:txBody>
-              <a:bodyPr rtlCol="0" anchor="ctr"/>
-              <a:lstStyle/>
-              <a:p>
-                <a:pPr algn="ctr"/>
-                <a14:m>
-                  <m:oMathPara xmlns:m="http://schemas.openxmlformats.org/officeDocument/2006/math">
-                    <m:oMathParaPr>
-                      <m:jc m:val="centerGroup"/>
-                    </m:oMathParaPr>
-                    <m:oMath xmlns:m="http://schemas.openxmlformats.org/officeDocument/2006/math">
-                      <m:sSup>
-                        <m:sSupPr>
-                          <m:ctrlPr>
-                            <a:rPr lang="en-GB" i="1" dirty="0">
-                              <a:latin typeface="Cambria Math" panose="02040503050406030204" pitchFamily="18" charset="0"/>
-                            </a:rPr>
-                          </m:ctrlPr>
-                        </m:sSupPr>
-                        <m:e>
-                          <m:r>
-                            <a:rPr lang="en-GB" i="1" dirty="0">
-                              <a:latin typeface="Cambria Math" panose="02040503050406030204" pitchFamily="18" charset="0"/>
-                            </a:rPr>
-                            <m:t>𝑚𝑠</m:t>
-                          </m:r>
-                        </m:e>
-                        <m:sup>
-                          <m:r>
-                            <a:rPr lang="en-GB" i="1" dirty="0">
-                              <a:latin typeface="Cambria Math" panose="02040503050406030204" pitchFamily="18" charset="0"/>
-                            </a:rPr>
-                            <m:t>2</m:t>
-                          </m:r>
-                        </m:sup>
-                      </m:sSup>
-                      <m:r>
-                        <a:rPr lang="en-GB" i="1" dirty="0">
-                          <a:latin typeface="Cambria Math" panose="02040503050406030204" pitchFamily="18" charset="0"/>
-                        </a:rPr>
-                        <m:t>+</m:t>
-                      </m:r>
-                      <m:r>
-                        <a:rPr lang="en-GB" i="1" dirty="0">
-                          <a:latin typeface="Cambria Math" panose="02040503050406030204" pitchFamily="18" charset="0"/>
-                        </a:rPr>
-                        <m:t>𝑐𝑠</m:t>
-                      </m:r>
-                      <m:r>
-                        <a:rPr lang="en-GB" i="1" dirty="0">
-                          <a:latin typeface="Cambria Math" panose="02040503050406030204" pitchFamily="18" charset="0"/>
-                        </a:rPr>
-                        <m:t>+</m:t>
-                      </m:r>
-                      <m:r>
-                        <m:rPr>
-                          <m:sty m:val="p"/>
-                        </m:rPr>
-                        <a:rPr lang="en-GB" dirty="0">
-                          <a:latin typeface="Cambria Math" panose="02040503050406030204" pitchFamily="18" charset="0"/>
-                        </a:rPr>
-                        <m:t>k</m:t>
-                      </m:r>
-                    </m:oMath>
-                  </m:oMathPara>
-                </a14:m>
-                <a:endParaRPr lang="en-GB" dirty="0"/>
-              </a:p>
-            </p:txBody>
-          </p:sp>
-        </mc:Choice>
-        <mc:Fallback xmlns="">
-          <p:sp>
-            <p:nvSpPr>
-              <p:cNvPr id="28" name="Rectangle 27">
-                <a:extLst>
-                  <a:ext uri="{FF2B5EF4-FFF2-40B4-BE49-F238E27FC236}">
-                    <a16:creationId xmlns:a16="http://schemas.microsoft.com/office/drawing/2014/main" id="{769F75B1-58AB-43B4-8C02-C96C12F4877E}"/>
-                  </a:ext>
-                </a:extLst>
-              </p:cNvPr>
-              <p:cNvSpPr>
-                <a:spLocks noRot="1" noChangeAspect="1" noMove="1" noResize="1" noEditPoints="1" noAdjustHandles="1" noChangeArrowheads="1" noChangeShapeType="1" noTextEdit="1"/>
-              </p:cNvSpPr>
-              <p:nvPr/>
-            </p:nvSpPr>
-            <p:spPr>
-              <a:xfrm>
-                <a:off x="6096000" y="1721962"/>
-                <a:ext cx="1776779" cy="914400"/>
-              </a:xfrm>
-              <a:prstGeom prst="rect">
-                <a:avLst/>
-              </a:prstGeom>
-              <a:blipFill>
-                <a:blip r:embed="rId2"/>
-                <a:stretch>
-                  <a:fillRect/>
-                </a:stretch>
-              </a:blipFill>
-              <a:ln w="28575">
-                <a:solidFill>
-                  <a:schemeClr val="tx1"/>
-                </a:solidFill>
-              </a:ln>
-            </p:spPr>
-            <p:txBody>
-              <a:bodyPr/>
-              <a:lstStyle/>
-              <a:p>
-                <a:r>
-                  <a:rPr lang="en-GB">
-                    <a:noFill/>
-                  </a:rPr>
-                  <a:t> </a:t>
-                </a:r>
-              </a:p>
-            </p:txBody>
-          </p:sp>
-        </mc:Fallback>
-      </mc:AlternateContent>
-      <p:cxnSp>
-        <p:nvCxnSpPr>
-          <p:cNvPr id="30" name="Straight Arrow Connector 29">
-            <a:extLst>
-              <a:ext uri="{FF2B5EF4-FFF2-40B4-BE49-F238E27FC236}">
-                <a16:creationId xmlns:a16="http://schemas.microsoft.com/office/drawing/2014/main" id="{7311DE7D-687D-481A-BDA5-5BF4E82D1A09}"/>
-              </a:ext>
-            </a:extLst>
-          </p:cNvPr>
-          <p:cNvCxnSpPr>
-            <a:cxnSpLocks/>
-            <a:endCxn id="28" idx="3"/>
-          </p:cNvCxnSpPr>
-          <p:nvPr/>
-        </p:nvCxnSpPr>
-        <p:spPr>
-          <a:xfrm flipH="1">
-            <a:off x="7872779" y="2179162"/>
-            <a:ext cx="1443500" cy="0"/>
-          </a:xfrm>
-          <a:prstGeom prst="straightConnector1">
-            <a:avLst/>
-          </a:prstGeom>
-          <a:ln w="38100">
-            <a:solidFill>
-              <a:schemeClr val="tx1"/>
-            </a:solidFill>
-            <a:tailEnd type="triangle"/>
-          </a:ln>
-        </p:spPr>
-        <p:style>
-          <a:lnRef idx="1">
-            <a:schemeClr val="accent1"/>
-          </a:lnRef>
-          <a:fillRef idx="0">
-            <a:schemeClr val="accent1"/>
-          </a:fillRef>
-          <a:effectRef idx="0">
-            <a:schemeClr val="accent1"/>
-          </a:effectRef>
-          <a:fontRef idx="minor">
-            <a:schemeClr val="tx1"/>
-          </a:fontRef>
-        </p:style>
-      </p:cxnSp>
-      <p:sp>
-        <p:nvSpPr>
-          <p:cNvPr id="32" name="TextBox 31">
-            <a:extLst>
-              <a:ext uri="{FF2B5EF4-FFF2-40B4-BE49-F238E27FC236}">
-                <a16:creationId xmlns:a16="http://schemas.microsoft.com/office/drawing/2014/main" id="{DDD782F4-8EBC-457E-8BC0-9721A1892FCF}"/>
-              </a:ext>
-            </a:extLst>
-          </p:cNvPr>
-          <p:cNvSpPr txBox="1"/>
-          <p:nvPr/>
-        </p:nvSpPr>
-        <p:spPr>
-          <a:xfrm>
-            <a:off x="9281334" y="2686744"/>
-            <a:ext cx="492379" cy="369332"/>
-          </a:xfrm>
-          <a:prstGeom prst="rect">
-            <a:avLst/>
-          </a:prstGeom>
-          <a:noFill/>
-          <a:ln>
-            <a:noFill/>
-          </a:ln>
-        </p:spPr>
-        <p:txBody>
-          <a:bodyPr wrap="none" rtlCol="0">
-            <a:spAutoFit/>
-          </a:bodyPr>
-          <a:lstStyle/>
-          <a:p>
-            <a:r>
-              <a:rPr lang="en-GB" dirty="0"/>
-              <a:t>P</a:t>
-            </a:r>
-            <a:r>
-              <a:rPr lang="en-GB" baseline="-25000" dirty="0"/>
-              <a:t>ext</a:t>
-            </a:r>
-          </a:p>
-        </p:txBody>
-      </p:sp>
-      <p:cxnSp>
-        <p:nvCxnSpPr>
-          <p:cNvPr id="38" name="Straight Arrow Connector 37">
-            <a:extLst>
-              <a:ext uri="{FF2B5EF4-FFF2-40B4-BE49-F238E27FC236}">
-                <a16:creationId xmlns:a16="http://schemas.microsoft.com/office/drawing/2014/main" id="{42951A53-C17F-40A7-AEB2-E771101FBD44}"/>
-              </a:ext>
-            </a:extLst>
-          </p:cNvPr>
-          <p:cNvCxnSpPr>
-            <a:cxnSpLocks/>
-          </p:cNvCxnSpPr>
-          <p:nvPr/>
-        </p:nvCxnSpPr>
-        <p:spPr>
-          <a:xfrm>
-            <a:off x="3963523" y="2179161"/>
-            <a:ext cx="5835" cy="1278504"/>
-          </a:xfrm>
-          <a:prstGeom prst="straightConnector1">
-            <a:avLst/>
-          </a:prstGeom>
-          <a:ln w="38100">
-            <a:solidFill>
-              <a:schemeClr val="tx1"/>
-            </a:solidFill>
-            <a:tailEnd type="triangle"/>
-          </a:ln>
-        </p:spPr>
-        <p:style>
-          <a:lnRef idx="1">
-            <a:schemeClr val="accent1"/>
-          </a:lnRef>
-          <a:fillRef idx="0">
-            <a:schemeClr val="accent1"/>
-          </a:fillRef>
-          <a:effectRef idx="0">
-            <a:schemeClr val="accent1"/>
-          </a:effectRef>
-          <a:fontRef idx="minor">
-            <a:schemeClr val="tx1"/>
-          </a:fontRef>
-        </p:style>
-      </p:cxnSp>
-      <p:sp>
-        <p:nvSpPr>
-          <p:cNvPr id="43" name="TextBox 42">
-            <a:extLst>
-              <a:ext uri="{FF2B5EF4-FFF2-40B4-BE49-F238E27FC236}">
-                <a16:creationId xmlns:a16="http://schemas.microsoft.com/office/drawing/2014/main" id="{28CA8CA2-462B-4B62-96C3-62B5F3B58994}"/>
-              </a:ext>
-            </a:extLst>
-          </p:cNvPr>
-          <p:cNvSpPr txBox="1"/>
-          <p:nvPr/>
-        </p:nvSpPr>
-        <p:spPr>
-          <a:xfrm>
-            <a:off x="6103320" y="1385206"/>
-            <a:ext cx="1730667" cy="369332"/>
-          </a:xfrm>
-          <a:prstGeom prst="rect">
-            <a:avLst/>
-          </a:prstGeom>
-          <a:noFill/>
-        </p:spPr>
-        <p:txBody>
-          <a:bodyPr wrap="none" rtlCol="0">
-            <a:spAutoFit/>
-          </a:bodyPr>
-          <a:lstStyle/>
-          <a:p>
-            <a:r>
-              <a:rPr lang="en-GB" dirty="0"/>
-              <a:t>Impedance filter</a:t>
-            </a:r>
-          </a:p>
-        </p:txBody>
-      </p:sp>
-      <p:cxnSp>
-        <p:nvCxnSpPr>
-          <p:cNvPr id="45" name="Straight Arrow Connector 44">
-            <a:extLst>
-              <a:ext uri="{FF2B5EF4-FFF2-40B4-BE49-F238E27FC236}">
-                <a16:creationId xmlns:a16="http://schemas.microsoft.com/office/drawing/2014/main" id="{B89021DF-5DAD-4B21-9E98-3288E0EFE358}"/>
-              </a:ext>
-            </a:extLst>
-          </p:cNvPr>
-          <p:cNvCxnSpPr>
-            <a:stCxn id="25" idx="3"/>
-          </p:cNvCxnSpPr>
-          <p:nvPr/>
-        </p:nvCxnSpPr>
-        <p:spPr>
-          <a:xfrm>
-            <a:off x="8393992" y="3757617"/>
-            <a:ext cx="1247238" cy="0"/>
-          </a:xfrm>
-          <a:prstGeom prst="straightConnector1">
-            <a:avLst/>
-          </a:prstGeom>
-          <a:ln w="38100">
-            <a:solidFill>
-              <a:schemeClr val="tx1"/>
-            </a:solidFill>
-            <a:tailEnd type="triangle"/>
-          </a:ln>
-        </p:spPr>
-        <p:style>
-          <a:lnRef idx="1">
-            <a:schemeClr val="accent1"/>
-          </a:lnRef>
-          <a:fillRef idx="0">
-            <a:schemeClr val="accent1"/>
-          </a:fillRef>
-          <a:effectRef idx="0">
-            <a:schemeClr val="accent1"/>
-          </a:effectRef>
-          <a:fontRef idx="minor">
-            <a:schemeClr val="tx1"/>
-          </a:fontRef>
-        </p:style>
-      </p:cxnSp>
-      <p:sp>
-        <p:nvSpPr>
-          <p:cNvPr id="46" name="TextBox 45">
-            <a:extLst>
-              <a:ext uri="{FF2B5EF4-FFF2-40B4-BE49-F238E27FC236}">
-                <a16:creationId xmlns:a16="http://schemas.microsoft.com/office/drawing/2014/main" id="{C1077C81-17EC-471D-8EE6-004678B2073D}"/>
-              </a:ext>
-            </a:extLst>
-          </p:cNvPr>
-          <p:cNvSpPr txBox="1"/>
-          <p:nvPr/>
-        </p:nvSpPr>
-        <p:spPr>
-          <a:xfrm>
-            <a:off x="5974818" y="4752605"/>
-            <a:ext cx="1721690" cy="369332"/>
-          </a:xfrm>
-          <a:prstGeom prst="rect">
-            <a:avLst/>
-          </a:prstGeom>
-          <a:noFill/>
-        </p:spPr>
-        <p:txBody>
-          <a:bodyPr wrap="none" rtlCol="0">
-            <a:spAutoFit/>
-          </a:bodyPr>
-          <a:lstStyle/>
-          <a:p>
-            <a:r>
-              <a:rPr lang="en-GB" dirty="0"/>
-              <a:t>Actual Force (F</a:t>
-            </a:r>
-            <a:r>
-              <a:rPr lang="en-GB" baseline="-25000" dirty="0"/>
-              <a:t>A</a:t>
-            </a:r>
-            <a:r>
-              <a:rPr lang="en-GB" dirty="0"/>
-              <a:t>)</a:t>
-            </a:r>
-          </a:p>
-        </p:txBody>
-      </p:sp>
-      <p:cxnSp>
-        <p:nvCxnSpPr>
-          <p:cNvPr id="52" name="Straight Arrow Connector 51">
-            <a:extLst>
-              <a:ext uri="{FF2B5EF4-FFF2-40B4-BE49-F238E27FC236}">
-                <a16:creationId xmlns:a16="http://schemas.microsoft.com/office/drawing/2014/main" id="{429D0E40-6DE7-4726-A352-102088660B06}"/>
-              </a:ext>
-            </a:extLst>
-          </p:cNvPr>
-          <p:cNvCxnSpPr>
-            <a:cxnSpLocks/>
-            <a:endCxn id="6" idx="4"/>
-          </p:cNvCxnSpPr>
-          <p:nvPr/>
-        </p:nvCxnSpPr>
-        <p:spPr>
-          <a:xfrm flipV="1">
-            <a:off x="3968584" y="4057582"/>
-            <a:ext cx="1" cy="633688"/>
-          </a:xfrm>
-          <a:prstGeom prst="straightConnector1">
-            <a:avLst/>
-          </a:prstGeom>
-          <a:ln w="38100">
-            <a:solidFill>
-              <a:schemeClr val="tx1"/>
-            </a:solidFill>
-            <a:tailEnd type="triangle"/>
-          </a:ln>
-        </p:spPr>
-        <p:style>
-          <a:lnRef idx="1">
-            <a:schemeClr val="accent1"/>
-          </a:lnRef>
-          <a:fillRef idx="0">
-            <a:schemeClr val="accent1"/>
-          </a:fillRef>
-          <a:effectRef idx="0">
-            <a:schemeClr val="accent1"/>
-          </a:effectRef>
-          <a:fontRef idx="minor">
-            <a:schemeClr val="tx1"/>
-          </a:fontRef>
-        </p:style>
-      </p:cxnSp>
-      <p:sp>
-        <p:nvSpPr>
-          <p:cNvPr id="57" name="TextBox 56">
-            <a:extLst>
-              <a:ext uri="{FF2B5EF4-FFF2-40B4-BE49-F238E27FC236}">
-                <a16:creationId xmlns:a16="http://schemas.microsoft.com/office/drawing/2014/main" id="{9971061F-C17A-422C-A3DF-95B4AD6286BB}"/>
-              </a:ext>
-            </a:extLst>
-          </p:cNvPr>
-          <p:cNvSpPr txBox="1"/>
-          <p:nvPr/>
-        </p:nvSpPr>
-        <p:spPr>
-          <a:xfrm>
-            <a:off x="4392544" y="2832198"/>
-            <a:ext cx="981359" cy="923330"/>
-          </a:xfrm>
-          <a:prstGeom prst="rect">
-            <a:avLst/>
-          </a:prstGeom>
-          <a:noFill/>
-        </p:spPr>
-        <p:txBody>
-          <a:bodyPr wrap="none" rtlCol="0">
-            <a:spAutoFit/>
-          </a:bodyPr>
-          <a:lstStyle/>
-          <a:p>
-            <a:pPr algn="ctr"/>
-            <a:r>
-              <a:rPr lang="en-GB" dirty="0"/>
-              <a:t>Force</a:t>
-            </a:r>
-          </a:p>
-          <a:p>
-            <a:pPr algn="ctr"/>
-            <a:r>
-              <a:rPr lang="en-GB" dirty="0"/>
-              <a:t>Demand</a:t>
-            </a:r>
-          </a:p>
-          <a:p>
-            <a:pPr algn="ctr"/>
-            <a:r>
-              <a:rPr lang="en-GB" dirty="0"/>
-              <a:t>(F</a:t>
-            </a:r>
-            <a:r>
-              <a:rPr lang="en-GB" baseline="-25000" dirty="0"/>
-              <a:t>D</a:t>
-            </a:r>
-            <a:r>
-              <a:rPr lang="en-GB" dirty="0"/>
-              <a:t>)</a:t>
-            </a:r>
-          </a:p>
-        </p:txBody>
-      </p:sp>
-      <p:cxnSp>
-        <p:nvCxnSpPr>
-          <p:cNvPr id="36" name="Straight Connector 35">
-            <a:extLst>
-              <a:ext uri="{FF2B5EF4-FFF2-40B4-BE49-F238E27FC236}">
-                <a16:creationId xmlns:a16="http://schemas.microsoft.com/office/drawing/2014/main" id="{DBC7FE70-9F9B-4AA8-B566-51C3223ACB08}"/>
-              </a:ext>
-            </a:extLst>
-          </p:cNvPr>
-          <p:cNvCxnSpPr>
-            <a:cxnSpLocks/>
-          </p:cNvCxnSpPr>
-          <p:nvPr/>
-        </p:nvCxnSpPr>
-        <p:spPr>
-          <a:xfrm>
-            <a:off x="9316279" y="2179161"/>
-            <a:ext cx="0" cy="1369407"/>
-          </a:xfrm>
-          <a:prstGeom prst="line">
-            <a:avLst/>
-          </a:prstGeom>
-          <a:ln w="38100">
-            <a:solidFill>
-              <a:schemeClr val="tx1"/>
-            </a:solidFill>
-          </a:ln>
-        </p:spPr>
-        <p:style>
-          <a:lnRef idx="1">
-            <a:schemeClr val="accent1"/>
-          </a:lnRef>
-          <a:fillRef idx="0">
-            <a:schemeClr val="accent1"/>
-          </a:fillRef>
-          <a:effectRef idx="0">
-            <a:schemeClr val="accent1"/>
-          </a:effectRef>
-          <a:fontRef idx="minor">
-            <a:schemeClr val="tx1"/>
-          </a:fontRef>
-        </p:style>
-      </p:cxnSp>
-      <p:cxnSp>
-        <p:nvCxnSpPr>
-          <p:cNvPr id="40" name="Straight Connector 39">
-            <a:extLst>
-              <a:ext uri="{FF2B5EF4-FFF2-40B4-BE49-F238E27FC236}">
-                <a16:creationId xmlns:a16="http://schemas.microsoft.com/office/drawing/2014/main" id="{0860DC1A-21C9-4D38-88FC-FD4DAE9358D4}"/>
-              </a:ext>
-            </a:extLst>
-          </p:cNvPr>
-          <p:cNvCxnSpPr/>
-          <p:nvPr/>
-        </p:nvCxnSpPr>
-        <p:spPr>
-          <a:xfrm flipH="1">
-            <a:off x="8393992" y="3548568"/>
-            <a:ext cx="922287" cy="0"/>
-          </a:xfrm>
-          <a:prstGeom prst="line">
-            <a:avLst/>
-          </a:prstGeom>
-          <a:ln w="38100">
-            <a:solidFill>
-              <a:schemeClr val="tx1"/>
-            </a:solidFill>
-          </a:ln>
-        </p:spPr>
-        <p:style>
-          <a:lnRef idx="1">
-            <a:schemeClr val="accent1"/>
-          </a:lnRef>
-          <a:fillRef idx="0">
-            <a:schemeClr val="accent1"/>
-          </a:fillRef>
-          <a:effectRef idx="0">
-            <a:schemeClr val="accent1"/>
-          </a:effectRef>
-          <a:fontRef idx="minor">
-            <a:schemeClr val="tx1"/>
-          </a:fontRef>
-        </p:style>
-      </p:cxnSp>
-      <p:cxnSp>
-        <p:nvCxnSpPr>
-          <p:cNvPr id="47" name="Straight Connector 46">
-            <a:extLst>
-              <a:ext uri="{FF2B5EF4-FFF2-40B4-BE49-F238E27FC236}">
-                <a16:creationId xmlns:a16="http://schemas.microsoft.com/office/drawing/2014/main" id="{ECA3E01D-2BD3-4D6D-966C-0488668C9D39}"/>
-              </a:ext>
-            </a:extLst>
-          </p:cNvPr>
-          <p:cNvCxnSpPr>
-            <a:cxnSpLocks/>
-          </p:cNvCxnSpPr>
-          <p:nvPr/>
-        </p:nvCxnSpPr>
-        <p:spPr>
-          <a:xfrm>
-            <a:off x="3969980" y="4691270"/>
-            <a:ext cx="5346299" cy="0"/>
-          </a:xfrm>
-          <a:prstGeom prst="line">
-            <a:avLst/>
-          </a:prstGeom>
-          <a:ln w="38100">
-            <a:solidFill>
-              <a:schemeClr val="tx1"/>
-            </a:solidFill>
-          </a:ln>
-        </p:spPr>
-        <p:style>
-          <a:lnRef idx="1">
-            <a:schemeClr val="accent1"/>
-          </a:lnRef>
-          <a:fillRef idx="0">
-            <a:schemeClr val="accent1"/>
-          </a:fillRef>
-          <a:effectRef idx="0">
-            <a:schemeClr val="accent1"/>
-          </a:effectRef>
-          <a:fontRef idx="minor">
-            <a:schemeClr val="tx1"/>
-          </a:fontRef>
-        </p:style>
-      </p:cxnSp>
-      <p:cxnSp>
-        <p:nvCxnSpPr>
-          <p:cNvPr id="50" name="Straight Connector 49">
-            <a:extLst>
-              <a:ext uri="{FF2B5EF4-FFF2-40B4-BE49-F238E27FC236}">
-                <a16:creationId xmlns:a16="http://schemas.microsoft.com/office/drawing/2014/main" id="{E1D87BEC-48FB-4599-85F8-4014752CC3F0}"/>
-              </a:ext>
-            </a:extLst>
-          </p:cNvPr>
-          <p:cNvCxnSpPr/>
-          <p:nvPr/>
-        </p:nvCxnSpPr>
-        <p:spPr>
-          <a:xfrm flipV="1">
-            <a:off x="9321090" y="3766097"/>
-            <a:ext cx="0" cy="925173"/>
-          </a:xfrm>
-          <a:prstGeom prst="line">
-            <a:avLst/>
-          </a:prstGeom>
-          <a:ln w="38100">
-            <a:solidFill>
-              <a:schemeClr val="tx1"/>
-            </a:solidFill>
-          </a:ln>
-        </p:spPr>
-        <p:style>
-          <a:lnRef idx="1">
-            <a:schemeClr val="accent1"/>
-          </a:lnRef>
-          <a:fillRef idx="0">
-            <a:schemeClr val="accent1"/>
-          </a:fillRef>
-          <a:effectRef idx="0">
-            <a:schemeClr val="accent1"/>
-          </a:effectRef>
-          <a:fontRef idx="minor">
-            <a:schemeClr val="tx1"/>
-          </a:fontRef>
-        </p:style>
-      </p:cxnSp>
-      <p:cxnSp>
-        <p:nvCxnSpPr>
-          <p:cNvPr id="54" name="Straight Connector 53">
-            <a:extLst>
-              <a:ext uri="{FF2B5EF4-FFF2-40B4-BE49-F238E27FC236}">
-                <a16:creationId xmlns:a16="http://schemas.microsoft.com/office/drawing/2014/main" id="{2097F77C-B8C7-485C-AA47-BF8AC3DE7CBE}"/>
-              </a:ext>
-            </a:extLst>
-          </p:cNvPr>
-          <p:cNvCxnSpPr>
-            <a:cxnSpLocks/>
-            <a:stCxn id="28" idx="1"/>
-          </p:cNvCxnSpPr>
-          <p:nvPr/>
-        </p:nvCxnSpPr>
-        <p:spPr>
-          <a:xfrm flipH="1" flipV="1">
-            <a:off x="3963522" y="2179161"/>
-            <a:ext cx="2132478" cy="1"/>
-          </a:xfrm>
-          <a:prstGeom prst="line">
-            <a:avLst/>
-          </a:prstGeom>
-          <a:ln w="38100">
-            <a:solidFill>
-              <a:schemeClr val="tx1"/>
-            </a:solidFill>
-          </a:ln>
-        </p:spPr>
-        <p:style>
-          <a:lnRef idx="1">
-            <a:schemeClr val="accent1"/>
-          </a:lnRef>
-          <a:fillRef idx="0">
-            <a:schemeClr val="accent1"/>
-          </a:fillRef>
-          <a:effectRef idx="0">
-            <a:schemeClr val="accent1"/>
-          </a:effectRef>
-          <a:fontRef idx="minor">
-            <a:schemeClr val="tx1"/>
-          </a:fontRef>
-        </p:style>
-      </p:cxnSp>
     </p:spTree>
     <p:extLst>
       <p:ext uri="{BB962C8B-B14F-4D97-AF65-F5344CB8AC3E}">

</xml_diff>